<commit_message>
architecture and first use cases
</commit_message>
<xml_diff>
--- a/text/images/illustrations.pptx
+++ b/text/images/illustrations.pptx
@@ -4,9 +4,14 @@
   <p:sldMasterIdLst>
     <p:sldMasterId id="2147483648" r:id="rId1"/>
   </p:sldMasterIdLst>
+  <p:notesMasterIdLst>
+    <p:notesMasterId r:id="rId6"/>
+  </p:notesMasterIdLst>
   <p:sldIdLst>
     <p:sldId id="256" r:id="rId2"/>
     <p:sldId id="257" r:id="rId3"/>
+    <p:sldId id="259" r:id="rId4"/>
+    <p:sldId id="258" r:id="rId5"/>
   </p:sldIdLst>
   <p:sldSz cx="9144000" cy="6858000" type="screen4x3"/>
   <p:notesSz cx="6858000" cy="9144000"/>
@@ -108,6 +113,440 @@
 </p:presentation>
 </file>
 
+<file path=ppt/notesMasters/notesMaster1.xml><?xml version="1.0" encoding="utf-8"?>
+<p:notesMaster xmlns:a="http://schemas.openxmlformats.org/drawingml/2006/main" xmlns:r="http://schemas.openxmlformats.org/officeDocument/2006/relationships" xmlns:p="http://schemas.openxmlformats.org/presentationml/2006/main">
+  <p:cSld>
+    <p:bg>
+      <p:bgRef idx="1001">
+        <a:schemeClr val="bg1"/>
+      </p:bgRef>
+    </p:bg>
+    <p:spTree>
+      <p:nvGrpSpPr>
+        <p:cNvPr id="1" name=""/>
+        <p:cNvGrpSpPr/>
+        <p:nvPr/>
+      </p:nvGrpSpPr>
+      <p:grpSpPr>
+        <a:xfrm>
+          <a:off x="0" y="0"/>
+          <a:ext cx="0" cy="0"/>
+          <a:chOff x="0" y="0"/>
+          <a:chExt cx="0" cy="0"/>
+        </a:xfrm>
+      </p:grpSpPr>
+      <p:sp>
+        <p:nvSpPr>
+          <p:cNvPr id="2" name="Kopfzeilenplatzhalter 1"/>
+          <p:cNvSpPr>
+            <a:spLocks noGrp="1"/>
+          </p:cNvSpPr>
+          <p:nvPr>
+            <p:ph type="hdr" sz="quarter"/>
+          </p:nvPr>
+        </p:nvSpPr>
+        <p:spPr>
+          <a:xfrm>
+            <a:off x="0" y="0"/>
+            <a:ext cx="2971800" cy="457200"/>
+          </a:xfrm>
+          <a:prstGeom prst="rect">
+            <a:avLst/>
+          </a:prstGeom>
+        </p:spPr>
+        <p:txBody>
+          <a:bodyPr vert="horz" lIns="91440" tIns="45720" rIns="91440" bIns="45720" rtlCol="0"/>
+          <a:lstStyle>
+            <a:lvl1pPr algn="l">
+              <a:defRPr sz="1200"/>
+            </a:lvl1pPr>
+          </a:lstStyle>
+          <a:p>
+            <a:endParaRPr lang="de-DE"/>
+          </a:p>
+        </p:txBody>
+      </p:sp>
+      <p:sp>
+        <p:nvSpPr>
+          <p:cNvPr id="3" name="Datumsplatzhalter 2"/>
+          <p:cNvSpPr>
+            <a:spLocks noGrp="1"/>
+          </p:cNvSpPr>
+          <p:nvPr>
+            <p:ph type="dt" idx="1"/>
+          </p:nvPr>
+        </p:nvSpPr>
+        <p:spPr>
+          <a:xfrm>
+            <a:off x="3884613" y="0"/>
+            <a:ext cx="2971800" cy="457200"/>
+          </a:xfrm>
+          <a:prstGeom prst="rect">
+            <a:avLst/>
+          </a:prstGeom>
+        </p:spPr>
+        <p:txBody>
+          <a:bodyPr vert="horz" lIns="91440" tIns="45720" rIns="91440" bIns="45720" rtlCol="0"/>
+          <a:lstStyle>
+            <a:lvl1pPr algn="r">
+              <a:defRPr sz="1200"/>
+            </a:lvl1pPr>
+          </a:lstStyle>
+          <a:p>
+            <a:fld id="{7C9ABC5C-FC58-4AE2-89F8-727F30362B08}" type="datetimeFigureOut">
+              <a:rPr lang="de-DE" smtClean="0"/>
+              <a:t>27.03.2012</a:t>
+            </a:fld>
+            <a:endParaRPr lang="de-DE"/>
+          </a:p>
+        </p:txBody>
+      </p:sp>
+      <p:sp>
+        <p:nvSpPr>
+          <p:cNvPr id="4" name="Folienbildplatzhalter 3"/>
+          <p:cNvSpPr>
+            <a:spLocks noGrp="1" noRot="1" noChangeAspect="1"/>
+          </p:cNvSpPr>
+          <p:nvPr>
+            <p:ph type="sldImg" idx="2"/>
+          </p:nvPr>
+        </p:nvSpPr>
+        <p:spPr>
+          <a:xfrm>
+            <a:off x="1143000" y="685800"/>
+            <a:ext cx="4572000" cy="3429000"/>
+          </a:xfrm>
+          <a:prstGeom prst="rect">
+            <a:avLst/>
+          </a:prstGeom>
+          <a:noFill/>
+          <a:ln w="12700">
+            <a:solidFill>
+              <a:prstClr val="black"/>
+            </a:solidFill>
+          </a:ln>
+        </p:spPr>
+        <p:txBody>
+          <a:bodyPr vert="horz" lIns="91440" tIns="45720" rIns="91440" bIns="45720" rtlCol="0" anchor="ctr"/>
+          <a:lstStyle/>
+          <a:p>
+            <a:endParaRPr lang="de-DE"/>
+          </a:p>
+        </p:txBody>
+      </p:sp>
+      <p:sp>
+        <p:nvSpPr>
+          <p:cNvPr id="5" name="Notizenplatzhalter 4"/>
+          <p:cNvSpPr>
+            <a:spLocks noGrp="1"/>
+          </p:cNvSpPr>
+          <p:nvPr>
+            <p:ph type="body" sz="quarter" idx="3"/>
+          </p:nvPr>
+        </p:nvSpPr>
+        <p:spPr>
+          <a:xfrm>
+            <a:off x="685800" y="4343400"/>
+            <a:ext cx="5486400" cy="4114800"/>
+          </a:xfrm>
+          <a:prstGeom prst="rect">
+            <a:avLst/>
+          </a:prstGeom>
+        </p:spPr>
+        <p:txBody>
+          <a:bodyPr vert="horz" lIns="91440" tIns="45720" rIns="91440" bIns="45720" rtlCol="0"/>
+          <a:lstStyle/>
+          <a:p>
+            <a:pPr lvl="0"/>
+            <a:r>
+              <a:rPr lang="de-DE" smtClean="0"/>
+              <a:t>Textmasterformat bearbeiten</a:t>
+            </a:r>
+          </a:p>
+          <a:p>
+            <a:pPr lvl="1"/>
+            <a:r>
+              <a:rPr lang="de-DE" smtClean="0"/>
+              <a:t>Zweite Ebene</a:t>
+            </a:r>
+          </a:p>
+          <a:p>
+            <a:pPr lvl="2"/>
+            <a:r>
+              <a:rPr lang="de-DE" smtClean="0"/>
+              <a:t>Dritte Ebene</a:t>
+            </a:r>
+          </a:p>
+          <a:p>
+            <a:pPr lvl="3"/>
+            <a:r>
+              <a:rPr lang="de-DE" smtClean="0"/>
+              <a:t>Vierte Ebene</a:t>
+            </a:r>
+          </a:p>
+          <a:p>
+            <a:pPr lvl="4"/>
+            <a:r>
+              <a:rPr lang="de-DE" smtClean="0"/>
+              <a:t>Fünfte Ebene</a:t>
+            </a:r>
+            <a:endParaRPr lang="de-DE"/>
+          </a:p>
+        </p:txBody>
+      </p:sp>
+      <p:sp>
+        <p:nvSpPr>
+          <p:cNvPr id="6" name="Fußzeilenplatzhalter 5"/>
+          <p:cNvSpPr>
+            <a:spLocks noGrp="1"/>
+          </p:cNvSpPr>
+          <p:nvPr>
+            <p:ph type="ftr" sz="quarter" idx="4"/>
+          </p:nvPr>
+        </p:nvSpPr>
+        <p:spPr>
+          <a:xfrm>
+            <a:off x="0" y="8685213"/>
+            <a:ext cx="2971800" cy="457200"/>
+          </a:xfrm>
+          <a:prstGeom prst="rect">
+            <a:avLst/>
+          </a:prstGeom>
+        </p:spPr>
+        <p:txBody>
+          <a:bodyPr vert="horz" lIns="91440" tIns="45720" rIns="91440" bIns="45720" rtlCol="0" anchor="b"/>
+          <a:lstStyle>
+            <a:lvl1pPr algn="l">
+              <a:defRPr sz="1200"/>
+            </a:lvl1pPr>
+          </a:lstStyle>
+          <a:p>
+            <a:endParaRPr lang="de-DE"/>
+          </a:p>
+        </p:txBody>
+      </p:sp>
+      <p:sp>
+        <p:nvSpPr>
+          <p:cNvPr id="7" name="Foliennummernplatzhalter 6"/>
+          <p:cNvSpPr>
+            <a:spLocks noGrp="1"/>
+          </p:cNvSpPr>
+          <p:nvPr>
+            <p:ph type="sldNum" sz="quarter" idx="5"/>
+          </p:nvPr>
+        </p:nvSpPr>
+        <p:spPr>
+          <a:xfrm>
+            <a:off x="3884613" y="8685213"/>
+            <a:ext cx="2971800" cy="457200"/>
+          </a:xfrm>
+          <a:prstGeom prst="rect">
+            <a:avLst/>
+          </a:prstGeom>
+        </p:spPr>
+        <p:txBody>
+          <a:bodyPr vert="horz" lIns="91440" tIns="45720" rIns="91440" bIns="45720" rtlCol="0" anchor="b"/>
+          <a:lstStyle>
+            <a:lvl1pPr algn="r">
+              <a:defRPr sz="1200"/>
+            </a:lvl1pPr>
+          </a:lstStyle>
+          <a:p>
+            <a:fld id="{AAC1FA76-46A6-49F4-8E84-FEF8584513B4}" type="slidenum">
+              <a:rPr lang="de-DE" smtClean="0"/>
+              <a:t>‹Nr.›</a:t>
+            </a:fld>
+            <a:endParaRPr lang="de-DE"/>
+          </a:p>
+        </p:txBody>
+      </p:sp>
+    </p:spTree>
+    <p:extLst>
+      <p:ext uri="{BB962C8B-B14F-4D97-AF65-F5344CB8AC3E}">
+        <p14:creationId xmlns:p14="http://schemas.microsoft.com/office/powerpoint/2010/main" val="2459867004"/>
+      </p:ext>
+    </p:extLst>
+  </p:cSld>
+  <p:clrMap bg1="lt1" tx1="dk1" bg2="lt2" tx2="dk2" accent1="accent1" accent2="accent2" accent3="accent3" accent4="accent4" accent5="accent5" accent6="accent6" hlink="hlink" folHlink="folHlink"/>
+  <p:notesStyle>
+    <a:lvl1pPr marL="0" algn="l" defTabSz="914400" rtl="0" eaLnBrk="1" latinLnBrk="0" hangingPunct="1">
+      <a:defRPr sz="1200" kern="1200">
+        <a:solidFill>
+          <a:schemeClr val="tx1"/>
+        </a:solidFill>
+        <a:latin typeface="+mn-lt"/>
+        <a:ea typeface="+mn-ea"/>
+        <a:cs typeface="+mn-cs"/>
+      </a:defRPr>
+    </a:lvl1pPr>
+    <a:lvl2pPr marL="457200" algn="l" defTabSz="914400" rtl="0" eaLnBrk="1" latinLnBrk="0" hangingPunct="1">
+      <a:defRPr sz="1200" kern="1200">
+        <a:solidFill>
+          <a:schemeClr val="tx1"/>
+        </a:solidFill>
+        <a:latin typeface="+mn-lt"/>
+        <a:ea typeface="+mn-ea"/>
+        <a:cs typeface="+mn-cs"/>
+      </a:defRPr>
+    </a:lvl2pPr>
+    <a:lvl3pPr marL="914400" algn="l" defTabSz="914400" rtl="0" eaLnBrk="1" latinLnBrk="0" hangingPunct="1">
+      <a:defRPr sz="1200" kern="1200">
+        <a:solidFill>
+          <a:schemeClr val="tx1"/>
+        </a:solidFill>
+        <a:latin typeface="+mn-lt"/>
+        <a:ea typeface="+mn-ea"/>
+        <a:cs typeface="+mn-cs"/>
+      </a:defRPr>
+    </a:lvl3pPr>
+    <a:lvl4pPr marL="1371600" algn="l" defTabSz="914400" rtl="0" eaLnBrk="1" latinLnBrk="0" hangingPunct="1">
+      <a:defRPr sz="1200" kern="1200">
+        <a:solidFill>
+          <a:schemeClr val="tx1"/>
+        </a:solidFill>
+        <a:latin typeface="+mn-lt"/>
+        <a:ea typeface="+mn-ea"/>
+        <a:cs typeface="+mn-cs"/>
+      </a:defRPr>
+    </a:lvl4pPr>
+    <a:lvl5pPr marL="1828800" algn="l" defTabSz="914400" rtl="0" eaLnBrk="1" latinLnBrk="0" hangingPunct="1">
+      <a:defRPr sz="1200" kern="1200">
+        <a:solidFill>
+          <a:schemeClr val="tx1"/>
+        </a:solidFill>
+        <a:latin typeface="+mn-lt"/>
+        <a:ea typeface="+mn-ea"/>
+        <a:cs typeface="+mn-cs"/>
+      </a:defRPr>
+    </a:lvl5pPr>
+    <a:lvl6pPr marL="2286000" algn="l" defTabSz="914400" rtl="0" eaLnBrk="1" latinLnBrk="0" hangingPunct="1">
+      <a:defRPr sz="1200" kern="1200">
+        <a:solidFill>
+          <a:schemeClr val="tx1"/>
+        </a:solidFill>
+        <a:latin typeface="+mn-lt"/>
+        <a:ea typeface="+mn-ea"/>
+        <a:cs typeface="+mn-cs"/>
+      </a:defRPr>
+    </a:lvl6pPr>
+    <a:lvl7pPr marL="2743200" algn="l" defTabSz="914400" rtl="0" eaLnBrk="1" latinLnBrk="0" hangingPunct="1">
+      <a:defRPr sz="1200" kern="1200">
+        <a:solidFill>
+          <a:schemeClr val="tx1"/>
+        </a:solidFill>
+        <a:latin typeface="+mn-lt"/>
+        <a:ea typeface="+mn-ea"/>
+        <a:cs typeface="+mn-cs"/>
+      </a:defRPr>
+    </a:lvl7pPr>
+    <a:lvl8pPr marL="3200400" algn="l" defTabSz="914400" rtl="0" eaLnBrk="1" latinLnBrk="0" hangingPunct="1">
+      <a:defRPr sz="1200" kern="1200">
+        <a:solidFill>
+          <a:schemeClr val="tx1"/>
+        </a:solidFill>
+        <a:latin typeface="+mn-lt"/>
+        <a:ea typeface="+mn-ea"/>
+        <a:cs typeface="+mn-cs"/>
+      </a:defRPr>
+    </a:lvl8pPr>
+    <a:lvl9pPr marL="3657600" algn="l" defTabSz="914400" rtl="0" eaLnBrk="1" latinLnBrk="0" hangingPunct="1">
+      <a:defRPr sz="1200" kern="1200">
+        <a:solidFill>
+          <a:schemeClr val="tx1"/>
+        </a:solidFill>
+        <a:latin typeface="+mn-lt"/>
+        <a:ea typeface="+mn-ea"/>
+        <a:cs typeface="+mn-cs"/>
+      </a:defRPr>
+    </a:lvl9pPr>
+  </p:notesStyle>
+</p:notesMaster>
+</file>
+
+<file path=ppt/notesSlides/notesSlide1.xml><?xml version="1.0" encoding="utf-8"?>
+<p:notes xmlns:a="http://schemas.openxmlformats.org/drawingml/2006/main" xmlns:r="http://schemas.openxmlformats.org/officeDocument/2006/relationships" xmlns:p="http://schemas.openxmlformats.org/presentationml/2006/main">
+  <p:cSld>
+    <p:spTree>
+      <p:nvGrpSpPr>
+        <p:cNvPr id="1" name=""/>
+        <p:cNvGrpSpPr/>
+        <p:nvPr/>
+      </p:nvGrpSpPr>
+      <p:grpSpPr>
+        <a:xfrm>
+          <a:off x="0" y="0"/>
+          <a:ext cx="0" cy="0"/>
+          <a:chOff x="0" y="0"/>
+          <a:chExt cx="0" cy="0"/>
+        </a:xfrm>
+      </p:grpSpPr>
+      <p:sp>
+        <p:nvSpPr>
+          <p:cNvPr id="2" name="Folienbildplatzhalter 1"/>
+          <p:cNvSpPr>
+            <a:spLocks noGrp="1" noRot="1" noChangeAspect="1"/>
+          </p:cNvSpPr>
+          <p:nvPr>
+            <p:ph type="sldImg"/>
+          </p:nvPr>
+        </p:nvSpPr>
+        <p:spPr/>
+      </p:sp>
+      <p:sp>
+        <p:nvSpPr>
+          <p:cNvPr id="3" name="Notizenplatzhalter 2"/>
+          <p:cNvSpPr>
+            <a:spLocks noGrp="1"/>
+          </p:cNvSpPr>
+          <p:nvPr>
+            <p:ph type="body" idx="1"/>
+          </p:nvPr>
+        </p:nvSpPr>
+        <p:spPr/>
+        <p:txBody>
+          <a:bodyPr/>
+          <a:lstStyle/>
+          <a:p>
+            <a:endParaRPr lang="de-DE" dirty="0"/>
+          </a:p>
+        </p:txBody>
+      </p:sp>
+      <p:sp>
+        <p:nvSpPr>
+          <p:cNvPr id="4" name="Foliennummernplatzhalter 3"/>
+          <p:cNvSpPr>
+            <a:spLocks noGrp="1"/>
+          </p:cNvSpPr>
+          <p:nvPr>
+            <p:ph type="sldNum" sz="quarter" idx="10"/>
+          </p:nvPr>
+        </p:nvSpPr>
+        <p:spPr/>
+        <p:txBody>
+          <a:bodyPr/>
+          <a:lstStyle/>
+          <a:p>
+            <a:fld id="{AAC1FA76-46A6-49F4-8E84-FEF8584513B4}" type="slidenum">
+              <a:rPr lang="de-DE" smtClean="0"/>
+              <a:t>3</a:t>
+            </a:fld>
+            <a:endParaRPr lang="de-DE"/>
+          </a:p>
+        </p:txBody>
+      </p:sp>
+    </p:spTree>
+    <p:extLst>
+      <p:ext uri="{BB962C8B-B14F-4D97-AF65-F5344CB8AC3E}">
+        <p14:creationId xmlns:p14="http://schemas.microsoft.com/office/powerpoint/2010/main" val="2493930981"/>
+      </p:ext>
+    </p:extLst>
+  </p:cSld>
+  <p:clrMapOvr>
+    <a:masterClrMapping/>
+  </p:clrMapOvr>
+</p:notes>
+</file>
+
 <file path=ppt/slideLayouts/slideLayout1.xml><?xml version="1.0" encoding="utf-8"?>
 <p:sldLayout xmlns:a="http://schemas.openxmlformats.org/drawingml/2006/main" xmlns:r="http://schemas.openxmlformats.org/officeDocument/2006/relationships" xmlns:p="http://schemas.openxmlformats.org/presentationml/2006/main" type="title" preserve="1">
   <p:cSld name="Titelfolie">
@@ -137,7 +576,7 @@
         </p:nvSpPr>
         <p:spPr>
           <a:xfrm>
-            <a:off x="685800" y="2130425"/>
+            <a:off x="685800" y="2130426"/>
             <a:ext cx="7772400" cy="1470025"/>
           </a:xfrm>
         </p:spPr>
@@ -289,7 +728,7 @@
           <a:p>
             <a:fld id="{5430F42D-6984-4A4E-9090-AA314D14663F}" type="datetimeFigureOut">
               <a:rPr lang="de-DE" smtClean="0"/>
-              <a:t>21.03.2012</a:t>
+              <a:t>27.03.2012</a:t>
             </a:fld>
             <a:endParaRPr lang="de-DE"/>
           </a:p>
@@ -459,7 +898,7 @@
           <a:p>
             <a:fld id="{5430F42D-6984-4A4E-9090-AA314D14663F}" type="datetimeFigureOut">
               <a:rPr lang="de-DE" smtClean="0"/>
-              <a:t>21.03.2012</a:t>
+              <a:t>27.03.2012</a:t>
             </a:fld>
             <a:endParaRPr lang="de-DE"/>
           </a:p>
@@ -549,7 +988,7 @@
         </p:nvSpPr>
         <p:spPr>
           <a:xfrm>
-            <a:off x="6629400" y="274638"/>
+            <a:off x="6629400" y="274639"/>
             <a:ext cx="2057400" cy="5851525"/>
           </a:xfrm>
         </p:spPr>
@@ -577,7 +1016,7 @@
         </p:nvSpPr>
         <p:spPr>
           <a:xfrm>
-            <a:off x="457200" y="274638"/>
+            <a:off x="457200" y="274639"/>
             <a:ext cx="6019800" cy="5851525"/>
           </a:xfrm>
         </p:spPr>
@@ -639,7 +1078,7 @@
           <a:p>
             <a:fld id="{5430F42D-6984-4A4E-9090-AA314D14663F}" type="datetimeFigureOut">
               <a:rPr lang="de-DE" smtClean="0"/>
-              <a:t>21.03.2012</a:t>
+              <a:t>27.03.2012</a:t>
             </a:fld>
             <a:endParaRPr lang="de-DE"/>
           </a:p>
@@ -809,7 +1248,7 @@
           <a:p>
             <a:fld id="{5430F42D-6984-4A4E-9090-AA314D14663F}" type="datetimeFigureOut">
               <a:rPr lang="de-DE" smtClean="0"/>
-              <a:t>21.03.2012</a:t>
+              <a:t>27.03.2012</a:t>
             </a:fld>
             <a:endParaRPr lang="de-DE"/>
           </a:p>
@@ -931,7 +1370,7 @@
         </p:nvSpPr>
         <p:spPr>
           <a:xfrm>
-            <a:off x="722313" y="2906713"/>
+            <a:off x="722313" y="2906714"/>
             <a:ext cx="7772400" cy="1500187"/>
           </a:xfrm>
         </p:spPr>
@@ -1055,7 +1494,7 @@
           <a:p>
             <a:fld id="{5430F42D-6984-4A4E-9090-AA314D14663F}" type="datetimeFigureOut">
               <a:rPr lang="de-DE" smtClean="0"/>
-              <a:t>21.03.2012</a:t>
+              <a:t>27.03.2012</a:t>
             </a:fld>
             <a:endParaRPr lang="de-DE"/>
           </a:p>
@@ -1168,7 +1607,7 @@
         </p:nvSpPr>
         <p:spPr>
           <a:xfrm>
-            <a:off x="457200" y="1600200"/>
+            <a:off x="457200" y="1600201"/>
             <a:ext cx="4038600" cy="4525963"/>
           </a:xfrm>
         </p:spPr>
@@ -1253,7 +1692,7 @@
         </p:nvSpPr>
         <p:spPr>
           <a:xfrm>
-            <a:off x="4648200" y="1600200"/>
+            <a:off x="4648200" y="1600201"/>
             <a:ext cx="4038600" cy="4525963"/>
           </a:xfrm>
         </p:spPr>
@@ -1343,7 +1782,7 @@
           <a:p>
             <a:fld id="{5430F42D-6984-4A4E-9090-AA314D14663F}" type="datetimeFigureOut">
               <a:rPr lang="de-DE" smtClean="0"/>
-              <a:t>21.03.2012</a:t>
+              <a:t>27.03.2012</a:t>
             </a:fld>
             <a:endParaRPr lang="de-DE"/>
           </a:p>
@@ -1460,7 +1899,7 @@
         </p:nvSpPr>
         <p:spPr>
           <a:xfrm>
-            <a:off x="457200" y="1535113"/>
+            <a:off x="457201" y="1535113"/>
             <a:ext cx="4040188" cy="639762"/>
           </a:xfrm>
         </p:spPr>
@@ -1525,7 +1964,7 @@
         </p:nvSpPr>
         <p:spPr>
           <a:xfrm>
-            <a:off x="457200" y="2174875"/>
+            <a:off x="457201" y="2174875"/>
             <a:ext cx="4040188" cy="3951288"/>
           </a:xfrm>
         </p:spPr>
@@ -1610,7 +2049,7 @@
         </p:nvSpPr>
         <p:spPr>
           <a:xfrm>
-            <a:off x="4645025" y="1535113"/>
+            <a:off x="4645026" y="1535113"/>
             <a:ext cx="4041775" cy="639762"/>
           </a:xfrm>
         </p:spPr>
@@ -1675,7 +2114,7 @@
         </p:nvSpPr>
         <p:spPr>
           <a:xfrm>
-            <a:off x="4645025" y="2174875"/>
+            <a:off x="4645026" y="2174875"/>
             <a:ext cx="4041775" cy="3951288"/>
           </a:xfrm>
         </p:spPr>
@@ -1765,7 +2204,7 @@
           <a:p>
             <a:fld id="{5430F42D-6984-4A4E-9090-AA314D14663F}" type="datetimeFigureOut">
               <a:rPr lang="de-DE" smtClean="0"/>
-              <a:t>21.03.2012</a:t>
+              <a:t>27.03.2012</a:t>
             </a:fld>
             <a:endParaRPr lang="de-DE"/>
           </a:p>
@@ -1883,7 +2322,7 @@
           <a:p>
             <a:fld id="{5430F42D-6984-4A4E-9090-AA314D14663F}" type="datetimeFigureOut">
               <a:rPr lang="de-DE" smtClean="0"/>
-              <a:t>21.03.2012</a:t>
+              <a:t>27.03.2012</a:t>
             </a:fld>
             <a:endParaRPr lang="de-DE"/>
           </a:p>
@@ -1978,7 +2417,7 @@
           <a:p>
             <a:fld id="{5430F42D-6984-4A4E-9090-AA314D14663F}" type="datetimeFigureOut">
               <a:rPr lang="de-DE" smtClean="0"/>
-              <a:t>21.03.2012</a:t>
+              <a:t>27.03.2012</a:t>
             </a:fld>
             <a:endParaRPr lang="de-DE"/>
           </a:p>
@@ -2068,7 +2507,7 @@
         </p:nvSpPr>
         <p:spPr>
           <a:xfrm>
-            <a:off x="457200" y="273050"/>
+            <a:off x="457201" y="273050"/>
             <a:ext cx="3008313" cy="1162050"/>
           </a:xfrm>
         </p:spPr>
@@ -2100,8 +2539,8 @@
         </p:nvSpPr>
         <p:spPr>
           <a:xfrm>
-            <a:off x="3575050" y="273050"/>
-            <a:ext cx="5111750" cy="5853113"/>
+            <a:off x="3575050" y="273051"/>
+            <a:ext cx="5111751" cy="5853113"/>
           </a:xfrm>
         </p:spPr>
         <p:txBody>
@@ -2185,7 +2624,7 @@
         </p:nvSpPr>
         <p:spPr>
           <a:xfrm>
-            <a:off x="457200" y="1435100"/>
+            <a:off x="457201" y="1435101"/>
             <a:ext cx="3008313" cy="4691063"/>
           </a:xfrm>
         </p:spPr>
@@ -2255,7 +2694,7 @@
           <a:p>
             <a:fld id="{5430F42D-6984-4A4E-9090-AA314D14663F}" type="datetimeFigureOut">
               <a:rPr lang="de-DE" smtClean="0"/>
-              <a:t>21.03.2012</a:t>
+              <a:t>27.03.2012</a:t>
             </a:fld>
             <a:endParaRPr lang="de-DE"/>
           </a:p>
@@ -2345,7 +2784,7 @@
         </p:nvSpPr>
         <p:spPr>
           <a:xfrm>
-            <a:off x="1792288" y="4800600"/>
+            <a:off x="1792288" y="4800601"/>
             <a:ext cx="5486400" cy="566738"/>
           </a:xfrm>
         </p:spPr>
@@ -2438,7 +2877,7 @@
         </p:nvSpPr>
         <p:spPr>
           <a:xfrm>
-            <a:off x="1792288" y="5367338"/>
+            <a:off x="1792288" y="5367339"/>
             <a:ext cx="5486400" cy="804862"/>
           </a:xfrm>
         </p:spPr>
@@ -2508,7 +2947,7 @@
           <a:p>
             <a:fld id="{5430F42D-6984-4A4E-9090-AA314D14663F}" type="datetimeFigureOut">
               <a:rPr lang="de-DE" smtClean="0"/>
-              <a:t>21.03.2012</a:t>
+              <a:t>27.03.2012</a:t>
             </a:fld>
             <a:endParaRPr lang="de-DE"/>
           </a:p>
@@ -2636,7 +3075,7 @@
         </p:nvSpPr>
         <p:spPr>
           <a:xfrm>
-            <a:off x="457200" y="1600200"/>
+            <a:off x="457200" y="1600201"/>
             <a:ext cx="8229600" cy="4525963"/>
           </a:xfrm>
           <a:prstGeom prst="rect">
@@ -2698,7 +3137,7 @@
         </p:nvSpPr>
         <p:spPr>
           <a:xfrm>
-            <a:off x="457200" y="6356350"/>
+            <a:off x="457200" y="6356351"/>
             <a:ext cx="2133600" cy="365125"/>
           </a:xfrm>
           <a:prstGeom prst="rect">
@@ -2721,7 +3160,7 @@
           <a:p>
             <a:fld id="{5430F42D-6984-4A4E-9090-AA314D14663F}" type="datetimeFigureOut">
               <a:rPr lang="de-DE" smtClean="0"/>
-              <a:t>21.03.2012</a:t>
+              <a:t>27.03.2012</a:t>
             </a:fld>
             <a:endParaRPr lang="de-DE"/>
           </a:p>
@@ -2739,7 +3178,7 @@
         </p:nvSpPr>
         <p:spPr>
           <a:xfrm>
-            <a:off x="3124200" y="6356350"/>
+            <a:off x="3124200" y="6356351"/>
             <a:ext cx="2895600" cy="365125"/>
           </a:xfrm>
           <a:prstGeom prst="rect">
@@ -2776,7 +3215,7 @@
         </p:nvSpPr>
         <p:spPr>
           <a:xfrm>
-            <a:off x="6553200" y="6356350"/>
+            <a:off x="6553200" y="6356351"/>
             <a:ext cx="2133600" cy="365125"/>
           </a:xfrm>
           <a:prstGeom prst="rect">
@@ -3153,7 +3592,7 @@
         </p:nvSpPr>
         <p:spPr>
           <a:xfrm>
-            <a:off x="2172546" y="3685312"/>
+            <a:off x="2172547" y="3685312"/>
             <a:ext cx="1080120" cy="522846"/>
           </a:xfrm>
           <a:prstGeom prst="rect">
@@ -3451,7 +3890,7 @@
         <p:spPr>
           <a:xfrm flipH="1">
             <a:off x="1799692" y="4208158"/>
-            <a:ext cx="912914" cy="575778"/>
+            <a:ext cx="912915" cy="575778"/>
           </a:xfrm>
           <a:prstGeom prst="straightConnector1">
             <a:avLst/>
@@ -3487,7 +3926,7 @@
         <p:spPr>
           <a:xfrm>
             <a:off x="2712606" y="4208158"/>
-            <a:ext cx="887286" cy="575778"/>
+            <a:ext cx="887287" cy="575778"/>
           </a:xfrm>
           <a:prstGeom prst="straightConnector1">
             <a:avLst/>
@@ -3595,7 +4034,7 @@
         <p:spPr>
           <a:xfrm flipH="1">
             <a:off x="2712606" y="2871726"/>
-            <a:ext cx="1751382" cy="813586"/>
+            <a:ext cx="1751383" cy="813586"/>
           </a:xfrm>
           <a:prstGeom prst="straightConnector1">
             <a:avLst/>
@@ -3739,7 +4178,7 @@
         </p:nvSpPr>
         <p:spPr>
           <a:xfrm>
-            <a:off x="3510123" y="1772816"/>
+            <a:off x="3510123" y="1772817"/>
             <a:ext cx="576064" cy="576064"/>
           </a:xfrm>
           <a:prstGeom prst="ellipse">
@@ -3777,7 +4216,7 @@
         </p:nvSpPr>
         <p:spPr>
           <a:xfrm>
-            <a:off x="3514566" y="2852936"/>
+            <a:off x="3514567" y="2852937"/>
             <a:ext cx="576064" cy="576064"/>
           </a:xfrm>
           <a:prstGeom prst="ellipse">
@@ -3857,7 +4296,7 @@
         </p:nvSpPr>
         <p:spPr>
           <a:xfrm>
-            <a:off x="5061257" y="3501008"/>
+            <a:off x="5061257" y="3501009"/>
             <a:ext cx="576064" cy="576064"/>
           </a:xfrm>
           <a:prstGeom prst="ellipse">
@@ -3975,7 +4414,7 @@
         </p:nvSpPr>
         <p:spPr>
           <a:xfrm>
-            <a:off x="3909129" y="5517232"/>
+            <a:off x="3909129" y="5517233"/>
             <a:ext cx="576064" cy="576064"/>
           </a:xfrm>
           <a:prstGeom prst="ellipse">
@@ -4016,7 +4455,7 @@
         </p:nvCxnSpPr>
         <p:spPr>
           <a:xfrm>
-            <a:off x="3798155" y="2348880"/>
+            <a:off x="3798156" y="2348881"/>
             <a:ext cx="4443" cy="504056"/>
           </a:xfrm>
           <a:prstGeom prst="straightConnector1">
@@ -4052,7 +4491,7 @@
         </p:nvCxnSpPr>
         <p:spPr>
           <a:xfrm flipH="1">
-            <a:off x="2687437" y="3344637"/>
+            <a:off x="2687438" y="3344637"/>
             <a:ext cx="911492" cy="1016304"/>
           </a:xfrm>
           <a:prstGeom prst="straightConnector1">
@@ -4088,7 +4527,7 @@
         </p:nvCxnSpPr>
         <p:spPr>
           <a:xfrm>
-            <a:off x="4006267" y="3344637"/>
+            <a:off x="4006269" y="3344638"/>
             <a:ext cx="1139353" cy="240734"/>
           </a:xfrm>
           <a:prstGeom prst="straightConnector1">
@@ -4161,7 +4600,7 @@
         <p:spPr>
           <a:xfrm>
             <a:off x="5552958" y="3992709"/>
-            <a:ext cx="744790" cy="384750"/>
+            <a:ext cx="744791" cy="384750"/>
           </a:xfrm>
           <a:prstGeom prst="straightConnector1">
             <a:avLst/>
@@ -4196,7 +4635,7 @@
         </p:nvCxnSpPr>
         <p:spPr>
           <a:xfrm>
-            <a:off x="2483768" y="4852642"/>
+            <a:off x="2483769" y="4852643"/>
             <a:ext cx="1509724" cy="748953"/>
           </a:xfrm>
           <a:prstGeom prst="straightConnector1">
@@ -4233,7 +4672,7 @@
         <p:spPr>
           <a:xfrm flipH="1">
             <a:off x="4400830" y="4784797"/>
-            <a:ext cx="744790" cy="816798"/>
+            <a:ext cx="744791" cy="816798"/>
           </a:xfrm>
           <a:prstGeom prst="straightConnector1">
             <a:avLst/>
@@ -4268,7 +4707,7 @@
         </p:nvCxnSpPr>
         <p:spPr>
           <a:xfrm flipH="1">
-            <a:off x="4485193" y="4784797"/>
+            <a:off x="4485193" y="4784798"/>
             <a:ext cx="1812555" cy="1020467"/>
           </a:xfrm>
           <a:prstGeom prst="straightConnector1">
@@ -4343,7 +4782,7 @@
         <p:spPr>
           <a:xfrm flipH="1">
             <a:off x="4400830" y="3992709"/>
-            <a:ext cx="744790" cy="368232"/>
+            <a:ext cx="744791" cy="368232"/>
           </a:xfrm>
           <a:prstGeom prst="straightConnector1">
             <a:avLst/>
@@ -4407,6 +4846,2473 @@
     <p:extLst>
       <p:ext uri="{BB962C8B-B14F-4D97-AF65-F5344CB8AC3E}">
         <p14:creationId xmlns:p14="http://schemas.microsoft.com/office/powerpoint/2010/main" val="4250351481"/>
+      </p:ext>
+    </p:extLst>
+  </p:cSld>
+  <p:clrMapOvr>
+    <a:masterClrMapping/>
+  </p:clrMapOvr>
+</p:sld>
+</file>
+
+<file path=ppt/slides/slide3.xml><?xml version="1.0" encoding="utf-8"?>
+<p:sld xmlns:a="http://schemas.openxmlformats.org/drawingml/2006/main" xmlns:r="http://schemas.openxmlformats.org/officeDocument/2006/relationships" xmlns:p="http://schemas.openxmlformats.org/presentationml/2006/main">
+  <p:cSld>
+    <p:spTree>
+      <p:nvGrpSpPr>
+        <p:cNvPr id="1" name=""/>
+        <p:cNvGrpSpPr/>
+        <p:nvPr/>
+      </p:nvGrpSpPr>
+      <p:grpSpPr>
+        <a:xfrm>
+          <a:off x="0" y="0"/>
+          <a:ext cx="0" cy="0"/>
+          <a:chOff x="0" y="0"/>
+          <a:chExt cx="0" cy="0"/>
+        </a:xfrm>
+      </p:grpSpPr>
+      <p:sp>
+        <p:nvSpPr>
+          <p:cNvPr id="113" name="Rechteck 112"/>
+          <p:cNvSpPr/>
+          <p:nvPr/>
+        </p:nvSpPr>
+        <p:spPr>
+          <a:xfrm>
+            <a:off x="683568" y="1700808"/>
+            <a:ext cx="8244408" cy="4752528"/>
+          </a:xfrm>
+          <a:prstGeom prst="rect">
+            <a:avLst/>
+          </a:prstGeom>
+          <a:solidFill>
+            <a:schemeClr val="accent3">
+              <a:alpha val="60000"/>
+            </a:schemeClr>
+          </a:solidFill>
+          <a:ln>
+            <a:noFill/>
+          </a:ln>
+        </p:spPr>
+        <p:style>
+          <a:lnRef idx="2">
+            <a:schemeClr val="accent1">
+              <a:shade val="50000"/>
+            </a:schemeClr>
+          </a:lnRef>
+          <a:fillRef idx="1">
+            <a:schemeClr val="accent1"/>
+          </a:fillRef>
+          <a:effectRef idx="0">
+            <a:schemeClr val="accent1"/>
+          </a:effectRef>
+          <a:fontRef idx="minor">
+            <a:schemeClr val="lt1"/>
+          </a:fontRef>
+        </p:style>
+        <p:txBody>
+          <a:bodyPr rtlCol="0" anchor="ctr"/>
+          <a:lstStyle/>
+          <a:p>
+            <a:pPr algn="ctr"/>
+            <a:endParaRPr lang="de-DE"/>
+          </a:p>
+        </p:txBody>
+      </p:sp>
+      <p:sp>
+        <p:nvSpPr>
+          <p:cNvPr id="111" name="Rechteck 110"/>
+          <p:cNvSpPr/>
+          <p:nvPr/>
+        </p:nvSpPr>
+        <p:spPr>
+          <a:xfrm>
+            <a:off x="251520" y="2175247"/>
+            <a:ext cx="2664296" cy="4278089"/>
+          </a:xfrm>
+          <a:prstGeom prst="rect">
+            <a:avLst/>
+          </a:prstGeom>
+          <a:solidFill>
+            <a:schemeClr val="accent1">
+              <a:alpha val="60000"/>
+            </a:schemeClr>
+          </a:solidFill>
+          <a:ln>
+            <a:noFill/>
+          </a:ln>
+        </p:spPr>
+        <p:style>
+          <a:lnRef idx="2">
+            <a:schemeClr val="accent1">
+              <a:shade val="50000"/>
+            </a:schemeClr>
+          </a:lnRef>
+          <a:fillRef idx="1">
+            <a:schemeClr val="accent1"/>
+          </a:fillRef>
+          <a:effectRef idx="0">
+            <a:schemeClr val="accent1"/>
+          </a:effectRef>
+          <a:fontRef idx="minor">
+            <a:schemeClr val="lt1"/>
+          </a:fontRef>
+        </p:style>
+        <p:txBody>
+          <a:bodyPr rtlCol="0" anchor="ctr"/>
+          <a:lstStyle/>
+          <a:p>
+            <a:pPr algn="ctr"/>
+            <a:endParaRPr lang="de-DE"/>
+          </a:p>
+        </p:txBody>
+      </p:sp>
+      <p:sp>
+        <p:nvSpPr>
+          <p:cNvPr id="10" name="Würfel 9"/>
+          <p:cNvSpPr/>
+          <p:nvPr/>
+        </p:nvSpPr>
+        <p:spPr>
+          <a:xfrm>
+            <a:off x="6804248" y="4149080"/>
+            <a:ext cx="1800200" cy="1517029"/>
+          </a:xfrm>
+          <a:prstGeom prst="cube">
+            <a:avLst/>
+          </a:prstGeom>
+        </p:spPr>
+        <p:style>
+          <a:lnRef idx="0">
+            <a:schemeClr val="accent1"/>
+          </a:lnRef>
+          <a:fillRef idx="3">
+            <a:schemeClr val="accent1"/>
+          </a:fillRef>
+          <a:effectRef idx="3">
+            <a:schemeClr val="accent1"/>
+          </a:effectRef>
+          <a:fontRef idx="minor">
+            <a:schemeClr val="lt1"/>
+          </a:fontRef>
+        </p:style>
+        <p:txBody>
+          <a:bodyPr rtlCol="0" anchor="ctr"/>
+          <a:lstStyle/>
+          <a:p>
+            <a:pPr algn="ctr"/>
+            <a:r>
+              <a:rPr lang="de-DE" sz="2400" dirty="0" err="1" smtClean="0"/>
+              <a:t>Assembly</a:t>
+            </a:r>
+            <a:endParaRPr lang="de-DE" sz="2400" dirty="0"/>
+          </a:p>
+        </p:txBody>
+      </p:sp>
+      <p:sp>
+        <p:nvSpPr>
+          <p:cNvPr id="56" name="Pfeil nach unten 55"/>
+          <p:cNvSpPr/>
+          <p:nvPr/>
+        </p:nvSpPr>
+        <p:spPr>
+          <a:xfrm>
+            <a:off x="6893293" y="2492896"/>
+            <a:ext cx="1682579" cy="1867348"/>
+          </a:xfrm>
+          <a:prstGeom prst="downArrow">
+            <a:avLst/>
+          </a:prstGeom>
+          <a:solidFill>
+            <a:schemeClr val="accent1">
+              <a:alpha val="30000"/>
+            </a:schemeClr>
+          </a:solidFill>
+          <a:ln>
+            <a:noFill/>
+          </a:ln>
+        </p:spPr>
+        <p:style>
+          <a:lnRef idx="1">
+            <a:schemeClr val="accent5"/>
+          </a:lnRef>
+          <a:fillRef idx="2">
+            <a:schemeClr val="accent5"/>
+          </a:fillRef>
+          <a:effectRef idx="1">
+            <a:schemeClr val="accent5"/>
+          </a:effectRef>
+          <a:fontRef idx="minor">
+            <a:schemeClr val="dk1"/>
+          </a:fontRef>
+        </p:style>
+        <p:txBody>
+          <a:bodyPr rtlCol="0" anchor="ctr"/>
+          <a:lstStyle/>
+          <a:p>
+            <a:pPr algn="ctr"/>
+            <a:endParaRPr lang="de-DE"/>
+          </a:p>
+        </p:txBody>
+      </p:sp>
+      <p:sp>
+        <p:nvSpPr>
+          <p:cNvPr id="4" name="Titel 31"/>
+          <p:cNvSpPr>
+            <a:spLocks noGrp="1"/>
+          </p:cNvSpPr>
+          <p:nvPr>
+            <p:ph type="title"/>
+          </p:nvPr>
+        </p:nvSpPr>
+        <p:spPr>
+          <a:xfrm>
+            <a:off x="457200" y="274638"/>
+            <a:ext cx="8229600" cy="1143000"/>
+          </a:xfrm>
+        </p:spPr>
+        <p:txBody>
+          <a:bodyPr/>
+          <a:lstStyle/>
+          <a:p>
+            <a:r>
+              <a:rPr lang="de-DE" dirty="0" smtClean="0"/>
+              <a:t>Architektur</a:t>
+            </a:r>
+            <a:endParaRPr lang="de-DE" dirty="0"/>
+          </a:p>
+        </p:txBody>
+      </p:sp>
+      <p:grpSp>
+        <p:nvGrpSpPr>
+          <p:cNvPr id="14" name="Gruppieren 13"/>
+          <p:cNvGrpSpPr/>
+          <p:nvPr/>
+        </p:nvGrpSpPr>
+        <p:grpSpPr>
+          <a:xfrm>
+            <a:off x="3293999" y="2780929"/>
+            <a:ext cx="3123575" cy="3384376"/>
+            <a:chOff x="3779912" y="2060849"/>
+            <a:chExt cx="2592288" cy="3384376"/>
+          </a:xfrm>
+        </p:grpSpPr>
+        <p:sp>
+          <p:nvSpPr>
+            <p:cNvPr id="6" name="Rechteck 5"/>
+            <p:cNvSpPr/>
+            <p:nvPr/>
+          </p:nvSpPr>
+          <p:spPr>
+            <a:xfrm>
+              <a:off x="3779912" y="2060849"/>
+              <a:ext cx="2592288" cy="3384376"/>
+            </a:xfrm>
+            <a:prstGeom prst="rect">
+              <a:avLst/>
+            </a:prstGeom>
+          </p:spPr>
+          <p:style>
+            <a:lnRef idx="1">
+              <a:schemeClr val="accent2"/>
+            </a:lnRef>
+            <a:fillRef idx="2">
+              <a:schemeClr val="accent2"/>
+            </a:fillRef>
+            <a:effectRef idx="1">
+              <a:schemeClr val="accent2"/>
+            </a:effectRef>
+            <a:fontRef idx="minor">
+              <a:schemeClr val="dk1"/>
+            </a:fontRef>
+          </p:style>
+          <p:txBody>
+            <a:bodyPr rtlCol="0" anchor="ctr"/>
+            <a:lstStyle/>
+            <a:p>
+              <a:pPr algn="ctr"/>
+              <a:endParaRPr lang="de-DE" dirty="0"/>
+            </a:p>
+          </p:txBody>
+        </p:sp>
+        <p:sp>
+          <p:nvSpPr>
+            <p:cNvPr id="11" name="Textfeld 10"/>
+            <p:cNvSpPr txBox="1"/>
+            <p:nvPr/>
+          </p:nvSpPr>
+          <p:spPr>
+            <a:xfrm>
+              <a:off x="3779912" y="5045114"/>
+              <a:ext cx="2592288" cy="400110"/>
+            </a:xfrm>
+            <a:prstGeom prst="rect">
+              <a:avLst/>
+            </a:prstGeom>
+            <a:noFill/>
+          </p:spPr>
+          <p:txBody>
+            <a:bodyPr wrap="square" rtlCol="0">
+              <a:spAutoFit/>
+            </a:bodyPr>
+            <a:lstStyle/>
+            <a:p>
+              <a:r>
+                <a:rPr lang="de-DE" sz="2000" b="1" dirty="0" smtClean="0"/>
+                <a:t>statische Code-Analyse</a:t>
+              </a:r>
+              <a:endParaRPr lang="de-DE" sz="2000" b="1" dirty="0"/>
+            </a:p>
+          </p:txBody>
+        </p:sp>
+      </p:grpSp>
+      <p:grpSp>
+        <p:nvGrpSpPr>
+          <p:cNvPr id="17" name="Gruppieren 16"/>
+          <p:cNvGrpSpPr/>
+          <p:nvPr/>
+        </p:nvGrpSpPr>
+        <p:grpSpPr>
+          <a:xfrm>
+            <a:off x="974243" y="2780929"/>
+            <a:ext cx="1705464" cy="3384376"/>
+            <a:chOff x="827584" y="2060849"/>
+            <a:chExt cx="2592288" cy="3384376"/>
+          </a:xfrm>
+        </p:grpSpPr>
+        <p:sp>
+          <p:nvSpPr>
+            <p:cNvPr id="5" name="Rechteck 4"/>
+            <p:cNvSpPr/>
+            <p:nvPr/>
+          </p:nvSpPr>
+          <p:spPr>
+            <a:xfrm>
+              <a:off x="827584" y="2060849"/>
+              <a:ext cx="2592288" cy="3384376"/>
+            </a:xfrm>
+            <a:prstGeom prst="rect">
+              <a:avLst/>
+            </a:prstGeom>
+          </p:spPr>
+          <p:style>
+            <a:lnRef idx="1">
+              <a:schemeClr val="accent3"/>
+            </a:lnRef>
+            <a:fillRef idx="2">
+              <a:schemeClr val="accent3"/>
+            </a:fillRef>
+            <a:effectRef idx="1">
+              <a:schemeClr val="accent3"/>
+            </a:effectRef>
+            <a:fontRef idx="minor">
+              <a:schemeClr val="dk1"/>
+            </a:fontRef>
+          </p:style>
+          <p:txBody>
+            <a:bodyPr rtlCol="0" anchor="ctr"/>
+            <a:lstStyle/>
+            <a:p>
+              <a:pPr algn="ctr"/>
+              <a:endParaRPr lang="de-DE"/>
+            </a:p>
+          </p:txBody>
+        </p:sp>
+        <p:sp>
+          <p:nvSpPr>
+            <p:cNvPr id="16" name="Textfeld 15"/>
+            <p:cNvSpPr txBox="1"/>
+            <p:nvPr/>
+          </p:nvSpPr>
+          <p:spPr>
+            <a:xfrm>
+              <a:off x="842443" y="5045114"/>
+              <a:ext cx="2577429" cy="400110"/>
+            </a:xfrm>
+            <a:prstGeom prst="rect">
+              <a:avLst/>
+            </a:prstGeom>
+            <a:noFill/>
+          </p:spPr>
+          <p:txBody>
+            <a:bodyPr wrap="square" rtlCol="0">
+              <a:spAutoFit/>
+            </a:bodyPr>
+            <a:lstStyle/>
+            <a:p>
+              <a:r>
+                <a:rPr lang="de-DE" sz="2000" b="1" dirty="0" smtClean="0"/>
+                <a:t>Visualisierung</a:t>
+              </a:r>
+              <a:endParaRPr lang="de-DE" sz="2000" b="1" dirty="0"/>
+            </a:p>
+          </p:txBody>
+        </p:sp>
+      </p:grpSp>
+      <p:sp>
+        <p:nvSpPr>
+          <p:cNvPr id="69" name="Zylinder 68"/>
+          <p:cNvSpPr/>
+          <p:nvPr/>
+        </p:nvSpPr>
+        <p:spPr>
+          <a:xfrm>
+            <a:off x="4538972" y="4365104"/>
+            <a:ext cx="1440160" cy="1152128"/>
+          </a:xfrm>
+          <a:prstGeom prst="can">
+            <a:avLst/>
+          </a:prstGeom>
+        </p:spPr>
+        <p:style>
+          <a:lnRef idx="0">
+            <a:schemeClr val="accent2"/>
+          </a:lnRef>
+          <a:fillRef idx="3">
+            <a:schemeClr val="accent2"/>
+          </a:fillRef>
+          <a:effectRef idx="3">
+            <a:schemeClr val="accent2"/>
+          </a:effectRef>
+          <a:fontRef idx="minor">
+            <a:schemeClr val="lt1"/>
+          </a:fontRef>
+        </p:style>
+        <p:txBody>
+          <a:bodyPr rtlCol="0" anchor="ctr"/>
+          <a:lstStyle/>
+          <a:p>
+            <a:pPr algn="ctr"/>
+            <a:r>
+              <a:rPr lang="de-DE" sz="2400" dirty="0" smtClean="0"/>
+              <a:t>Metrik</a:t>
+            </a:r>
+          </a:p>
+          <a:p>
+            <a:pPr algn="ctr"/>
+            <a:r>
+              <a:rPr lang="de-DE" sz="2400" dirty="0" smtClean="0"/>
+              <a:t>DB</a:t>
+            </a:r>
+            <a:endParaRPr lang="de-DE" sz="2400" dirty="0"/>
+          </a:p>
+        </p:txBody>
+      </p:sp>
+      <p:cxnSp>
+        <p:nvCxnSpPr>
+          <p:cNvPr id="46" name="Gerade Verbindung mit Pfeil 45"/>
+          <p:cNvCxnSpPr>
+            <a:stCxn id="19" idx="4"/>
+          </p:cNvCxnSpPr>
+          <p:nvPr/>
+        </p:nvCxnSpPr>
+        <p:spPr>
+          <a:xfrm>
+            <a:off x="5724128" y="3933056"/>
+            <a:ext cx="0" cy="576064"/>
+          </a:xfrm>
+          <a:prstGeom prst="straightConnector1">
+            <a:avLst/>
+          </a:prstGeom>
+          <a:ln>
+            <a:tailEnd type="arrow"/>
+          </a:ln>
+        </p:spPr>
+        <p:style>
+          <a:lnRef idx="3">
+            <a:schemeClr val="dk1"/>
+          </a:lnRef>
+          <a:fillRef idx="0">
+            <a:schemeClr val="dk1"/>
+          </a:fillRef>
+          <a:effectRef idx="2">
+            <a:schemeClr val="dk1"/>
+          </a:effectRef>
+          <a:fontRef idx="minor">
+            <a:schemeClr val="tx1"/>
+          </a:fontRef>
+        </p:style>
+      </p:cxnSp>
+      <p:cxnSp>
+        <p:nvCxnSpPr>
+          <p:cNvPr id="86" name="Gerade Verbindung mit Pfeil 85"/>
+          <p:cNvCxnSpPr>
+            <a:stCxn id="77" idx="4"/>
+          </p:cNvCxnSpPr>
+          <p:nvPr/>
+        </p:nvCxnSpPr>
+        <p:spPr>
+          <a:xfrm>
+            <a:off x="4857985" y="3933056"/>
+            <a:ext cx="0" cy="576064"/>
+          </a:xfrm>
+          <a:prstGeom prst="straightConnector1">
+            <a:avLst/>
+          </a:prstGeom>
+          <a:ln>
+            <a:tailEnd type="arrow"/>
+          </a:ln>
+        </p:spPr>
+        <p:style>
+          <a:lnRef idx="3">
+            <a:schemeClr val="dk1"/>
+          </a:lnRef>
+          <a:fillRef idx="0">
+            <a:schemeClr val="dk1"/>
+          </a:fillRef>
+          <a:effectRef idx="2">
+            <a:schemeClr val="dk1"/>
+          </a:effectRef>
+          <a:fontRef idx="minor">
+            <a:schemeClr val="tx1"/>
+          </a:fontRef>
+        </p:style>
+      </p:cxnSp>
+      <p:cxnSp>
+        <p:nvCxnSpPr>
+          <p:cNvPr id="99" name="Gerade Verbindung mit Pfeil 98"/>
+          <p:cNvCxnSpPr>
+            <a:endCxn id="69" idx="2"/>
+          </p:cNvCxnSpPr>
+          <p:nvPr/>
+        </p:nvCxnSpPr>
+        <p:spPr>
+          <a:xfrm>
+            <a:off x="2146564" y="4941168"/>
+            <a:ext cx="2392408" cy="0"/>
+          </a:xfrm>
+          <a:prstGeom prst="straightConnector1">
+            <a:avLst/>
+          </a:prstGeom>
+          <a:ln>
+            <a:tailEnd type="arrow"/>
+          </a:ln>
+        </p:spPr>
+        <p:style>
+          <a:lnRef idx="3">
+            <a:schemeClr val="dk1"/>
+          </a:lnRef>
+          <a:fillRef idx="0">
+            <a:schemeClr val="dk1"/>
+          </a:fillRef>
+          <a:effectRef idx="2">
+            <a:schemeClr val="dk1"/>
+          </a:effectRef>
+          <a:fontRef idx="minor">
+            <a:schemeClr val="tx1"/>
+          </a:fontRef>
+        </p:style>
+      </p:cxnSp>
+      <p:sp>
+        <p:nvSpPr>
+          <p:cNvPr id="112" name="Textfeld 111"/>
+          <p:cNvSpPr txBox="1"/>
+          <p:nvPr/>
+        </p:nvSpPr>
+        <p:spPr>
+          <a:xfrm>
+            <a:off x="254163" y="2175247"/>
+            <a:ext cx="1941573" cy="461665"/>
+          </a:xfrm>
+          <a:prstGeom prst="rect">
+            <a:avLst/>
+          </a:prstGeom>
+          <a:noFill/>
+        </p:spPr>
+        <p:txBody>
+          <a:bodyPr wrap="square" rtlCol="0">
+            <a:spAutoFit/>
+          </a:bodyPr>
+          <a:lstStyle/>
+          <a:p>
+            <a:r>
+              <a:rPr lang="de-DE" sz="2400" dirty="0" smtClean="0">
+                <a:solidFill>
+                  <a:schemeClr val="bg1"/>
+                </a:solidFill>
+              </a:rPr>
+              <a:t>Visual Studio</a:t>
+            </a:r>
+            <a:endParaRPr lang="de-DE" sz="2400" dirty="0">
+              <a:solidFill>
+                <a:schemeClr val="bg1"/>
+              </a:solidFill>
+            </a:endParaRPr>
+          </a:p>
+        </p:txBody>
+      </p:sp>
+      <p:sp>
+        <p:nvSpPr>
+          <p:cNvPr id="114" name="Textfeld 113"/>
+          <p:cNvSpPr txBox="1"/>
+          <p:nvPr/>
+        </p:nvSpPr>
+        <p:spPr>
+          <a:xfrm>
+            <a:off x="7930489" y="5877272"/>
+            <a:ext cx="1033999" cy="584775"/>
+          </a:xfrm>
+          <a:prstGeom prst="rect">
+            <a:avLst/>
+          </a:prstGeom>
+          <a:noFill/>
+        </p:spPr>
+        <p:txBody>
+          <a:bodyPr wrap="square" rtlCol="0">
+            <a:spAutoFit/>
+          </a:bodyPr>
+          <a:lstStyle/>
+          <a:p>
+            <a:r>
+              <a:rPr lang="de-DE" sz="3200" dirty="0" smtClean="0">
+                <a:solidFill>
+                  <a:schemeClr val="tx1">
+                    <a:lumMod val="75000"/>
+                    <a:lumOff val="25000"/>
+                  </a:schemeClr>
+                </a:solidFill>
+              </a:rPr>
+              <a:t>.NET</a:t>
+            </a:r>
+            <a:endParaRPr lang="de-DE" sz="3200" dirty="0">
+              <a:solidFill>
+                <a:schemeClr val="tx1">
+                  <a:lumMod val="75000"/>
+                  <a:lumOff val="25000"/>
+                </a:schemeClr>
+              </a:solidFill>
+            </a:endParaRPr>
+          </a:p>
+        </p:txBody>
+      </p:sp>
+      <p:sp>
+        <p:nvSpPr>
+          <p:cNvPr id="115" name="180-Grad-Pfeil 114"/>
+          <p:cNvSpPr/>
+          <p:nvPr/>
+        </p:nvSpPr>
+        <p:spPr>
+          <a:xfrm>
+            <a:off x="2524937" y="839174"/>
+            <a:ext cx="5548821" cy="1339056"/>
+          </a:xfrm>
+          <a:prstGeom prst="uturnArrow">
+            <a:avLst>
+              <a:gd name="adj1" fmla="val 28978"/>
+              <a:gd name="adj2" fmla="val 25000"/>
+              <a:gd name="adj3" fmla="val 25000"/>
+              <a:gd name="adj4" fmla="val 43750"/>
+              <a:gd name="adj5" fmla="val 100000"/>
+            </a:avLst>
+          </a:prstGeom>
+          <a:solidFill>
+            <a:schemeClr val="accent1">
+              <a:alpha val="60000"/>
+            </a:schemeClr>
+          </a:solidFill>
+          <a:ln>
+            <a:noFill/>
+          </a:ln>
+        </p:spPr>
+        <p:style>
+          <a:lnRef idx="2">
+            <a:schemeClr val="accent1">
+              <a:shade val="50000"/>
+            </a:schemeClr>
+          </a:lnRef>
+          <a:fillRef idx="1">
+            <a:schemeClr val="accent1"/>
+          </a:fillRef>
+          <a:effectRef idx="0">
+            <a:schemeClr val="accent1"/>
+          </a:effectRef>
+          <a:fontRef idx="minor">
+            <a:schemeClr val="lt1"/>
+          </a:fontRef>
+        </p:style>
+        <p:txBody>
+          <a:bodyPr rtlCol="0" anchor="ctr"/>
+          <a:lstStyle/>
+          <a:p>
+            <a:pPr algn="ctr"/>
+            <a:endParaRPr lang="de-DE">
+              <a:solidFill>
+                <a:schemeClr val="tx1"/>
+              </a:solidFill>
+            </a:endParaRPr>
+          </a:p>
+        </p:txBody>
+      </p:sp>
+      <p:sp>
+        <p:nvSpPr>
+          <p:cNvPr id="122" name="180-Grad-Pfeil 121"/>
+          <p:cNvSpPr/>
+          <p:nvPr/>
+        </p:nvSpPr>
+        <p:spPr>
+          <a:xfrm rot="10800000">
+            <a:off x="2381668" y="2492896"/>
+            <a:ext cx="5548821" cy="1339056"/>
+          </a:xfrm>
+          <a:prstGeom prst="uturnArrow">
+            <a:avLst>
+              <a:gd name="adj1" fmla="val 28978"/>
+              <a:gd name="adj2" fmla="val 25000"/>
+              <a:gd name="adj3" fmla="val 25000"/>
+              <a:gd name="adj4" fmla="val 43750"/>
+              <a:gd name="adj5" fmla="val 100000"/>
+            </a:avLst>
+          </a:prstGeom>
+          <a:solidFill>
+            <a:schemeClr val="accent6">
+              <a:alpha val="80000"/>
+            </a:schemeClr>
+          </a:solidFill>
+          <a:ln>
+            <a:noFill/>
+          </a:ln>
+        </p:spPr>
+        <p:style>
+          <a:lnRef idx="2">
+            <a:schemeClr val="accent1">
+              <a:shade val="50000"/>
+            </a:schemeClr>
+          </a:lnRef>
+          <a:fillRef idx="1">
+            <a:schemeClr val="accent1"/>
+          </a:fillRef>
+          <a:effectRef idx="0">
+            <a:schemeClr val="accent1"/>
+          </a:effectRef>
+          <a:fontRef idx="minor">
+            <a:schemeClr val="lt1"/>
+          </a:fontRef>
+        </p:style>
+        <p:txBody>
+          <a:bodyPr rtlCol="0" anchor="ctr"/>
+          <a:lstStyle/>
+          <a:p>
+            <a:pPr algn="ctr"/>
+            <a:endParaRPr lang="de-DE">
+              <a:solidFill>
+                <a:schemeClr val="tx1"/>
+              </a:solidFill>
+            </a:endParaRPr>
+          </a:p>
+        </p:txBody>
+      </p:sp>
+      <p:sp>
+        <p:nvSpPr>
+          <p:cNvPr id="9" name="Fensterinhalt vertikal verschieben 8"/>
+          <p:cNvSpPr/>
+          <p:nvPr/>
+        </p:nvSpPr>
+        <p:spPr>
+          <a:xfrm>
+            <a:off x="7168494" y="2148284"/>
+            <a:ext cx="1152128" cy="1017835"/>
+          </a:xfrm>
+          <a:prstGeom prst="verticalScroll">
+            <a:avLst/>
+          </a:prstGeom>
+        </p:spPr>
+        <p:style>
+          <a:lnRef idx="1">
+            <a:schemeClr val="accent1"/>
+          </a:lnRef>
+          <a:fillRef idx="2">
+            <a:schemeClr val="accent1"/>
+          </a:fillRef>
+          <a:effectRef idx="1">
+            <a:schemeClr val="accent1"/>
+          </a:effectRef>
+          <a:fontRef idx="minor">
+            <a:schemeClr val="dk1"/>
+          </a:fontRef>
+        </p:style>
+        <p:txBody>
+          <a:bodyPr rtlCol="0" anchor="ctr"/>
+          <a:lstStyle/>
+          <a:p>
+            <a:pPr algn="ctr"/>
+            <a:r>
+              <a:rPr lang="de-DE" sz="2400" dirty="0" smtClean="0"/>
+              <a:t>Code</a:t>
+            </a:r>
+            <a:endParaRPr lang="de-DE" sz="2400" dirty="0"/>
+          </a:p>
+        </p:txBody>
+      </p:sp>
+      <p:sp>
+        <p:nvSpPr>
+          <p:cNvPr id="19" name="Flussdiagramm: Zusammenführung 18"/>
+          <p:cNvSpPr/>
+          <p:nvPr/>
+        </p:nvSpPr>
+        <p:spPr>
+          <a:xfrm>
+            <a:off x="5436096" y="3356992"/>
+            <a:ext cx="576064" cy="576064"/>
+          </a:xfrm>
+          <a:prstGeom prst="flowChartSummingJunction">
+            <a:avLst/>
+          </a:prstGeom>
+        </p:spPr>
+        <p:style>
+          <a:lnRef idx="1">
+            <a:schemeClr val="dk1"/>
+          </a:lnRef>
+          <a:fillRef idx="2">
+            <a:schemeClr val="dk1"/>
+          </a:fillRef>
+          <a:effectRef idx="1">
+            <a:schemeClr val="dk1"/>
+          </a:effectRef>
+          <a:fontRef idx="minor">
+            <a:schemeClr val="dk1"/>
+          </a:fontRef>
+        </p:style>
+        <p:txBody>
+          <a:bodyPr rtlCol="0" anchor="ctr"/>
+          <a:lstStyle/>
+          <a:p>
+            <a:pPr algn="ctr"/>
+            <a:endParaRPr lang="de-DE" dirty="0"/>
+          </a:p>
+        </p:txBody>
+      </p:sp>
+      <p:sp>
+        <p:nvSpPr>
+          <p:cNvPr id="77" name="Flussdiagramm: Zusammenführung 76"/>
+          <p:cNvSpPr/>
+          <p:nvPr/>
+        </p:nvSpPr>
+        <p:spPr>
+          <a:xfrm>
+            <a:off x="4569953" y="3356992"/>
+            <a:ext cx="576064" cy="576064"/>
+          </a:xfrm>
+          <a:prstGeom prst="flowChartSummingJunction">
+            <a:avLst/>
+          </a:prstGeom>
+        </p:spPr>
+        <p:style>
+          <a:lnRef idx="1">
+            <a:schemeClr val="dk1"/>
+          </a:lnRef>
+          <a:fillRef idx="2">
+            <a:schemeClr val="dk1"/>
+          </a:fillRef>
+          <a:effectRef idx="1">
+            <a:schemeClr val="dk1"/>
+          </a:effectRef>
+          <a:fontRef idx="minor">
+            <a:schemeClr val="dk1"/>
+          </a:fontRef>
+        </p:style>
+        <p:txBody>
+          <a:bodyPr rtlCol="0" anchor="ctr"/>
+          <a:lstStyle/>
+          <a:p>
+            <a:pPr algn="ctr"/>
+            <a:endParaRPr lang="de-DE"/>
+          </a:p>
+        </p:txBody>
+      </p:sp>
+      <p:sp>
+        <p:nvSpPr>
+          <p:cNvPr id="81" name="Flussdiagramm: Zusammenführung 80"/>
+          <p:cNvSpPr/>
+          <p:nvPr/>
+        </p:nvSpPr>
+        <p:spPr>
+          <a:xfrm>
+            <a:off x="3707904" y="3356993"/>
+            <a:ext cx="576064" cy="576064"/>
+          </a:xfrm>
+          <a:prstGeom prst="flowChartSummingJunction">
+            <a:avLst/>
+          </a:prstGeom>
+        </p:spPr>
+        <p:style>
+          <a:lnRef idx="1">
+            <a:schemeClr val="dk1"/>
+          </a:lnRef>
+          <a:fillRef idx="2">
+            <a:schemeClr val="dk1"/>
+          </a:fillRef>
+          <a:effectRef idx="1">
+            <a:schemeClr val="dk1"/>
+          </a:effectRef>
+          <a:fontRef idx="minor">
+            <a:schemeClr val="dk1"/>
+          </a:fontRef>
+        </p:style>
+        <p:txBody>
+          <a:bodyPr rtlCol="0" anchor="ctr"/>
+          <a:lstStyle/>
+          <a:p>
+            <a:pPr algn="ctr"/>
+            <a:endParaRPr lang="de-DE"/>
+          </a:p>
+        </p:txBody>
+      </p:sp>
+      <p:sp>
+        <p:nvSpPr>
+          <p:cNvPr id="90" name="Ovale Legende 89"/>
+          <p:cNvSpPr/>
+          <p:nvPr/>
+        </p:nvSpPr>
+        <p:spPr>
+          <a:xfrm>
+            <a:off x="5208203" y="2222862"/>
+            <a:ext cx="1857920" cy="612068"/>
+          </a:xfrm>
+          <a:prstGeom prst="wedgeEllipseCallout">
+            <a:avLst>
+              <a:gd name="adj1" fmla="val -25291"/>
+              <a:gd name="adj2" fmla="val 160156"/>
+            </a:avLst>
+          </a:prstGeom>
+          <a:solidFill>
+            <a:schemeClr val="accent6">
+              <a:alpha val="50000"/>
+            </a:schemeClr>
+          </a:solidFill>
+          <a:ln>
+            <a:noFill/>
+          </a:ln>
+        </p:spPr>
+        <p:style>
+          <a:lnRef idx="2">
+            <a:schemeClr val="accent6">
+              <a:shade val="50000"/>
+            </a:schemeClr>
+          </a:lnRef>
+          <a:fillRef idx="1">
+            <a:schemeClr val="accent6"/>
+          </a:fillRef>
+          <a:effectRef idx="0">
+            <a:schemeClr val="accent6"/>
+          </a:effectRef>
+          <a:fontRef idx="minor">
+            <a:schemeClr val="lt1"/>
+          </a:fontRef>
+        </p:style>
+        <p:txBody>
+          <a:bodyPr rtlCol="0" anchor="ctr"/>
+          <a:lstStyle/>
+          <a:p>
+            <a:pPr algn="ctr"/>
+            <a:r>
+              <a:rPr lang="de-DE" dirty="0" smtClean="0">
+                <a:solidFill>
+                  <a:schemeClr val="tx1"/>
+                </a:solidFill>
+              </a:rPr>
+              <a:t>Berechnung</a:t>
+            </a:r>
+            <a:endParaRPr lang="de-DE" dirty="0">
+              <a:solidFill>
+                <a:schemeClr val="tx1"/>
+              </a:solidFill>
+            </a:endParaRPr>
+          </a:p>
+        </p:txBody>
+      </p:sp>
+      <p:sp>
+        <p:nvSpPr>
+          <p:cNvPr id="89" name="Ovale Legende 88"/>
+          <p:cNvSpPr/>
+          <p:nvPr/>
+        </p:nvSpPr>
+        <p:spPr>
+          <a:xfrm>
+            <a:off x="4193183" y="1838287"/>
+            <a:ext cx="1857920" cy="612068"/>
+          </a:xfrm>
+          <a:prstGeom prst="wedgeEllipseCallout">
+            <a:avLst>
+              <a:gd name="adj1" fmla="val -12403"/>
+              <a:gd name="adj2" fmla="val 220847"/>
+            </a:avLst>
+          </a:prstGeom>
+          <a:solidFill>
+            <a:schemeClr val="accent6">
+              <a:alpha val="50000"/>
+            </a:schemeClr>
+          </a:solidFill>
+          <a:ln>
+            <a:noFill/>
+          </a:ln>
+        </p:spPr>
+        <p:style>
+          <a:lnRef idx="2">
+            <a:schemeClr val="accent6">
+              <a:shade val="50000"/>
+            </a:schemeClr>
+          </a:lnRef>
+          <a:fillRef idx="1">
+            <a:schemeClr val="accent6"/>
+          </a:fillRef>
+          <a:effectRef idx="0">
+            <a:schemeClr val="accent6"/>
+          </a:effectRef>
+          <a:fontRef idx="minor">
+            <a:schemeClr val="lt1"/>
+          </a:fontRef>
+        </p:style>
+        <p:txBody>
+          <a:bodyPr rtlCol="0" anchor="ctr"/>
+          <a:lstStyle/>
+          <a:p>
+            <a:pPr algn="ctr"/>
+            <a:r>
+              <a:rPr lang="de-DE" dirty="0" smtClean="0">
+                <a:solidFill>
+                  <a:schemeClr val="tx1"/>
+                </a:solidFill>
+              </a:rPr>
+              <a:t>Gewichtung</a:t>
+            </a:r>
+            <a:endParaRPr lang="de-DE" dirty="0">
+              <a:solidFill>
+                <a:schemeClr val="tx1"/>
+              </a:solidFill>
+            </a:endParaRPr>
+          </a:p>
+        </p:txBody>
+      </p:sp>
+      <p:sp>
+        <p:nvSpPr>
+          <p:cNvPr id="91" name="Ovale Legende 90"/>
+          <p:cNvSpPr/>
+          <p:nvPr/>
+        </p:nvSpPr>
+        <p:spPr>
+          <a:xfrm>
+            <a:off x="3166528" y="2330878"/>
+            <a:ext cx="1857920" cy="612068"/>
+          </a:xfrm>
+          <a:prstGeom prst="wedgeEllipseCallout">
+            <a:avLst>
+              <a:gd name="adj1" fmla="val -7334"/>
+              <a:gd name="adj2" fmla="val 141164"/>
+            </a:avLst>
+          </a:prstGeom>
+          <a:solidFill>
+            <a:schemeClr val="accent6">
+              <a:alpha val="50000"/>
+            </a:schemeClr>
+          </a:solidFill>
+          <a:ln>
+            <a:noFill/>
+          </a:ln>
+        </p:spPr>
+        <p:style>
+          <a:lnRef idx="2">
+            <a:schemeClr val="accent6">
+              <a:shade val="50000"/>
+            </a:schemeClr>
+          </a:lnRef>
+          <a:fillRef idx="1">
+            <a:schemeClr val="accent6"/>
+          </a:fillRef>
+          <a:effectRef idx="0">
+            <a:schemeClr val="accent6"/>
+          </a:effectRef>
+          <a:fontRef idx="minor">
+            <a:schemeClr val="lt1"/>
+          </a:fontRef>
+        </p:style>
+        <p:txBody>
+          <a:bodyPr rtlCol="0" anchor="ctr"/>
+          <a:lstStyle/>
+          <a:p>
+            <a:pPr algn="ctr"/>
+            <a:r>
+              <a:rPr lang="de-DE" dirty="0" smtClean="0">
+                <a:solidFill>
+                  <a:schemeClr val="tx1"/>
+                </a:solidFill>
+              </a:rPr>
+              <a:t>Bewertung</a:t>
+            </a:r>
+            <a:endParaRPr lang="de-DE" dirty="0">
+              <a:solidFill>
+                <a:schemeClr val="tx1"/>
+              </a:solidFill>
+            </a:endParaRPr>
+          </a:p>
+        </p:txBody>
+      </p:sp>
+      <p:cxnSp>
+        <p:nvCxnSpPr>
+          <p:cNvPr id="36" name="Gewinkelte Verbindung 35"/>
+          <p:cNvCxnSpPr>
+            <a:stCxn id="19" idx="6"/>
+          </p:cNvCxnSpPr>
+          <p:nvPr/>
+        </p:nvCxnSpPr>
+        <p:spPr>
+          <a:xfrm>
+            <a:off x="6012160" y="3645024"/>
+            <a:ext cx="990527" cy="1041760"/>
+          </a:xfrm>
+          <a:prstGeom prst="bentConnector2">
+            <a:avLst/>
+          </a:prstGeom>
+          <a:ln>
+            <a:tailEnd type="arrow"/>
+          </a:ln>
+        </p:spPr>
+        <p:style>
+          <a:lnRef idx="3">
+            <a:schemeClr val="dk1"/>
+          </a:lnRef>
+          <a:fillRef idx="0">
+            <a:schemeClr val="dk1"/>
+          </a:fillRef>
+          <a:effectRef idx="2">
+            <a:schemeClr val="dk1"/>
+          </a:effectRef>
+          <a:fontRef idx="minor">
+            <a:schemeClr val="tx1"/>
+          </a:fontRef>
+        </p:style>
+      </p:cxnSp>
+      <p:cxnSp>
+        <p:nvCxnSpPr>
+          <p:cNvPr id="29" name="Gewinkelte Verbindung 28"/>
+          <p:cNvCxnSpPr>
+            <a:stCxn id="19" idx="6"/>
+          </p:cNvCxnSpPr>
+          <p:nvPr/>
+        </p:nvCxnSpPr>
+        <p:spPr>
+          <a:xfrm flipV="1">
+            <a:off x="6012160" y="2979538"/>
+            <a:ext cx="1368152" cy="665486"/>
+          </a:xfrm>
+          <a:prstGeom prst="bentConnector3">
+            <a:avLst>
+              <a:gd name="adj1" fmla="val 72711"/>
+            </a:avLst>
+          </a:prstGeom>
+          <a:ln>
+            <a:tailEnd type="arrow"/>
+          </a:ln>
+        </p:spPr>
+        <p:style>
+          <a:lnRef idx="3">
+            <a:schemeClr val="dk1"/>
+          </a:lnRef>
+          <a:fillRef idx="0">
+            <a:schemeClr val="dk1"/>
+          </a:fillRef>
+          <a:effectRef idx="2">
+            <a:schemeClr val="dk1"/>
+          </a:effectRef>
+          <a:fontRef idx="minor">
+            <a:schemeClr val="tx1"/>
+          </a:fontRef>
+        </p:style>
+      </p:cxnSp>
+      <p:cxnSp>
+        <p:nvCxnSpPr>
+          <p:cNvPr id="94" name="Gerade Verbindung mit Pfeil 93"/>
+          <p:cNvCxnSpPr>
+            <a:endCxn id="81" idx="2"/>
+          </p:cNvCxnSpPr>
+          <p:nvPr/>
+        </p:nvCxnSpPr>
+        <p:spPr>
+          <a:xfrm>
+            <a:off x="1790704" y="3645025"/>
+            <a:ext cx="1917200" cy="0"/>
+          </a:xfrm>
+          <a:prstGeom prst="straightConnector1">
+            <a:avLst/>
+          </a:prstGeom>
+          <a:ln>
+            <a:tailEnd type="arrow"/>
+          </a:ln>
+        </p:spPr>
+        <p:style>
+          <a:lnRef idx="3">
+            <a:schemeClr val="dk1"/>
+          </a:lnRef>
+          <a:fillRef idx="0">
+            <a:schemeClr val="dk1"/>
+          </a:fillRef>
+          <a:effectRef idx="2">
+            <a:schemeClr val="dk1"/>
+          </a:effectRef>
+          <a:fontRef idx="minor">
+            <a:schemeClr val="tx1"/>
+          </a:fontRef>
+        </p:style>
+      </p:cxnSp>
+      <p:grpSp>
+        <p:nvGrpSpPr>
+          <p:cNvPr id="109" name="Gruppieren 108"/>
+          <p:cNvGrpSpPr/>
+          <p:nvPr/>
+        </p:nvGrpSpPr>
+        <p:grpSpPr>
+          <a:xfrm>
+            <a:off x="1222056" y="3458218"/>
+            <a:ext cx="1333720" cy="1842990"/>
+            <a:chOff x="1301208" y="3244551"/>
+            <a:chExt cx="1333720" cy="1842990"/>
+          </a:xfrm>
+        </p:grpSpPr>
+        <p:sp>
+          <p:nvSpPr>
+            <p:cNvPr id="105" name="&quot;Nein&quot;-Symbol 104"/>
+            <p:cNvSpPr/>
+            <p:nvPr/>
+          </p:nvSpPr>
+          <p:spPr>
+            <a:xfrm>
+              <a:off x="1782689" y="3710174"/>
+              <a:ext cx="762943" cy="762943"/>
+            </a:xfrm>
+            <a:prstGeom prst="noSmoking">
+              <a:avLst/>
+            </a:prstGeom>
+          </p:spPr>
+          <p:style>
+            <a:lnRef idx="1">
+              <a:schemeClr val="accent2"/>
+            </a:lnRef>
+            <a:fillRef idx="3">
+              <a:schemeClr val="accent2"/>
+            </a:fillRef>
+            <a:effectRef idx="2">
+              <a:schemeClr val="accent2"/>
+            </a:effectRef>
+            <a:fontRef idx="minor">
+              <a:schemeClr val="lt1"/>
+            </a:fontRef>
+          </p:style>
+          <p:txBody>
+            <a:bodyPr rtlCol="0" anchor="ctr"/>
+            <a:lstStyle/>
+            <a:p>
+              <a:pPr algn="ctr"/>
+              <a:endParaRPr lang="de-DE">
+                <a:solidFill>
+                  <a:schemeClr val="tx1"/>
+                </a:solidFill>
+              </a:endParaRPr>
+            </a:p>
+          </p:txBody>
+        </p:sp>
+        <p:sp>
+          <p:nvSpPr>
+            <p:cNvPr id="106" name="Smiley 105"/>
+            <p:cNvSpPr/>
+            <p:nvPr/>
+          </p:nvSpPr>
+          <p:spPr>
+            <a:xfrm>
+              <a:off x="1475656" y="3244551"/>
+              <a:ext cx="688505" cy="688505"/>
+            </a:xfrm>
+            <a:prstGeom prst="smileyFace">
+              <a:avLst/>
+            </a:prstGeom>
+          </p:spPr>
+          <p:style>
+            <a:lnRef idx="2">
+              <a:schemeClr val="accent5">
+                <a:shade val="50000"/>
+              </a:schemeClr>
+            </a:lnRef>
+            <a:fillRef idx="1">
+              <a:schemeClr val="accent5"/>
+            </a:fillRef>
+            <a:effectRef idx="0">
+              <a:schemeClr val="accent5"/>
+            </a:effectRef>
+            <a:fontRef idx="minor">
+              <a:schemeClr val="lt1"/>
+            </a:fontRef>
+          </p:style>
+          <p:txBody>
+            <a:bodyPr rtlCol="0" anchor="ctr"/>
+            <a:lstStyle/>
+            <a:p>
+              <a:pPr algn="ctr"/>
+              <a:endParaRPr lang="de-DE"/>
+            </a:p>
+          </p:txBody>
+        </p:sp>
+        <p:sp>
+          <p:nvSpPr>
+            <p:cNvPr id="107" name="Gewitterblitz 106"/>
+            <p:cNvSpPr/>
+            <p:nvPr/>
+          </p:nvSpPr>
+          <p:spPr>
+            <a:xfrm>
+              <a:off x="1946423" y="4399036"/>
+              <a:ext cx="688505" cy="688505"/>
+            </a:xfrm>
+            <a:prstGeom prst="lightningBolt">
+              <a:avLst/>
+            </a:prstGeom>
+          </p:spPr>
+          <p:style>
+            <a:lnRef idx="0">
+              <a:schemeClr val="accent4"/>
+            </a:lnRef>
+            <a:fillRef idx="3">
+              <a:schemeClr val="accent4"/>
+            </a:fillRef>
+            <a:effectRef idx="3">
+              <a:schemeClr val="accent4"/>
+            </a:effectRef>
+            <a:fontRef idx="minor">
+              <a:schemeClr val="lt1"/>
+            </a:fontRef>
+          </p:style>
+          <p:txBody>
+            <a:bodyPr rtlCol="0" anchor="ctr"/>
+            <a:lstStyle/>
+            <a:p>
+              <a:pPr algn="ctr"/>
+              <a:endParaRPr lang="de-DE"/>
+            </a:p>
+          </p:txBody>
+        </p:sp>
+        <p:sp>
+          <p:nvSpPr>
+            <p:cNvPr id="108" name="Gefaltete Ecke 107"/>
+            <p:cNvSpPr/>
+            <p:nvPr/>
+          </p:nvSpPr>
+          <p:spPr>
+            <a:xfrm>
+              <a:off x="1301208" y="4051623"/>
+              <a:ext cx="720080" cy="720080"/>
+            </a:xfrm>
+            <a:prstGeom prst="foldedCorner">
+              <a:avLst>
+                <a:gd name="adj" fmla="val 32143"/>
+              </a:avLst>
+            </a:prstGeom>
+          </p:spPr>
+          <p:style>
+            <a:lnRef idx="0">
+              <a:schemeClr val="accent6"/>
+            </a:lnRef>
+            <a:fillRef idx="3">
+              <a:schemeClr val="accent6"/>
+            </a:fillRef>
+            <a:effectRef idx="3">
+              <a:schemeClr val="accent6"/>
+            </a:effectRef>
+            <a:fontRef idx="minor">
+              <a:schemeClr val="lt1"/>
+            </a:fontRef>
+          </p:style>
+          <p:txBody>
+            <a:bodyPr rtlCol="0" anchor="ctr"/>
+            <a:lstStyle/>
+            <a:p>
+              <a:pPr algn="ctr"/>
+              <a:endParaRPr lang="de-DE"/>
+            </a:p>
+          </p:txBody>
+        </p:sp>
+      </p:grpSp>
+      <p:cxnSp>
+        <p:nvCxnSpPr>
+          <p:cNvPr id="78" name="Gerade Verbindung mit Pfeil 77"/>
+          <p:cNvCxnSpPr>
+            <a:stCxn id="77" idx="6"/>
+            <a:endCxn id="19" idx="2"/>
+          </p:cNvCxnSpPr>
+          <p:nvPr/>
+        </p:nvCxnSpPr>
+        <p:spPr>
+          <a:xfrm>
+            <a:off x="5146017" y="3645024"/>
+            <a:ext cx="290079" cy="0"/>
+          </a:xfrm>
+          <a:prstGeom prst="straightConnector1">
+            <a:avLst/>
+          </a:prstGeom>
+          <a:ln>
+            <a:tailEnd type="arrow"/>
+          </a:ln>
+        </p:spPr>
+        <p:style>
+          <a:lnRef idx="3">
+            <a:schemeClr val="dk1"/>
+          </a:lnRef>
+          <a:fillRef idx="0">
+            <a:schemeClr val="dk1"/>
+          </a:fillRef>
+          <a:effectRef idx="2">
+            <a:schemeClr val="dk1"/>
+          </a:effectRef>
+          <a:fontRef idx="minor">
+            <a:schemeClr val="tx1"/>
+          </a:fontRef>
+        </p:style>
+      </p:cxnSp>
+      <p:cxnSp>
+        <p:nvCxnSpPr>
+          <p:cNvPr id="82" name="Gerade Verbindung mit Pfeil 81"/>
+          <p:cNvCxnSpPr>
+            <a:stCxn id="81" idx="6"/>
+            <a:endCxn id="77" idx="2"/>
+          </p:cNvCxnSpPr>
+          <p:nvPr/>
+        </p:nvCxnSpPr>
+        <p:spPr>
+          <a:xfrm flipV="1">
+            <a:off x="4283968" y="3645024"/>
+            <a:ext cx="285985" cy="1"/>
+          </a:xfrm>
+          <a:prstGeom prst="straightConnector1">
+            <a:avLst/>
+          </a:prstGeom>
+          <a:ln>
+            <a:tailEnd type="arrow"/>
+          </a:ln>
+        </p:spPr>
+        <p:style>
+          <a:lnRef idx="3">
+            <a:schemeClr val="dk1"/>
+          </a:lnRef>
+          <a:fillRef idx="0">
+            <a:schemeClr val="dk1"/>
+          </a:fillRef>
+          <a:effectRef idx="2">
+            <a:schemeClr val="dk1"/>
+          </a:effectRef>
+          <a:fontRef idx="minor">
+            <a:schemeClr val="tx1"/>
+          </a:fontRef>
+        </p:style>
+      </p:cxnSp>
+    </p:spTree>
+    <p:extLst>
+      <p:ext uri="{BB962C8B-B14F-4D97-AF65-F5344CB8AC3E}">
+        <p14:creationId xmlns:p14="http://schemas.microsoft.com/office/powerpoint/2010/main" val="446503568"/>
+      </p:ext>
+    </p:extLst>
+  </p:cSld>
+  <p:clrMapOvr>
+    <a:masterClrMapping/>
+  </p:clrMapOvr>
+</p:sld>
+</file>
+
+<file path=ppt/slides/slide4.xml><?xml version="1.0" encoding="utf-8"?>
+<p:sld xmlns:a="http://schemas.openxmlformats.org/drawingml/2006/main" xmlns:r="http://schemas.openxmlformats.org/officeDocument/2006/relationships" xmlns:p="http://schemas.openxmlformats.org/presentationml/2006/main">
+  <p:cSld>
+    <p:spTree>
+      <p:nvGrpSpPr>
+        <p:cNvPr id="1" name=""/>
+        <p:cNvGrpSpPr/>
+        <p:nvPr/>
+      </p:nvGrpSpPr>
+      <p:grpSpPr>
+        <a:xfrm>
+          <a:off x="0" y="0"/>
+          <a:ext cx="0" cy="0"/>
+          <a:chOff x="0" y="0"/>
+          <a:chExt cx="0" cy="0"/>
+        </a:xfrm>
+      </p:grpSpPr>
+      <p:sp>
+        <p:nvSpPr>
+          <p:cNvPr id="4" name="Titel 31"/>
+          <p:cNvSpPr>
+            <a:spLocks noGrp="1"/>
+          </p:cNvSpPr>
+          <p:nvPr>
+            <p:ph type="title"/>
+          </p:nvPr>
+        </p:nvSpPr>
+        <p:spPr>
+          <a:xfrm>
+            <a:off x="457200" y="274638"/>
+            <a:ext cx="8229600" cy="1143000"/>
+          </a:xfrm>
+        </p:spPr>
+        <p:txBody>
+          <a:bodyPr/>
+          <a:lstStyle/>
+          <a:p>
+            <a:r>
+              <a:rPr lang="de-DE" dirty="0" err="1" smtClean="0"/>
+              <a:t>Use</a:t>
+            </a:r>
+            <a:r>
+              <a:rPr lang="de-DE" dirty="0" smtClean="0"/>
+              <a:t> Cases</a:t>
+            </a:r>
+            <a:endParaRPr lang="de-DE" dirty="0"/>
+          </a:p>
+        </p:txBody>
+      </p:sp>
+      <p:sp>
+        <p:nvSpPr>
+          <p:cNvPr id="5" name="Rechteck 4"/>
+          <p:cNvSpPr/>
+          <p:nvPr/>
+        </p:nvSpPr>
+        <p:spPr>
+          <a:xfrm>
+            <a:off x="2411759" y="1718206"/>
+            <a:ext cx="4439668" cy="3871034"/>
+          </a:xfrm>
+          <a:prstGeom prst="rect">
+            <a:avLst/>
+          </a:prstGeom>
+        </p:spPr>
+        <p:style>
+          <a:lnRef idx="1">
+            <a:schemeClr val="accent3"/>
+          </a:lnRef>
+          <a:fillRef idx="2">
+            <a:schemeClr val="accent3"/>
+          </a:fillRef>
+          <a:effectRef idx="1">
+            <a:schemeClr val="accent3"/>
+          </a:effectRef>
+          <a:fontRef idx="minor">
+            <a:schemeClr val="dk1"/>
+          </a:fontRef>
+        </p:style>
+        <p:txBody>
+          <a:bodyPr rtlCol="0" anchor="ctr"/>
+          <a:lstStyle/>
+          <a:p>
+            <a:pPr algn="ctr"/>
+            <a:endParaRPr lang="de-DE"/>
+          </a:p>
+        </p:txBody>
+      </p:sp>
+      <p:grpSp>
+        <p:nvGrpSpPr>
+          <p:cNvPr id="10" name="Gruppieren 9"/>
+          <p:cNvGrpSpPr/>
+          <p:nvPr/>
+        </p:nvGrpSpPr>
+        <p:grpSpPr>
+          <a:xfrm>
+            <a:off x="2975410" y="2332494"/>
+            <a:ext cx="1656184" cy="846258"/>
+            <a:chOff x="3779912" y="2060848"/>
+            <a:chExt cx="2088232" cy="1144974"/>
+          </a:xfrm>
+        </p:grpSpPr>
+        <p:sp>
+          <p:nvSpPr>
+            <p:cNvPr id="6" name="Ellipse 5"/>
+            <p:cNvSpPr/>
+            <p:nvPr/>
+          </p:nvSpPr>
+          <p:spPr>
+            <a:xfrm>
+              <a:off x="3779912" y="2060848"/>
+              <a:ext cx="2088232" cy="1144974"/>
+            </a:xfrm>
+            <a:prstGeom prst="ellipse">
+              <a:avLst/>
+            </a:prstGeom>
+          </p:spPr>
+          <p:style>
+            <a:lnRef idx="1">
+              <a:schemeClr val="accent1"/>
+            </a:lnRef>
+            <a:fillRef idx="2">
+              <a:schemeClr val="accent1"/>
+            </a:fillRef>
+            <a:effectRef idx="1">
+              <a:schemeClr val="accent1"/>
+            </a:effectRef>
+            <a:fontRef idx="minor">
+              <a:schemeClr val="dk1"/>
+            </a:fontRef>
+          </p:style>
+          <p:txBody>
+            <a:bodyPr rtlCol="0" anchor="ctr"/>
+            <a:lstStyle/>
+            <a:p>
+              <a:pPr algn="ctr"/>
+              <a:endParaRPr lang="de-DE" sz="1400" dirty="0"/>
+            </a:p>
+          </p:txBody>
+        </p:sp>
+        <p:sp>
+          <p:nvSpPr>
+            <p:cNvPr id="9" name="Textfeld 8"/>
+            <p:cNvSpPr txBox="1"/>
+            <p:nvPr/>
+          </p:nvSpPr>
+          <p:spPr>
+            <a:xfrm>
+              <a:off x="4005306" y="2304653"/>
+              <a:ext cx="1800200" cy="523220"/>
+            </a:xfrm>
+            <a:prstGeom prst="rect">
+              <a:avLst/>
+            </a:prstGeom>
+            <a:noFill/>
+          </p:spPr>
+          <p:txBody>
+            <a:bodyPr wrap="square" rtlCol="0">
+              <a:spAutoFit/>
+            </a:bodyPr>
+            <a:lstStyle/>
+            <a:p>
+              <a:r>
+                <a:rPr lang="de-DE" sz="1400" dirty="0" smtClean="0"/>
+                <a:t>Code-</a:t>
+              </a:r>
+              <a:r>
+                <a:rPr lang="de-DE" sz="1400" dirty="0" err="1" smtClean="0"/>
+                <a:t>Metriken</a:t>
+              </a:r>
+              <a:r>
+                <a:rPr lang="de-DE" sz="1400" dirty="0" smtClean="0"/>
+                <a:t> anzeigen</a:t>
+              </a:r>
+              <a:endParaRPr lang="de-DE" sz="1400" dirty="0"/>
+            </a:p>
+          </p:txBody>
+        </p:sp>
+      </p:grpSp>
+      <p:grpSp>
+        <p:nvGrpSpPr>
+          <p:cNvPr id="12" name="Gruppieren 11"/>
+          <p:cNvGrpSpPr/>
+          <p:nvPr/>
+        </p:nvGrpSpPr>
+        <p:grpSpPr>
+          <a:xfrm>
+            <a:off x="4807512" y="3115791"/>
+            <a:ext cx="1656184" cy="1000958"/>
+            <a:chOff x="3779912" y="2060848"/>
+            <a:chExt cx="2183151" cy="1144974"/>
+          </a:xfrm>
+        </p:grpSpPr>
+        <p:sp>
+          <p:nvSpPr>
+            <p:cNvPr id="13" name="Ellipse 12"/>
+            <p:cNvSpPr/>
+            <p:nvPr/>
+          </p:nvSpPr>
+          <p:spPr>
+            <a:xfrm>
+              <a:off x="3779912" y="2060848"/>
+              <a:ext cx="2088232" cy="1144974"/>
+            </a:xfrm>
+            <a:prstGeom prst="ellipse">
+              <a:avLst/>
+            </a:prstGeom>
+          </p:spPr>
+          <p:style>
+            <a:lnRef idx="1">
+              <a:schemeClr val="accent1"/>
+            </a:lnRef>
+            <a:fillRef idx="2">
+              <a:schemeClr val="accent1"/>
+            </a:fillRef>
+            <a:effectRef idx="1">
+              <a:schemeClr val="accent1"/>
+            </a:effectRef>
+            <a:fontRef idx="minor">
+              <a:schemeClr val="dk1"/>
+            </a:fontRef>
+          </p:style>
+          <p:txBody>
+            <a:bodyPr rtlCol="0" anchor="ctr"/>
+            <a:lstStyle/>
+            <a:p>
+              <a:pPr algn="ctr"/>
+              <a:endParaRPr lang="de-DE" sz="1400" dirty="0"/>
+            </a:p>
+          </p:txBody>
+        </p:sp>
+        <p:sp>
+          <p:nvSpPr>
+            <p:cNvPr id="14" name="Textfeld 13"/>
+            <p:cNvSpPr txBox="1"/>
+            <p:nvPr/>
+          </p:nvSpPr>
+          <p:spPr>
+            <a:xfrm>
+              <a:off x="4031940" y="2343467"/>
+              <a:ext cx="1931123" cy="598500"/>
+            </a:xfrm>
+            <a:prstGeom prst="rect">
+              <a:avLst/>
+            </a:prstGeom>
+            <a:noFill/>
+          </p:spPr>
+          <p:txBody>
+            <a:bodyPr wrap="square" rtlCol="0">
+              <a:spAutoFit/>
+            </a:bodyPr>
+            <a:lstStyle/>
+            <a:p>
+              <a:r>
+                <a:rPr lang="de-DE" sz="1400" dirty="0" smtClean="0"/>
+                <a:t>Code-Probleme</a:t>
+              </a:r>
+            </a:p>
+            <a:p>
+              <a:r>
+                <a:rPr lang="de-DE" sz="1400" dirty="0" smtClean="0"/>
+                <a:t>anzeigen</a:t>
+              </a:r>
+              <a:endParaRPr lang="de-DE" sz="1400" dirty="0"/>
+            </a:p>
+          </p:txBody>
+        </p:sp>
+      </p:grpSp>
+      <p:grpSp>
+        <p:nvGrpSpPr>
+          <p:cNvPr id="15" name="Gruppieren 14"/>
+          <p:cNvGrpSpPr/>
+          <p:nvPr/>
+        </p:nvGrpSpPr>
+        <p:grpSpPr>
+          <a:xfrm>
+            <a:off x="2843808" y="4384389"/>
+            <a:ext cx="1646814" cy="936104"/>
+            <a:chOff x="3779912" y="2060848"/>
+            <a:chExt cx="2088232" cy="1144974"/>
+          </a:xfrm>
+        </p:grpSpPr>
+        <p:sp>
+          <p:nvSpPr>
+            <p:cNvPr id="16" name="Ellipse 15"/>
+            <p:cNvSpPr/>
+            <p:nvPr/>
+          </p:nvSpPr>
+          <p:spPr>
+            <a:xfrm>
+              <a:off x="3779912" y="2060848"/>
+              <a:ext cx="2088232" cy="1144974"/>
+            </a:xfrm>
+            <a:prstGeom prst="ellipse">
+              <a:avLst/>
+            </a:prstGeom>
+          </p:spPr>
+          <p:style>
+            <a:lnRef idx="1">
+              <a:schemeClr val="accent1"/>
+            </a:lnRef>
+            <a:fillRef idx="2">
+              <a:schemeClr val="accent1"/>
+            </a:fillRef>
+            <a:effectRef idx="1">
+              <a:schemeClr val="accent1"/>
+            </a:effectRef>
+            <a:fontRef idx="minor">
+              <a:schemeClr val="dk1"/>
+            </a:fontRef>
+          </p:style>
+          <p:txBody>
+            <a:bodyPr rtlCol="0" anchor="ctr"/>
+            <a:lstStyle/>
+            <a:p>
+              <a:pPr algn="ctr"/>
+              <a:endParaRPr lang="de-DE" sz="1400" dirty="0"/>
+            </a:p>
+          </p:txBody>
+        </p:sp>
+        <p:sp>
+          <p:nvSpPr>
+            <p:cNvPr id="17" name="Textfeld 16"/>
+            <p:cNvSpPr txBox="1"/>
+            <p:nvPr/>
+          </p:nvSpPr>
+          <p:spPr>
+            <a:xfrm>
+              <a:off x="3933298" y="2347041"/>
+              <a:ext cx="1934846" cy="523220"/>
+            </a:xfrm>
+            <a:prstGeom prst="rect">
+              <a:avLst/>
+            </a:prstGeom>
+            <a:noFill/>
+          </p:spPr>
+          <p:txBody>
+            <a:bodyPr wrap="square" rtlCol="0">
+              <a:spAutoFit/>
+            </a:bodyPr>
+            <a:lstStyle/>
+            <a:p>
+              <a:r>
+                <a:rPr lang="de-DE" sz="1400" dirty="0" smtClean="0"/>
+                <a:t>Software-Qualität</a:t>
+              </a:r>
+            </a:p>
+            <a:p>
+              <a:r>
+                <a:rPr lang="de-DE" sz="1400" dirty="0" smtClean="0"/>
+                <a:t>ermitteln</a:t>
+              </a:r>
+              <a:endParaRPr lang="de-DE" sz="1400" dirty="0"/>
+            </a:p>
+          </p:txBody>
+        </p:sp>
+      </p:grpSp>
+      <p:grpSp>
+        <p:nvGrpSpPr>
+          <p:cNvPr id="21" name="Gruppieren 20"/>
+          <p:cNvGrpSpPr/>
+          <p:nvPr/>
+        </p:nvGrpSpPr>
+        <p:grpSpPr>
+          <a:xfrm>
+            <a:off x="870725" y="2423615"/>
+            <a:ext cx="1353878" cy="1437433"/>
+            <a:chOff x="870725" y="2083320"/>
+            <a:chExt cx="1353878" cy="1437433"/>
+          </a:xfrm>
+        </p:grpSpPr>
+        <p:pic>
+          <p:nvPicPr>
+            <p:cNvPr id="1026" name="Picture 2" descr="C:\Users\mnaujoks\AppData\Local\Microsoft\Windows\Temporary Internet Files\Content.IE5\WYSQLFTH\MC900019782[1].wmf"/>
+            <p:cNvPicPr>
+              <a:picLocks noChangeAspect="1" noChangeArrowheads="1"/>
+            </p:cNvPicPr>
+            <p:nvPr/>
+          </p:nvPicPr>
+          <p:blipFill>
+            <a:blip r:embed="rId2" cstate="print">
+              <a:extLst>
+                <a:ext uri="{28A0092B-C50C-407E-A947-70E740481C1C}">
+                  <a14:useLocalDpi xmlns:a14="http://schemas.microsoft.com/office/drawing/2010/main" val="0"/>
+                </a:ext>
+              </a:extLst>
+            </a:blip>
+            <a:srcRect/>
+            <a:stretch>
+              <a:fillRect/>
+            </a:stretch>
+          </p:blipFill>
+          <p:spPr bwMode="auto">
+            <a:xfrm>
+              <a:off x="1115617" y="2083320"/>
+              <a:ext cx="864095" cy="1122502"/>
+            </a:xfrm>
+            <a:prstGeom prst="rect">
+              <a:avLst/>
+            </a:prstGeom>
+            <a:noFill/>
+            <a:extLst>
+              <a:ext uri="{909E8E84-426E-40DD-AFC4-6F175D3DCCD1}">
+                <a14:hiddenFill xmlns:a14="http://schemas.microsoft.com/office/drawing/2010/main">
+                  <a:solidFill>
+                    <a:srgbClr val="FFFFFF"/>
+                  </a:solidFill>
+                </a14:hiddenFill>
+              </a:ext>
+            </a:extLst>
+          </p:spPr>
+        </p:pic>
+        <p:sp>
+          <p:nvSpPr>
+            <p:cNvPr id="11" name="Textfeld 10"/>
+            <p:cNvSpPr txBox="1"/>
+            <p:nvPr/>
+          </p:nvSpPr>
+          <p:spPr>
+            <a:xfrm>
+              <a:off x="870725" y="3212976"/>
+              <a:ext cx="1353878" cy="307777"/>
+            </a:xfrm>
+            <a:prstGeom prst="rect">
+              <a:avLst/>
+            </a:prstGeom>
+            <a:noFill/>
+          </p:spPr>
+          <p:txBody>
+            <a:bodyPr wrap="square" rtlCol="0">
+              <a:spAutoFit/>
+            </a:bodyPr>
+            <a:lstStyle/>
+            <a:p>
+              <a:r>
+                <a:rPr lang="de-DE" sz="1400" dirty="0" smtClean="0"/>
+                <a:t>.NET-Entwickler</a:t>
+              </a:r>
+              <a:endParaRPr lang="de-DE" sz="1400" dirty="0"/>
+            </a:p>
+          </p:txBody>
+        </p:sp>
+      </p:grpSp>
+      <p:grpSp>
+        <p:nvGrpSpPr>
+          <p:cNvPr id="26" name="Gruppieren 25"/>
+          <p:cNvGrpSpPr/>
+          <p:nvPr/>
+        </p:nvGrpSpPr>
+        <p:grpSpPr>
+          <a:xfrm>
+            <a:off x="798102" y="4284680"/>
+            <a:ext cx="1499122" cy="1430279"/>
+            <a:chOff x="798103" y="2097486"/>
+            <a:chExt cx="1499122" cy="1430279"/>
+          </a:xfrm>
+        </p:grpSpPr>
+        <p:pic>
+          <p:nvPicPr>
+            <p:cNvPr id="27" name="Picture 2" descr="C:\Users\mnaujoks\AppData\Local\Microsoft\Windows\Temporary Internet Files\Content.IE5\WYSQLFTH\MC900019782[1].wmf"/>
+            <p:cNvPicPr>
+              <a:picLocks noChangeAspect="1" noChangeArrowheads="1"/>
+            </p:cNvPicPr>
+            <p:nvPr/>
+          </p:nvPicPr>
+          <p:blipFill>
+            <a:blip r:embed="rId2" cstate="print">
+              <a:extLst>
+                <a:ext uri="{28A0092B-C50C-407E-A947-70E740481C1C}">
+                  <a14:useLocalDpi xmlns:a14="http://schemas.microsoft.com/office/drawing/2010/main" val="0"/>
+                </a:ext>
+              </a:extLst>
+            </a:blip>
+            <a:srcRect/>
+            <a:stretch>
+              <a:fillRect/>
+            </a:stretch>
+          </p:blipFill>
+          <p:spPr bwMode="auto">
+            <a:xfrm>
+              <a:off x="1115616" y="2097486"/>
+              <a:ext cx="864095" cy="1122502"/>
+            </a:xfrm>
+            <a:prstGeom prst="rect">
+              <a:avLst/>
+            </a:prstGeom>
+            <a:noFill/>
+            <a:extLst>
+              <a:ext uri="{909E8E84-426E-40DD-AFC4-6F175D3DCCD1}">
+                <a14:hiddenFill xmlns:a14="http://schemas.microsoft.com/office/drawing/2010/main">
+                  <a:solidFill>
+                    <a:srgbClr val="FFFFFF"/>
+                  </a:solidFill>
+                </a14:hiddenFill>
+              </a:ext>
+            </a:extLst>
+          </p:spPr>
+        </p:pic>
+        <p:sp>
+          <p:nvSpPr>
+            <p:cNvPr id="28" name="Textfeld 27"/>
+            <p:cNvSpPr txBox="1"/>
+            <p:nvPr/>
+          </p:nvSpPr>
+          <p:spPr>
+            <a:xfrm>
+              <a:off x="798103" y="3219988"/>
+              <a:ext cx="1499122" cy="307777"/>
+            </a:xfrm>
+            <a:prstGeom prst="rect">
+              <a:avLst/>
+            </a:prstGeom>
+            <a:noFill/>
+          </p:spPr>
+          <p:txBody>
+            <a:bodyPr wrap="square" rtlCol="0">
+              <a:spAutoFit/>
+            </a:bodyPr>
+            <a:lstStyle/>
+            <a:p>
+              <a:r>
+                <a:rPr lang="de-DE" sz="1400" dirty="0" smtClean="0"/>
+                <a:t>mit viel Erfahrung</a:t>
+              </a:r>
+              <a:endParaRPr lang="de-DE" sz="1400" dirty="0"/>
+            </a:p>
+          </p:txBody>
+        </p:sp>
+      </p:grpSp>
+      <p:cxnSp>
+        <p:nvCxnSpPr>
+          <p:cNvPr id="29" name="Gerade Verbindung mit Pfeil 28"/>
+          <p:cNvCxnSpPr>
+            <a:endCxn id="11" idx="2"/>
+          </p:cNvCxnSpPr>
+          <p:nvPr/>
+        </p:nvCxnSpPr>
+        <p:spPr>
+          <a:xfrm flipV="1">
+            <a:off x="1547664" y="3861048"/>
+            <a:ext cx="0" cy="314163"/>
+          </a:xfrm>
+          <a:prstGeom prst="straightConnector1">
+            <a:avLst/>
+          </a:prstGeom>
+          <a:ln>
+            <a:tailEnd type="arrow"/>
+          </a:ln>
+        </p:spPr>
+        <p:style>
+          <a:lnRef idx="3">
+            <a:schemeClr val="dk1"/>
+          </a:lnRef>
+          <a:fillRef idx="0">
+            <a:schemeClr val="dk1"/>
+          </a:fillRef>
+          <a:effectRef idx="2">
+            <a:schemeClr val="dk1"/>
+          </a:effectRef>
+          <a:fontRef idx="minor">
+            <a:schemeClr val="tx1"/>
+          </a:fontRef>
+        </p:style>
+      </p:cxnSp>
+      <p:cxnSp>
+        <p:nvCxnSpPr>
+          <p:cNvPr id="1024" name="Gerade Verbindung mit Pfeil 1023"/>
+          <p:cNvCxnSpPr>
+            <a:stCxn id="1026" idx="3"/>
+            <a:endCxn id="6" idx="2"/>
+          </p:cNvCxnSpPr>
+          <p:nvPr/>
+        </p:nvCxnSpPr>
+        <p:spPr>
+          <a:xfrm flipV="1">
+            <a:off x="1979712" y="2755623"/>
+            <a:ext cx="995698" cy="229243"/>
+          </a:xfrm>
+          <a:prstGeom prst="straightConnector1">
+            <a:avLst/>
+          </a:prstGeom>
+          <a:ln>
+            <a:tailEnd type="arrow"/>
+          </a:ln>
+        </p:spPr>
+        <p:style>
+          <a:lnRef idx="3">
+            <a:schemeClr val="accent1"/>
+          </a:lnRef>
+          <a:fillRef idx="0">
+            <a:schemeClr val="accent1"/>
+          </a:fillRef>
+          <a:effectRef idx="2">
+            <a:schemeClr val="accent1"/>
+          </a:effectRef>
+          <a:fontRef idx="minor">
+            <a:schemeClr val="tx1"/>
+          </a:fontRef>
+        </p:style>
+      </p:cxnSp>
+      <p:cxnSp>
+        <p:nvCxnSpPr>
+          <p:cNvPr id="34" name="Gerade Verbindung mit Pfeil 33"/>
+          <p:cNvCxnSpPr>
+            <a:stCxn id="27" idx="3"/>
+            <a:endCxn id="16" idx="2"/>
+          </p:cNvCxnSpPr>
+          <p:nvPr/>
+        </p:nvCxnSpPr>
+        <p:spPr>
+          <a:xfrm>
+            <a:off x="1979710" y="4845931"/>
+            <a:ext cx="864098" cy="6510"/>
+          </a:xfrm>
+          <a:prstGeom prst="straightConnector1">
+            <a:avLst/>
+          </a:prstGeom>
+          <a:ln>
+            <a:tailEnd type="arrow"/>
+          </a:ln>
+        </p:spPr>
+        <p:style>
+          <a:lnRef idx="3">
+            <a:schemeClr val="accent1"/>
+          </a:lnRef>
+          <a:fillRef idx="0">
+            <a:schemeClr val="accent1"/>
+          </a:fillRef>
+          <a:effectRef idx="2">
+            <a:schemeClr val="accent1"/>
+          </a:effectRef>
+          <a:fontRef idx="minor">
+            <a:schemeClr val="tx1"/>
+          </a:fontRef>
+        </p:style>
+      </p:cxnSp>
+      <p:cxnSp>
+        <p:nvCxnSpPr>
+          <p:cNvPr id="37" name="Gerade Verbindung mit Pfeil 36"/>
+          <p:cNvCxnSpPr>
+            <a:stCxn id="1026" idx="3"/>
+            <a:endCxn id="13" idx="2"/>
+          </p:cNvCxnSpPr>
+          <p:nvPr/>
+        </p:nvCxnSpPr>
+        <p:spPr>
+          <a:xfrm>
+            <a:off x="1979712" y="2984866"/>
+            <a:ext cx="2827800" cy="631404"/>
+          </a:xfrm>
+          <a:prstGeom prst="straightConnector1">
+            <a:avLst/>
+          </a:prstGeom>
+          <a:ln>
+            <a:tailEnd type="arrow"/>
+          </a:ln>
+        </p:spPr>
+        <p:style>
+          <a:lnRef idx="3">
+            <a:schemeClr val="accent1"/>
+          </a:lnRef>
+          <a:fillRef idx="0">
+            <a:schemeClr val="accent1"/>
+          </a:fillRef>
+          <a:effectRef idx="2">
+            <a:schemeClr val="accent1"/>
+          </a:effectRef>
+          <a:fontRef idx="minor">
+            <a:schemeClr val="tx1"/>
+          </a:fontRef>
+        </p:style>
+      </p:cxnSp>
+      <p:grpSp>
+        <p:nvGrpSpPr>
+          <p:cNvPr id="46" name="Gruppieren 45"/>
+          <p:cNvGrpSpPr/>
+          <p:nvPr/>
+        </p:nvGrpSpPr>
+        <p:grpSpPr>
+          <a:xfrm>
+            <a:off x="4735503" y="4364208"/>
+            <a:ext cx="1800202" cy="936104"/>
+            <a:chOff x="3779912" y="2060848"/>
+            <a:chExt cx="2282735" cy="1144974"/>
+          </a:xfrm>
+        </p:grpSpPr>
+        <p:sp>
+          <p:nvSpPr>
+            <p:cNvPr id="47" name="Ellipse 46"/>
+            <p:cNvSpPr/>
+            <p:nvPr/>
+          </p:nvSpPr>
+          <p:spPr>
+            <a:xfrm>
+              <a:off x="3779912" y="2060848"/>
+              <a:ext cx="2088232" cy="1144974"/>
+            </a:xfrm>
+            <a:prstGeom prst="ellipse">
+              <a:avLst/>
+            </a:prstGeom>
+          </p:spPr>
+          <p:style>
+            <a:lnRef idx="1">
+              <a:schemeClr val="accent1"/>
+            </a:lnRef>
+            <a:fillRef idx="2">
+              <a:schemeClr val="accent1"/>
+            </a:fillRef>
+            <a:effectRef idx="1">
+              <a:schemeClr val="accent1"/>
+            </a:effectRef>
+            <a:fontRef idx="minor">
+              <a:schemeClr val="dk1"/>
+            </a:fontRef>
+          </p:style>
+          <p:txBody>
+            <a:bodyPr rtlCol="0" anchor="ctr"/>
+            <a:lstStyle/>
+            <a:p>
+              <a:pPr algn="ctr"/>
+              <a:endParaRPr lang="de-DE" sz="1400" dirty="0"/>
+            </a:p>
+          </p:txBody>
+        </p:sp>
+        <p:sp>
+          <p:nvSpPr>
+            <p:cNvPr id="48" name="Textfeld 47"/>
+            <p:cNvSpPr txBox="1"/>
+            <p:nvPr/>
+          </p:nvSpPr>
+          <p:spPr>
+            <a:xfrm>
+              <a:off x="4127801" y="2324749"/>
+              <a:ext cx="1934846" cy="639964"/>
+            </a:xfrm>
+            <a:prstGeom prst="rect">
+              <a:avLst/>
+            </a:prstGeom>
+            <a:noFill/>
+          </p:spPr>
+          <p:txBody>
+            <a:bodyPr wrap="square" rtlCol="0">
+              <a:spAutoFit/>
+            </a:bodyPr>
+            <a:lstStyle/>
+            <a:p>
+              <a:r>
+                <a:rPr lang="de-DE" sz="1400" dirty="0" smtClean="0"/>
+                <a:t>Clean Code entwickeln</a:t>
+              </a:r>
+              <a:endParaRPr lang="de-DE" sz="1400" dirty="0"/>
+            </a:p>
+          </p:txBody>
+        </p:sp>
+      </p:grpSp>
+      <p:cxnSp>
+        <p:nvCxnSpPr>
+          <p:cNvPr id="49" name="Gerade Verbindung mit Pfeil 48"/>
+          <p:cNvCxnSpPr>
+            <a:stCxn id="1026" idx="3"/>
+            <a:endCxn id="47" idx="1"/>
+          </p:cNvCxnSpPr>
+          <p:nvPr/>
+        </p:nvCxnSpPr>
+        <p:spPr>
+          <a:xfrm>
+            <a:off x="1979712" y="2984866"/>
+            <a:ext cx="2996961" cy="1516431"/>
+          </a:xfrm>
+          <a:prstGeom prst="straightConnector1">
+            <a:avLst/>
+          </a:prstGeom>
+          <a:ln>
+            <a:tailEnd type="arrow"/>
+          </a:ln>
+        </p:spPr>
+        <p:style>
+          <a:lnRef idx="3">
+            <a:schemeClr val="accent1"/>
+          </a:lnRef>
+          <a:fillRef idx="0">
+            <a:schemeClr val="accent1"/>
+          </a:fillRef>
+          <a:effectRef idx="2">
+            <a:schemeClr val="accent1"/>
+          </a:effectRef>
+          <a:fontRef idx="minor">
+            <a:schemeClr val="tx1"/>
+          </a:fontRef>
+        </p:style>
+      </p:cxnSp>
+      <p:grpSp>
+        <p:nvGrpSpPr>
+          <p:cNvPr id="52" name="Gruppieren 51"/>
+          <p:cNvGrpSpPr/>
+          <p:nvPr/>
+        </p:nvGrpSpPr>
+        <p:grpSpPr>
+          <a:xfrm>
+            <a:off x="7236296" y="4274356"/>
+            <a:ext cx="1108987" cy="1437433"/>
+            <a:chOff x="993170" y="2083320"/>
+            <a:chExt cx="1108987" cy="1437433"/>
+          </a:xfrm>
+        </p:grpSpPr>
+        <p:pic>
+          <p:nvPicPr>
+            <p:cNvPr id="53" name="Picture 2" descr="C:\Users\mnaujoks\AppData\Local\Microsoft\Windows\Temporary Internet Files\Content.IE5\WYSQLFTH\MC900019782[1].wmf"/>
+            <p:cNvPicPr>
+              <a:picLocks noChangeAspect="1" noChangeArrowheads="1"/>
+            </p:cNvPicPr>
+            <p:nvPr/>
+          </p:nvPicPr>
+          <p:blipFill>
+            <a:blip r:embed="rId2" cstate="print">
+              <a:extLst>
+                <a:ext uri="{28A0092B-C50C-407E-A947-70E740481C1C}">
+                  <a14:useLocalDpi xmlns:a14="http://schemas.microsoft.com/office/drawing/2010/main" val="0"/>
+                </a:ext>
+              </a:extLst>
+            </a:blip>
+            <a:srcRect/>
+            <a:stretch>
+              <a:fillRect/>
+            </a:stretch>
+          </p:blipFill>
+          <p:spPr bwMode="auto">
+            <a:xfrm>
+              <a:off x="1115617" y="2083320"/>
+              <a:ext cx="864095" cy="1122502"/>
+            </a:xfrm>
+            <a:prstGeom prst="rect">
+              <a:avLst/>
+            </a:prstGeom>
+            <a:noFill/>
+            <a:extLst>
+              <a:ext uri="{909E8E84-426E-40DD-AFC4-6F175D3DCCD1}">
+                <a14:hiddenFill xmlns:a14="http://schemas.microsoft.com/office/drawing/2010/main">
+                  <a:solidFill>
+                    <a:srgbClr val="FFFFFF"/>
+                  </a:solidFill>
+                </a14:hiddenFill>
+              </a:ext>
+            </a:extLst>
+          </p:spPr>
+        </p:pic>
+        <p:sp>
+          <p:nvSpPr>
+            <p:cNvPr id="54" name="Textfeld 53"/>
+            <p:cNvSpPr txBox="1"/>
+            <p:nvPr/>
+          </p:nvSpPr>
+          <p:spPr>
+            <a:xfrm>
+              <a:off x="993170" y="3212976"/>
+              <a:ext cx="1108987" cy="307777"/>
+            </a:xfrm>
+            <a:prstGeom prst="rect">
+              <a:avLst/>
+            </a:prstGeom>
+            <a:noFill/>
+          </p:spPr>
+          <p:txBody>
+            <a:bodyPr wrap="square" rtlCol="0">
+              <a:spAutoFit/>
+            </a:bodyPr>
+            <a:lstStyle/>
+            <a:p>
+              <a:r>
+                <a:rPr lang="de-DE" sz="1400" dirty="0" smtClean="0"/>
+                <a:t>Clean </a:t>
+              </a:r>
+              <a:r>
+                <a:rPr lang="de-DE" sz="1400" dirty="0" err="1" smtClean="0"/>
+                <a:t>Coder</a:t>
+              </a:r>
+              <a:endParaRPr lang="de-DE" sz="1400" dirty="0"/>
+            </a:p>
+          </p:txBody>
+        </p:sp>
+      </p:grpSp>
+      <p:cxnSp>
+        <p:nvCxnSpPr>
+          <p:cNvPr id="55" name="Gerade Verbindung mit Pfeil 54"/>
+          <p:cNvCxnSpPr>
+            <a:stCxn id="53" idx="1"/>
+            <a:endCxn id="47" idx="6"/>
+          </p:cNvCxnSpPr>
+          <p:nvPr/>
+        </p:nvCxnSpPr>
+        <p:spPr>
+          <a:xfrm flipH="1" flipV="1">
+            <a:off x="6382317" y="4832260"/>
+            <a:ext cx="976426" cy="3347"/>
+          </a:xfrm>
+          <a:prstGeom prst="straightConnector1">
+            <a:avLst/>
+          </a:prstGeom>
+          <a:ln>
+            <a:tailEnd type="arrow"/>
+          </a:ln>
+        </p:spPr>
+        <p:style>
+          <a:lnRef idx="3">
+            <a:schemeClr val="accent1"/>
+          </a:lnRef>
+          <a:fillRef idx="0">
+            <a:schemeClr val="accent1"/>
+          </a:fillRef>
+          <a:effectRef idx="2">
+            <a:schemeClr val="accent1"/>
+          </a:effectRef>
+          <a:fontRef idx="minor">
+            <a:schemeClr val="tx1"/>
+          </a:fontRef>
+        </p:style>
+      </p:cxnSp>
+      <p:sp>
+        <p:nvSpPr>
+          <p:cNvPr id="1040" name="Textfeld 1039"/>
+          <p:cNvSpPr txBox="1"/>
+          <p:nvPr/>
+        </p:nvSpPr>
+        <p:spPr>
+          <a:xfrm>
+            <a:off x="2411759" y="1718205"/>
+            <a:ext cx="4439669" cy="307777"/>
+          </a:xfrm>
+          <a:prstGeom prst="rect">
+            <a:avLst/>
+          </a:prstGeom>
+        </p:spPr>
+        <p:style>
+          <a:lnRef idx="1">
+            <a:schemeClr val="accent3"/>
+          </a:lnRef>
+          <a:fillRef idx="2">
+            <a:schemeClr val="accent3"/>
+          </a:fillRef>
+          <a:effectRef idx="1">
+            <a:schemeClr val="accent3"/>
+          </a:effectRef>
+          <a:fontRef idx="minor">
+            <a:schemeClr val="dk1"/>
+          </a:fontRef>
+        </p:style>
+        <p:txBody>
+          <a:bodyPr wrap="square" rtlCol="0">
+            <a:spAutoFit/>
+          </a:bodyPr>
+          <a:lstStyle/>
+          <a:p>
+            <a:r>
+              <a:rPr lang="de-DE" sz="1400" dirty="0" smtClean="0"/>
+              <a:t>Visual Studio Erweiterung zur statischen Code-Analyse</a:t>
+            </a:r>
+            <a:endParaRPr lang="de-DE" sz="1400" dirty="0"/>
+          </a:p>
+        </p:txBody>
+      </p:sp>
+      <p:cxnSp>
+        <p:nvCxnSpPr>
+          <p:cNvPr id="32" name="Gerade Verbindung mit Pfeil 31"/>
+          <p:cNvCxnSpPr>
+            <a:stCxn id="53" idx="1"/>
+            <a:endCxn id="13" idx="5"/>
+          </p:cNvCxnSpPr>
+          <p:nvPr/>
+        </p:nvCxnSpPr>
+        <p:spPr>
+          <a:xfrm flipH="1" flipV="1">
+            <a:off x="6159691" y="3970162"/>
+            <a:ext cx="1199052" cy="865445"/>
+          </a:xfrm>
+          <a:prstGeom prst="straightConnector1">
+            <a:avLst/>
+          </a:prstGeom>
+          <a:ln>
+            <a:tailEnd type="arrow"/>
+          </a:ln>
+        </p:spPr>
+        <p:style>
+          <a:lnRef idx="3">
+            <a:schemeClr val="accent1"/>
+          </a:lnRef>
+          <a:fillRef idx="0">
+            <a:schemeClr val="accent1"/>
+          </a:fillRef>
+          <a:effectRef idx="2">
+            <a:schemeClr val="accent1"/>
+          </a:effectRef>
+          <a:fontRef idx="minor">
+            <a:schemeClr val="tx1"/>
+          </a:fontRef>
+        </p:style>
+      </p:cxnSp>
+    </p:spTree>
+    <p:extLst>
+      <p:ext uri="{BB962C8B-B14F-4D97-AF65-F5344CB8AC3E}">
+        <p14:creationId xmlns:p14="http://schemas.microsoft.com/office/powerpoint/2010/main" val="3878568275"/>
       </p:ext>
     </p:extLst>
   </p:cSld>
@@ -4699,4 +7605,289 @@
   <a:objectDefaults/>
   <a:extraClrSchemeLst/>
 </a:theme>
+</file>
+
+<file path=ppt/theme/theme2.xml><?xml version="1.0" encoding="utf-8"?>
+<a:theme xmlns:a="http://schemas.openxmlformats.org/drawingml/2006/main" name="Larissa">
+  <a:themeElements>
+    <a:clrScheme name="Larissa">
+      <a:dk1>
+        <a:sysClr val="windowText" lastClr="000000"/>
+      </a:dk1>
+      <a:lt1>
+        <a:sysClr val="window" lastClr="FFFFFF"/>
+      </a:lt1>
+      <a:dk2>
+        <a:srgbClr val="1F497D"/>
+      </a:dk2>
+      <a:lt2>
+        <a:srgbClr val="EEECE1"/>
+      </a:lt2>
+      <a:accent1>
+        <a:srgbClr val="4F81BD"/>
+      </a:accent1>
+      <a:accent2>
+        <a:srgbClr val="C0504D"/>
+      </a:accent2>
+      <a:accent3>
+        <a:srgbClr val="9BBB59"/>
+      </a:accent3>
+      <a:accent4>
+        <a:srgbClr val="8064A2"/>
+      </a:accent4>
+      <a:accent5>
+        <a:srgbClr val="4BACC6"/>
+      </a:accent5>
+      <a:accent6>
+        <a:srgbClr val="F79646"/>
+      </a:accent6>
+      <a:hlink>
+        <a:srgbClr val="0000FF"/>
+      </a:hlink>
+      <a:folHlink>
+        <a:srgbClr val="800080"/>
+      </a:folHlink>
+    </a:clrScheme>
+    <a:fontScheme name="Larissa">
+      <a:majorFont>
+        <a:latin typeface="Calibri"/>
+        <a:ea typeface=""/>
+        <a:cs typeface=""/>
+        <a:font script="Jpan" typeface="ＭＳ Ｐゴシック"/>
+        <a:font script="Hang" typeface="맑은 고딕"/>
+        <a:font script="Hans" typeface="宋体"/>
+        <a:font script="Hant" typeface="新細明體"/>
+        <a:font script="Arab" typeface="Times New Roman"/>
+        <a:font script="Hebr" typeface="Times New Roman"/>
+        <a:font script="Thai" typeface="Angsana New"/>
+        <a:font script="Ethi" typeface="Nyala"/>
+        <a:font script="Beng" typeface="Vrinda"/>
+        <a:font script="Gujr" typeface="Shruti"/>
+        <a:font script="Khmr" typeface="MoolBoran"/>
+        <a:font script="Knda" typeface="Tunga"/>
+        <a:font script="Guru" typeface="Raavi"/>
+        <a:font script="Cans" typeface="Euphemia"/>
+        <a:font script="Cher" typeface="Plantagenet Cherokee"/>
+        <a:font script="Yiii" typeface="Microsoft Yi Baiti"/>
+        <a:font script="Tibt" typeface="Microsoft Himalaya"/>
+        <a:font script="Thaa" typeface="MV Boli"/>
+        <a:font script="Deva" typeface="Mangal"/>
+        <a:font script="Telu" typeface="Gautami"/>
+        <a:font script="Taml" typeface="Latha"/>
+        <a:font script="Syrc" typeface="Estrangelo Edessa"/>
+        <a:font script="Orya" typeface="Kalinga"/>
+        <a:font script="Mlym" typeface="Kartika"/>
+        <a:font script="Laoo" typeface="DokChampa"/>
+        <a:font script="Sinh" typeface="Iskoola Pota"/>
+        <a:font script="Mong" typeface="Mongolian Baiti"/>
+        <a:font script="Viet" typeface="Times New Roman"/>
+        <a:font script="Uigh" typeface="Microsoft Uighur"/>
+        <a:font script="Geor" typeface="Sylfaen"/>
+      </a:majorFont>
+      <a:minorFont>
+        <a:latin typeface="Calibri"/>
+        <a:ea typeface=""/>
+        <a:cs typeface=""/>
+        <a:font script="Jpan" typeface="ＭＳ Ｐゴシック"/>
+        <a:font script="Hang" typeface="맑은 고딕"/>
+        <a:font script="Hans" typeface="宋体"/>
+        <a:font script="Hant" typeface="新細明體"/>
+        <a:font script="Arab" typeface="Arial"/>
+        <a:font script="Hebr" typeface="Arial"/>
+        <a:font script="Thai" typeface="Cordia New"/>
+        <a:font script="Ethi" typeface="Nyala"/>
+        <a:font script="Beng" typeface="Vrinda"/>
+        <a:font script="Gujr" typeface="Shruti"/>
+        <a:font script="Khmr" typeface="DaunPenh"/>
+        <a:font script="Knda" typeface="Tunga"/>
+        <a:font script="Guru" typeface="Raavi"/>
+        <a:font script="Cans" typeface="Euphemia"/>
+        <a:font script="Cher" typeface="Plantagenet Cherokee"/>
+        <a:font script="Yiii" typeface="Microsoft Yi Baiti"/>
+        <a:font script="Tibt" typeface="Microsoft Himalaya"/>
+        <a:font script="Thaa" typeface="MV Boli"/>
+        <a:font script="Deva" typeface="Mangal"/>
+        <a:font script="Telu" typeface="Gautami"/>
+        <a:font script="Taml" typeface="Latha"/>
+        <a:font script="Syrc" typeface="Estrangelo Edessa"/>
+        <a:font script="Orya" typeface="Kalinga"/>
+        <a:font script="Mlym" typeface="Kartika"/>
+        <a:font script="Laoo" typeface="DokChampa"/>
+        <a:font script="Sinh" typeface="Iskoola Pota"/>
+        <a:font script="Mong" typeface="Mongolian Baiti"/>
+        <a:font script="Viet" typeface="Arial"/>
+        <a:font script="Uigh" typeface="Microsoft Uighur"/>
+        <a:font script="Geor" typeface="Sylfaen"/>
+      </a:minorFont>
+    </a:fontScheme>
+    <a:fmtScheme name="Larissa">
+      <a:fillStyleLst>
+        <a:solidFill>
+          <a:schemeClr val="phClr"/>
+        </a:solidFill>
+        <a:gradFill rotWithShape="1">
+          <a:gsLst>
+            <a:gs pos="0">
+              <a:schemeClr val="phClr">
+                <a:tint val="50000"/>
+                <a:satMod val="300000"/>
+              </a:schemeClr>
+            </a:gs>
+            <a:gs pos="35000">
+              <a:schemeClr val="phClr">
+                <a:tint val="37000"/>
+                <a:satMod val="300000"/>
+              </a:schemeClr>
+            </a:gs>
+            <a:gs pos="100000">
+              <a:schemeClr val="phClr">
+                <a:tint val="15000"/>
+                <a:satMod val="350000"/>
+              </a:schemeClr>
+            </a:gs>
+          </a:gsLst>
+          <a:lin ang="16200000" scaled="1"/>
+        </a:gradFill>
+        <a:gradFill rotWithShape="1">
+          <a:gsLst>
+            <a:gs pos="0">
+              <a:schemeClr val="phClr">
+                <a:shade val="51000"/>
+                <a:satMod val="130000"/>
+              </a:schemeClr>
+            </a:gs>
+            <a:gs pos="80000">
+              <a:schemeClr val="phClr">
+                <a:shade val="93000"/>
+                <a:satMod val="130000"/>
+              </a:schemeClr>
+            </a:gs>
+            <a:gs pos="100000">
+              <a:schemeClr val="phClr">
+                <a:shade val="94000"/>
+                <a:satMod val="135000"/>
+              </a:schemeClr>
+            </a:gs>
+          </a:gsLst>
+          <a:lin ang="16200000" scaled="0"/>
+        </a:gradFill>
+      </a:fillStyleLst>
+      <a:lnStyleLst>
+        <a:ln w="9525" cap="flat" cmpd="sng" algn="ctr">
+          <a:solidFill>
+            <a:schemeClr val="phClr">
+              <a:shade val="95000"/>
+              <a:satMod val="105000"/>
+            </a:schemeClr>
+          </a:solidFill>
+          <a:prstDash val="solid"/>
+        </a:ln>
+        <a:ln w="25400" cap="flat" cmpd="sng" algn="ctr">
+          <a:solidFill>
+            <a:schemeClr val="phClr"/>
+          </a:solidFill>
+          <a:prstDash val="solid"/>
+        </a:ln>
+        <a:ln w="38100" cap="flat" cmpd="sng" algn="ctr">
+          <a:solidFill>
+            <a:schemeClr val="phClr"/>
+          </a:solidFill>
+          <a:prstDash val="solid"/>
+        </a:ln>
+      </a:lnStyleLst>
+      <a:effectStyleLst>
+        <a:effectStyle>
+          <a:effectLst>
+            <a:outerShdw blurRad="40000" dist="20000" dir="5400000" rotWithShape="0">
+              <a:srgbClr val="000000">
+                <a:alpha val="38000"/>
+              </a:srgbClr>
+            </a:outerShdw>
+          </a:effectLst>
+        </a:effectStyle>
+        <a:effectStyle>
+          <a:effectLst>
+            <a:outerShdw blurRad="40000" dist="23000" dir="5400000" rotWithShape="0">
+              <a:srgbClr val="000000">
+                <a:alpha val="35000"/>
+              </a:srgbClr>
+            </a:outerShdw>
+          </a:effectLst>
+        </a:effectStyle>
+        <a:effectStyle>
+          <a:effectLst>
+            <a:outerShdw blurRad="40000" dist="23000" dir="5400000" rotWithShape="0">
+              <a:srgbClr val="000000">
+                <a:alpha val="35000"/>
+              </a:srgbClr>
+            </a:outerShdw>
+          </a:effectLst>
+          <a:scene3d>
+            <a:camera prst="orthographicFront">
+              <a:rot lat="0" lon="0" rev="0"/>
+            </a:camera>
+            <a:lightRig rig="threePt" dir="t">
+              <a:rot lat="0" lon="0" rev="1200000"/>
+            </a:lightRig>
+          </a:scene3d>
+          <a:sp3d>
+            <a:bevelT w="63500" h="25400"/>
+          </a:sp3d>
+        </a:effectStyle>
+      </a:effectStyleLst>
+      <a:bgFillStyleLst>
+        <a:solidFill>
+          <a:schemeClr val="phClr"/>
+        </a:solidFill>
+        <a:gradFill rotWithShape="1">
+          <a:gsLst>
+            <a:gs pos="0">
+              <a:schemeClr val="phClr">
+                <a:tint val="40000"/>
+                <a:satMod val="350000"/>
+              </a:schemeClr>
+            </a:gs>
+            <a:gs pos="40000">
+              <a:schemeClr val="phClr">
+                <a:tint val="45000"/>
+                <a:shade val="99000"/>
+                <a:satMod val="350000"/>
+              </a:schemeClr>
+            </a:gs>
+            <a:gs pos="100000">
+              <a:schemeClr val="phClr">
+                <a:shade val="20000"/>
+                <a:satMod val="255000"/>
+              </a:schemeClr>
+            </a:gs>
+          </a:gsLst>
+          <a:path path="circle">
+            <a:fillToRect l="50000" t="-80000" r="50000" b="180000"/>
+          </a:path>
+        </a:gradFill>
+        <a:gradFill rotWithShape="1">
+          <a:gsLst>
+            <a:gs pos="0">
+              <a:schemeClr val="phClr">
+                <a:tint val="80000"/>
+                <a:satMod val="300000"/>
+              </a:schemeClr>
+            </a:gs>
+            <a:gs pos="100000">
+              <a:schemeClr val="phClr">
+                <a:shade val="30000"/>
+                <a:satMod val="200000"/>
+              </a:schemeClr>
+            </a:gs>
+          </a:gsLst>
+          <a:path path="circle">
+            <a:fillToRect l="50000" t="50000" r="50000" b="50000"/>
+          </a:path>
+        </a:gradFill>
+      </a:bgFillStyleLst>
+    </a:fmtScheme>
+  </a:themeElements>
+  <a:objectDefaults/>
+  <a:extraClrSchemeLst/>
+</a:theme>
 </file>
</xml_diff>

<commit_message>
better stories, more text
</commit_message>
<xml_diff>
--- a/text/images/illustrations.pptx
+++ b/text/images/illustrations.pptx
@@ -196,7 +196,7 @@
           <a:p>
             <a:fld id="{7C9ABC5C-FC58-4AE2-89F8-727F30362B08}" type="datetimeFigureOut">
               <a:rPr lang="de-DE" smtClean="0"/>
-              <a:t>28.03.2012</a:t>
+              <a:t>29.03.2012</a:t>
             </a:fld>
             <a:endParaRPr lang="de-DE"/>
           </a:p>
@@ -729,7 +729,7 @@
           <a:p>
             <a:fld id="{5430F42D-6984-4A4E-9090-AA314D14663F}" type="datetimeFigureOut">
               <a:rPr lang="de-DE" smtClean="0"/>
-              <a:t>28.03.2012</a:t>
+              <a:t>29.03.2012</a:t>
             </a:fld>
             <a:endParaRPr lang="de-DE"/>
           </a:p>
@@ -899,7 +899,7 @@
           <a:p>
             <a:fld id="{5430F42D-6984-4A4E-9090-AA314D14663F}" type="datetimeFigureOut">
               <a:rPr lang="de-DE" smtClean="0"/>
-              <a:t>28.03.2012</a:t>
+              <a:t>29.03.2012</a:t>
             </a:fld>
             <a:endParaRPr lang="de-DE"/>
           </a:p>
@@ -1079,7 +1079,7 @@
           <a:p>
             <a:fld id="{5430F42D-6984-4A4E-9090-AA314D14663F}" type="datetimeFigureOut">
               <a:rPr lang="de-DE" smtClean="0"/>
-              <a:t>28.03.2012</a:t>
+              <a:t>29.03.2012</a:t>
             </a:fld>
             <a:endParaRPr lang="de-DE"/>
           </a:p>
@@ -1249,7 +1249,7 @@
           <a:p>
             <a:fld id="{5430F42D-6984-4A4E-9090-AA314D14663F}" type="datetimeFigureOut">
               <a:rPr lang="de-DE" smtClean="0"/>
-              <a:t>28.03.2012</a:t>
+              <a:t>29.03.2012</a:t>
             </a:fld>
             <a:endParaRPr lang="de-DE"/>
           </a:p>
@@ -1495,7 +1495,7 @@
           <a:p>
             <a:fld id="{5430F42D-6984-4A4E-9090-AA314D14663F}" type="datetimeFigureOut">
               <a:rPr lang="de-DE" smtClean="0"/>
-              <a:t>28.03.2012</a:t>
+              <a:t>29.03.2012</a:t>
             </a:fld>
             <a:endParaRPr lang="de-DE"/>
           </a:p>
@@ -1783,7 +1783,7 @@
           <a:p>
             <a:fld id="{5430F42D-6984-4A4E-9090-AA314D14663F}" type="datetimeFigureOut">
               <a:rPr lang="de-DE" smtClean="0"/>
-              <a:t>28.03.2012</a:t>
+              <a:t>29.03.2012</a:t>
             </a:fld>
             <a:endParaRPr lang="de-DE"/>
           </a:p>
@@ -2205,7 +2205,7 @@
           <a:p>
             <a:fld id="{5430F42D-6984-4A4E-9090-AA314D14663F}" type="datetimeFigureOut">
               <a:rPr lang="de-DE" smtClean="0"/>
-              <a:t>28.03.2012</a:t>
+              <a:t>29.03.2012</a:t>
             </a:fld>
             <a:endParaRPr lang="de-DE"/>
           </a:p>
@@ -2323,7 +2323,7 @@
           <a:p>
             <a:fld id="{5430F42D-6984-4A4E-9090-AA314D14663F}" type="datetimeFigureOut">
               <a:rPr lang="de-DE" smtClean="0"/>
-              <a:t>28.03.2012</a:t>
+              <a:t>29.03.2012</a:t>
             </a:fld>
             <a:endParaRPr lang="de-DE"/>
           </a:p>
@@ -2418,7 +2418,7 @@
           <a:p>
             <a:fld id="{5430F42D-6984-4A4E-9090-AA314D14663F}" type="datetimeFigureOut">
               <a:rPr lang="de-DE" smtClean="0"/>
-              <a:t>28.03.2012</a:t>
+              <a:t>29.03.2012</a:t>
             </a:fld>
             <a:endParaRPr lang="de-DE"/>
           </a:p>
@@ -2695,7 +2695,7 @@
           <a:p>
             <a:fld id="{5430F42D-6984-4A4E-9090-AA314D14663F}" type="datetimeFigureOut">
               <a:rPr lang="de-DE" smtClean="0"/>
-              <a:t>28.03.2012</a:t>
+              <a:t>29.03.2012</a:t>
             </a:fld>
             <a:endParaRPr lang="de-DE"/>
           </a:p>
@@ -2948,7 +2948,7 @@
           <a:p>
             <a:fld id="{5430F42D-6984-4A4E-9090-AA314D14663F}" type="datetimeFigureOut">
               <a:rPr lang="de-DE" smtClean="0"/>
-              <a:t>28.03.2012</a:t>
+              <a:t>29.03.2012</a:t>
             </a:fld>
             <a:endParaRPr lang="de-DE"/>
           </a:p>
@@ -3161,7 +3161,7 @@
           <a:p>
             <a:fld id="{5430F42D-6984-4A4E-9090-AA314D14663F}" type="datetimeFigureOut">
               <a:rPr lang="de-DE" smtClean="0"/>
-              <a:t>28.03.2012</a:t>
+              <a:t>29.03.2012</a:t>
             </a:fld>
             <a:endParaRPr lang="de-DE"/>
           </a:p>
@@ -7063,11 +7063,7 @@
             <a:p>
               <a:r>
                 <a:rPr lang="de-DE" sz="1400" dirty="0" smtClean="0"/>
-                <a:t>Clean </a:t>
-              </a:r>
-              <a:r>
-                <a:rPr lang="de-DE" sz="1400" dirty="0" smtClean="0"/>
-                <a:t>Code</a:t>
+                <a:t>Clean Code</a:t>
               </a:r>
             </a:p>
             <a:p>
@@ -7603,8 +7599,8 @@
         </p:nvSpPr>
         <p:spPr>
           <a:xfrm>
-            <a:off x="35496" y="44624"/>
-            <a:ext cx="8229600" cy="346050"/>
+            <a:off x="-1" y="0"/>
+            <a:ext cx="9144001" cy="188640"/>
           </a:xfrm>
         </p:spPr>
         <p:txBody>
@@ -7615,27 +7611,29 @@
           <a:p>
             <a:pPr algn="l"/>
             <a:r>
-              <a:rPr lang="de-DE" sz="2000" dirty="0" smtClean="0"/>
+              <a:rPr lang="de-DE" sz="1200" dirty="0" smtClean="0"/>
               <a:t>Produkt-</a:t>
             </a:r>
             <a:r>
-              <a:rPr lang="de-DE" sz="2000" dirty="0" err="1" smtClean="0"/>
+              <a:rPr lang="de-DE" sz="1200" dirty="0" err="1" smtClean="0"/>
               <a:t>Backlog</a:t>
             </a:r>
-            <a:endParaRPr lang="de-DE" sz="2000" dirty="0"/>
+            <a:endParaRPr lang="de-DE" sz="1200" dirty="0"/>
           </a:p>
         </p:txBody>
       </p:sp>
       <p:cxnSp>
         <p:nvCxnSpPr>
           <p:cNvPr id="64" name="Gerade Verbindung 63"/>
-          <p:cNvCxnSpPr/>
+          <p:cNvCxnSpPr>
+            <a:endCxn id="105" idx="1"/>
+          </p:cNvCxnSpPr>
           <p:nvPr/>
         </p:nvCxnSpPr>
         <p:spPr>
           <a:xfrm flipH="1">
-            <a:off x="899592" y="1350350"/>
-            <a:ext cx="2290" cy="5112359"/>
+            <a:off x="899592" y="1037705"/>
+            <a:ext cx="2290" cy="5660382"/>
           </a:xfrm>
           <a:prstGeom prst="line">
             <a:avLst/>
@@ -7664,8 +7662,8 @@
         </p:nvCxnSpPr>
         <p:spPr>
           <a:xfrm flipH="1">
-            <a:off x="3321177" y="1350350"/>
-            <a:ext cx="28977" cy="5112359"/>
+            <a:off x="3321177" y="1037705"/>
+            <a:ext cx="28978" cy="5660382"/>
           </a:xfrm>
           <a:prstGeom prst="line">
             <a:avLst/>
@@ -7693,9 +7691,9 @@
           <p:nvPr/>
         </p:nvCxnSpPr>
         <p:spPr>
-          <a:xfrm flipH="1">
-            <a:off x="5789380" y="1340768"/>
-            <a:ext cx="9046" cy="5121941"/>
+          <a:xfrm>
+            <a:off x="5798426" y="1028123"/>
+            <a:ext cx="0" cy="5669964"/>
           </a:xfrm>
           <a:prstGeom prst="line">
             <a:avLst/>
@@ -7724,8 +7722,8 @@
         </p:nvCxnSpPr>
         <p:spPr>
           <a:xfrm>
-            <a:off x="8246698" y="1340768"/>
-            <a:ext cx="18002" cy="5121941"/>
+            <a:off x="8246698" y="1028123"/>
+            <a:ext cx="23469" cy="5669964"/>
           </a:xfrm>
           <a:prstGeom prst="line">
             <a:avLst/>
@@ -7754,7 +7752,7 @@
         </p:nvGrpSpPr>
         <p:grpSpPr>
           <a:xfrm>
-            <a:off x="119544" y="2636912"/>
+            <a:off x="287524" y="2276872"/>
             <a:ext cx="1404156" cy="577081"/>
             <a:chOff x="1187624" y="3068960"/>
             <a:chExt cx="1404156" cy="577081"/>
@@ -7849,13 +7847,1918 @@
       </p:grpSp>
       <p:grpSp>
         <p:nvGrpSpPr>
+          <p:cNvPr id="30" name="Gruppieren 29"/>
+          <p:cNvGrpSpPr/>
+          <p:nvPr/>
+        </p:nvGrpSpPr>
+        <p:grpSpPr>
+          <a:xfrm>
+            <a:off x="215516" y="3573016"/>
+            <a:ext cx="1404156" cy="577081"/>
+            <a:chOff x="1187624" y="3068960"/>
+            <a:chExt cx="1404156" cy="577081"/>
+          </a:xfrm>
+        </p:grpSpPr>
+        <p:sp>
+          <p:nvSpPr>
+            <p:cNvPr id="31" name="Gefaltete Ecke 30"/>
+            <p:cNvSpPr/>
+            <p:nvPr/>
+          </p:nvSpPr>
+          <p:spPr>
+            <a:xfrm>
+              <a:off x="1187624" y="3068960"/>
+              <a:ext cx="1296144" cy="577081"/>
+            </a:xfrm>
+            <a:prstGeom prst="foldedCorner">
+              <a:avLst/>
+            </a:prstGeom>
+          </p:spPr>
+          <p:style>
+            <a:lnRef idx="1">
+              <a:schemeClr val="accent6"/>
+            </a:lnRef>
+            <a:fillRef idx="2">
+              <a:schemeClr val="accent6"/>
+            </a:fillRef>
+            <a:effectRef idx="1">
+              <a:schemeClr val="accent6"/>
+            </a:effectRef>
+            <a:fontRef idx="minor">
+              <a:schemeClr val="dk1"/>
+            </a:fontRef>
+          </p:style>
+          <p:txBody>
+            <a:bodyPr rtlCol="0" anchor="ctr"/>
+            <a:lstStyle/>
+            <a:p>
+              <a:pPr algn="ctr"/>
+              <a:endParaRPr lang="de-DE" sz="1400" dirty="0"/>
+            </a:p>
+          </p:txBody>
+        </p:sp>
+        <p:sp>
+          <p:nvSpPr>
+            <p:cNvPr id="32" name="Textfeld 31"/>
+            <p:cNvSpPr txBox="1"/>
+            <p:nvPr/>
+          </p:nvSpPr>
+          <p:spPr>
+            <a:xfrm>
+              <a:off x="1187624" y="3068960"/>
+              <a:ext cx="1404156" cy="461665"/>
+            </a:xfrm>
+            <a:prstGeom prst="rect">
+              <a:avLst/>
+            </a:prstGeom>
+            <a:noFill/>
+          </p:spPr>
+          <p:txBody>
+            <a:bodyPr wrap="square" rtlCol="0">
+              <a:spAutoFit/>
+            </a:bodyPr>
+            <a:lstStyle/>
+            <a:p>
+              <a:r>
+                <a:rPr lang="de-DE" sz="800" dirty="0" smtClean="0"/>
+                <a:t>Als .NET-Entwickler</a:t>
+              </a:r>
+            </a:p>
+            <a:p>
+              <a:r>
+                <a:rPr lang="de-DE" sz="800" dirty="0"/>
+                <a:t>w</a:t>
+              </a:r>
+              <a:r>
+                <a:rPr lang="de-DE" sz="800" dirty="0" smtClean="0"/>
+                <a:t>ill ich </a:t>
+              </a:r>
+              <a:r>
+                <a:rPr lang="de-DE" sz="800" dirty="0" err="1" smtClean="0"/>
+                <a:t>Metriken</a:t>
+              </a:r>
+              <a:r>
+                <a:rPr lang="de-DE" sz="800" dirty="0" smtClean="0"/>
+                <a:t> direkt in Visual Studio sehen.</a:t>
+              </a:r>
+              <a:endParaRPr lang="de-DE" sz="800" dirty="0"/>
+            </a:p>
+          </p:txBody>
+        </p:sp>
+      </p:grpSp>
+      <p:grpSp>
+        <p:nvGrpSpPr>
+          <p:cNvPr id="33" name="Gruppieren 32"/>
+          <p:cNvGrpSpPr/>
+          <p:nvPr/>
+        </p:nvGrpSpPr>
+        <p:grpSpPr>
+          <a:xfrm>
+            <a:off x="2670774" y="1124744"/>
+            <a:ext cx="1404156" cy="577081"/>
+            <a:chOff x="1187624" y="3068960"/>
+            <a:chExt cx="1404156" cy="577081"/>
+          </a:xfrm>
+        </p:grpSpPr>
+        <p:sp>
+          <p:nvSpPr>
+            <p:cNvPr id="34" name="Gefaltete Ecke 33"/>
+            <p:cNvSpPr/>
+            <p:nvPr/>
+          </p:nvSpPr>
+          <p:spPr>
+            <a:xfrm>
+              <a:off x="1187624" y="3068960"/>
+              <a:ext cx="1296144" cy="577081"/>
+            </a:xfrm>
+            <a:prstGeom prst="foldedCorner">
+              <a:avLst/>
+            </a:prstGeom>
+          </p:spPr>
+          <p:style>
+            <a:lnRef idx="1">
+              <a:schemeClr val="accent6"/>
+            </a:lnRef>
+            <a:fillRef idx="2">
+              <a:schemeClr val="accent6"/>
+            </a:fillRef>
+            <a:effectRef idx="1">
+              <a:schemeClr val="accent6"/>
+            </a:effectRef>
+            <a:fontRef idx="minor">
+              <a:schemeClr val="dk1"/>
+            </a:fontRef>
+          </p:style>
+          <p:txBody>
+            <a:bodyPr rtlCol="0" anchor="ctr"/>
+            <a:lstStyle/>
+            <a:p>
+              <a:pPr algn="ctr"/>
+              <a:endParaRPr lang="de-DE" sz="1400" dirty="0"/>
+            </a:p>
+          </p:txBody>
+        </p:sp>
+        <p:sp>
+          <p:nvSpPr>
+            <p:cNvPr id="35" name="Textfeld 34"/>
+            <p:cNvSpPr txBox="1"/>
+            <p:nvPr/>
+          </p:nvSpPr>
+          <p:spPr>
+            <a:xfrm>
+              <a:off x="1187624" y="3068960"/>
+              <a:ext cx="1404156" cy="461665"/>
+            </a:xfrm>
+            <a:prstGeom prst="rect">
+              <a:avLst/>
+            </a:prstGeom>
+            <a:noFill/>
+          </p:spPr>
+          <p:txBody>
+            <a:bodyPr wrap="square" rtlCol="0">
+              <a:spAutoFit/>
+            </a:bodyPr>
+            <a:lstStyle/>
+            <a:p>
+              <a:r>
+                <a:rPr lang="de-DE" sz="800" dirty="0" smtClean="0"/>
+                <a:t>Als .NET-Entwickler</a:t>
+              </a:r>
+            </a:p>
+            <a:p>
+              <a:r>
+                <a:rPr lang="de-DE" sz="800" dirty="0"/>
+                <a:t>w</a:t>
+              </a:r>
+              <a:r>
+                <a:rPr lang="de-DE" sz="800" dirty="0" smtClean="0"/>
+                <a:t>ill ich </a:t>
+              </a:r>
+              <a:r>
+                <a:rPr lang="de-DE" sz="800" dirty="0" err="1" smtClean="0"/>
+                <a:t>Metriken</a:t>
+              </a:r>
+              <a:r>
+                <a:rPr lang="de-DE" sz="800" dirty="0" smtClean="0"/>
+                <a:t> und deren Gewichtung sehen.</a:t>
+              </a:r>
+              <a:endParaRPr lang="de-DE" sz="800" dirty="0"/>
+            </a:p>
+          </p:txBody>
+        </p:sp>
+      </p:grpSp>
+      <p:grpSp>
+        <p:nvGrpSpPr>
+          <p:cNvPr id="39" name="Gruppieren 38"/>
+          <p:cNvGrpSpPr/>
+          <p:nvPr/>
+        </p:nvGrpSpPr>
+        <p:grpSpPr>
+          <a:xfrm>
+            <a:off x="2792092" y="2556193"/>
+            <a:ext cx="1404156" cy="584775"/>
+            <a:chOff x="1187624" y="3068960"/>
+            <a:chExt cx="1404156" cy="584775"/>
+          </a:xfrm>
+        </p:grpSpPr>
+        <p:sp>
+          <p:nvSpPr>
+            <p:cNvPr id="40" name="Gefaltete Ecke 39"/>
+            <p:cNvSpPr/>
+            <p:nvPr/>
+          </p:nvSpPr>
+          <p:spPr>
+            <a:xfrm>
+              <a:off x="1187624" y="3068960"/>
+              <a:ext cx="1296144" cy="577081"/>
+            </a:xfrm>
+            <a:prstGeom prst="foldedCorner">
+              <a:avLst/>
+            </a:prstGeom>
+          </p:spPr>
+          <p:style>
+            <a:lnRef idx="1">
+              <a:schemeClr val="accent6"/>
+            </a:lnRef>
+            <a:fillRef idx="2">
+              <a:schemeClr val="accent6"/>
+            </a:fillRef>
+            <a:effectRef idx="1">
+              <a:schemeClr val="accent6"/>
+            </a:effectRef>
+            <a:fontRef idx="minor">
+              <a:schemeClr val="dk1"/>
+            </a:fontRef>
+          </p:style>
+          <p:txBody>
+            <a:bodyPr rtlCol="0" anchor="ctr"/>
+            <a:lstStyle/>
+            <a:p>
+              <a:pPr algn="ctr"/>
+              <a:endParaRPr lang="de-DE" sz="1400" dirty="0"/>
+            </a:p>
+          </p:txBody>
+        </p:sp>
+        <p:sp>
+          <p:nvSpPr>
+            <p:cNvPr id="41" name="Textfeld 40"/>
+            <p:cNvSpPr txBox="1"/>
+            <p:nvPr/>
+          </p:nvSpPr>
+          <p:spPr>
+            <a:xfrm>
+              <a:off x="1187624" y="3068960"/>
+              <a:ext cx="1404156" cy="584775"/>
+            </a:xfrm>
+            <a:prstGeom prst="rect">
+              <a:avLst/>
+            </a:prstGeom>
+            <a:noFill/>
+          </p:spPr>
+          <p:txBody>
+            <a:bodyPr wrap="square" rtlCol="0">
+              <a:spAutoFit/>
+            </a:bodyPr>
+            <a:lstStyle/>
+            <a:p>
+              <a:r>
+                <a:rPr lang="de-DE" sz="800" dirty="0" smtClean="0"/>
+                <a:t>Als .NET-Entwickler</a:t>
+              </a:r>
+            </a:p>
+            <a:p>
+              <a:r>
+                <a:rPr lang="de-DE" sz="800" dirty="0"/>
+                <a:t>w</a:t>
+              </a:r>
+              <a:r>
+                <a:rPr lang="de-DE" sz="800" dirty="0" smtClean="0"/>
+                <a:t>ill ich Klassen finden, deren gewichtete </a:t>
+              </a:r>
+              <a:r>
+                <a:rPr lang="de-DE" sz="800" dirty="0" err="1" smtClean="0"/>
+                <a:t>Metriken</a:t>
+              </a:r>
+              <a:r>
+                <a:rPr lang="de-DE" sz="800" dirty="0" smtClean="0"/>
+                <a:t> über einer Schwelle liegen.</a:t>
+              </a:r>
+              <a:endParaRPr lang="de-DE" sz="800" dirty="0"/>
+            </a:p>
+          </p:txBody>
+        </p:sp>
+      </p:grpSp>
+      <p:grpSp>
+        <p:nvGrpSpPr>
+          <p:cNvPr id="48" name="Gruppieren 47"/>
+          <p:cNvGrpSpPr/>
+          <p:nvPr/>
+        </p:nvGrpSpPr>
+        <p:grpSpPr>
+          <a:xfrm>
+            <a:off x="5076056" y="3571999"/>
+            <a:ext cx="1404156" cy="584775"/>
+            <a:chOff x="1187624" y="3068960"/>
+            <a:chExt cx="1404156" cy="584775"/>
+          </a:xfrm>
+        </p:grpSpPr>
+        <p:sp>
+          <p:nvSpPr>
+            <p:cNvPr id="49" name="Gefaltete Ecke 48"/>
+            <p:cNvSpPr/>
+            <p:nvPr/>
+          </p:nvSpPr>
+          <p:spPr>
+            <a:xfrm>
+              <a:off x="1187624" y="3068960"/>
+              <a:ext cx="1296144" cy="577081"/>
+            </a:xfrm>
+            <a:prstGeom prst="foldedCorner">
+              <a:avLst/>
+            </a:prstGeom>
+          </p:spPr>
+          <p:style>
+            <a:lnRef idx="1">
+              <a:schemeClr val="accent6"/>
+            </a:lnRef>
+            <a:fillRef idx="2">
+              <a:schemeClr val="accent6"/>
+            </a:fillRef>
+            <a:effectRef idx="1">
+              <a:schemeClr val="accent6"/>
+            </a:effectRef>
+            <a:fontRef idx="minor">
+              <a:schemeClr val="dk1"/>
+            </a:fontRef>
+          </p:style>
+          <p:txBody>
+            <a:bodyPr rtlCol="0" anchor="ctr"/>
+            <a:lstStyle/>
+            <a:p>
+              <a:pPr algn="ctr"/>
+              <a:endParaRPr lang="de-DE" sz="1400" dirty="0"/>
+            </a:p>
+          </p:txBody>
+        </p:sp>
+        <p:sp>
+          <p:nvSpPr>
+            <p:cNvPr id="50" name="Textfeld 49"/>
+            <p:cNvSpPr txBox="1"/>
+            <p:nvPr/>
+          </p:nvSpPr>
+          <p:spPr>
+            <a:xfrm>
+              <a:off x="1187624" y="3068960"/>
+              <a:ext cx="1404156" cy="584775"/>
+            </a:xfrm>
+            <a:prstGeom prst="rect">
+              <a:avLst/>
+            </a:prstGeom>
+            <a:noFill/>
+          </p:spPr>
+          <p:txBody>
+            <a:bodyPr wrap="square" rtlCol="0">
+              <a:spAutoFit/>
+            </a:bodyPr>
+            <a:lstStyle/>
+            <a:p>
+              <a:r>
+                <a:rPr lang="de-DE" sz="800" dirty="0" smtClean="0"/>
+                <a:t>Als Clean </a:t>
+              </a:r>
+              <a:r>
+                <a:rPr lang="de-DE" sz="800" dirty="0" err="1" smtClean="0"/>
+                <a:t>Coder</a:t>
+              </a:r>
+              <a:endParaRPr lang="de-DE" sz="800" dirty="0" smtClean="0"/>
+            </a:p>
+            <a:p>
+              <a:r>
+                <a:rPr lang="de-DE" sz="800" dirty="0"/>
+                <a:t>w</a:t>
+              </a:r>
+              <a:r>
+                <a:rPr lang="de-DE" sz="800" dirty="0" smtClean="0"/>
+                <a:t>ill ich ständig an </a:t>
+              </a:r>
+              <a:r>
+                <a:rPr lang="de-DE" sz="800" dirty="0" smtClean="0"/>
+                <a:t>die Clean </a:t>
+              </a:r>
+              <a:r>
+                <a:rPr lang="de-DE" sz="800" dirty="0" smtClean="0"/>
+                <a:t>Code </a:t>
+              </a:r>
+              <a:r>
+                <a:rPr lang="de-DE" sz="800" dirty="0" smtClean="0"/>
+                <a:t>Prinzipien erinnert </a:t>
+              </a:r>
+              <a:r>
+                <a:rPr lang="de-DE" sz="800" dirty="0" smtClean="0"/>
+                <a:t>werden.</a:t>
+              </a:r>
+              <a:endParaRPr lang="de-DE" sz="800" dirty="0"/>
+            </a:p>
+          </p:txBody>
+        </p:sp>
+      </p:grpSp>
+      <p:grpSp>
+        <p:nvGrpSpPr>
+          <p:cNvPr id="57" name="Gruppieren 56"/>
+          <p:cNvGrpSpPr/>
+          <p:nvPr/>
+        </p:nvGrpSpPr>
+        <p:grpSpPr>
+          <a:xfrm>
+            <a:off x="6624228" y="5915956"/>
+            <a:ext cx="1404156" cy="584775"/>
+            <a:chOff x="1187624" y="3068960"/>
+            <a:chExt cx="1404156" cy="584775"/>
+          </a:xfrm>
+        </p:grpSpPr>
+        <p:sp>
+          <p:nvSpPr>
+            <p:cNvPr id="58" name="Gefaltete Ecke 57"/>
+            <p:cNvSpPr/>
+            <p:nvPr/>
+          </p:nvSpPr>
+          <p:spPr>
+            <a:xfrm>
+              <a:off x="1187624" y="3068960"/>
+              <a:ext cx="1296144" cy="577081"/>
+            </a:xfrm>
+            <a:prstGeom prst="foldedCorner">
+              <a:avLst/>
+            </a:prstGeom>
+          </p:spPr>
+          <p:style>
+            <a:lnRef idx="1">
+              <a:schemeClr val="accent6"/>
+            </a:lnRef>
+            <a:fillRef idx="2">
+              <a:schemeClr val="accent6"/>
+            </a:fillRef>
+            <a:effectRef idx="1">
+              <a:schemeClr val="accent6"/>
+            </a:effectRef>
+            <a:fontRef idx="minor">
+              <a:schemeClr val="dk1"/>
+            </a:fontRef>
+          </p:style>
+          <p:txBody>
+            <a:bodyPr rtlCol="0" anchor="ctr"/>
+            <a:lstStyle/>
+            <a:p>
+              <a:pPr algn="ctr"/>
+              <a:endParaRPr lang="de-DE" sz="1400" dirty="0"/>
+            </a:p>
+          </p:txBody>
+        </p:sp>
+        <p:sp>
+          <p:nvSpPr>
+            <p:cNvPr id="59" name="Textfeld 58"/>
+            <p:cNvSpPr txBox="1"/>
+            <p:nvPr/>
+          </p:nvSpPr>
+          <p:spPr>
+            <a:xfrm>
+              <a:off x="1187624" y="3068960"/>
+              <a:ext cx="1404156" cy="584775"/>
+            </a:xfrm>
+            <a:prstGeom prst="rect">
+              <a:avLst/>
+            </a:prstGeom>
+            <a:noFill/>
+          </p:spPr>
+          <p:txBody>
+            <a:bodyPr wrap="square" rtlCol="0">
+              <a:spAutoFit/>
+            </a:bodyPr>
+            <a:lstStyle/>
+            <a:p>
+              <a:r>
+                <a:rPr lang="de-DE" sz="800" dirty="0" smtClean="0"/>
+                <a:t>Als erfahr. .NET-Entwickler</a:t>
+              </a:r>
+            </a:p>
+            <a:p>
+              <a:r>
+                <a:rPr lang="de-DE" sz="800" dirty="0"/>
+                <a:t>w</a:t>
+              </a:r>
+              <a:r>
+                <a:rPr lang="de-DE" sz="800" dirty="0" smtClean="0"/>
+                <a:t>ill ich sehen, wie eine Veränderung des Systems</a:t>
+              </a:r>
+            </a:p>
+            <a:p>
+              <a:r>
+                <a:rPr lang="de-DE" sz="800" dirty="0" smtClean="0"/>
+                <a:t>die Qualität verändert.</a:t>
+              </a:r>
+              <a:endParaRPr lang="de-DE" sz="800" dirty="0"/>
+            </a:p>
+          </p:txBody>
+        </p:sp>
+      </p:grpSp>
+      <p:grpSp>
+        <p:nvGrpSpPr>
+          <p:cNvPr id="90" name="Gruppieren 89"/>
+          <p:cNvGrpSpPr/>
+          <p:nvPr/>
+        </p:nvGrpSpPr>
+        <p:grpSpPr>
+          <a:xfrm>
+            <a:off x="7560332" y="3574033"/>
+            <a:ext cx="1404156" cy="584775"/>
+            <a:chOff x="1187624" y="3068960"/>
+            <a:chExt cx="1404156" cy="584775"/>
+          </a:xfrm>
+        </p:grpSpPr>
+        <p:sp>
+          <p:nvSpPr>
+            <p:cNvPr id="91" name="Gefaltete Ecke 90"/>
+            <p:cNvSpPr/>
+            <p:nvPr/>
+          </p:nvSpPr>
+          <p:spPr>
+            <a:xfrm>
+              <a:off x="1187624" y="3068960"/>
+              <a:ext cx="1296144" cy="577081"/>
+            </a:xfrm>
+            <a:prstGeom prst="foldedCorner">
+              <a:avLst/>
+            </a:prstGeom>
+          </p:spPr>
+          <p:style>
+            <a:lnRef idx="1">
+              <a:schemeClr val="accent6"/>
+            </a:lnRef>
+            <a:fillRef idx="2">
+              <a:schemeClr val="accent6"/>
+            </a:fillRef>
+            <a:effectRef idx="1">
+              <a:schemeClr val="accent6"/>
+            </a:effectRef>
+            <a:fontRef idx="minor">
+              <a:schemeClr val="dk1"/>
+            </a:fontRef>
+          </p:style>
+          <p:txBody>
+            <a:bodyPr rtlCol="0" anchor="ctr"/>
+            <a:lstStyle/>
+            <a:p>
+              <a:pPr algn="ctr"/>
+              <a:endParaRPr lang="de-DE" sz="1400" dirty="0"/>
+            </a:p>
+          </p:txBody>
+        </p:sp>
+        <p:sp>
+          <p:nvSpPr>
+            <p:cNvPr id="92" name="Textfeld 91"/>
+            <p:cNvSpPr txBox="1"/>
+            <p:nvPr/>
+          </p:nvSpPr>
+          <p:spPr>
+            <a:xfrm>
+              <a:off x="1187624" y="3068960"/>
+              <a:ext cx="1404156" cy="584775"/>
+            </a:xfrm>
+            <a:prstGeom prst="rect">
+              <a:avLst/>
+            </a:prstGeom>
+            <a:noFill/>
+          </p:spPr>
+          <p:txBody>
+            <a:bodyPr wrap="square" rtlCol="0">
+              <a:spAutoFit/>
+            </a:bodyPr>
+            <a:lstStyle/>
+            <a:p>
+              <a:r>
+                <a:rPr lang="de-DE" sz="800" dirty="0" smtClean="0"/>
+                <a:t>Als erfahr. .NET-Entwickler</a:t>
+              </a:r>
+            </a:p>
+            <a:p>
+              <a:r>
+                <a:rPr lang="de-DE" sz="800" dirty="0"/>
+                <a:t>w</a:t>
+              </a:r>
+              <a:r>
+                <a:rPr lang="de-DE" sz="800" dirty="0" smtClean="0"/>
+                <a:t>ill ich sehen, wie die </a:t>
+              </a:r>
+              <a:r>
+                <a:rPr lang="de-DE" sz="800" dirty="0" err="1" smtClean="0"/>
+                <a:t>Metriken</a:t>
+              </a:r>
+              <a:r>
+                <a:rPr lang="de-DE" sz="800" dirty="0" smtClean="0"/>
+                <a:t> </a:t>
+              </a:r>
+              <a:r>
+                <a:rPr lang="de-DE" sz="800" dirty="0"/>
+                <a:t>in der </a:t>
+              </a:r>
+              <a:r>
+                <a:rPr lang="de-DE" sz="800" dirty="0" smtClean="0"/>
+                <a:t>VS-Solution </a:t>
+              </a:r>
+              <a:r>
+                <a:rPr lang="de-DE" sz="800" dirty="0" smtClean="0"/>
+                <a:t>statistisch </a:t>
+              </a:r>
+              <a:r>
+                <a:rPr lang="de-DE" sz="800" dirty="0" smtClean="0"/>
+                <a:t>verteilt sind.</a:t>
+              </a:r>
+              <a:endParaRPr lang="de-DE" sz="800" dirty="0"/>
+            </a:p>
+          </p:txBody>
+        </p:sp>
+      </p:grpSp>
+      <p:grpSp>
+        <p:nvGrpSpPr>
+          <p:cNvPr id="23" name="Gruppieren 22"/>
+          <p:cNvGrpSpPr/>
+          <p:nvPr/>
+        </p:nvGrpSpPr>
+        <p:grpSpPr>
+          <a:xfrm>
+            <a:off x="215516" y="1195735"/>
+            <a:ext cx="1404156" cy="577081"/>
+            <a:chOff x="1187624" y="3068960"/>
+            <a:chExt cx="1404156" cy="577081"/>
+          </a:xfrm>
+        </p:grpSpPr>
+        <p:sp>
+          <p:nvSpPr>
+            <p:cNvPr id="21" name="Gefaltete Ecke 20"/>
+            <p:cNvSpPr/>
+            <p:nvPr/>
+          </p:nvSpPr>
+          <p:spPr>
+            <a:xfrm>
+              <a:off x="1187624" y="3068960"/>
+              <a:ext cx="1296144" cy="577081"/>
+            </a:xfrm>
+            <a:prstGeom prst="foldedCorner">
+              <a:avLst/>
+            </a:prstGeom>
+          </p:spPr>
+          <p:style>
+            <a:lnRef idx="1">
+              <a:schemeClr val="accent6"/>
+            </a:lnRef>
+            <a:fillRef idx="2">
+              <a:schemeClr val="accent6"/>
+            </a:fillRef>
+            <a:effectRef idx="1">
+              <a:schemeClr val="accent6"/>
+            </a:effectRef>
+            <a:fontRef idx="minor">
+              <a:schemeClr val="dk1"/>
+            </a:fontRef>
+          </p:style>
+          <p:txBody>
+            <a:bodyPr rtlCol="0" anchor="ctr"/>
+            <a:lstStyle/>
+            <a:p>
+              <a:pPr algn="ctr"/>
+              <a:endParaRPr lang="de-DE" sz="1400" dirty="0"/>
+            </a:p>
+          </p:txBody>
+        </p:sp>
+        <p:sp>
+          <p:nvSpPr>
+            <p:cNvPr id="22" name="Textfeld 21"/>
+            <p:cNvSpPr txBox="1"/>
+            <p:nvPr/>
+          </p:nvSpPr>
+          <p:spPr>
+            <a:xfrm>
+              <a:off x="1187624" y="3068960"/>
+              <a:ext cx="1404156" cy="461665"/>
+            </a:xfrm>
+            <a:prstGeom prst="rect">
+              <a:avLst/>
+            </a:prstGeom>
+            <a:noFill/>
+          </p:spPr>
+          <p:txBody>
+            <a:bodyPr wrap="square" rtlCol="0">
+              <a:spAutoFit/>
+            </a:bodyPr>
+            <a:lstStyle/>
+            <a:p>
+              <a:r>
+                <a:rPr lang="de-DE" sz="800" dirty="0" smtClean="0"/>
+                <a:t>Als .NET-Entwickler</a:t>
+              </a:r>
+            </a:p>
+            <a:p>
+              <a:r>
+                <a:rPr lang="de-DE" sz="800" dirty="0"/>
+                <a:t>w</a:t>
+              </a:r>
+              <a:r>
+                <a:rPr lang="de-DE" sz="800" dirty="0" smtClean="0"/>
+                <a:t>ill ich Methoden-</a:t>
+              </a:r>
+              <a:r>
+                <a:rPr lang="de-DE" sz="800" dirty="0" err="1" smtClean="0"/>
+                <a:t>Metriken</a:t>
+              </a:r>
+              <a:r>
+                <a:rPr lang="de-DE" sz="800" dirty="0" smtClean="0"/>
+                <a:t> sehen.</a:t>
+              </a:r>
+              <a:endParaRPr lang="de-DE" sz="800" dirty="0"/>
+            </a:p>
+          </p:txBody>
+        </p:sp>
+      </p:grpSp>
+      <p:sp>
+        <p:nvSpPr>
+          <p:cNvPr id="99" name="Gestreifter Pfeil nach rechts 98"/>
+          <p:cNvSpPr/>
+          <p:nvPr/>
+        </p:nvSpPr>
+        <p:spPr>
+          <a:xfrm>
+            <a:off x="906890" y="2036236"/>
+            <a:ext cx="7560840" cy="86562"/>
+          </a:xfrm>
+          <a:prstGeom prst="stripedRightArrow">
+            <a:avLst/>
+          </a:prstGeom>
+        </p:spPr>
+        <p:style>
+          <a:lnRef idx="0">
+            <a:schemeClr val="accent1"/>
+          </a:lnRef>
+          <a:fillRef idx="3">
+            <a:schemeClr val="accent1"/>
+          </a:fillRef>
+          <a:effectRef idx="3">
+            <a:schemeClr val="accent1"/>
+          </a:effectRef>
+          <a:fontRef idx="minor">
+            <a:schemeClr val="lt1"/>
+          </a:fontRef>
+        </p:style>
+        <p:txBody>
+          <a:bodyPr rtlCol="0" anchor="ctr"/>
+          <a:lstStyle/>
+          <a:p>
+            <a:pPr algn="ctr"/>
+            <a:r>
+              <a:rPr lang="de-DE" dirty="0" smtClean="0">
+                <a:solidFill>
+                  <a:schemeClr val="tx1"/>
+                </a:solidFill>
+              </a:rPr>
+              <a:t>Sprint1</a:t>
+            </a:r>
+            <a:endParaRPr lang="de-DE" dirty="0">
+              <a:solidFill>
+                <a:schemeClr val="tx1"/>
+              </a:solidFill>
+            </a:endParaRPr>
+          </a:p>
+        </p:txBody>
+      </p:sp>
+      <p:sp>
+        <p:nvSpPr>
+          <p:cNvPr id="100" name="Gestreifter Pfeil nach rechts 99"/>
+          <p:cNvSpPr/>
+          <p:nvPr/>
+        </p:nvSpPr>
+        <p:spPr>
+          <a:xfrm>
+            <a:off x="896874" y="3231263"/>
+            <a:ext cx="7560840" cy="86562"/>
+          </a:xfrm>
+          <a:prstGeom prst="stripedRightArrow">
+            <a:avLst/>
+          </a:prstGeom>
+        </p:spPr>
+        <p:style>
+          <a:lnRef idx="0">
+            <a:schemeClr val="accent1"/>
+          </a:lnRef>
+          <a:fillRef idx="3">
+            <a:schemeClr val="accent1"/>
+          </a:fillRef>
+          <a:effectRef idx="3">
+            <a:schemeClr val="accent1"/>
+          </a:effectRef>
+          <a:fontRef idx="minor">
+            <a:schemeClr val="lt1"/>
+          </a:fontRef>
+        </p:style>
+        <p:txBody>
+          <a:bodyPr rtlCol="0" anchor="ctr"/>
+          <a:lstStyle/>
+          <a:p>
+            <a:pPr algn="ctr"/>
+            <a:r>
+              <a:rPr lang="de-DE" dirty="0" smtClean="0">
+                <a:solidFill>
+                  <a:schemeClr val="tx1"/>
+                </a:solidFill>
+              </a:rPr>
+              <a:t>Sprint2</a:t>
+            </a:r>
+            <a:endParaRPr lang="de-DE" dirty="0">
+              <a:solidFill>
+                <a:schemeClr val="tx1"/>
+              </a:solidFill>
+            </a:endParaRPr>
+          </a:p>
+        </p:txBody>
+      </p:sp>
+      <p:sp>
+        <p:nvSpPr>
+          <p:cNvPr id="101" name="Gestreifter Pfeil nach rechts 100"/>
+          <p:cNvSpPr/>
+          <p:nvPr/>
+        </p:nvSpPr>
+        <p:spPr>
+          <a:xfrm>
+            <a:off x="896874" y="4383391"/>
+            <a:ext cx="7560840" cy="86562"/>
+          </a:xfrm>
+          <a:prstGeom prst="stripedRightArrow">
+            <a:avLst/>
+          </a:prstGeom>
+        </p:spPr>
+        <p:style>
+          <a:lnRef idx="0">
+            <a:schemeClr val="accent1"/>
+          </a:lnRef>
+          <a:fillRef idx="3">
+            <a:schemeClr val="accent1"/>
+          </a:fillRef>
+          <a:effectRef idx="3">
+            <a:schemeClr val="accent1"/>
+          </a:effectRef>
+          <a:fontRef idx="minor">
+            <a:schemeClr val="lt1"/>
+          </a:fontRef>
+        </p:style>
+        <p:txBody>
+          <a:bodyPr rtlCol="0" anchor="ctr"/>
+          <a:lstStyle/>
+          <a:p>
+            <a:pPr algn="ctr"/>
+            <a:r>
+              <a:rPr lang="de-DE" dirty="0" smtClean="0">
+                <a:solidFill>
+                  <a:schemeClr val="tx1"/>
+                </a:solidFill>
+              </a:rPr>
+              <a:t>Sprint3</a:t>
+            </a:r>
+            <a:endParaRPr lang="de-DE" dirty="0">
+              <a:solidFill>
+                <a:schemeClr val="tx1"/>
+              </a:solidFill>
+            </a:endParaRPr>
+          </a:p>
+        </p:txBody>
+      </p:sp>
+      <p:sp>
+        <p:nvSpPr>
+          <p:cNvPr id="102" name="Gestreifter Pfeil nach rechts 101"/>
+          <p:cNvSpPr/>
+          <p:nvPr/>
+        </p:nvSpPr>
+        <p:spPr>
+          <a:xfrm>
+            <a:off x="896874" y="5535519"/>
+            <a:ext cx="7560840" cy="86562"/>
+          </a:xfrm>
+          <a:prstGeom prst="stripedRightArrow">
+            <a:avLst/>
+          </a:prstGeom>
+        </p:spPr>
+        <p:style>
+          <a:lnRef idx="0">
+            <a:schemeClr val="accent1"/>
+          </a:lnRef>
+          <a:fillRef idx="3">
+            <a:schemeClr val="accent1"/>
+          </a:fillRef>
+          <a:effectRef idx="3">
+            <a:schemeClr val="accent1"/>
+          </a:effectRef>
+          <a:fontRef idx="minor">
+            <a:schemeClr val="lt1"/>
+          </a:fontRef>
+        </p:style>
+        <p:txBody>
+          <a:bodyPr rtlCol="0" anchor="ctr"/>
+          <a:lstStyle/>
+          <a:p>
+            <a:pPr algn="ctr"/>
+            <a:r>
+              <a:rPr lang="de-DE" dirty="0" smtClean="0">
+                <a:solidFill>
+                  <a:schemeClr val="tx1"/>
+                </a:solidFill>
+              </a:rPr>
+              <a:t>Sprint4</a:t>
+            </a:r>
+            <a:endParaRPr lang="de-DE" dirty="0">
+              <a:solidFill>
+                <a:schemeClr val="tx1"/>
+              </a:solidFill>
+            </a:endParaRPr>
+          </a:p>
+        </p:txBody>
+      </p:sp>
+      <p:sp>
+        <p:nvSpPr>
+          <p:cNvPr id="105" name="Gestreifter Pfeil nach rechts 104"/>
+          <p:cNvSpPr/>
+          <p:nvPr/>
+        </p:nvSpPr>
+        <p:spPr>
+          <a:xfrm>
+            <a:off x="899592" y="6654806"/>
+            <a:ext cx="7560840" cy="86562"/>
+          </a:xfrm>
+          <a:prstGeom prst="stripedRightArrow">
+            <a:avLst/>
+          </a:prstGeom>
+        </p:spPr>
+        <p:style>
+          <a:lnRef idx="0">
+            <a:schemeClr val="accent1"/>
+          </a:lnRef>
+          <a:fillRef idx="3">
+            <a:schemeClr val="accent1"/>
+          </a:fillRef>
+          <a:effectRef idx="3">
+            <a:schemeClr val="accent1"/>
+          </a:effectRef>
+          <a:fontRef idx="minor">
+            <a:schemeClr val="lt1"/>
+          </a:fontRef>
+        </p:style>
+        <p:txBody>
+          <a:bodyPr rtlCol="0" anchor="ctr"/>
+          <a:lstStyle/>
+          <a:p>
+            <a:pPr algn="ctr"/>
+            <a:r>
+              <a:rPr lang="de-DE" dirty="0" smtClean="0">
+                <a:solidFill>
+                  <a:schemeClr val="tx1"/>
+                </a:solidFill>
+              </a:rPr>
+              <a:t>Sprint5</a:t>
+            </a:r>
+            <a:endParaRPr lang="de-DE" dirty="0">
+              <a:solidFill>
+                <a:schemeClr val="tx1"/>
+              </a:solidFill>
+            </a:endParaRPr>
+          </a:p>
+        </p:txBody>
+      </p:sp>
+      <p:sp>
+        <p:nvSpPr>
+          <p:cNvPr id="113" name="Ellipse 112"/>
+          <p:cNvSpPr/>
+          <p:nvPr/>
+        </p:nvSpPr>
+        <p:spPr>
+          <a:xfrm>
+            <a:off x="145798" y="357603"/>
+            <a:ext cx="1512168" cy="729662"/>
+          </a:xfrm>
+          <a:prstGeom prst="ellipse">
+            <a:avLst/>
+          </a:prstGeom>
+        </p:spPr>
+        <p:style>
+          <a:lnRef idx="1">
+            <a:schemeClr val="accent1"/>
+          </a:lnRef>
+          <a:fillRef idx="2">
+            <a:schemeClr val="accent1"/>
+          </a:fillRef>
+          <a:effectRef idx="1">
+            <a:schemeClr val="accent1"/>
+          </a:effectRef>
+          <a:fontRef idx="minor">
+            <a:schemeClr val="dk1"/>
+          </a:fontRef>
+        </p:style>
+        <p:txBody>
+          <a:bodyPr rtlCol="0" anchor="ctr"/>
+          <a:lstStyle/>
+          <a:p>
+            <a:pPr algn="ctr"/>
+            <a:endParaRPr lang="de-DE"/>
+          </a:p>
+        </p:txBody>
+      </p:sp>
+      <p:sp>
+        <p:nvSpPr>
+          <p:cNvPr id="114" name="Ellipse 113"/>
+          <p:cNvSpPr/>
+          <p:nvPr/>
+        </p:nvSpPr>
+        <p:spPr>
+          <a:xfrm>
+            <a:off x="2597304" y="355229"/>
+            <a:ext cx="1512168" cy="729662"/>
+          </a:xfrm>
+          <a:prstGeom prst="ellipse">
+            <a:avLst/>
+          </a:prstGeom>
+        </p:spPr>
+        <p:style>
+          <a:lnRef idx="1">
+            <a:schemeClr val="accent1"/>
+          </a:lnRef>
+          <a:fillRef idx="2">
+            <a:schemeClr val="accent1"/>
+          </a:fillRef>
+          <a:effectRef idx="1">
+            <a:schemeClr val="accent1"/>
+          </a:effectRef>
+          <a:fontRef idx="minor">
+            <a:schemeClr val="dk1"/>
+          </a:fontRef>
+        </p:style>
+        <p:txBody>
+          <a:bodyPr rtlCol="0" anchor="ctr"/>
+          <a:lstStyle/>
+          <a:p>
+            <a:pPr algn="ctr"/>
+            <a:endParaRPr lang="de-DE"/>
+          </a:p>
+        </p:txBody>
+      </p:sp>
+      <p:sp>
+        <p:nvSpPr>
+          <p:cNvPr id="115" name="Ellipse 114"/>
+          <p:cNvSpPr/>
+          <p:nvPr/>
+        </p:nvSpPr>
+        <p:spPr>
+          <a:xfrm>
+            <a:off x="5053196" y="355229"/>
+            <a:ext cx="1512168" cy="729662"/>
+          </a:xfrm>
+          <a:prstGeom prst="ellipse">
+            <a:avLst/>
+          </a:prstGeom>
+        </p:spPr>
+        <p:style>
+          <a:lnRef idx="1">
+            <a:schemeClr val="accent1"/>
+          </a:lnRef>
+          <a:fillRef idx="2">
+            <a:schemeClr val="accent1"/>
+          </a:fillRef>
+          <a:effectRef idx="1">
+            <a:schemeClr val="accent1"/>
+          </a:effectRef>
+          <a:fontRef idx="minor">
+            <a:schemeClr val="dk1"/>
+          </a:fontRef>
+        </p:style>
+        <p:txBody>
+          <a:bodyPr rtlCol="0" anchor="ctr"/>
+          <a:lstStyle/>
+          <a:p>
+            <a:pPr algn="ctr"/>
+            <a:endParaRPr lang="de-DE"/>
+          </a:p>
+        </p:txBody>
+      </p:sp>
+      <p:sp>
+        <p:nvSpPr>
+          <p:cNvPr id="116" name="Ellipse 115"/>
+          <p:cNvSpPr/>
+          <p:nvPr/>
+        </p:nvSpPr>
+        <p:spPr>
+          <a:xfrm>
+            <a:off x="7493848" y="355229"/>
+            <a:ext cx="1512168" cy="729662"/>
+          </a:xfrm>
+          <a:prstGeom prst="ellipse">
+            <a:avLst/>
+          </a:prstGeom>
+        </p:spPr>
+        <p:style>
+          <a:lnRef idx="1">
+            <a:schemeClr val="accent1"/>
+          </a:lnRef>
+          <a:fillRef idx="2">
+            <a:schemeClr val="accent1"/>
+          </a:fillRef>
+          <a:effectRef idx="1">
+            <a:schemeClr val="accent1"/>
+          </a:effectRef>
+          <a:fontRef idx="minor">
+            <a:schemeClr val="dk1"/>
+          </a:fontRef>
+        </p:style>
+        <p:txBody>
+          <a:bodyPr rtlCol="0" anchor="ctr"/>
+          <a:lstStyle/>
+          <a:p>
+            <a:pPr algn="ctr"/>
+            <a:endParaRPr lang="de-DE"/>
+          </a:p>
+        </p:txBody>
+      </p:sp>
+      <p:sp>
+        <p:nvSpPr>
+          <p:cNvPr id="16" name="Rechteck 15"/>
+          <p:cNvSpPr/>
+          <p:nvPr/>
+        </p:nvSpPr>
+        <p:spPr>
+          <a:xfrm>
+            <a:off x="7528714" y="459679"/>
+            <a:ext cx="1482906" cy="523220"/>
+          </a:xfrm>
+          <a:prstGeom prst="rect">
+            <a:avLst/>
+          </a:prstGeom>
+        </p:spPr>
+        <p:txBody>
+          <a:bodyPr wrap="none">
+            <a:spAutoFit/>
+          </a:bodyPr>
+          <a:lstStyle/>
+          <a:p>
+            <a:r>
+              <a:rPr lang="de-DE" sz="1400" dirty="0" smtClean="0"/>
+              <a:t>Software-Qualität</a:t>
+            </a:r>
+          </a:p>
+          <a:p>
+            <a:r>
+              <a:rPr lang="de-DE" sz="1400" dirty="0" smtClean="0"/>
+              <a:t>ermitteln</a:t>
+            </a:r>
+            <a:endParaRPr lang="de-DE" sz="1400" dirty="0"/>
+          </a:p>
+        </p:txBody>
+      </p:sp>
+      <p:sp>
+        <p:nvSpPr>
+          <p:cNvPr id="9" name="Rechteck 8"/>
+          <p:cNvSpPr/>
+          <p:nvPr/>
+        </p:nvSpPr>
+        <p:spPr>
+          <a:xfrm>
+            <a:off x="5203806" y="432895"/>
+            <a:ext cx="1384418" cy="523220"/>
+          </a:xfrm>
+          <a:prstGeom prst="rect">
+            <a:avLst/>
+          </a:prstGeom>
+        </p:spPr>
+        <p:txBody>
+          <a:bodyPr wrap="none">
+            <a:spAutoFit/>
+          </a:bodyPr>
+          <a:lstStyle/>
+          <a:p>
+            <a:r>
+              <a:rPr lang="de-DE" sz="1400" dirty="0"/>
+              <a:t>Clean </a:t>
+            </a:r>
+            <a:r>
+              <a:rPr lang="de-DE" sz="1400" dirty="0" smtClean="0"/>
+              <a:t>Code</a:t>
+            </a:r>
+          </a:p>
+          <a:p>
+            <a:r>
+              <a:rPr lang="de-DE" sz="1400" dirty="0" smtClean="0"/>
+              <a:t>Hilfe bekommen</a:t>
+            </a:r>
+            <a:endParaRPr lang="de-DE" sz="1400" dirty="0"/>
+          </a:p>
+        </p:txBody>
+      </p:sp>
+      <p:sp>
+        <p:nvSpPr>
+          <p:cNvPr id="19" name="Rechteck 18"/>
+          <p:cNvSpPr/>
+          <p:nvPr/>
+        </p:nvSpPr>
+        <p:spPr>
+          <a:xfrm>
+            <a:off x="2748031" y="442477"/>
+            <a:ext cx="1319913" cy="523220"/>
+          </a:xfrm>
+          <a:prstGeom prst="rect">
+            <a:avLst/>
+          </a:prstGeom>
+        </p:spPr>
+        <p:txBody>
+          <a:bodyPr wrap="none">
+            <a:spAutoFit/>
+          </a:bodyPr>
+          <a:lstStyle/>
+          <a:p>
+            <a:r>
+              <a:rPr lang="de-DE" sz="1400" dirty="0" smtClean="0"/>
+              <a:t>Code-Probleme</a:t>
+            </a:r>
+          </a:p>
+          <a:p>
+            <a:r>
+              <a:rPr lang="de-DE" sz="1400" dirty="0" smtClean="0"/>
+              <a:t>identifizieren</a:t>
+            </a:r>
+            <a:endParaRPr lang="de-DE" sz="1400" dirty="0"/>
+          </a:p>
+        </p:txBody>
+      </p:sp>
+      <p:sp>
+        <p:nvSpPr>
+          <p:cNvPr id="13" name="Rechteck 12"/>
+          <p:cNvSpPr/>
+          <p:nvPr/>
+        </p:nvSpPr>
+        <p:spPr>
+          <a:xfrm>
+            <a:off x="337270" y="504903"/>
+            <a:ext cx="1282402" cy="523220"/>
+          </a:xfrm>
+          <a:prstGeom prst="rect">
+            <a:avLst/>
+          </a:prstGeom>
+        </p:spPr>
+        <p:txBody>
+          <a:bodyPr wrap="none">
+            <a:spAutoFit/>
+          </a:bodyPr>
+          <a:lstStyle/>
+          <a:p>
+            <a:r>
+              <a:rPr lang="de-DE" sz="1400" dirty="0" smtClean="0"/>
+              <a:t>Code-</a:t>
+            </a:r>
+            <a:r>
+              <a:rPr lang="de-DE" sz="1400" dirty="0" err="1" smtClean="0"/>
+              <a:t>Metriken</a:t>
+            </a:r>
+            <a:endParaRPr lang="de-DE" sz="1400" dirty="0" smtClean="0"/>
+          </a:p>
+          <a:p>
+            <a:r>
+              <a:rPr lang="de-DE" sz="1400" dirty="0" smtClean="0"/>
+              <a:t>bestimmen</a:t>
+            </a:r>
+            <a:endParaRPr lang="de-DE" sz="1400" dirty="0"/>
+          </a:p>
+        </p:txBody>
+      </p:sp>
+      <p:grpSp>
+        <p:nvGrpSpPr>
+          <p:cNvPr id="42" name="Gruppieren 41"/>
+          <p:cNvGrpSpPr/>
+          <p:nvPr/>
+        </p:nvGrpSpPr>
+        <p:grpSpPr>
+          <a:xfrm>
+            <a:off x="4463988" y="4805863"/>
+            <a:ext cx="1404156" cy="584775"/>
+            <a:chOff x="1187624" y="3068960"/>
+            <a:chExt cx="1404156" cy="584775"/>
+          </a:xfrm>
+        </p:grpSpPr>
+        <p:sp>
+          <p:nvSpPr>
+            <p:cNvPr id="43" name="Gefaltete Ecke 42"/>
+            <p:cNvSpPr/>
+            <p:nvPr/>
+          </p:nvSpPr>
+          <p:spPr>
+            <a:xfrm>
+              <a:off x="1187624" y="3068960"/>
+              <a:ext cx="1296144" cy="577081"/>
+            </a:xfrm>
+            <a:prstGeom prst="foldedCorner">
+              <a:avLst/>
+            </a:prstGeom>
+          </p:spPr>
+          <p:style>
+            <a:lnRef idx="1">
+              <a:schemeClr val="accent6"/>
+            </a:lnRef>
+            <a:fillRef idx="2">
+              <a:schemeClr val="accent6"/>
+            </a:fillRef>
+            <a:effectRef idx="1">
+              <a:schemeClr val="accent6"/>
+            </a:effectRef>
+            <a:fontRef idx="minor">
+              <a:schemeClr val="dk1"/>
+            </a:fontRef>
+          </p:style>
+          <p:txBody>
+            <a:bodyPr rtlCol="0" anchor="ctr"/>
+            <a:lstStyle/>
+            <a:p>
+              <a:pPr algn="ctr"/>
+              <a:endParaRPr lang="de-DE" sz="1400" dirty="0"/>
+            </a:p>
+          </p:txBody>
+        </p:sp>
+        <p:sp>
+          <p:nvSpPr>
+            <p:cNvPr id="44" name="Textfeld 43"/>
+            <p:cNvSpPr txBox="1"/>
+            <p:nvPr/>
+          </p:nvSpPr>
+          <p:spPr>
+            <a:xfrm>
+              <a:off x="1187624" y="3068960"/>
+              <a:ext cx="1404156" cy="584775"/>
+            </a:xfrm>
+            <a:prstGeom prst="rect">
+              <a:avLst/>
+            </a:prstGeom>
+            <a:noFill/>
+          </p:spPr>
+          <p:txBody>
+            <a:bodyPr wrap="square" rtlCol="0">
+              <a:spAutoFit/>
+            </a:bodyPr>
+            <a:lstStyle/>
+            <a:p>
+              <a:r>
+                <a:rPr lang="de-DE" sz="800" dirty="0" smtClean="0"/>
+                <a:t>Als Clean </a:t>
+              </a:r>
+              <a:r>
+                <a:rPr lang="de-DE" sz="800" dirty="0" err="1" smtClean="0"/>
+                <a:t>Coder</a:t>
+              </a:r>
+              <a:r>
+                <a:rPr lang="de-DE" sz="800" dirty="0" smtClean="0"/>
+                <a:t> </a:t>
+              </a:r>
+            </a:p>
+            <a:p>
+              <a:r>
+                <a:rPr lang="de-DE" sz="800" dirty="0" smtClean="0"/>
+                <a:t>will ich einen Hinweis bekommen, wenn eine Aktion Clean Code fördert.</a:t>
+              </a:r>
+              <a:endParaRPr lang="de-DE" sz="800" dirty="0"/>
+            </a:p>
+          </p:txBody>
+        </p:sp>
+      </p:grpSp>
+      <p:grpSp>
+        <p:nvGrpSpPr>
+          <p:cNvPr id="62" name="Gruppieren 61"/>
+          <p:cNvGrpSpPr/>
+          <p:nvPr/>
+        </p:nvGrpSpPr>
+        <p:grpSpPr>
+          <a:xfrm>
+            <a:off x="5256076" y="4437112"/>
+            <a:ext cx="1404156" cy="577081"/>
+            <a:chOff x="1187624" y="3068960"/>
+            <a:chExt cx="1404156" cy="577081"/>
+          </a:xfrm>
+        </p:grpSpPr>
+        <p:sp>
+          <p:nvSpPr>
+            <p:cNvPr id="63" name="Gefaltete Ecke 62"/>
+            <p:cNvSpPr/>
+            <p:nvPr/>
+          </p:nvSpPr>
+          <p:spPr>
+            <a:xfrm>
+              <a:off x="1187624" y="3068960"/>
+              <a:ext cx="1296144" cy="577081"/>
+            </a:xfrm>
+            <a:prstGeom prst="foldedCorner">
+              <a:avLst/>
+            </a:prstGeom>
+          </p:spPr>
+          <p:style>
+            <a:lnRef idx="1">
+              <a:schemeClr val="accent6"/>
+            </a:lnRef>
+            <a:fillRef idx="2">
+              <a:schemeClr val="accent6"/>
+            </a:fillRef>
+            <a:effectRef idx="1">
+              <a:schemeClr val="accent6"/>
+            </a:effectRef>
+            <a:fontRef idx="minor">
+              <a:schemeClr val="dk1"/>
+            </a:fontRef>
+          </p:style>
+          <p:txBody>
+            <a:bodyPr rtlCol="0" anchor="ctr"/>
+            <a:lstStyle/>
+            <a:p>
+              <a:pPr algn="ctr"/>
+              <a:endParaRPr lang="de-DE" sz="1400" dirty="0"/>
+            </a:p>
+          </p:txBody>
+        </p:sp>
+        <p:sp>
+          <p:nvSpPr>
+            <p:cNvPr id="65" name="Textfeld 64"/>
+            <p:cNvSpPr txBox="1"/>
+            <p:nvPr/>
+          </p:nvSpPr>
+          <p:spPr>
+            <a:xfrm>
+              <a:off x="1187624" y="3068960"/>
+              <a:ext cx="1404156" cy="461665"/>
+            </a:xfrm>
+            <a:prstGeom prst="rect">
+              <a:avLst/>
+            </a:prstGeom>
+            <a:noFill/>
+          </p:spPr>
+          <p:txBody>
+            <a:bodyPr wrap="square" rtlCol="0">
+              <a:spAutoFit/>
+            </a:bodyPr>
+            <a:lstStyle/>
+            <a:p>
+              <a:r>
+                <a:rPr lang="de-DE" sz="800" dirty="0" smtClean="0"/>
+                <a:t>Als Clean </a:t>
+              </a:r>
+              <a:r>
+                <a:rPr lang="de-DE" sz="800" dirty="0" err="1" smtClean="0"/>
+                <a:t>Coder</a:t>
+              </a:r>
+              <a:endParaRPr lang="de-DE" sz="800" b="1" dirty="0" smtClean="0"/>
+            </a:p>
+            <a:p>
+              <a:r>
+                <a:rPr lang="de-DE" sz="800" dirty="0"/>
+                <a:t>w</a:t>
+              </a:r>
+              <a:r>
+                <a:rPr lang="de-DE" sz="800" dirty="0" smtClean="0"/>
+                <a:t>ill ich </a:t>
+              </a:r>
+              <a:r>
+                <a:rPr lang="de-DE" sz="800" dirty="0" smtClean="0"/>
+                <a:t>Clean Code </a:t>
+              </a:r>
+              <a:r>
+                <a:rPr lang="de-DE" sz="800" dirty="0" err="1" smtClean="0"/>
+                <a:t>Metriken</a:t>
+              </a:r>
+              <a:r>
+                <a:rPr lang="de-DE" sz="800" dirty="0"/>
+                <a:t> </a:t>
+              </a:r>
+              <a:r>
+                <a:rPr lang="de-DE" sz="800" dirty="0" smtClean="0"/>
+                <a:t>der </a:t>
+              </a:r>
+              <a:r>
+                <a:rPr lang="de-DE" sz="800" dirty="0"/>
+                <a:t>VS-Solution sehen</a:t>
+              </a:r>
+              <a:r>
+                <a:rPr lang="de-DE" sz="800" dirty="0" smtClean="0"/>
+                <a:t>.</a:t>
+              </a:r>
+              <a:endParaRPr lang="de-DE" sz="800" dirty="0"/>
+            </a:p>
+          </p:txBody>
+        </p:sp>
+      </p:grpSp>
+      <p:grpSp>
+        <p:nvGrpSpPr>
+          <p:cNvPr id="66" name="Gruppieren 65"/>
+          <p:cNvGrpSpPr/>
+          <p:nvPr/>
+        </p:nvGrpSpPr>
+        <p:grpSpPr>
+          <a:xfrm>
+            <a:off x="7668344" y="5555916"/>
+            <a:ext cx="1404156" cy="584775"/>
+            <a:chOff x="1187624" y="3068960"/>
+            <a:chExt cx="1404156" cy="584775"/>
+          </a:xfrm>
+        </p:grpSpPr>
+        <p:sp>
+          <p:nvSpPr>
+            <p:cNvPr id="67" name="Gefaltete Ecke 66"/>
+            <p:cNvSpPr/>
+            <p:nvPr/>
+          </p:nvSpPr>
+          <p:spPr>
+            <a:xfrm>
+              <a:off x="1187624" y="3068960"/>
+              <a:ext cx="1296144" cy="577081"/>
+            </a:xfrm>
+            <a:prstGeom prst="foldedCorner">
+              <a:avLst/>
+            </a:prstGeom>
+          </p:spPr>
+          <p:style>
+            <a:lnRef idx="1">
+              <a:schemeClr val="accent6"/>
+            </a:lnRef>
+            <a:fillRef idx="2">
+              <a:schemeClr val="accent6"/>
+            </a:fillRef>
+            <a:effectRef idx="1">
+              <a:schemeClr val="accent6"/>
+            </a:effectRef>
+            <a:fontRef idx="minor">
+              <a:schemeClr val="dk1"/>
+            </a:fontRef>
+          </p:style>
+          <p:txBody>
+            <a:bodyPr rtlCol="0" anchor="ctr"/>
+            <a:lstStyle/>
+            <a:p>
+              <a:pPr algn="ctr"/>
+              <a:endParaRPr lang="de-DE" sz="1400" dirty="0"/>
+            </a:p>
+          </p:txBody>
+        </p:sp>
+        <p:sp>
+          <p:nvSpPr>
+            <p:cNvPr id="68" name="Textfeld 67"/>
+            <p:cNvSpPr txBox="1"/>
+            <p:nvPr/>
+          </p:nvSpPr>
+          <p:spPr>
+            <a:xfrm>
+              <a:off x="1187624" y="3068960"/>
+              <a:ext cx="1404156" cy="584775"/>
+            </a:xfrm>
+            <a:prstGeom prst="rect">
+              <a:avLst/>
+            </a:prstGeom>
+            <a:noFill/>
+          </p:spPr>
+          <p:txBody>
+            <a:bodyPr wrap="square" rtlCol="0">
+              <a:spAutoFit/>
+            </a:bodyPr>
+            <a:lstStyle/>
+            <a:p>
+              <a:r>
+                <a:rPr lang="de-DE" sz="800" dirty="0" smtClean="0"/>
+                <a:t>Als erfahr. .NET-Entwickler</a:t>
+              </a:r>
+            </a:p>
+            <a:p>
+              <a:r>
+                <a:rPr lang="de-DE" sz="800" dirty="0"/>
+                <a:t>w</a:t>
+              </a:r>
+              <a:r>
+                <a:rPr lang="de-DE" sz="800" dirty="0" smtClean="0"/>
+                <a:t>ill ich sehen, wie eine Veränderung des Systems die </a:t>
+              </a:r>
+              <a:r>
+                <a:rPr lang="de-DE" sz="800" dirty="0" err="1" smtClean="0"/>
+                <a:t>Metriken</a:t>
+              </a:r>
+              <a:r>
+                <a:rPr lang="de-DE" sz="800" dirty="0" smtClean="0"/>
+                <a:t> verändert.</a:t>
+              </a:r>
+              <a:endParaRPr lang="de-DE" sz="800" dirty="0"/>
+            </a:p>
+          </p:txBody>
+        </p:sp>
+      </p:grpSp>
+      <p:grpSp>
+        <p:nvGrpSpPr>
+          <p:cNvPr id="51" name="Gruppieren 50"/>
+          <p:cNvGrpSpPr/>
+          <p:nvPr/>
+        </p:nvGrpSpPr>
+        <p:grpSpPr>
+          <a:xfrm>
+            <a:off x="7768405" y="6084585"/>
+            <a:ext cx="1404156" cy="584775"/>
+            <a:chOff x="1187624" y="3068960"/>
+            <a:chExt cx="1404156" cy="584775"/>
+          </a:xfrm>
+        </p:grpSpPr>
+        <p:sp>
+          <p:nvSpPr>
+            <p:cNvPr id="52" name="Gefaltete Ecke 51"/>
+            <p:cNvSpPr/>
+            <p:nvPr/>
+          </p:nvSpPr>
+          <p:spPr>
+            <a:xfrm>
+              <a:off x="1187624" y="3068960"/>
+              <a:ext cx="1296144" cy="577081"/>
+            </a:xfrm>
+            <a:prstGeom prst="foldedCorner">
+              <a:avLst/>
+            </a:prstGeom>
+          </p:spPr>
+          <p:style>
+            <a:lnRef idx="1">
+              <a:schemeClr val="accent6"/>
+            </a:lnRef>
+            <a:fillRef idx="2">
+              <a:schemeClr val="accent6"/>
+            </a:fillRef>
+            <a:effectRef idx="1">
+              <a:schemeClr val="accent6"/>
+            </a:effectRef>
+            <a:fontRef idx="minor">
+              <a:schemeClr val="dk1"/>
+            </a:fontRef>
+          </p:style>
+          <p:txBody>
+            <a:bodyPr rtlCol="0" anchor="ctr"/>
+            <a:lstStyle/>
+            <a:p>
+              <a:pPr algn="ctr"/>
+              <a:endParaRPr lang="de-DE" sz="1400" dirty="0"/>
+            </a:p>
+          </p:txBody>
+        </p:sp>
+        <p:sp>
+          <p:nvSpPr>
+            <p:cNvPr id="53" name="Textfeld 52"/>
+            <p:cNvSpPr txBox="1"/>
+            <p:nvPr/>
+          </p:nvSpPr>
+          <p:spPr>
+            <a:xfrm>
+              <a:off x="1187624" y="3068960"/>
+              <a:ext cx="1404156" cy="584775"/>
+            </a:xfrm>
+            <a:prstGeom prst="rect">
+              <a:avLst/>
+            </a:prstGeom>
+            <a:noFill/>
+          </p:spPr>
+          <p:txBody>
+            <a:bodyPr wrap="square" rtlCol="0">
+              <a:spAutoFit/>
+            </a:bodyPr>
+            <a:lstStyle/>
+            <a:p>
+              <a:r>
+                <a:rPr lang="de-DE" sz="800" dirty="0" smtClean="0"/>
+                <a:t>Als erfahr. .NET-Entwickler</a:t>
+              </a:r>
+            </a:p>
+            <a:p>
+              <a:r>
+                <a:rPr lang="de-DE" sz="800" dirty="0"/>
+                <a:t>w</a:t>
+              </a:r>
+              <a:r>
+                <a:rPr lang="de-DE" sz="800" dirty="0" smtClean="0"/>
+                <a:t>ill ich eine Qualitätsaussage über meine </a:t>
+              </a:r>
+              <a:r>
+                <a:rPr lang="de-DE" sz="800" dirty="0" smtClean="0"/>
+                <a:t>VS-Solution </a:t>
+              </a:r>
+              <a:r>
+                <a:rPr lang="de-DE" sz="800" dirty="0" smtClean="0"/>
+                <a:t>sehen.</a:t>
+              </a:r>
+              <a:endParaRPr lang="de-DE" sz="800" dirty="0"/>
+            </a:p>
+          </p:txBody>
+        </p:sp>
+      </p:grpSp>
+      <p:grpSp>
+        <p:nvGrpSpPr>
+          <p:cNvPr id="45" name="Gruppieren 44"/>
+          <p:cNvGrpSpPr/>
+          <p:nvPr/>
+        </p:nvGrpSpPr>
+        <p:grpSpPr>
+          <a:xfrm>
+            <a:off x="5652120" y="4949119"/>
+            <a:ext cx="1404156" cy="577081"/>
+            <a:chOff x="1187624" y="3068960"/>
+            <a:chExt cx="1404156" cy="577081"/>
+          </a:xfrm>
+        </p:grpSpPr>
+        <p:sp>
+          <p:nvSpPr>
+            <p:cNvPr id="46" name="Gefaltete Ecke 45"/>
+            <p:cNvSpPr/>
+            <p:nvPr/>
+          </p:nvSpPr>
+          <p:spPr>
+            <a:xfrm>
+              <a:off x="1187624" y="3068960"/>
+              <a:ext cx="1296144" cy="577081"/>
+            </a:xfrm>
+            <a:prstGeom prst="foldedCorner">
+              <a:avLst/>
+            </a:prstGeom>
+          </p:spPr>
+          <p:style>
+            <a:lnRef idx="1">
+              <a:schemeClr val="accent6"/>
+            </a:lnRef>
+            <a:fillRef idx="2">
+              <a:schemeClr val="accent6"/>
+            </a:fillRef>
+            <a:effectRef idx="1">
+              <a:schemeClr val="accent6"/>
+            </a:effectRef>
+            <a:fontRef idx="minor">
+              <a:schemeClr val="dk1"/>
+            </a:fontRef>
+          </p:style>
+          <p:txBody>
+            <a:bodyPr rtlCol="0" anchor="ctr"/>
+            <a:lstStyle/>
+            <a:p>
+              <a:pPr algn="ctr"/>
+              <a:endParaRPr lang="de-DE" sz="1400" dirty="0"/>
+            </a:p>
+          </p:txBody>
+        </p:sp>
+        <p:sp>
+          <p:nvSpPr>
+            <p:cNvPr id="47" name="Textfeld 46"/>
+            <p:cNvSpPr txBox="1"/>
+            <p:nvPr/>
+          </p:nvSpPr>
+          <p:spPr>
+            <a:xfrm>
+              <a:off x="1187624" y="3068960"/>
+              <a:ext cx="1404156" cy="461665"/>
+            </a:xfrm>
+            <a:prstGeom prst="rect">
+              <a:avLst/>
+            </a:prstGeom>
+            <a:noFill/>
+          </p:spPr>
+          <p:txBody>
+            <a:bodyPr wrap="square" rtlCol="0">
+              <a:spAutoFit/>
+            </a:bodyPr>
+            <a:lstStyle/>
+            <a:p>
+              <a:r>
+                <a:rPr lang="de-DE" sz="800" dirty="0" smtClean="0"/>
+                <a:t>Als Clean </a:t>
+              </a:r>
+              <a:r>
+                <a:rPr lang="de-DE" sz="800" dirty="0" err="1" smtClean="0"/>
+                <a:t>Coder</a:t>
+              </a:r>
+              <a:endParaRPr lang="de-DE" sz="800" b="1" dirty="0" smtClean="0"/>
+            </a:p>
+            <a:p>
+              <a:r>
+                <a:rPr lang="de-DE" sz="800" dirty="0"/>
+                <a:t>w</a:t>
+              </a:r>
+              <a:r>
+                <a:rPr lang="de-DE" sz="800" dirty="0" smtClean="0"/>
+                <a:t>ill ich sehen, warum mein Code nicht mehr clean ist.</a:t>
+              </a:r>
+              <a:endParaRPr lang="de-DE" sz="800" dirty="0"/>
+            </a:p>
+          </p:txBody>
+        </p:sp>
+      </p:grpSp>
+      <p:grpSp>
+        <p:nvGrpSpPr>
+          <p:cNvPr id="36" name="Gruppieren 35"/>
+          <p:cNvGrpSpPr/>
+          <p:nvPr/>
+        </p:nvGrpSpPr>
+        <p:grpSpPr>
+          <a:xfrm>
+            <a:off x="3131840" y="1524539"/>
+            <a:ext cx="1404156" cy="584775"/>
+            <a:chOff x="1187624" y="3068960"/>
+            <a:chExt cx="1404156" cy="584775"/>
+          </a:xfrm>
+        </p:grpSpPr>
+        <p:sp>
+          <p:nvSpPr>
+            <p:cNvPr id="37" name="Gefaltete Ecke 36"/>
+            <p:cNvSpPr/>
+            <p:nvPr/>
+          </p:nvSpPr>
+          <p:spPr>
+            <a:xfrm>
+              <a:off x="1187624" y="3068960"/>
+              <a:ext cx="1296144" cy="577081"/>
+            </a:xfrm>
+            <a:prstGeom prst="foldedCorner">
+              <a:avLst/>
+            </a:prstGeom>
+          </p:spPr>
+          <p:style>
+            <a:lnRef idx="1">
+              <a:schemeClr val="accent6"/>
+            </a:lnRef>
+            <a:fillRef idx="2">
+              <a:schemeClr val="accent6"/>
+            </a:fillRef>
+            <a:effectRef idx="1">
+              <a:schemeClr val="accent6"/>
+            </a:effectRef>
+            <a:fontRef idx="minor">
+              <a:schemeClr val="dk1"/>
+            </a:fontRef>
+          </p:style>
+          <p:txBody>
+            <a:bodyPr rtlCol="0" anchor="ctr"/>
+            <a:lstStyle/>
+            <a:p>
+              <a:pPr algn="ctr"/>
+              <a:endParaRPr lang="de-DE" sz="1400" dirty="0"/>
+            </a:p>
+          </p:txBody>
+        </p:sp>
+        <p:sp>
+          <p:nvSpPr>
+            <p:cNvPr id="38" name="Textfeld 37"/>
+            <p:cNvSpPr txBox="1"/>
+            <p:nvPr/>
+          </p:nvSpPr>
+          <p:spPr>
+            <a:xfrm>
+              <a:off x="1187624" y="3068960"/>
+              <a:ext cx="1404156" cy="584775"/>
+            </a:xfrm>
+            <a:prstGeom prst="rect">
+              <a:avLst/>
+            </a:prstGeom>
+            <a:noFill/>
+          </p:spPr>
+          <p:txBody>
+            <a:bodyPr wrap="square" rtlCol="0">
+              <a:spAutoFit/>
+            </a:bodyPr>
+            <a:lstStyle/>
+            <a:p>
+              <a:r>
+                <a:rPr lang="de-DE" sz="800" dirty="0" smtClean="0"/>
+                <a:t>Als .NET-Entwickler</a:t>
+              </a:r>
+            </a:p>
+            <a:p>
+              <a:r>
+                <a:rPr lang="de-DE" sz="800" dirty="0"/>
+                <a:t>w</a:t>
+              </a:r>
+              <a:r>
+                <a:rPr lang="de-DE" sz="800" dirty="0" smtClean="0"/>
+                <a:t>ill ich Methoden finden, deren gewichtete </a:t>
+              </a:r>
+              <a:r>
+                <a:rPr lang="de-DE" sz="800" dirty="0" err="1" smtClean="0"/>
+                <a:t>Metriken</a:t>
+              </a:r>
+              <a:r>
+                <a:rPr lang="de-DE" sz="800" dirty="0" smtClean="0"/>
+                <a:t> über einer Schwelle liegen.</a:t>
+              </a:r>
+              <a:endParaRPr lang="de-DE" sz="800" dirty="0"/>
+            </a:p>
+          </p:txBody>
+        </p:sp>
+      </p:grpSp>
+      <p:grpSp>
+        <p:nvGrpSpPr>
           <p:cNvPr id="27" name="Gruppieren 26"/>
           <p:cNvGrpSpPr/>
           <p:nvPr/>
         </p:nvGrpSpPr>
         <p:grpSpPr>
           <a:xfrm>
-            <a:off x="107504" y="1628800"/>
+            <a:off x="755576" y="1483767"/>
             <a:ext cx="1404156" cy="577081"/>
             <a:chOff x="1187624" y="3068960"/>
             <a:chExt cx="1404156" cy="577081"/>
@@ -7942,510 +9845,13 @@
       </p:grpSp>
       <p:grpSp>
         <p:nvGrpSpPr>
-          <p:cNvPr id="30" name="Gruppieren 29"/>
+          <p:cNvPr id="54" name="Gruppieren 53"/>
           <p:cNvGrpSpPr/>
           <p:nvPr/>
         </p:nvGrpSpPr>
         <p:grpSpPr>
           <a:xfrm>
-            <a:off x="215516" y="3644007"/>
-            <a:ext cx="1404156" cy="577081"/>
-            <a:chOff x="1187624" y="3068960"/>
-            <a:chExt cx="1404156" cy="577081"/>
-          </a:xfrm>
-        </p:grpSpPr>
-        <p:sp>
-          <p:nvSpPr>
-            <p:cNvPr id="31" name="Gefaltete Ecke 30"/>
-            <p:cNvSpPr/>
-            <p:nvPr/>
-          </p:nvSpPr>
-          <p:spPr>
-            <a:xfrm>
-              <a:off x="1187624" y="3068960"/>
-              <a:ext cx="1296144" cy="577081"/>
-            </a:xfrm>
-            <a:prstGeom prst="foldedCorner">
-              <a:avLst/>
-            </a:prstGeom>
-          </p:spPr>
-          <p:style>
-            <a:lnRef idx="1">
-              <a:schemeClr val="accent6"/>
-            </a:lnRef>
-            <a:fillRef idx="2">
-              <a:schemeClr val="accent6"/>
-            </a:fillRef>
-            <a:effectRef idx="1">
-              <a:schemeClr val="accent6"/>
-            </a:effectRef>
-            <a:fontRef idx="minor">
-              <a:schemeClr val="dk1"/>
-            </a:fontRef>
-          </p:style>
-          <p:txBody>
-            <a:bodyPr rtlCol="0" anchor="ctr"/>
-            <a:lstStyle/>
-            <a:p>
-              <a:pPr algn="ctr"/>
-              <a:endParaRPr lang="de-DE" sz="1400" dirty="0"/>
-            </a:p>
-          </p:txBody>
-        </p:sp>
-        <p:sp>
-          <p:nvSpPr>
-            <p:cNvPr id="32" name="Textfeld 31"/>
-            <p:cNvSpPr txBox="1"/>
-            <p:nvPr/>
-          </p:nvSpPr>
-          <p:spPr>
-            <a:xfrm>
-              <a:off x="1187624" y="3068960"/>
-              <a:ext cx="1404156" cy="461665"/>
-            </a:xfrm>
-            <a:prstGeom prst="rect">
-              <a:avLst/>
-            </a:prstGeom>
-            <a:noFill/>
-          </p:spPr>
-          <p:txBody>
-            <a:bodyPr wrap="square" rtlCol="0">
-              <a:spAutoFit/>
-            </a:bodyPr>
-            <a:lstStyle/>
-            <a:p>
-              <a:r>
-                <a:rPr lang="de-DE" sz="800" dirty="0" smtClean="0"/>
-                <a:t>Als .NET-Entwickler</a:t>
-              </a:r>
-            </a:p>
-            <a:p>
-              <a:r>
-                <a:rPr lang="de-DE" sz="800" dirty="0"/>
-                <a:t>w</a:t>
-              </a:r>
-              <a:r>
-                <a:rPr lang="de-DE" sz="800" dirty="0" smtClean="0"/>
-                <a:t>ill ich </a:t>
-              </a:r>
-              <a:r>
-                <a:rPr lang="de-DE" sz="800" dirty="0" err="1" smtClean="0"/>
-                <a:t>Metriken</a:t>
-              </a:r>
-              <a:r>
-                <a:rPr lang="de-DE" sz="800" dirty="0" smtClean="0"/>
-                <a:t> direkt in Visual Studio sehen.</a:t>
-              </a:r>
-              <a:endParaRPr lang="de-DE" sz="800" dirty="0"/>
-            </a:p>
-          </p:txBody>
-        </p:sp>
-      </p:grpSp>
-      <p:grpSp>
-        <p:nvGrpSpPr>
-          <p:cNvPr id="33" name="Gruppieren 32"/>
-          <p:cNvGrpSpPr/>
-          <p:nvPr/>
-        </p:nvGrpSpPr>
-        <p:grpSpPr>
-          <a:xfrm>
-            <a:off x="2738086" y="1579022"/>
-            <a:ext cx="1404156" cy="577081"/>
-            <a:chOff x="1187624" y="3068960"/>
-            <a:chExt cx="1404156" cy="577081"/>
-          </a:xfrm>
-        </p:grpSpPr>
-        <p:sp>
-          <p:nvSpPr>
-            <p:cNvPr id="34" name="Gefaltete Ecke 33"/>
-            <p:cNvSpPr/>
-            <p:nvPr/>
-          </p:nvSpPr>
-          <p:spPr>
-            <a:xfrm>
-              <a:off x="1187624" y="3068960"/>
-              <a:ext cx="1296144" cy="577081"/>
-            </a:xfrm>
-            <a:prstGeom prst="foldedCorner">
-              <a:avLst/>
-            </a:prstGeom>
-          </p:spPr>
-          <p:style>
-            <a:lnRef idx="1">
-              <a:schemeClr val="accent6"/>
-            </a:lnRef>
-            <a:fillRef idx="2">
-              <a:schemeClr val="accent6"/>
-            </a:fillRef>
-            <a:effectRef idx="1">
-              <a:schemeClr val="accent6"/>
-            </a:effectRef>
-            <a:fontRef idx="minor">
-              <a:schemeClr val="dk1"/>
-            </a:fontRef>
-          </p:style>
-          <p:txBody>
-            <a:bodyPr rtlCol="0" anchor="ctr"/>
-            <a:lstStyle/>
-            <a:p>
-              <a:pPr algn="ctr"/>
-              <a:endParaRPr lang="de-DE" sz="1400" dirty="0"/>
-            </a:p>
-          </p:txBody>
-        </p:sp>
-        <p:sp>
-          <p:nvSpPr>
-            <p:cNvPr id="35" name="Textfeld 34"/>
-            <p:cNvSpPr txBox="1"/>
-            <p:nvPr/>
-          </p:nvSpPr>
-          <p:spPr>
-            <a:xfrm>
-              <a:off x="1187624" y="3068960"/>
-              <a:ext cx="1404156" cy="461665"/>
-            </a:xfrm>
-            <a:prstGeom prst="rect">
-              <a:avLst/>
-            </a:prstGeom>
-            <a:noFill/>
-          </p:spPr>
-          <p:txBody>
-            <a:bodyPr wrap="square" rtlCol="0">
-              <a:spAutoFit/>
-            </a:bodyPr>
-            <a:lstStyle/>
-            <a:p>
-              <a:r>
-                <a:rPr lang="de-DE" sz="800" dirty="0" smtClean="0"/>
-                <a:t>Als .NET-Entwickler</a:t>
-              </a:r>
-            </a:p>
-            <a:p>
-              <a:r>
-                <a:rPr lang="de-DE" sz="800" dirty="0"/>
-                <a:t>w</a:t>
-              </a:r>
-              <a:r>
-                <a:rPr lang="de-DE" sz="800" dirty="0" smtClean="0"/>
-                <a:t>ill ich </a:t>
-              </a:r>
-              <a:r>
-                <a:rPr lang="de-DE" sz="800" dirty="0" err="1" smtClean="0"/>
-                <a:t>Metriken</a:t>
-              </a:r>
-              <a:r>
-                <a:rPr lang="de-DE" sz="800" dirty="0" smtClean="0"/>
-                <a:t> und deren Gewichtung sehen.</a:t>
-              </a:r>
-              <a:endParaRPr lang="de-DE" sz="800" dirty="0"/>
-            </a:p>
-          </p:txBody>
-        </p:sp>
-      </p:grpSp>
-      <p:grpSp>
-        <p:nvGrpSpPr>
-          <p:cNvPr id="36" name="Gruppieren 35"/>
-          <p:cNvGrpSpPr/>
-          <p:nvPr/>
-        </p:nvGrpSpPr>
-        <p:grpSpPr>
-          <a:xfrm>
-            <a:off x="3962222" y="1627838"/>
-            <a:ext cx="1404156" cy="584775"/>
-            <a:chOff x="1187624" y="3068960"/>
-            <a:chExt cx="1404156" cy="584775"/>
-          </a:xfrm>
-        </p:grpSpPr>
-        <p:sp>
-          <p:nvSpPr>
-            <p:cNvPr id="37" name="Gefaltete Ecke 36"/>
-            <p:cNvSpPr/>
-            <p:nvPr/>
-          </p:nvSpPr>
-          <p:spPr>
-            <a:xfrm>
-              <a:off x="1187624" y="3068960"/>
-              <a:ext cx="1296144" cy="577081"/>
-            </a:xfrm>
-            <a:prstGeom prst="foldedCorner">
-              <a:avLst/>
-            </a:prstGeom>
-          </p:spPr>
-          <p:style>
-            <a:lnRef idx="1">
-              <a:schemeClr val="accent6"/>
-            </a:lnRef>
-            <a:fillRef idx="2">
-              <a:schemeClr val="accent6"/>
-            </a:fillRef>
-            <a:effectRef idx="1">
-              <a:schemeClr val="accent6"/>
-            </a:effectRef>
-            <a:fontRef idx="minor">
-              <a:schemeClr val="dk1"/>
-            </a:fontRef>
-          </p:style>
-          <p:txBody>
-            <a:bodyPr rtlCol="0" anchor="ctr"/>
-            <a:lstStyle/>
-            <a:p>
-              <a:pPr algn="ctr"/>
-              <a:endParaRPr lang="de-DE" sz="1400" dirty="0"/>
-            </a:p>
-          </p:txBody>
-        </p:sp>
-        <p:sp>
-          <p:nvSpPr>
-            <p:cNvPr id="38" name="Textfeld 37"/>
-            <p:cNvSpPr txBox="1"/>
-            <p:nvPr/>
-          </p:nvSpPr>
-          <p:spPr>
-            <a:xfrm>
-              <a:off x="1187624" y="3068960"/>
-              <a:ext cx="1404156" cy="584775"/>
-            </a:xfrm>
-            <a:prstGeom prst="rect">
-              <a:avLst/>
-            </a:prstGeom>
-            <a:noFill/>
-          </p:spPr>
-          <p:txBody>
-            <a:bodyPr wrap="square" rtlCol="0">
-              <a:spAutoFit/>
-            </a:bodyPr>
-            <a:lstStyle/>
-            <a:p>
-              <a:r>
-                <a:rPr lang="de-DE" sz="800" dirty="0" smtClean="0"/>
-                <a:t>Als .NET-Entwickler</a:t>
-              </a:r>
-            </a:p>
-            <a:p>
-              <a:r>
-                <a:rPr lang="de-DE" sz="800" dirty="0"/>
-                <a:t>w</a:t>
-              </a:r>
-              <a:r>
-                <a:rPr lang="de-DE" sz="800" dirty="0" smtClean="0"/>
-                <a:t>ill ich Methoden finden, deren gewichtete </a:t>
-              </a:r>
-              <a:r>
-                <a:rPr lang="de-DE" sz="800" dirty="0" err="1" smtClean="0"/>
-                <a:t>Metriken</a:t>
-              </a:r>
-              <a:r>
-                <a:rPr lang="de-DE" sz="800" dirty="0" smtClean="0"/>
-                <a:t> über einer Schwelle liegen.</a:t>
-              </a:r>
-              <a:endParaRPr lang="de-DE" sz="800" dirty="0"/>
-            </a:p>
-          </p:txBody>
-        </p:sp>
-      </p:grpSp>
-      <p:grpSp>
-        <p:nvGrpSpPr>
-          <p:cNvPr id="39" name="Gruppieren 38"/>
-          <p:cNvGrpSpPr/>
-          <p:nvPr/>
-        </p:nvGrpSpPr>
-        <p:grpSpPr>
-          <a:xfrm>
-            <a:off x="2792092" y="2636912"/>
-            <a:ext cx="1404156" cy="584775"/>
-            <a:chOff x="1187624" y="3068960"/>
-            <a:chExt cx="1404156" cy="584775"/>
-          </a:xfrm>
-        </p:grpSpPr>
-        <p:sp>
-          <p:nvSpPr>
-            <p:cNvPr id="40" name="Gefaltete Ecke 39"/>
-            <p:cNvSpPr/>
-            <p:nvPr/>
-          </p:nvSpPr>
-          <p:spPr>
-            <a:xfrm>
-              <a:off x="1187624" y="3068960"/>
-              <a:ext cx="1296144" cy="577081"/>
-            </a:xfrm>
-            <a:prstGeom prst="foldedCorner">
-              <a:avLst/>
-            </a:prstGeom>
-          </p:spPr>
-          <p:style>
-            <a:lnRef idx="1">
-              <a:schemeClr val="accent6"/>
-            </a:lnRef>
-            <a:fillRef idx="2">
-              <a:schemeClr val="accent6"/>
-            </a:fillRef>
-            <a:effectRef idx="1">
-              <a:schemeClr val="accent6"/>
-            </a:effectRef>
-            <a:fontRef idx="minor">
-              <a:schemeClr val="dk1"/>
-            </a:fontRef>
-          </p:style>
-          <p:txBody>
-            <a:bodyPr rtlCol="0" anchor="ctr"/>
-            <a:lstStyle/>
-            <a:p>
-              <a:pPr algn="ctr"/>
-              <a:endParaRPr lang="de-DE" sz="1400" dirty="0"/>
-            </a:p>
-          </p:txBody>
-        </p:sp>
-        <p:sp>
-          <p:nvSpPr>
-            <p:cNvPr id="41" name="Textfeld 40"/>
-            <p:cNvSpPr txBox="1"/>
-            <p:nvPr/>
-          </p:nvSpPr>
-          <p:spPr>
-            <a:xfrm>
-              <a:off x="1187624" y="3068960"/>
-              <a:ext cx="1404156" cy="584775"/>
-            </a:xfrm>
-            <a:prstGeom prst="rect">
-              <a:avLst/>
-            </a:prstGeom>
-            <a:noFill/>
-          </p:spPr>
-          <p:txBody>
-            <a:bodyPr wrap="square" rtlCol="0">
-              <a:spAutoFit/>
-            </a:bodyPr>
-            <a:lstStyle/>
-            <a:p>
-              <a:r>
-                <a:rPr lang="de-DE" sz="800" dirty="0" smtClean="0"/>
-                <a:t>Als .NET-Entwickler</a:t>
-              </a:r>
-            </a:p>
-            <a:p>
-              <a:r>
-                <a:rPr lang="de-DE" sz="800" dirty="0"/>
-                <a:t>w</a:t>
-              </a:r>
-              <a:r>
-                <a:rPr lang="de-DE" sz="800" dirty="0" smtClean="0"/>
-                <a:t>ill ich Klassen finden, deren gewichtete </a:t>
-              </a:r>
-              <a:r>
-                <a:rPr lang="de-DE" sz="800" dirty="0" err="1" smtClean="0"/>
-                <a:t>Metriken</a:t>
-              </a:r>
-              <a:r>
-                <a:rPr lang="de-DE" sz="800" dirty="0" smtClean="0"/>
-                <a:t> über einer Schwelle liegen.</a:t>
-              </a:r>
-              <a:endParaRPr lang="de-DE" sz="800" dirty="0"/>
-            </a:p>
-          </p:txBody>
-        </p:sp>
-      </p:grpSp>
-      <p:grpSp>
-        <p:nvGrpSpPr>
-          <p:cNvPr id="48" name="Gruppieren 47"/>
-          <p:cNvGrpSpPr/>
-          <p:nvPr/>
-        </p:nvGrpSpPr>
-        <p:grpSpPr>
-          <a:xfrm>
-            <a:off x="5114350" y="3644007"/>
-            <a:ext cx="1404156" cy="577081"/>
-            <a:chOff x="1187624" y="3068960"/>
-            <a:chExt cx="1404156" cy="577081"/>
-          </a:xfrm>
-        </p:grpSpPr>
-        <p:sp>
-          <p:nvSpPr>
-            <p:cNvPr id="49" name="Gefaltete Ecke 48"/>
-            <p:cNvSpPr/>
-            <p:nvPr/>
-          </p:nvSpPr>
-          <p:spPr>
-            <a:xfrm>
-              <a:off x="1187624" y="3068960"/>
-              <a:ext cx="1296144" cy="577081"/>
-            </a:xfrm>
-            <a:prstGeom prst="foldedCorner">
-              <a:avLst/>
-            </a:prstGeom>
-          </p:spPr>
-          <p:style>
-            <a:lnRef idx="1">
-              <a:schemeClr val="accent6"/>
-            </a:lnRef>
-            <a:fillRef idx="2">
-              <a:schemeClr val="accent6"/>
-            </a:fillRef>
-            <a:effectRef idx="1">
-              <a:schemeClr val="accent6"/>
-            </a:effectRef>
-            <a:fontRef idx="minor">
-              <a:schemeClr val="dk1"/>
-            </a:fontRef>
-          </p:style>
-          <p:txBody>
-            <a:bodyPr rtlCol="0" anchor="ctr"/>
-            <a:lstStyle/>
-            <a:p>
-              <a:pPr algn="ctr"/>
-              <a:endParaRPr lang="de-DE" sz="1400" dirty="0"/>
-            </a:p>
-          </p:txBody>
-        </p:sp>
-        <p:sp>
-          <p:nvSpPr>
-            <p:cNvPr id="50" name="Textfeld 49"/>
-            <p:cNvSpPr txBox="1"/>
-            <p:nvPr/>
-          </p:nvSpPr>
-          <p:spPr>
-            <a:xfrm>
-              <a:off x="1187624" y="3068960"/>
-              <a:ext cx="1404156" cy="461665"/>
-            </a:xfrm>
-            <a:prstGeom prst="rect">
-              <a:avLst/>
-            </a:prstGeom>
-            <a:noFill/>
-          </p:spPr>
-          <p:txBody>
-            <a:bodyPr wrap="square" rtlCol="0">
-              <a:spAutoFit/>
-            </a:bodyPr>
-            <a:lstStyle/>
-            <a:p>
-              <a:r>
-                <a:rPr lang="de-DE" sz="800" dirty="0" smtClean="0"/>
-                <a:t>Als .NET-Entwickler</a:t>
-              </a:r>
-            </a:p>
-            <a:p>
-              <a:r>
-                <a:rPr lang="de-DE" sz="800" dirty="0"/>
-                <a:t>w</a:t>
-              </a:r>
-              <a:r>
-                <a:rPr lang="de-DE" sz="800" dirty="0" smtClean="0"/>
-                <a:t>ill ich ständig sehen, was Clean Code konform wäre.</a:t>
-              </a:r>
-              <a:endParaRPr lang="de-DE" sz="800" dirty="0"/>
-            </a:p>
-          </p:txBody>
-        </p:sp>
-      </p:grpSp>
-      <p:grpSp>
-        <p:nvGrpSpPr>
-          <p:cNvPr id="54" name="Gruppieren 53"/>
-          <p:cNvGrpSpPr/>
-          <p:nvPr/>
-        </p:nvGrpSpPr>
-        <p:grpSpPr>
-          <a:xfrm>
-            <a:off x="1333930" y="2753345"/>
+            <a:off x="719572" y="2636912"/>
             <a:ext cx="1404156" cy="577081"/>
             <a:chOff x="1187624" y="3068960"/>
             <a:chExt cx="1404156" cy="577081"/>
@@ -8538,1138 +9944,6 @@
           </p:txBody>
         </p:sp>
       </p:grpSp>
-      <p:grpSp>
-        <p:nvGrpSpPr>
-          <p:cNvPr id="57" name="Gruppieren 56"/>
-          <p:cNvGrpSpPr/>
-          <p:nvPr/>
-        </p:nvGrpSpPr>
-        <p:grpSpPr>
-          <a:xfrm>
-            <a:off x="6588224" y="5733256"/>
-            <a:ext cx="1404156" cy="584775"/>
-            <a:chOff x="1187624" y="3068960"/>
-            <a:chExt cx="1404156" cy="584775"/>
-          </a:xfrm>
-        </p:grpSpPr>
-        <p:sp>
-          <p:nvSpPr>
-            <p:cNvPr id="58" name="Gefaltete Ecke 57"/>
-            <p:cNvSpPr/>
-            <p:nvPr/>
-          </p:nvSpPr>
-          <p:spPr>
-            <a:xfrm>
-              <a:off x="1187624" y="3068960"/>
-              <a:ext cx="1296144" cy="577081"/>
-            </a:xfrm>
-            <a:prstGeom prst="foldedCorner">
-              <a:avLst/>
-            </a:prstGeom>
-          </p:spPr>
-          <p:style>
-            <a:lnRef idx="1">
-              <a:schemeClr val="accent6"/>
-            </a:lnRef>
-            <a:fillRef idx="2">
-              <a:schemeClr val="accent6"/>
-            </a:fillRef>
-            <a:effectRef idx="1">
-              <a:schemeClr val="accent6"/>
-            </a:effectRef>
-            <a:fontRef idx="minor">
-              <a:schemeClr val="dk1"/>
-            </a:fontRef>
-          </p:style>
-          <p:txBody>
-            <a:bodyPr rtlCol="0" anchor="ctr"/>
-            <a:lstStyle/>
-            <a:p>
-              <a:pPr algn="ctr"/>
-              <a:endParaRPr lang="de-DE" sz="1400" dirty="0"/>
-            </a:p>
-          </p:txBody>
-        </p:sp>
-        <p:sp>
-          <p:nvSpPr>
-            <p:cNvPr id="59" name="Textfeld 58"/>
-            <p:cNvSpPr txBox="1"/>
-            <p:nvPr/>
-          </p:nvSpPr>
-          <p:spPr>
-            <a:xfrm>
-              <a:off x="1187624" y="3068960"/>
-              <a:ext cx="1404156" cy="584775"/>
-            </a:xfrm>
-            <a:prstGeom prst="rect">
-              <a:avLst/>
-            </a:prstGeom>
-            <a:noFill/>
-          </p:spPr>
-          <p:txBody>
-            <a:bodyPr wrap="square" rtlCol="0">
-              <a:spAutoFit/>
-            </a:bodyPr>
-            <a:lstStyle/>
-            <a:p>
-              <a:r>
-                <a:rPr lang="de-DE" sz="800" dirty="0" smtClean="0"/>
-                <a:t>Als .NET-Entwickler</a:t>
-              </a:r>
-            </a:p>
-            <a:p>
-              <a:r>
-                <a:rPr lang="de-DE" sz="800" dirty="0"/>
-                <a:t>w</a:t>
-              </a:r>
-              <a:r>
-                <a:rPr lang="de-DE" sz="800" dirty="0" smtClean="0"/>
-                <a:t>ill ich sehen, wie eine Veränderung des Systems</a:t>
-              </a:r>
-            </a:p>
-            <a:p>
-              <a:r>
-                <a:rPr lang="de-DE" sz="800" dirty="0" smtClean="0"/>
-                <a:t>die Qualität verändert.</a:t>
-              </a:r>
-              <a:endParaRPr lang="de-DE" sz="800" dirty="0"/>
-            </a:p>
-          </p:txBody>
-        </p:sp>
-      </p:grpSp>
-      <p:grpSp>
-        <p:nvGrpSpPr>
-          <p:cNvPr id="90" name="Gruppieren 89"/>
-          <p:cNvGrpSpPr/>
-          <p:nvPr/>
-        </p:nvGrpSpPr>
-        <p:grpSpPr>
-          <a:xfrm>
-            <a:off x="7562622" y="3645024"/>
-            <a:ext cx="1404156" cy="584775"/>
-            <a:chOff x="1187624" y="3068960"/>
-            <a:chExt cx="1404156" cy="584775"/>
-          </a:xfrm>
-        </p:grpSpPr>
-        <p:sp>
-          <p:nvSpPr>
-            <p:cNvPr id="91" name="Gefaltete Ecke 90"/>
-            <p:cNvSpPr/>
-            <p:nvPr/>
-          </p:nvSpPr>
-          <p:spPr>
-            <a:xfrm>
-              <a:off x="1187624" y="3068960"/>
-              <a:ext cx="1296144" cy="577081"/>
-            </a:xfrm>
-            <a:prstGeom prst="foldedCorner">
-              <a:avLst/>
-            </a:prstGeom>
-          </p:spPr>
-          <p:style>
-            <a:lnRef idx="1">
-              <a:schemeClr val="accent6"/>
-            </a:lnRef>
-            <a:fillRef idx="2">
-              <a:schemeClr val="accent6"/>
-            </a:fillRef>
-            <a:effectRef idx="1">
-              <a:schemeClr val="accent6"/>
-            </a:effectRef>
-            <a:fontRef idx="minor">
-              <a:schemeClr val="dk1"/>
-            </a:fontRef>
-          </p:style>
-          <p:txBody>
-            <a:bodyPr rtlCol="0" anchor="ctr"/>
-            <a:lstStyle/>
-            <a:p>
-              <a:pPr algn="ctr"/>
-              <a:endParaRPr lang="de-DE" sz="1400" dirty="0"/>
-            </a:p>
-          </p:txBody>
-        </p:sp>
-        <p:sp>
-          <p:nvSpPr>
-            <p:cNvPr id="92" name="Textfeld 91"/>
-            <p:cNvSpPr txBox="1"/>
-            <p:nvPr/>
-          </p:nvSpPr>
-          <p:spPr>
-            <a:xfrm>
-              <a:off x="1187624" y="3068960"/>
-              <a:ext cx="1404156" cy="584775"/>
-            </a:xfrm>
-            <a:prstGeom prst="rect">
-              <a:avLst/>
-            </a:prstGeom>
-            <a:noFill/>
-          </p:spPr>
-          <p:txBody>
-            <a:bodyPr wrap="square" rtlCol="0">
-              <a:spAutoFit/>
-            </a:bodyPr>
-            <a:lstStyle/>
-            <a:p>
-              <a:r>
-                <a:rPr lang="de-DE" sz="800" dirty="0" smtClean="0"/>
-                <a:t>Als .NET-Entwickler</a:t>
-              </a:r>
-            </a:p>
-            <a:p>
-              <a:r>
-                <a:rPr lang="de-DE" sz="800" dirty="0"/>
-                <a:t>w</a:t>
-              </a:r>
-              <a:r>
-                <a:rPr lang="de-DE" sz="800" dirty="0" smtClean="0"/>
-                <a:t>ill ich sehen, wie eine Veränderung des Systems die </a:t>
-              </a:r>
-              <a:r>
-                <a:rPr lang="de-DE" sz="800" dirty="0" err="1" smtClean="0"/>
-                <a:t>Metriken</a:t>
-              </a:r>
-              <a:r>
-                <a:rPr lang="de-DE" sz="800" dirty="0" smtClean="0"/>
-                <a:t> verändert.</a:t>
-              </a:r>
-              <a:endParaRPr lang="de-DE" sz="800" dirty="0"/>
-            </a:p>
-          </p:txBody>
-        </p:sp>
-      </p:grpSp>
-      <p:grpSp>
-        <p:nvGrpSpPr>
-          <p:cNvPr id="23" name="Gruppieren 22"/>
-          <p:cNvGrpSpPr/>
-          <p:nvPr/>
-        </p:nvGrpSpPr>
-        <p:grpSpPr>
-          <a:xfrm>
-            <a:off x="1261922" y="1696653"/>
-            <a:ext cx="1404156" cy="577081"/>
-            <a:chOff x="1187624" y="3068960"/>
-            <a:chExt cx="1404156" cy="577081"/>
-          </a:xfrm>
-        </p:grpSpPr>
-        <p:sp>
-          <p:nvSpPr>
-            <p:cNvPr id="21" name="Gefaltete Ecke 20"/>
-            <p:cNvSpPr/>
-            <p:nvPr/>
-          </p:nvSpPr>
-          <p:spPr>
-            <a:xfrm>
-              <a:off x="1187624" y="3068960"/>
-              <a:ext cx="1296144" cy="577081"/>
-            </a:xfrm>
-            <a:prstGeom prst="foldedCorner">
-              <a:avLst/>
-            </a:prstGeom>
-          </p:spPr>
-          <p:style>
-            <a:lnRef idx="1">
-              <a:schemeClr val="accent6"/>
-            </a:lnRef>
-            <a:fillRef idx="2">
-              <a:schemeClr val="accent6"/>
-            </a:fillRef>
-            <a:effectRef idx="1">
-              <a:schemeClr val="accent6"/>
-            </a:effectRef>
-            <a:fontRef idx="minor">
-              <a:schemeClr val="dk1"/>
-            </a:fontRef>
-          </p:style>
-          <p:txBody>
-            <a:bodyPr rtlCol="0" anchor="ctr"/>
-            <a:lstStyle/>
-            <a:p>
-              <a:pPr algn="ctr"/>
-              <a:endParaRPr lang="de-DE" sz="1400" dirty="0"/>
-            </a:p>
-          </p:txBody>
-        </p:sp>
-        <p:sp>
-          <p:nvSpPr>
-            <p:cNvPr id="22" name="Textfeld 21"/>
-            <p:cNvSpPr txBox="1"/>
-            <p:nvPr/>
-          </p:nvSpPr>
-          <p:spPr>
-            <a:xfrm>
-              <a:off x="1187624" y="3068960"/>
-              <a:ext cx="1404156" cy="461665"/>
-            </a:xfrm>
-            <a:prstGeom prst="rect">
-              <a:avLst/>
-            </a:prstGeom>
-            <a:noFill/>
-          </p:spPr>
-          <p:txBody>
-            <a:bodyPr wrap="square" rtlCol="0">
-              <a:spAutoFit/>
-            </a:bodyPr>
-            <a:lstStyle/>
-            <a:p>
-              <a:r>
-                <a:rPr lang="de-DE" sz="800" dirty="0" smtClean="0"/>
-                <a:t>Als .NET-Entwickler</a:t>
-              </a:r>
-            </a:p>
-            <a:p>
-              <a:r>
-                <a:rPr lang="de-DE" sz="800" dirty="0"/>
-                <a:t>w</a:t>
-              </a:r>
-              <a:r>
-                <a:rPr lang="de-DE" sz="800" dirty="0" smtClean="0"/>
-                <a:t>ill ich Methoden-</a:t>
-              </a:r>
-              <a:r>
-                <a:rPr lang="de-DE" sz="800" dirty="0" err="1" smtClean="0"/>
-                <a:t>Metriken</a:t>
-              </a:r>
-              <a:r>
-                <a:rPr lang="de-DE" sz="800" dirty="0" smtClean="0"/>
-                <a:t> sehen.</a:t>
-              </a:r>
-              <a:endParaRPr lang="de-DE" sz="800" dirty="0"/>
-            </a:p>
-          </p:txBody>
-        </p:sp>
-      </p:grpSp>
-      <p:grpSp>
-        <p:nvGrpSpPr>
-          <p:cNvPr id="42" name="Gruppieren 41"/>
-          <p:cNvGrpSpPr/>
-          <p:nvPr/>
-        </p:nvGrpSpPr>
-        <p:grpSpPr>
-          <a:xfrm>
-            <a:off x="4826318" y="4788441"/>
-            <a:ext cx="1404156" cy="584775"/>
-            <a:chOff x="1187624" y="3068960"/>
-            <a:chExt cx="1404156" cy="584775"/>
-          </a:xfrm>
-        </p:grpSpPr>
-        <p:sp>
-          <p:nvSpPr>
-            <p:cNvPr id="43" name="Gefaltete Ecke 42"/>
-            <p:cNvSpPr/>
-            <p:nvPr/>
-          </p:nvSpPr>
-          <p:spPr>
-            <a:xfrm>
-              <a:off x="1187624" y="3068960"/>
-              <a:ext cx="1296144" cy="577081"/>
-            </a:xfrm>
-            <a:prstGeom prst="foldedCorner">
-              <a:avLst/>
-            </a:prstGeom>
-          </p:spPr>
-          <p:style>
-            <a:lnRef idx="1">
-              <a:schemeClr val="accent6"/>
-            </a:lnRef>
-            <a:fillRef idx="2">
-              <a:schemeClr val="accent6"/>
-            </a:fillRef>
-            <a:effectRef idx="1">
-              <a:schemeClr val="accent6"/>
-            </a:effectRef>
-            <a:fontRef idx="minor">
-              <a:schemeClr val="dk1"/>
-            </a:fontRef>
-          </p:style>
-          <p:txBody>
-            <a:bodyPr rtlCol="0" anchor="ctr"/>
-            <a:lstStyle/>
-            <a:p>
-              <a:pPr algn="ctr"/>
-              <a:endParaRPr lang="de-DE" sz="1400" dirty="0"/>
-            </a:p>
-          </p:txBody>
-        </p:sp>
-        <p:sp>
-          <p:nvSpPr>
-            <p:cNvPr id="44" name="Textfeld 43"/>
-            <p:cNvSpPr txBox="1"/>
-            <p:nvPr/>
-          </p:nvSpPr>
-          <p:spPr>
-            <a:xfrm>
-              <a:off x="1187624" y="3068960"/>
-              <a:ext cx="1404156" cy="584775"/>
-            </a:xfrm>
-            <a:prstGeom prst="rect">
-              <a:avLst/>
-            </a:prstGeom>
-            <a:noFill/>
-          </p:spPr>
-          <p:txBody>
-            <a:bodyPr wrap="square" rtlCol="0">
-              <a:spAutoFit/>
-            </a:bodyPr>
-            <a:lstStyle/>
-            <a:p>
-              <a:r>
-                <a:rPr lang="de-DE" sz="800" dirty="0" smtClean="0"/>
-                <a:t>Als .NET-Entwickler</a:t>
-              </a:r>
-            </a:p>
-            <a:p>
-              <a:r>
-                <a:rPr lang="de-DE" sz="800" dirty="0"/>
-                <a:t>w</a:t>
-              </a:r>
-              <a:r>
-                <a:rPr lang="de-DE" sz="800" dirty="0" smtClean="0"/>
-                <a:t>ill ich einen Hinweis bekommen, wenn eine Sache Clean Code konform ist.</a:t>
-              </a:r>
-              <a:endParaRPr lang="de-DE" sz="800" dirty="0"/>
-            </a:p>
-          </p:txBody>
-        </p:sp>
-      </p:grpSp>
-      <p:grpSp>
-        <p:nvGrpSpPr>
-          <p:cNvPr id="45" name="Gruppieren 44"/>
-          <p:cNvGrpSpPr/>
-          <p:nvPr/>
-        </p:nvGrpSpPr>
-        <p:grpSpPr>
-          <a:xfrm>
-            <a:off x="6086458" y="4653136"/>
-            <a:ext cx="1404156" cy="584775"/>
-            <a:chOff x="1187624" y="3068960"/>
-            <a:chExt cx="1404156" cy="584775"/>
-          </a:xfrm>
-        </p:grpSpPr>
-        <p:sp>
-          <p:nvSpPr>
-            <p:cNvPr id="46" name="Gefaltete Ecke 45"/>
-            <p:cNvSpPr/>
-            <p:nvPr/>
-          </p:nvSpPr>
-          <p:spPr>
-            <a:xfrm>
-              <a:off x="1187624" y="3068960"/>
-              <a:ext cx="1296144" cy="577081"/>
-            </a:xfrm>
-            <a:prstGeom prst="foldedCorner">
-              <a:avLst/>
-            </a:prstGeom>
-          </p:spPr>
-          <p:style>
-            <a:lnRef idx="1">
-              <a:schemeClr val="accent6"/>
-            </a:lnRef>
-            <a:fillRef idx="2">
-              <a:schemeClr val="accent6"/>
-            </a:fillRef>
-            <a:effectRef idx="1">
-              <a:schemeClr val="accent6"/>
-            </a:effectRef>
-            <a:fontRef idx="minor">
-              <a:schemeClr val="dk1"/>
-            </a:fontRef>
-          </p:style>
-          <p:txBody>
-            <a:bodyPr rtlCol="0" anchor="ctr"/>
-            <a:lstStyle/>
-            <a:p>
-              <a:pPr algn="ctr"/>
-              <a:endParaRPr lang="de-DE" sz="1400" dirty="0"/>
-            </a:p>
-          </p:txBody>
-        </p:sp>
-        <p:sp>
-          <p:nvSpPr>
-            <p:cNvPr id="47" name="Textfeld 46"/>
-            <p:cNvSpPr txBox="1"/>
-            <p:nvPr/>
-          </p:nvSpPr>
-          <p:spPr>
-            <a:xfrm>
-              <a:off x="1187624" y="3068960"/>
-              <a:ext cx="1404156" cy="584775"/>
-            </a:xfrm>
-            <a:prstGeom prst="rect">
-              <a:avLst/>
-            </a:prstGeom>
-            <a:noFill/>
-          </p:spPr>
-          <p:txBody>
-            <a:bodyPr wrap="square" rtlCol="0">
-              <a:spAutoFit/>
-            </a:bodyPr>
-            <a:lstStyle/>
-            <a:p>
-              <a:r>
-                <a:rPr lang="de-DE" sz="800" dirty="0" smtClean="0"/>
-                <a:t>Als .NET-Entwickler</a:t>
-              </a:r>
-              <a:endParaRPr lang="de-DE" sz="800" b="1" dirty="0" smtClean="0"/>
-            </a:p>
-            <a:p>
-              <a:r>
-                <a:rPr lang="de-DE" sz="800" dirty="0"/>
-                <a:t>w</a:t>
-              </a:r>
-              <a:r>
-                <a:rPr lang="de-DE" sz="800" dirty="0" smtClean="0"/>
-                <a:t>ill ich einen Hinweis bekommen, wenn eine Sache nicht Clean Code konform ist.</a:t>
-              </a:r>
-              <a:endParaRPr lang="de-DE" sz="800" dirty="0"/>
-            </a:p>
-          </p:txBody>
-        </p:sp>
-      </p:grpSp>
-      <p:grpSp>
-        <p:nvGrpSpPr>
-          <p:cNvPr id="51" name="Gruppieren 50"/>
-          <p:cNvGrpSpPr/>
-          <p:nvPr/>
-        </p:nvGrpSpPr>
-        <p:grpSpPr>
-          <a:xfrm>
-            <a:off x="7740352" y="5652537"/>
-            <a:ext cx="1404156" cy="584775"/>
-            <a:chOff x="1187624" y="3068960"/>
-            <a:chExt cx="1404156" cy="584775"/>
-          </a:xfrm>
-        </p:grpSpPr>
-        <p:sp>
-          <p:nvSpPr>
-            <p:cNvPr id="52" name="Gefaltete Ecke 51"/>
-            <p:cNvSpPr/>
-            <p:nvPr/>
-          </p:nvSpPr>
-          <p:spPr>
-            <a:xfrm>
-              <a:off x="1187624" y="3068960"/>
-              <a:ext cx="1296144" cy="577081"/>
-            </a:xfrm>
-            <a:prstGeom prst="foldedCorner">
-              <a:avLst/>
-            </a:prstGeom>
-          </p:spPr>
-          <p:style>
-            <a:lnRef idx="1">
-              <a:schemeClr val="accent6"/>
-            </a:lnRef>
-            <a:fillRef idx="2">
-              <a:schemeClr val="accent6"/>
-            </a:fillRef>
-            <a:effectRef idx="1">
-              <a:schemeClr val="accent6"/>
-            </a:effectRef>
-            <a:fontRef idx="minor">
-              <a:schemeClr val="dk1"/>
-            </a:fontRef>
-          </p:style>
-          <p:txBody>
-            <a:bodyPr rtlCol="0" anchor="ctr"/>
-            <a:lstStyle/>
-            <a:p>
-              <a:pPr algn="ctr"/>
-              <a:endParaRPr lang="de-DE" sz="1400" dirty="0"/>
-            </a:p>
-          </p:txBody>
-        </p:sp>
-        <p:sp>
-          <p:nvSpPr>
-            <p:cNvPr id="53" name="Textfeld 52"/>
-            <p:cNvSpPr txBox="1"/>
-            <p:nvPr/>
-          </p:nvSpPr>
-          <p:spPr>
-            <a:xfrm>
-              <a:off x="1187624" y="3068960"/>
-              <a:ext cx="1404156" cy="584775"/>
-            </a:xfrm>
-            <a:prstGeom prst="rect">
-              <a:avLst/>
-            </a:prstGeom>
-            <a:noFill/>
-          </p:spPr>
-          <p:txBody>
-            <a:bodyPr wrap="square" rtlCol="0">
-              <a:spAutoFit/>
-            </a:bodyPr>
-            <a:lstStyle/>
-            <a:p>
-              <a:r>
-                <a:rPr lang="de-DE" sz="800" dirty="0" smtClean="0"/>
-                <a:t>Als .NET-Entwickler</a:t>
-              </a:r>
-            </a:p>
-            <a:p>
-              <a:r>
-                <a:rPr lang="de-DE" sz="800" dirty="0"/>
-                <a:t>w</a:t>
-              </a:r>
-              <a:r>
-                <a:rPr lang="de-DE" sz="800" dirty="0" smtClean="0"/>
-                <a:t>ill ich eine Qualitätsaussage über meine Visual Studio Solution sehen.</a:t>
-              </a:r>
-              <a:endParaRPr lang="de-DE" sz="800" dirty="0"/>
-            </a:p>
-          </p:txBody>
-        </p:sp>
-      </p:grpSp>
-      <p:sp>
-        <p:nvSpPr>
-          <p:cNvPr id="99" name="Gestreifter Pfeil nach rechts 98"/>
-          <p:cNvSpPr/>
-          <p:nvPr/>
-        </p:nvSpPr>
-        <p:spPr>
-          <a:xfrm>
-            <a:off x="906890" y="2348881"/>
-            <a:ext cx="7560840" cy="86562"/>
-          </a:xfrm>
-          <a:prstGeom prst="stripedRightArrow">
-            <a:avLst/>
-          </a:prstGeom>
-        </p:spPr>
-        <p:style>
-          <a:lnRef idx="0">
-            <a:schemeClr val="accent1"/>
-          </a:lnRef>
-          <a:fillRef idx="3">
-            <a:schemeClr val="accent1"/>
-          </a:fillRef>
-          <a:effectRef idx="3">
-            <a:schemeClr val="accent1"/>
-          </a:effectRef>
-          <a:fontRef idx="minor">
-            <a:schemeClr val="lt1"/>
-          </a:fontRef>
-        </p:style>
-        <p:txBody>
-          <a:bodyPr rtlCol="0" anchor="ctr"/>
-          <a:lstStyle/>
-          <a:p>
-            <a:pPr algn="ctr"/>
-            <a:r>
-              <a:rPr lang="de-DE" dirty="0" smtClean="0">
-                <a:solidFill>
-                  <a:schemeClr val="tx1"/>
-                </a:solidFill>
-              </a:rPr>
-              <a:t>Sprint1</a:t>
-            </a:r>
-            <a:endParaRPr lang="de-DE" dirty="0">
-              <a:solidFill>
-                <a:schemeClr val="tx1"/>
-              </a:solidFill>
-            </a:endParaRPr>
-          </a:p>
-        </p:txBody>
-      </p:sp>
-      <p:sp>
-        <p:nvSpPr>
-          <p:cNvPr id="100" name="Gestreifter Pfeil nach rechts 99"/>
-          <p:cNvSpPr/>
-          <p:nvPr/>
-        </p:nvSpPr>
-        <p:spPr>
-          <a:xfrm>
-            <a:off x="896874" y="3399892"/>
-            <a:ext cx="7560840" cy="86562"/>
-          </a:xfrm>
-          <a:prstGeom prst="stripedRightArrow">
-            <a:avLst/>
-          </a:prstGeom>
-        </p:spPr>
-        <p:style>
-          <a:lnRef idx="0">
-            <a:schemeClr val="accent1"/>
-          </a:lnRef>
-          <a:fillRef idx="3">
-            <a:schemeClr val="accent1"/>
-          </a:fillRef>
-          <a:effectRef idx="3">
-            <a:schemeClr val="accent1"/>
-          </a:effectRef>
-          <a:fontRef idx="minor">
-            <a:schemeClr val="lt1"/>
-          </a:fontRef>
-        </p:style>
-        <p:txBody>
-          <a:bodyPr rtlCol="0" anchor="ctr"/>
-          <a:lstStyle/>
-          <a:p>
-            <a:pPr algn="ctr"/>
-            <a:r>
-              <a:rPr lang="de-DE" dirty="0" smtClean="0">
-                <a:solidFill>
-                  <a:schemeClr val="tx1"/>
-                </a:solidFill>
-              </a:rPr>
-              <a:t>Sprint2</a:t>
-            </a:r>
-            <a:endParaRPr lang="de-DE" dirty="0">
-              <a:solidFill>
-                <a:schemeClr val="tx1"/>
-              </a:solidFill>
-            </a:endParaRPr>
-          </a:p>
-        </p:txBody>
-      </p:sp>
-      <p:sp>
-        <p:nvSpPr>
-          <p:cNvPr id="101" name="Gestreifter Pfeil nach rechts 100"/>
-          <p:cNvSpPr/>
-          <p:nvPr/>
-        </p:nvSpPr>
-        <p:spPr>
-          <a:xfrm>
-            <a:off x="896874" y="4408004"/>
-            <a:ext cx="7560840" cy="86562"/>
-          </a:xfrm>
-          <a:prstGeom prst="stripedRightArrow">
-            <a:avLst/>
-          </a:prstGeom>
-        </p:spPr>
-        <p:style>
-          <a:lnRef idx="0">
-            <a:schemeClr val="accent1"/>
-          </a:lnRef>
-          <a:fillRef idx="3">
-            <a:schemeClr val="accent1"/>
-          </a:fillRef>
-          <a:effectRef idx="3">
-            <a:schemeClr val="accent1"/>
-          </a:effectRef>
-          <a:fontRef idx="minor">
-            <a:schemeClr val="lt1"/>
-          </a:fontRef>
-        </p:style>
-        <p:txBody>
-          <a:bodyPr rtlCol="0" anchor="ctr"/>
-          <a:lstStyle/>
-          <a:p>
-            <a:pPr algn="ctr"/>
-            <a:r>
-              <a:rPr lang="de-DE" dirty="0" smtClean="0">
-                <a:solidFill>
-                  <a:schemeClr val="tx1"/>
-                </a:solidFill>
-              </a:rPr>
-              <a:t>Sprint3</a:t>
-            </a:r>
-            <a:endParaRPr lang="de-DE" dirty="0">
-              <a:solidFill>
-                <a:schemeClr val="tx1"/>
-              </a:solidFill>
-            </a:endParaRPr>
-          </a:p>
-        </p:txBody>
-      </p:sp>
-      <p:sp>
-        <p:nvSpPr>
-          <p:cNvPr id="102" name="Gestreifter Pfeil nach rechts 101"/>
-          <p:cNvSpPr/>
-          <p:nvPr/>
-        </p:nvSpPr>
-        <p:spPr>
-          <a:xfrm>
-            <a:off x="896874" y="5416116"/>
-            <a:ext cx="7560840" cy="86562"/>
-          </a:xfrm>
-          <a:prstGeom prst="stripedRightArrow">
-            <a:avLst/>
-          </a:prstGeom>
-        </p:spPr>
-        <p:style>
-          <a:lnRef idx="0">
-            <a:schemeClr val="accent1"/>
-          </a:lnRef>
-          <a:fillRef idx="3">
-            <a:schemeClr val="accent1"/>
-          </a:fillRef>
-          <a:effectRef idx="3">
-            <a:schemeClr val="accent1"/>
-          </a:effectRef>
-          <a:fontRef idx="minor">
-            <a:schemeClr val="lt1"/>
-          </a:fontRef>
-        </p:style>
-        <p:txBody>
-          <a:bodyPr rtlCol="0" anchor="ctr"/>
-          <a:lstStyle/>
-          <a:p>
-            <a:pPr algn="ctr"/>
-            <a:r>
-              <a:rPr lang="de-DE" dirty="0" smtClean="0">
-                <a:solidFill>
-                  <a:schemeClr val="tx1"/>
-                </a:solidFill>
-              </a:rPr>
-              <a:t>Sprint4</a:t>
-            </a:r>
-            <a:endParaRPr lang="de-DE" dirty="0">
-              <a:solidFill>
-                <a:schemeClr val="tx1"/>
-              </a:solidFill>
-            </a:endParaRPr>
-          </a:p>
-        </p:txBody>
-      </p:sp>
-      <p:sp>
-        <p:nvSpPr>
-          <p:cNvPr id="105" name="Gestreifter Pfeil nach rechts 104"/>
-          <p:cNvSpPr/>
-          <p:nvPr/>
-        </p:nvSpPr>
-        <p:spPr>
-          <a:xfrm>
-            <a:off x="899592" y="6419428"/>
-            <a:ext cx="7560840" cy="86562"/>
-          </a:xfrm>
-          <a:prstGeom prst="stripedRightArrow">
-            <a:avLst/>
-          </a:prstGeom>
-        </p:spPr>
-        <p:style>
-          <a:lnRef idx="0">
-            <a:schemeClr val="accent1"/>
-          </a:lnRef>
-          <a:fillRef idx="3">
-            <a:schemeClr val="accent1"/>
-          </a:fillRef>
-          <a:effectRef idx="3">
-            <a:schemeClr val="accent1"/>
-          </a:effectRef>
-          <a:fontRef idx="minor">
-            <a:schemeClr val="lt1"/>
-          </a:fontRef>
-        </p:style>
-        <p:txBody>
-          <a:bodyPr rtlCol="0" anchor="ctr"/>
-          <a:lstStyle/>
-          <a:p>
-            <a:pPr algn="ctr"/>
-            <a:r>
-              <a:rPr lang="de-DE" dirty="0" smtClean="0">
-                <a:solidFill>
-                  <a:schemeClr val="tx1"/>
-                </a:solidFill>
-              </a:rPr>
-              <a:t>Sprint5</a:t>
-            </a:r>
-            <a:endParaRPr lang="de-DE" dirty="0">
-              <a:solidFill>
-                <a:schemeClr val="tx1"/>
-              </a:solidFill>
-            </a:endParaRPr>
-          </a:p>
-        </p:txBody>
-      </p:sp>
-      <p:sp>
-        <p:nvSpPr>
-          <p:cNvPr id="113" name="Ellipse 112"/>
-          <p:cNvSpPr/>
-          <p:nvPr/>
-        </p:nvSpPr>
-        <p:spPr>
-          <a:xfrm>
-            <a:off x="145798" y="670248"/>
-            <a:ext cx="1512168" cy="729662"/>
-          </a:xfrm>
-          <a:prstGeom prst="ellipse">
-            <a:avLst/>
-          </a:prstGeom>
-        </p:spPr>
-        <p:style>
-          <a:lnRef idx="1">
-            <a:schemeClr val="accent1"/>
-          </a:lnRef>
-          <a:fillRef idx="2">
-            <a:schemeClr val="accent1"/>
-          </a:fillRef>
-          <a:effectRef idx="1">
-            <a:schemeClr val="accent1"/>
-          </a:effectRef>
-          <a:fontRef idx="minor">
-            <a:schemeClr val="dk1"/>
-          </a:fontRef>
-        </p:style>
-        <p:txBody>
-          <a:bodyPr rtlCol="0" anchor="ctr"/>
-          <a:lstStyle/>
-          <a:p>
-            <a:pPr algn="ctr"/>
-            <a:endParaRPr lang="de-DE"/>
-          </a:p>
-        </p:txBody>
-      </p:sp>
-      <p:sp>
-        <p:nvSpPr>
-          <p:cNvPr id="114" name="Ellipse 113"/>
-          <p:cNvSpPr/>
-          <p:nvPr/>
-        </p:nvSpPr>
-        <p:spPr>
-          <a:xfrm>
-            <a:off x="2597304" y="667874"/>
-            <a:ext cx="1512168" cy="729662"/>
-          </a:xfrm>
-          <a:prstGeom prst="ellipse">
-            <a:avLst/>
-          </a:prstGeom>
-        </p:spPr>
-        <p:style>
-          <a:lnRef idx="1">
-            <a:schemeClr val="accent1"/>
-          </a:lnRef>
-          <a:fillRef idx="2">
-            <a:schemeClr val="accent1"/>
-          </a:fillRef>
-          <a:effectRef idx="1">
-            <a:schemeClr val="accent1"/>
-          </a:effectRef>
-          <a:fontRef idx="minor">
-            <a:schemeClr val="dk1"/>
-          </a:fontRef>
-        </p:style>
-        <p:txBody>
-          <a:bodyPr rtlCol="0" anchor="ctr"/>
-          <a:lstStyle/>
-          <a:p>
-            <a:pPr algn="ctr"/>
-            <a:endParaRPr lang="de-DE"/>
-          </a:p>
-        </p:txBody>
-      </p:sp>
-      <p:sp>
-        <p:nvSpPr>
-          <p:cNvPr id="115" name="Ellipse 114"/>
-          <p:cNvSpPr/>
-          <p:nvPr/>
-        </p:nvSpPr>
-        <p:spPr>
-          <a:xfrm>
-            <a:off x="5053196" y="667874"/>
-            <a:ext cx="1512168" cy="729662"/>
-          </a:xfrm>
-          <a:prstGeom prst="ellipse">
-            <a:avLst/>
-          </a:prstGeom>
-        </p:spPr>
-        <p:style>
-          <a:lnRef idx="1">
-            <a:schemeClr val="accent1"/>
-          </a:lnRef>
-          <a:fillRef idx="2">
-            <a:schemeClr val="accent1"/>
-          </a:fillRef>
-          <a:effectRef idx="1">
-            <a:schemeClr val="accent1"/>
-          </a:effectRef>
-          <a:fontRef idx="minor">
-            <a:schemeClr val="dk1"/>
-          </a:fontRef>
-        </p:style>
-        <p:txBody>
-          <a:bodyPr rtlCol="0" anchor="ctr"/>
-          <a:lstStyle/>
-          <a:p>
-            <a:pPr algn="ctr"/>
-            <a:endParaRPr lang="de-DE"/>
-          </a:p>
-        </p:txBody>
-      </p:sp>
-      <p:sp>
-        <p:nvSpPr>
-          <p:cNvPr id="116" name="Ellipse 115"/>
-          <p:cNvSpPr/>
-          <p:nvPr/>
-        </p:nvSpPr>
-        <p:spPr>
-          <a:xfrm>
-            <a:off x="7493848" y="667874"/>
-            <a:ext cx="1512168" cy="729662"/>
-          </a:xfrm>
-          <a:prstGeom prst="ellipse">
-            <a:avLst/>
-          </a:prstGeom>
-        </p:spPr>
-        <p:style>
-          <a:lnRef idx="1">
-            <a:schemeClr val="accent1"/>
-          </a:lnRef>
-          <a:fillRef idx="2">
-            <a:schemeClr val="accent1"/>
-          </a:fillRef>
-          <a:effectRef idx="1">
-            <a:schemeClr val="accent1"/>
-          </a:effectRef>
-          <a:fontRef idx="minor">
-            <a:schemeClr val="dk1"/>
-          </a:fontRef>
-        </p:style>
-        <p:txBody>
-          <a:bodyPr rtlCol="0" anchor="ctr"/>
-          <a:lstStyle/>
-          <a:p>
-            <a:pPr algn="ctr"/>
-            <a:endParaRPr lang="de-DE"/>
-          </a:p>
-        </p:txBody>
-      </p:sp>
-      <p:sp>
-        <p:nvSpPr>
-          <p:cNvPr id="16" name="Rechteck 15"/>
-          <p:cNvSpPr/>
-          <p:nvPr/>
-        </p:nvSpPr>
-        <p:spPr>
-          <a:xfrm>
-            <a:off x="7528714" y="772324"/>
-            <a:ext cx="1482906" cy="523220"/>
-          </a:xfrm>
-          <a:prstGeom prst="rect">
-            <a:avLst/>
-          </a:prstGeom>
-        </p:spPr>
-        <p:txBody>
-          <a:bodyPr wrap="none">
-            <a:spAutoFit/>
-          </a:bodyPr>
-          <a:lstStyle/>
-          <a:p>
-            <a:r>
-              <a:rPr lang="de-DE" sz="1400" dirty="0" smtClean="0"/>
-              <a:t>Software-Qualität</a:t>
-            </a:r>
-          </a:p>
-          <a:p>
-            <a:r>
-              <a:rPr lang="de-DE" sz="1400" dirty="0" smtClean="0"/>
-              <a:t>ermitteln</a:t>
-            </a:r>
-            <a:endParaRPr lang="de-DE" sz="1400" dirty="0"/>
-          </a:p>
-        </p:txBody>
-      </p:sp>
-      <p:sp>
-        <p:nvSpPr>
-          <p:cNvPr id="9" name="Rechteck 8"/>
-          <p:cNvSpPr/>
-          <p:nvPr/>
-        </p:nvSpPr>
-        <p:spPr>
-          <a:xfrm>
-            <a:off x="5203806" y="745540"/>
-            <a:ext cx="1384418" cy="523220"/>
-          </a:xfrm>
-          <a:prstGeom prst="rect">
-            <a:avLst/>
-          </a:prstGeom>
-        </p:spPr>
-        <p:txBody>
-          <a:bodyPr wrap="none">
-            <a:spAutoFit/>
-          </a:bodyPr>
-          <a:lstStyle/>
-          <a:p>
-            <a:r>
-              <a:rPr lang="de-DE" sz="1400" dirty="0"/>
-              <a:t>Clean </a:t>
-            </a:r>
-            <a:r>
-              <a:rPr lang="de-DE" sz="1400" dirty="0" smtClean="0"/>
-              <a:t>Code</a:t>
-            </a:r>
-          </a:p>
-          <a:p>
-            <a:r>
-              <a:rPr lang="de-DE" sz="1400" dirty="0" smtClean="0"/>
-              <a:t>Hilfe bekommen</a:t>
-            </a:r>
-            <a:endParaRPr lang="de-DE" sz="1400" dirty="0"/>
-          </a:p>
-        </p:txBody>
-      </p:sp>
-      <p:sp>
-        <p:nvSpPr>
-          <p:cNvPr id="19" name="Rechteck 18"/>
-          <p:cNvSpPr/>
-          <p:nvPr/>
-        </p:nvSpPr>
-        <p:spPr>
-          <a:xfrm>
-            <a:off x="2748031" y="755122"/>
-            <a:ext cx="1319913" cy="523220"/>
-          </a:xfrm>
-          <a:prstGeom prst="rect">
-            <a:avLst/>
-          </a:prstGeom>
-        </p:spPr>
-        <p:txBody>
-          <a:bodyPr wrap="none">
-            <a:spAutoFit/>
-          </a:bodyPr>
-          <a:lstStyle/>
-          <a:p>
-            <a:r>
-              <a:rPr lang="de-DE" sz="1400" dirty="0" smtClean="0"/>
-              <a:t>Code-Probleme</a:t>
-            </a:r>
-          </a:p>
-          <a:p>
-            <a:r>
-              <a:rPr lang="de-DE" sz="1400" dirty="0" smtClean="0"/>
-              <a:t>identifizieren</a:t>
-            </a:r>
-            <a:endParaRPr lang="de-DE" sz="1400" dirty="0"/>
-          </a:p>
-        </p:txBody>
-      </p:sp>
-      <p:sp>
-        <p:nvSpPr>
-          <p:cNvPr id="13" name="Rechteck 12"/>
-          <p:cNvSpPr/>
-          <p:nvPr/>
-        </p:nvSpPr>
-        <p:spPr>
-          <a:xfrm>
-            <a:off x="337270" y="817548"/>
-            <a:ext cx="1282402" cy="523220"/>
-          </a:xfrm>
-          <a:prstGeom prst="rect">
-            <a:avLst/>
-          </a:prstGeom>
-        </p:spPr>
-        <p:txBody>
-          <a:bodyPr wrap="none">
-            <a:spAutoFit/>
-          </a:bodyPr>
-          <a:lstStyle/>
-          <a:p>
-            <a:r>
-              <a:rPr lang="de-DE" sz="1400" dirty="0" smtClean="0"/>
-              <a:t>Code-</a:t>
-            </a:r>
-            <a:r>
-              <a:rPr lang="de-DE" sz="1400" dirty="0" err="1" smtClean="0"/>
-              <a:t>Metriken</a:t>
-            </a:r>
-            <a:endParaRPr lang="de-DE" sz="1400" dirty="0" smtClean="0"/>
-          </a:p>
-          <a:p>
-            <a:r>
-              <a:rPr lang="de-DE" sz="1400" dirty="0" smtClean="0"/>
-              <a:t>bestimmen</a:t>
-            </a:r>
-            <a:endParaRPr lang="de-DE" sz="1400" dirty="0"/>
-          </a:p>
-        </p:txBody>
-      </p:sp>
     </p:spTree>
     <p:extLst>
       <p:ext uri="{BB962C8B-B14F-4D97-AF65-F5344CB8AC3E}">

</xml_diff>

<commit_message>
more techeval summary with table
</commit_message>
<xml_diff>
--- a/text/images/illustrations.pptx
+++ b/text/images/illustrations.pptx
@@ -196,7 +196,7 @@
           <a:p>
             <a:fld id="{7C9ABC5C-FC58-4AE2-89F8-727F30362B08}" type="datetimeFigureOut">
               <a:rPr lang="de-DE" smtClean="0"/>
-              <a:t>10.04.2012</a:t>
+              <a:t>14.05.2012</a:t>
             </a:fld>
             <a:endParaRPr lang="de-DE"/>
           </a:p>
@@ -729,7 +729,7 @@
           <a:p>
             <a:fld id="{5430F42D-6984-4A4E-9090-AA314D14663F}" type="datetimeFigureOut">
               <a:rPr lang="de-DE" smtClean="0"/>
-              <a:t>10.04.2012</a:t>
+              <a:t>14.05.2012</a:t>
             </a:fld>
             <a:endParaRPr lang="de-DE"/>
           </a:p>
@@ -899,7 +899,7 @@
           <a:p>
             <a:fld id="{5430F42D-6984-4A4E-9090-AA314D14663F}" type="datetimeFigureOut">
               <a:rPr lang="de-DE" smtClean="0"/>
-              <a:t>10.04.2012</a:t>
+              <a:t>14.05.2012</a:t>
             </a:fld>
             <a:endParaRPr lang="de-DE"/>
           </a:p>
@@ -1079,7 +1079,7 @@
           <a:p>
             <a:fld id="{5430F42D-6984-4A4E-9090-AA314D14663F}" type="datetimeFigureOut">
               <a:rPr lang="de-DE" smtClean="0"/>
-              <a:t>10.04.2012</a:t>
+              <a:t>14.05.2012</a:t>
             </a:fld>
             <a:endParaRPr lang="de-DE"/>
           </a:p>
@@ -1249,7 +1249,7 @@
           <a:p>
             <a:fld id="{5430F42D-6984-4A4E-9090-AA314D14663F}" type="datetimeFigureOut">
               <a:rPr lang="de-DE" smtClean="0"/>
-              <a:t>10.04.2012</a:t>
+              <a:t>14.05.2012</a:t>
             </a:fld>
             <a:endParaRPr lang="de-DE"/>
           </a:p>
@@ -1495,7 +1495,7 @@
           <a:p>
             <a:fld id="{5430F42D-6984-4A4E-9090-AA314D14663F}" type="datetimeFigureOut">
               <a:rPr lang="de-DE" smtClean="0"/>
-              <a:t>10.04.2012</a:t>
+              <a:t>14.05.2012</a:t>
             </a:fld>
             <a:endParaRPr lang="de-DE"/>
           </a:p>
@@ -1783,7 +1783,7 @@
           <a:p>
             <a:fld id="{5430F42D-6984-4A4E-9090-AA314D14663F}" type="datetimeFigureOut">
               <a:rPr lang="de-DE" smtClean="0"/>
-              <a:t>10.04.2012</a:t>
+              <a:t>14.05.2012</a:t>
             </a:fld>
             <a:endParaRPr lang="de-DE"/>
           </a:p>
@@ -2205,7 +2205,7 @@
           <a:p>
             <a:fld id="{5430F42D-6984-4A4E-9090-AA314D14663F}" type="datetimeFigureOut">
               <a:rPr lang="de-DE" smtClean="0"/>
-              <a:t>10.04.2012</a:t>
+              <a:t>14.05.2012</a:t>
             </a:fld>
             <a:endParaRPr lang="de-DE"/>
           </a:p>
@@ -2323,7 +2323,7 @@
           <a:p>
             <a:fld id="{5430F42D-6984-4A4E-9090-AA314D14663F}" type="datetimeFigureOut">
               <a:rPr lang="de-DE" smtClean="0"/>
-              <a:t>10.04.2012</a:t>
+              <a:t>14.05.2012</a:t>
             </a:fld>
             <a:endParaRPr lang="de-DE"/>
           </a:p>
@@ -2418,7 +2418,7 @@
           <a:p>
             <a:fld id="{5430F42D-6984-4A4E-9090-AA314D14663F}" type="datetimeFigureOut">
               <a:rPr lang="de-DE" smtClean="0"/>
-              <a:t>10.04.2012</a:t>
+              <a:t>14.05.2012</a:t>
             </a:fld>
             <a:endParaRPr lang="de-DE"/>
           </a:p>
@@ -2695,7 +2695,7 @@
           <a:p>
             <a:fld id="{5430F42D-6984-4A4E-9090-AA314D14663F}" type="datetimeFigureOut">
               <a:rPr lang="de-DE" smtClean="0"/>
-              <a:t>10.04.2012</a:t>
+              <a:t>14.05.2012</a:t>
             </a:fld>
             <a:endParaRPr lang="de-DE"/>
           </a:p>
@@ -2948,7 +2948,7 @@
           <a:p>
             <a:fld id="{5430F42D-6984-4A4E-9090-AA314D14663F}" type="datetimeFigureOut">
               <a:rPr lang="de-DE" smtClean="0"/>
-              <a:t>10.04.2012</a:t>
+              <a:t>14.05.2012</a:t>
             </a:fld>
             <a:endParaRPr lang="de-DE"/>
           </a:p>
@@ -3161,7 +3161,7 @@
           <a:p>
             <a:fld id="{5430F42D-6984-4A4E-9090-AA314D14663F}" type="datetimeFigureOut">
               <a:rPr lang="de-DE" smtClean="0"/>
-              <a:t>10.04.2012</a:t>
+              <a:t>14.05.2012</a:t>
             </a:fld>
             <a:endParaRPr lang="de-DE"/>
           </a:p>
@@ -8332,23 +8332,7 @@
               </a:r>
               <a:r>
                 <a:rPr lang="de-DE" sz="800" dirty="0" smtClean="0"/>
-                <a:t>ill ich sehen, </a:t>
-              </a:r>
-              <a:r>
-                <a:rPr lang="de-DE" sz="800" dirty="0" smtClean="0"/>
-                <a:t>das eine </a:t>
-              </a:r>
-              <a:r>
-                <a:rPr lang="de-DE" sz="800" dirty="0" smtClean="0"/>
-                <a:t>Veränderung </a:t>
-              </a:r>
-              <a:r>
-                <a:rPr lang="de-DE" sz="800" dirty="0" smtClean="0"/>
-                <a:t>die Qualitäts-interpretation verändert</a:t>
-              </a:r>
-              <a:r>
-                <a:rPr lang="de-DE" sz="800" dirty="0" smtClean="0"/>
-                <a:t>.</a:t>
+                <a:t>ill ich sehen, das eine Veränderung die Qualitäts-interpretation verändert.</a:t>
               </a:r>
               <a:endParaRPr lang="de-DE" sz="800" dirty="0"/>
             </a:p>
@@ -8998,7 +8982,6 @@
               <a:rPr lang="de-DE" sz="1400" dirty="0"/>
               <a:t>interpretieren</a:t>
             </a:r>
-            <a:endParaRPr lang="de-DE" sz="1400" dirty="0"/>
           </a:p>
         </p:txBody>
       </p:sp>
@@ -9518,19 +9501,7 @@
               </a:r>
               <a:r>
                 <a:rPr lang="de-DE" sz="800" dirty="0" smtClean="0"/>
-                <a:t>ill ich eine </a:t>
-              </a:r>
-              <a:r>
-                <a:rPr lang="de-DE" sz="800" dirty="0" smtClean="0"/>
-                <a:t>Qualitäts-interpretation meiner </a:t>
-              </a:r>
-              <a:r>
-                <a:rPr lang="de-DE" sz="800" dirty="0" smtClean="0"/>
-                <a:t>VS-Solution </a:t>
-              </a:r>
-              <a:r>
-                <a:rPr lang="de-DE" sz="800" dirty="0" smtClean="0"/>
-                <a:t>vornehmen können.</a:t>
+                <a:t>ill ich eine Qualitäts-interpretation meiner VS-Solution vornehmen können.</a:t>
               </a:r>
               <a:endParaRPr lang="de-DE" sz="800" dirty="0"/>
             </a:p>

</xml_diff>

<commit_message>
saves and builds ui and event hookup
</commit_message>
<xml_diff>
--- a/text/images/illustrations.pptx
+++ b/text/images/illustrations.pptx
@@ -196,7 +196,7 @@
           <a:p>
             <a:fld id="{7C9ABC5C-FC58-4AE2-89F8-727F30362B08}" type="datetimeFigureOut">
               <a:rPr lang="de-DE" smtClean="0"/>
-              <a:t>14.05.2012</a:t>
+              <a:t>15.05.2012</a:t>
             </a:fld>
             <a:endParaRPr lang="de-DE"/>
           </a:p>
@@ -729,7 +729,7 @@
           <a:p>
             <a:fld id="{5430F42D-6984-4A4E-9090-AA314D14663F}" type="datetimeFigureOut">
               <a:rPr lang="de-DE" smtClean="0"/>
-              <a:t>14.05.2012</a:t>
+              <a:t>15.05.2012</a:t>
             </a:fld>
             <a:endParaRPr lang="de-DE"/>
           </a:p>
@@ -899,7 +899,7 @@
           <a:p>
             <a:fld id="{5430F42D-6984-4A4E-9090-AA314D14663F}" type="datetimeFigureOut">
               <a:rPr lang="de-DE" smtClean="0"/>
-              <a:t>14.05.2012</a:t>
+              <a:t>15.05.2012</a:t>
             </a:fld>
             <a:endParaRPr lang="de-DE"/>
           </a:p>
@@ -1079,7 +1079,7 @@
           <a:p>
             <a:fld id="{5430F42D-6984-4A4E-9090-AA314D14663F}" type="datetimeFigureOut">
               <a:rPr lang="de-DE" smtClean="0"/>
-              <a:t>14.05.2012</a:t>
+              <a:t>15.05.2012</a:t>
             </a:fld>
             <a:endParaRPr lang="de-DE"/>
           </a:p>
@@ -1249,7 +1249,7 @@
           <a:p>
             <a:fld id="{5430F42D-6984-4A4E-9090-AA314D14663F}" type="datetimeFigureOut">
               <a:rPr lang="de-DE" smtClean="0"/>
-              <a:t>14.05.2012</a:t>
+              <a:t>15.05.2012</a:t>
             </a:fld>
             <a:endParaRPr lang="de-DE"/>
           </a:p>
@@ -1495,7 +1495,7 @@
           <a:p>
             <a:fld id="{5430F42D-6984-4A4E-9090-AA314D14663F}" type="datetimeFigureOut">
               <a:rPr lang="de-DE" smtClean="0"/>
-              <a:t>14.05.2012</a:t>
+              <a:t>15.05.2012</a:t>
             </a:fld>
             <a:endParaRPr lang="de-DE"/>
           </a:p>
@@ -1783,7 +1783,7 @@
           <a:p>
             <a:fld id="{5430F42D-6984-4A4E-9090-AA314D14663F}" type="datetimeFigureOut">
               <a:rPr lang="de-DE" smtClean="0"/>
-              <a:t>14.05.2012</a:t>
+              <a:t>15.05.2012</a:t>
             </a:fld>
             <a:endParaRPr lang="de-DE"/>
           </a:p>
@@ -2205,7 +2205,7 @@
           <a:p>
             <a:fld id="{5430F42D-6984-4A4E-9090-AA314D14663F}" type="datetimeFigureOut">
               <a:rPr lang="de-DE" smtClean="0"/>
-              <a:t>14.05.2012</a:t>
+              <a:t>15.05.2012</a:t>
             </a:fld>
             <a:endParaRPr lang="de-DE"/>
           </a:p>
@@ -2323,7 +2323,7 @@
           <a:p>
             <a:fld id="{5430F42D-6984-4A4E-9090-AA314D14663F}" type="datetimeFigureOut">
               <a:rPr lang="de-DE" smtClean="0"/>
-              <a:t>14.05.2012</a:t>
+              <a:t>15.05.2012</a:t>
             </a:fld>
             <a:endParaRPr lang="de-DE"/>
           </a:p>
@@ -2418,7 +2418,7 @@
           <a:p>
             <a:fld id="{5430F42D-6984-4A4E-9090-AA314D14663F}" type="datetimeFigureOut">
               <a:rPr lang="de-DE" smtClean="0"/>
-              <a:t>14.05.2012</a:t>
+              <a:t>15.05.2012</a:t>
             </a:fld>
             <a:endParaRPr lang="de-DE"/>
           </a:p>
@@ -2695,7 +2695,7 @@
           <a:p>
             <a:fld id="{5430F42D-6984-4A4E-9090-AA314D14663F}" type="datetimeFigureOut">
               <a:rPr lang="de-DE" smtClean="0"/>
-              <a:t>14.05.2012</a:t>
+              <a:t>15.05.2012</a:t>
             </a:fld>
             <a:endParaRPr lang="de-DE"/>
           </a:p>
@@ -2948,7 +2948,7 @@
           <a:p>
             <a:fld id="{5430F42D-6984-4A4E-9090-AA314D14663F}" type="datetimeFigureOut">
               <a:rPr lang="de-DE" smtClean="0"/>
-              <a:t>14.05.2012</a:t>
+              <a:t>15.05.2012</a:t>
             </a:fld>
             <a:endParaRPr lang="de-DE"/>
           </a:p>
@@ -3161,7 +3161,7 @@
           <a:p>
             <a:fld id="{5430F42D-6984-4A4E-9090-AA314D14663F}" type="datetimeFigureOut">
               <a:rPr lang="de-DE" smtClean="0"/>
-              <a:t>14.05.2012</a:t>
+              <a:t>15.05.2012</a:t>
             </a:fld>
             <a:endParaRPr lang="de-DE"/>
           </a:p>
@@ -8332,7 +8332,15 @@
               </a:r>
               <a:r>
                 <a:rPr lang="de-DE" sz="800" dirty="0" smtClean="0"/>
-                <a:t>ill ich sehen, das eine Veränderung die Qualitäts-interpretation verändert.</a:t>
+                <a:t>ill ich sehen, das eine Veränderung die </a:t>
+              </a:r>
+              <a:r>
+                <a:rPr lang="de-DE" sz="800" dirty="0" smtClean="0"/>
+                <a:t>Qualitäts-interpretation </a:t>
+              </a:r>
+              <a:r>
+                <a:rPr lang="de-DE" sz="800" dirty="0" smtClean="0"/>
+                <a:t>verändert.</a:t>
               </a:r>
               <a:endParaRPr lang="de-DE" sz="800" dirty="0"/>
             </a:p>
@@ -9501,7 +9509,19 @@
               </a:r>
               <a:r>
                 <a:rPr lang="de-DE" sz="800" dirty="0" smtClean="0"/>
-                <a:t>ill ich eine Qualitäts-interpretation meiner VS-Solution vornehmen können.</a:t>
+                <a:t>ill ich </a:t>
+              </a:r>
+              <a:r>
+                <a:rPr lang="de-DE" sz="800" smtClean="0"/>
+                <a:t>eine </a:t>
+              </a:r>
+              <a:r>
+                <a:rPr lang="de-DE" sz="800" smtClean="0"/>
+                <a:t>Qualitäts-interpretation </a:t>
+              </a:r>
+              <a:r>
+                <a:rPr lang="de-DE" sz="800" dirty="0" smtClean="0"/>
+                <a:t>meiner VS-Solution vornehmen können.</a:t>
               </a:r>
               <a:endParaRPr lang="de-DE" sz="800" dirty="0"/>
             </a:p>

</xml_diff>

<commit_message>
first usus.net project structure
</commit_message>
<xml_diff>
--- a/text/images/illustrations.pptx
+++ b/text/images/illustrations.pptx
@@ -196,7 +196,7 @@
           <a:p>
             <a:fld id="{7C9ABC5C-FC58-4AE2-89F8-727F30362B08}" type="datetimeFigureOut">
               <a:rPr lang="de-DE" smtClean="0"/>
-              <a:t>15.05.2012</a:t>
+              <a:t>16.05.2012</a:t>
             </a:fld>
             <a:endParaRPr lang="de-DE"/>
           </a:p>
@@ -729,7 +729,7 @@
           <a:p>
             <a:fld id="{5430F42D-6984-4A4E-9090-AA314D14663F}" type="datetimeFigureOut">
               <a:rPr lang="de-DE" smtClean="0"/>
-              <a:t>15.05.2012</a:t>
+              <a:t>16.05.2012</a:t>
             </a:fld>
             <a:endParaRPr lang="de-DE"/>
           </a:p>
@@ -899,7 +899,7 @@
           <a:p>
             <a:fld id="{5430F42D-6984-4A4E-9090-AA314D14663F}" type="datetimeFigureOut">
               <a:rPr lang="de-DE" smtClean="0"/>
-              <a:t>15.05.2012</a:t>
+              <a:t>16.05.2012</a:t>
             </a:fld>
             <a:endParaRPr lang="de-DE"/>
           </a:p>
@@ -1079,7 +1079,7 @@
           <a:p>
             <a:fld id="{5430F42D-6984-4A4E-9090-AA314D14663F}" type="datetimeFigureOut">
               <a:rPr lang="de-DE" smtClean="0"/>
-              <a:t>15.05.2012</a:t>
+              <a:t>16.05.2012</a:t>
             </a:fld>
             <a:endParaRPr lang="de-DE"/>
           </a:p>
@@ -1249,7 +1249,7 @@
           <a:p>
             <a:fld id="{5430F42D-6984-4A4E-9090-AA314D14663F}" type="datetimeFigureOut">
               <a:rPr lang="de-DE" smtClean="0"/>
-              <a:t>15.05.2012</a:t>
+              <a:t>16.05.2012</a:t>
             </a:fld>
             <a:endParaRPr lang="de-DE"/>
           </a:p>
@@ -1495,7 +1495,7 @@
           <a:p>
             <a:fld id="{5430F42D-6984-4A4E-9090-AA314D14663F}" type="datetimeFigureOut">
               <a:rPr lang="de-DE" smtClean="0"/>
-              <a:t>15.05.2012</a:t>
+              <a:t>16.05.2012</a:t>
             </a:fld>
             <a:endParaRPr lang="de-DE"/>
           </a:p>
@@ -1783,7 +1783,7 @@
           <a:p>
             <a:fld id="{5430F42D-6984-4A4E-9090-AA314D14663F}" type="datetimeFigureOut">
               <a:rPr lang="de-DE" smtClean="0"/>
-              <a:t>15.05.2012</a:t>
+              <a:t>16.05.2012</a:t>
             </a:fld>
             <a:endParaRPr lang="de-DE"/>
           </a:p>
@@ -2205,7 +2205,7 @@
           <a:p>
             <a:fld id="{5430F42D-6984-4A4E-9090-AA314D14663F}" type="datetimeFigureOut">
               <a:rPr lang="de-DE" smtClean="0"/>
-              <a:t>15.05.2012</a:t>
+              <a:t>16.05.2012</a:t>
             </a:fld>
             <a:endParaRPr lang="de-DE"/>
           </a:p>
@@ -2323,7 +2323,7 @@
           <a:p>
             <a:fld id="{5430F42D-6984-4A4E-9090-AA314D14663F}" type="datetimeFigureOut">
               <a:rPr lang="de-DE" smtClean="0"/>
-              <a:t>15.05.2012</a:t>
+              <a:t>16.05.2012</a:t>
             </a:fld>
             <a:endParaRPr lang="de-DE"/>
           </a:p>
@@ -2418,7 +2418,7 @@
           <a:p>
             <a:fld id="{5430F42D-6984-4A4E-9090-AA314D14663F}" type="datetimeFigureOut">
               <a:rPr lang="de-DE" smtClean="0"/>
-              <a:t>15.05.2012</a:t>
+              <a:t>16.05.2012</a:t>
             </a:fld>
             <a:endParaRPr lang="de-DE"/>
           </a:p>
@@ -2695,7 +2695,7 @@
           <a:p>
             <a:fld id="{5430F42D-6984-4A4E-9090-AA314D14663F}" type="datetimeFigureOut">
               <a:rPr lang="de-DE" smtClean="0"/>
-              <a:t>15.05.2012</a:t>
+              <a:t>16.05.2012</a:t>
             </a:fld>
             <a:endParaRPr lang="de-DE"/>
           </a:p>
@@ -2948,7 +2948,7 @@
           <a:p>
             <a:fld id="{5430F42D-6984-4A4E-9090-AA314D14663F}" type="datetimeFigureOut">
               <a:rPr lang="de-DE" smtClean="0"/>
-              <a:t>15.05.2012</a:t>
+              <a:t>16.05.2012</a:t>
             </a:fld>
             <a:endParaRPr lang="de-DE"/>
           </a:p>
@@ -3161,7 +3161,7 @@
           <a:p>
             <a:fld id="{5430F42D-6984-4A4E-9090-AA314D14663F}" type="datetimeFigureOut">
               <a:rPr lang="de-DE" smtClean="0"/>
-              <a:t>15.05.2012</a:t>
+              <a:t>16.05.2012</a:t>
             </a:fld>
             <a:endParaRPr lang="de-DE"/>
           </a:p>
@@ -8332,15 +8332,7 @@
               </a:r>
               <a:r>
                 <a:rPr lang="de-DE" sz="800" dirty="0" smtClean="0"/>
-                <a:t>ill ich sehen, das eine Veränderung die </a:t>
-              </a:r>
-              <a:r>
-                <a:rPr lang="de-DE" sz="800" dirty="0" smtClean="0"/>
-                <a:t>Qualitäts-interpretation </a:t>
-              </a:r>
-              <a:r>
-                <a:rPr lang="de-DE" sz="800" dirty="0" smtClean="0"/>
-                <a:t>verändert.</a:t>
+                <a:t>ill ich sehen, das eine Veränderung die Qualitäts-interpretation verändert.</a:t>
               </a:r>
               <a:endParaRPr lang="de-DE" sz="800" dirty="0"/>
             </a:p>
@@ -9513,11 +9505,7 @@
               </a:r>
               <a:r>
                 <a:rPr lang="de-DE" sz="800" smtClean="0"/>
-                <a:t>eine </a:t>
-              </a:r>
-              <a:r>
-                <a:rPr lang="de-DE" sz="800" smtClean="0"/>
-                <a:t>Qualitäts-interpretation </a:t>
+                <a:t>eine Qualitäts-interpretation </a:t>
               </a:r>
               <a:r>
                 <a:rPr lang="de-DE" sz="800" dirty="0" smtClean="0"/>

</xml_diff>

<commit_message>
first prof corrections applied
</commit_message>
<xml_diff>
--- a/text/images/illustrations.pptx
+++ b/text/images/illustrations.pptx
@@ -196,7 +196,7 @@
           <a:p>
             <a:fld id="{7C9ABC5C-FC58-4AE2-89F8-727F30362B08}" type="datetimeFigureOut">
               <a:rPr lang="de-DE" smtClean="0"/>
-              <a:t>16.05.2012</a:t>
+              <a:t>17.05.2012</a:t>
             </a:fld>
             <a:endParaRPr lang="de-DE"/>
           </a:p>
@@ -355,7 +355,7 @@
           <a:p>
             <a:fld id="{AAC1FA76-46A6-49F4-8E84-FEF8584513B4}" type="slidenum">
               <a:rPr lang="de-DE" smtClean="0"/>
-              <a:t>‹Nr.›</a:t>
+              <a:t>‹#›</a:t>
             </a:fld>
             <a:endParaRPr lang="de-DE"/>
           </a:p>
@@ -729,7 +729,7 @@
           <a:p>
             <a:fld id="{5430F42D-6984-4A4E-9090-AA314D14663F}" type="datetimeFigureOut">
               <a:rPr lang="de-DE" smtClean="0"/>
-              <a:t>16.05.2012</a:t>
+              <a:t>17.05.2012</a:t>
             </a:fld>
             <a:endParaRPr lang="de-DE"/>
           </a:p>
@@ -771,7 +771,7 @@
           <a:p>
             <a:fld id="{0150BA9E-F14C-481F-965B-919CED594AA7}" type="slidenum">
               <a:rPr lang="de-DE" smtClean="0"/>
-              <a:t>‹Nr.›</a:t>
+              <a:t>‹#›</a:t>
             </a:fld>
             <a:endParaRPr lang="de-DE"/>
           </a:p>
@@ -899,7 +899,7 @@
           <a:p>
             <a:fld id="{5430F42D-6984-4A4E-9090-AA314D14663F}" type="datetimeFigureOut">
               <a:rPr lang="de-DE" smtClean="0"/>
-              <a:t>16.05.2012</a:t>
+              <a:t>17.05.2012</a:t>
             </a:fld>
             <a:endParaRPr lang="de-DE"/>
           </a:p>
@@ -941,7 +941,7 @@
           <a:p>
             <a:fld id="{0150BA9E-F14C-481F-965B-919CED594AA7}" type="slidenum">
               <a:rPr lang="de-DE" smtClean="0"/>
-              <a:t>‹Nr.›</a:t>
+              <a:t>‹#›</a:t>
             </a:fld>
             <a:endParaRPr lang="de-DE"/>
           </a:p>
@@ -1079,7 +1079,7 @@
           <a:p>
             <a:fld id="{5430F42D-6984-4A4E-9090-AA314D14663F}" type="datetimeFigureOut">
               <a:rPr lang="de-DE" smtClean="0"/>
-              <a:t>16.05.2012</a:t>
+              <a:t>17.05.2012</a:t>
             </a:fld>
             <a:endParaRPr lang="de-DE"/>
           </a:p>
@@ -1121,7 +1121,7 @@
           <a:p>
             <a:fld id="{0150BA9E-F14C-481F-965B-919CED594AA7}" type="slidenum">
               <a:rPr lang="de-DE" smtClean="0"/>
-              <a:t>‹Nr.›</a:t>
+              <a:t>‹#›</a:t>
             </a:fld>
             <a:endParaRPr lang="de-DE"/>
           </a:p>
@@ -1249,7 +1249,7 @@
           <a:p>
             <a:fld id="{5430F42D-6984-4A4E-9090-AA314D14663F}" type="datetimeFigureOut">
               <a:rPr lang="de-DE" smtClean="0"/>
-              <a:t>16.05.2012</a:t>
+              <a:t>17.05.2012</a:t>
             </a:fld>
             <a:endParaRPr lang="de-DE"/>
           </a:p>
@@ -1291,7 +1291,7 @@
           <a:p>
             <a:fld id="{0150BA9E-F14C-481F-965B-919CED594AA7}" type="slidenum">
               <a:rPr lang="de-DE" smtClean="0"/>
-              <a:t>‹Nr.›</a:t>
+              <a:t>‹#›</a:t>
             </a:fld>
             <a:endParaRPr lang="de-DE"/>
           </a:p>
@@ -1495,7 +1495,7 @@
           <a:p>
             <a:fld id="{5430F42D-6984-4A4E-9090-AA314D14663F}" type="datetimeFigureOut">
               <a:rPr lang="de-DE" smtClean="0"/>
-              <a:t>16.05.2012</a:t>
+              <a:t>17.05.2012</a:t>
             </a:fld>
             <a:endParaRPr lang="de-DE"/>
           </a:p>
@@ -1537,7 +1537,7 @@
           <a:p>
             <a:fld id="{0150BA9E-F14C-481F-965B-919CED594AA7}" type="slidenum">
               <a:rPr lang="de-DE" smtClean="0"/>
-              <a:t>‹Nr.›</a:t>
+              <a:t>‹#›</a:t>
             </a:fld>
             <a:endParaRPr lang="de-DE"/>
           </a:p>
@@ -1783,7 +1783,7 @@
           <a:p>
             <a:fld id="{5430F42D-6984-4A4E-9090-AA314D14663F}" type="datetimeFigureOut">
               <a:rPr lang="de-DE" smtClean="0"/>
-              <a:t>16.05.2012</a:t>
+              <a:t>17.05.2012</a:t>
             </a:fld>
             <a:endParaRPr lang="de-DE"/>
           </a:p>
@@ -1825,7 +1825,7 @@
           <a:p>
             <a:fld id="{0150BA9E-F14C-481F-965B-919CED594AA7}" type="slidenum">
               <a:rPr lang="de-DE" smtClean="0"/>
-              <a:t>‹Nr.›</a:t>
+              <a:t>‹#›</a:t>
             </a:fld>
             <a:endParaRPr lang="de-DE"/>
           </a:p>
@@ -2205,7 +2205,7 @@
           <a:p>
             <a:fld id="{5430F42D-6984-4A4E-9090-AA314D14663F}" type="datetimeFigureOut">
               <a:rPr lang="de-DE" smtClean="0"/>
-              <a:t>16.05.2012</a:t>
+              <a:t>17.05.2012</a:t>
             </a:fld>
             <a:endParaRPr lang="de-DE"/>
           </a:p>
@@ -2247,7 +2247,7 @@
           <a:p>
             <a:fld id="{0150BA9E-F14C-481F-965B-919CED594AA7}" type="slidenum">
               <a:rPr lang="de-DE" smtClean="0"/>
-              <a:t>‹Nr.›</a:t>
+              <a:t>‹#›</a:t>
             </a:fld>
             <a:endParaRPr lang="de-DE"/>
           </a:p>
@@ -2323,7 +2323,7 @@
           <a:p>
             <a:fld id="{5430F42D-6984-4A4E-9090-AA314D14663F}" type="datetimeFigureOut">
               <a:rPr lang="de-DE" smtClean="0"/>
-              <a:t>16.05.2012</a:t>
+              <a:t>17.05.2012</a:t>
             </a:fld>
             <a:endParaRPr lang="de-DE"/>
           </a:p>
@@ -2365,7 +2365,7 @@
           <a:p>
             <a:fld id="{0150BA9E-F14C-481F-965B-919CED594AA7}" type="slidenum">
               <a:rPr lang="de-DE" smtClean="0"/>
-              <a:t>‹Nr.›</a:t>
+              <a:t>‹#›</a:t>
             </a:fld>
             <a:endParaRPr lang="de-DE"/>
           </a:p>
@@ -2418,7 +2418,7 @@
           <a:p>
             <a:fld id="{5430F42D-6984-4A4E-9090-AA314D14663F}" type="datetimeFigureOut">
               <a:rPr lang="de-DE" smtClean="0"/>
-              <a:t>16.05.2012</a:t>
+              <a:t>17.05.2012</a:t>
             </a:fld>
             <a:endParaRPr lang="de-DE"/>
           </a:p>
@@ -2460,7 +2460,7 @@
           <a:p>
             <a:fld id="{0150BA9E-F14C-481F-965B-919CED594AA7}" type="slidenum">
               <a:rPr lang="de-DE" smtClean="0"/>
-              <a:t>‹Nr.›</a:t>
+              <a:t>‹#›</a:t>
             </a:fld>
             <a:endParaRPr lang="de-DE"/>
           </a:p>
@@ -2695,7 +2695,7 @@
           <a:p>
             <a:fld id="{5430F42D-6984-4A4E-9090-AA314D14663F}" type="datetimeFigureOut">
               <a:rPr lang="de-DE" smtClean="0"/>
-              <a:t>16.05.2012</a:t>
+              <a:t>17.05.2012</a:t>
             </a:fld>
             <a:endParaRPr lang="de-DE"/>
           </a:p>
@@ -2737,7 +2737,7 @@
           <a:p>
             <a:fld id="{0150BA9E-F14C-481F-965B-919CED594AA7}" type="slidenum">
               <a:rPr lang="de-DE" smtClean="0"/>
-              <a:t>‹Nr.›</a:t>
+              <a:t>‹#›</a:t>
             </a:fld>
             <a:endParaRPr lang="de-DE"/>
           </a:p>
@@ -2948,7 +2948,7 @@
           <a:p>
             <a:fld id="{5430F42D-6984-4A4E-9090-AA314D14663F}" type="datetimeFigureOut">
               <a:rPr lang="de-DE" smtClean="0"/>
-              <a:t>16.05.2012</a:t>
+              <a:t>17.05.2012</a:t>
             </a:fld>
             <a:endParaRPr lang="de-DE"/>
           </a:p>
@@ -2990,7 +2990,7 @@
           <a:p>
             <a:fld id="{0150BA9E-F14C-481F-965B-919CED594AA7}" type="slidenum">
               <a:rPr lang="de-DE" smtClean="0"/>
-              <a:t>‹Nr.›</a:t>
+              <a:t>‹#›</a:t>
             </a:fld>
             <a:endParaRPr lang="de-DE"/>
           </a:p>
@@ -3161,7 +3161,7 @@
           <a:p>
             <a:fld id="{5430F42D-6984-4A4E-9090-AA314D14663F}" type="datetimeFigureOut">
               <a:rPr lang="de-DE" smtClean="0"/>
-              <a:t>16.05.2012</a:t>
+              <a:t>17.05.2012</a:t>
             </a:fld>
             <a:endParaRPr lang="de-DE"/>
           </a:p>
@@ -3239,7 +3239,7 @@
           <a:p>
             <a:fld id="{0150BA9E-F14C-481F-965B-919CED594AA7}" type="slidenum">
               <a:rPr lang="de-DE" smtClean="0"/>
-              <a:t>‹Nr.›</a:t>
+              <a:t>‹#›</a:t>
             </a:fld>
             <a:endParaRPr lang="de-DE"/>
           </a:p>
@@ -7662,7 +7662,7 @@
         </p:nvCxnSpPr>
         <p:spPr>
           <a:xfrm flipH="1">
-            <a:off x="3321177" y="1037705"/>
+            <a:off x="3063625" y="1037705"/>
             <a:ext cx="28978" cy="5660382"/>
           </a:xfrm>
           <a:prstGeom prst="line">
@@ -7692,7 +7692,7 @@
         </p:nvCxnSpPr>
         <p:spPr>
           <a:xfrm>
-            <a:off x="5798426" y="1028123"/>
+            <a:off x="5258366" y="1028123"/>
             <a:ext cx="0" cy="5669964"/>
           </a:xfrm>
           <a:prstGeom prst="line">
@@ -7722,7 +7722,7 @@
         </p:nvCxnSpPr>
         <p:spPr>
           <a:xfrm>
-            <a:off x="8246698" y="1028123"/>
+            <a:off x="7454610" y="1028123"/>
             <a:ext cx="23469" cy="5669964"/>
           </a:xfrm>
           <a:prstGeom prst="line">
@@ -7954,7 +7954,7 @@
         </p:nvGrpSpPr>
         <p:grpSpPr>
           <a:xfrm>
-            <a:off x="2670774" y="1124744"/>
+            <a:off x="2413222" y="1124744"/>
             <a:ext cx="1404156" cy="577081"/>
             <a:chOff x="1187624" y="3068960"/>
             <a:chExt cx="1404156" cy="577081"/>
@@ -8055,7 +8055,7 @@
         </p:nvGrpSpPr>
         <p:grpSpPr>
           <a:xfrm>
-            <a:off x="2792092" y="2556193"/>
+            <a:off x="2534540" y="2556193"/>
             <a:ext cx="1404156" cy="584775"/>
             <a:chOff x="1187624" y="3068960"/>
             <a:chExt cx="1404156" cy="584775"/>
@@ -8156,7 +8156,7 @@
         </p:nvGrpSpPr>
         <p:grpSpPr>
           <a:xfrm>
-            <a:off x="5076056" y="3571999"/>
+            <a:off x="4535996" y="3571999"/>
             <a:ext cx="1404156" cy="584775"/>
             <a:chOff x="1187624" y="3068960"/>
             <a:chExt cx="1404156" cy="584775"/>
@@ -8254,7 +8254,7 @@
         </p:nvGrpSpPr>
         <p:grpSpPr>
           <a:xfrm>
-            <a:off x="6516216" y="5915956"/>
+            <a:off x="5724128" y="5915956"/>
             <a:ext cx="1404156" cy="584775"/>
             <a:chOff x="1187624" y="3068960"/>
             <a:chExt cx="1404156" cy="584775"/>
@@ -8347,7 +8347,7 @@
         </p:nvGrpSpPr>
         <p:grpSpPr>
           <a:xfrm>
-            <a:off x="7560332" y="3574033"/>
+            <a:off x="6768244" y="3574033"/>
             <a:ext cx="1404156" cy="584775"/>
             <a:chOff x="1187624" y="3068960"/>
             <a:chExt cx="1404156" cy="584775"/>
@@ -8558,7 +8558,7 @@
         <p:spPr>
           <a:xfrm>
             <a:off x="906890" y="2036236"/>
-            <a:ext cx="7560840" cy="86562"/>
+            <a:ext cx="6977478" cy="73078"/>
           </a:xfrm>
           <a:prstGeom prst="stripedRightArrow">
             <a:avLst/>
@@ -8608,7 +8608,7 @@
         <p:spPr>
           <a:xfrm>
             <a:off x="896874" y="3231263"/>
-            <a:ext cx="7560840" cy="86562"/>
+            <a:ext cx="6987494" cy="86562"/>
           </a:xfrm>
           <a:prstGeom prst="stripedRightArrow">
             <a:avLst/>
@@ -8658,7 +8658,7 @@
         <p:spPr>
           <a:xfrm>
             <a:off x="896874" y="4383391"/>
-            <a:ext cx="7560840" cy="86562"/>
+            <a:ext cx="6987494" cy="86562"/>
           </a:xfrm>
           <a:prstGeom prst="stripedRightArrow">
             <a:avLst/>
@@ -8708,7 +8708,7 @@
         <p:spPr>
           <a:xfrm>
             <a:off x="896874" y="5535519"/>
-            <a:ext cx="7560840" cy="86562"/>
+            <a:ext cx="6987494" cy="86562"/>
           </a:xfrm>
           <a:prstGeom prst="stripedRightArrow">
             <a:avLst/>
@@ -8758,7 +8758,7 @@
         <p:spPr>
           <a:xfrm>
             <a:off x="899592" y="6654806"/>
-            <a:ext cx="7560840" cy="86562"/>
+            <a:ext cx="6984776" cy="86562"/>
           </a:xfrm>
           <a:prstGeom prst="stripedRightArrow">
             <a:avLst/>
@@ -8845,7 +8845,7 @@
         </p:nvSpPr>
         <p:spPr>
           <a:xfrm>
-            <a:off x="2597304" y="355229"/>
+            <a:off x="2339752" y="355229"/>
             <a:ext cx="1512168" cy="729662"/>
           </a:xfrm>
           <a:prstGeom prst="ellipse">
@@ -8883,7 +8883,7 @@
         </p:nvSpPr>
         <p:spPr>
           <a:xfrm>
-            <a:off x="5053196" y="355229"/>
+            <a:off x="4513136" y="355229"/>
             <a:ext cx="1512168" cy="729662"/>
           </a:xfrm>
           <a:prstGeom prst="ellipse">
@@ -8921,7 +8921,7 @@
         </p:nvSpPr>
         <p:spPr>
           <a:xfrm>
-            <a:off x="7493848" y="355229"/>
+            <a:off x="6701760" y="355229"/>
             <a:ext cx="1512168" cy="729662"/>
           </a:xfrm>
           <a:prstGeom prst="ellipse">
@@ -8959,7 +8959,7 @@
         </p:nvSpPr>
         <p:spPr>
           <a:xfrm>
-            <a:off x="7528714" y="459679"/>
+            <a:off x="6736626" y="459679"/>
             <a:ext cx="1482906" cy="523220"/>
           </a:xfrm>
           <a:prstGeom prst="rect">
@@ -8993,7 +8993,7 @@
         </p:nvSpPr>
         <p:spPr>
           <a:xfrm>
-            <a:off x="5203806" y="432895"/>
+            <a:off x="4663746" y="432895"/>
             <a:ext cx="1384418" cy="523220"/>
           </a:xfrm>
           <a:prstGeom prst="rect">
@@ -9032,7 +9032,7 @@
         </p:nvSpPr>
         <p:spPr>
           <a:xfrm>
-            <a:off x="2748031" y="442477"/>
+            <a:off x="2490479" y="442477"/>
             <a:ext cx="1319913" cy="523220"/>
           </a:xfrm>
           <a:prstGeom prst="rect">
@@ -9107,7 +9107,7 @@
         </p:nvGrpSpPr>
         <p:grpSpPr>
           <a:xfrm>
-            <a:off x="4463988" y="4805863"/>
+            <a:off x="3923928" y="4805863"/>
             <a:ext cx="1404156" cy="584775"/>
             <a:chOff x="1187624" y="3068960"/>
             <a:chExt cx="1404156" cy="584775"/>
@@ -9204,7 +9204,7 @@
         </p:nvGrpSpPr>
         <p:grpSpPr>
           <a:xfrm>
-            <a:off x="5256076" y="4437112"/>
+            <a:off x="4716016" y="4437112"/>
             <a:ext cx="1404156" cy="577081"/>
             <a:chOff x="1187624" y="3068960"/>
             <a:chExt cx="1404156" cy="577081"/>
@@ -9322,7 +9322,7 @@
         </p:nvGrpSpPr>
         <p:grpSpPr>
           <a:xfrm>
-            <a:off x="7668344" y="5555916"/>
+            <a:off x="6876256" y="5555916"/>
             <a:ext cx="1404156" cy="584775"/>
             <a:chOff x="1187624" y="3068960"/>
             <a:chExt cx="1404156" cy="584775"/>
@@ -9423,7 +9423,7 @@
         </p:nvGrpSpPr>
         <p:grpSpPr>
           <a:xfrm>
-            <a:off x="7768405" y="6084585"/>
+            <a:off x="6976317" y="6084585"/>
             <a:ext cx="1404156" cy="584775"/>
             <a:chOff x="1187624" y="3068960"/>
             <a:chExt cx="1404156" cy="584775"/>
@@ -9524,7 +9524,7 @@
         </p:nvGrpSpPr>
         <p:grpSpPr>
           <a:xfrm>
-            <a:off x="5652120" y="4949119"/>
+            <a:off x="5112060" y="4949119"/>
             <a:ext cx="1404156" cy="577081"/>
             <a:chOff x="1187624" y="3068960"/>
             <a:chExt cx="1404156" cy="577081"/>
@@ -9622,7 +9622,7 @@
         </p:nvGrpSpPr>
         <p:grpSpPr>
           <a:xfrm>
-            <a:off x="3131840" y="1524539"/>
+            <a:off x="2874288" y="1524539"/>
             <a:ext cx="1404156" cy="584775"/>
             <a:chOff x="1187624" y="3068960"/>
             <a:chExt cx="1404156" cy="584775"/>

</xml_diff>

<commit_message>
text to metric calc, cc and logical line numbers
</commit_message>
<xml_diff>
--- a/text/images/illustrations.pptx
+++ b/text/images/illustrations.pptx
@@ -5,15 +5,16 @@
     <p:sldMasterId id="2147483648" r:id="rId1"/>
   </p:sldMasterIdLst>
   <p:notesMasterIdLst>
-    <p:notesMasterId r:id="rId8"/>
+    <p:notesMasterId r:id="rId9"/>
   </p:notesMasterIdLst>
   <p:sldIdLst>
     <p:sldId id="256" r:id="rId2"/>
     <p:sldId id="257" r:id="rId3"/>
     <p:sldId id="259" r:id="rId4"/>
-    <p:sldId id="261" r:id="rId5"/>
-    <p:sldId id="258" r:id="rId6"/>
-    <p:sldId id="260" r:id="rId7"/>
+    <p:sldId id="258" r:id="rId5"/>
+    <p:sldId id="260" r:id="rId6"/>
+    <p:sldId id="261" r:id="rId7"/>
+    <p:sldId id="262" r:id="rId8"/>
   </p:sldIdLst>
   <p:sldSz cx="9144000" cy="6858000" type="screen4x3"/>
   <p:notesSz cx="6797675" cy="9856788"/>
@@ -197,7 +198,7 @@
           <a:p>
             <a:fld id="{7C9ABC5C-FC58-4AE2-89F8-727F30362B08}" type="datetimeFigureOut">
               <a:rPr lang="de-DE" smtClean="0"/>
-              <a:t>30.05.2012</a:t>
+              <a:t>31.05.2012</a:t>
             </a:fld>
             <a:endParaRPr lang="de-DE"/>
           </a:p>
@@ -614,7 +615,91 @@
           <a:p>
             <a:fld id="{AAC1FA76-46A6-49F4-8E84-FEF8584513B4}" type="slidenum">
               <a:rPr lang="de-DE" smtClean="0"/>
-              <a:t>4</a:t>
+              <a:t>6</a:t>
+            </a:fld>
+            <a:endParaRPr lang="de-DE"/>
+          </a:p>
+        </p:txBody>
+      </p:sp>
+    </p:spTree>
+    <p:extLst>
+      <p:ext uri="{BB962C8B-B14F-4D97-AF65-F5344CB8AC3E}">
+        <p14:creationId xmlns:p14="http://schemas.microsoft.com/office/powerpoint/2010/main" val="2493930981"/>
+      </p:ext>
+    </p:extLst>
+  </p:cSld>
+  <p:clrMapOvr>
+    <a:masterClrMapping/>
+  </p:clrMapOvr>
+</p:notes>
+</file>
+
+<file path=ppt/notesSlides/notesSlide3.xml><?xml version="1.0" encoding="utf-8"?>
+<p:notes xmlns:a="http://schemas.openxmlformats.org/drawingml/2006/main" xmlns:r="http://schemas.openxmlformats.org/officeDocument/2006/relationships" xmlns:p="http://schemas.openxmlformats.org/presentationml/2006/main">
+  <p:cSld>
+    <p:spTree>
+      <p:nvGrpSpPr>
+        <p:cNvPr id="1" name=""/>
+        <p:cNvGrpSpPr/>
+        <p:nvPr/>
+      </p:nvGrpSpPr>
+      <p:grpSpPr>
+        <a:xfrm>
+          <a:off x="0" y="0"/>
+          <a:ext cx="0" cy="0"/>
+          <a:chOff x="0" y="0"/>
+          <a:chExt cx="0" cy="0"/>
+        </a:xfrm>
+      </p:grpSpPr>
+      <p:sp>
+        <p:nvSpPr>
+          <p:cNvPr id="2" name="Folienbildplatzhalter 1"/>
+          <p:cNvSpPr>
+            <a:spLocks noGrp="1" noRot="1" noChangeAspect="1"/>
+          </p:cNvSpPr>
+          <p:nvPr>
+            <p:ph type="sldImg"/>
+          </p:nvPr>
+        </p:nvSpPr>
+        <p:spPr/>
+      </p:sp>
+      <p:sp>
+        <p:nvSpPr>
+          <p:cNvPr id="3" name="Notizenplatzhalter 2"/>
+          <p:cNvSpPr>
+            <a:spLocks noGrp="1"/>
+          </p:cNvSpPr>
+          <p:nvPr>
+            <p:ph type="body" idx="1"/>
+          </p:nvPr>
+        </p:nvSpPr>
+        <p:spPr/>
+        <p:txBody>
+          <a:bodyPr/>
+          <a:lstStyle/>
+          <a:p>
+            <a:endParaRPr lang="de-DE" dirty="0"/>
+          </a:p>
+        </p:txBody>
+      </p:sp>
+      <p:sp>
+        <p:nvSpPr>
+          <p:cNvPr id="4" name="Foliennummernplatzhalter 3"/>
+          <p:cNvSpPr>
+            <a:spLocks noGrp="1"/>
+          </p:cNvSpPr>
+          <p:nvPr>
+            <p:ph type="sldNum" sz="quarter" idx="10"/>
+          </p:nvPr>
+        </p:nvSpPr>
+        <p:spPr/>
+        <p:txBody>
+          <a:bodyPr/>
+          <a:lstStyle/>
+          <a:p>
+            <a:fld id="{AAC1FA76-46A6-49F4-8E84-FEF8584513B4}" type="slidenum">
+              <a:rPr lang="de-DE" smtClean="0"/>
+              <a:t>7</a:t>
             </a:fld>
             <a:endParaRPr lang="de-DE"/>
           </a:p>
@@ -814,7 +899,7 @@
           <a:p>
             <a:fld id="{5430F42D-6984-4A4E-9090-AA314D14663F}" type="datetimeFigureOut">
               <a:rPr lang="de-DE" smtClean="0"/>
-              <a:t>30.05.2012</a:t>
+              <a:t>31.05.2012</a:t>
             </a:fld>
             <a:endParaRPr lang="de-DE"/>
           </a:p>
@@ -984,7 +1069,7 @@
           <a:p>
             <a:fld id="{5430F42D-6984-4A4E-9090-AA314D14663F}" type="datetimeFigureOut">
               <a:rPr lang="de-DE" smtClean="0"/>
-              <a:t>30.05.2012</a:t>
+              <a:t>31.05.2012</a:t>
             </a:fld>
             <a:endParaRPr lang="de-DE"/>
           </a:p>
@@ -1164,7 +1249,7 @@
           <a:p>
             <a:fld id="{5430F42D-6984-4A4E-9090-AA314D14663F}" type="datetimeFigureOut">
               <a:rPr lang="de-DE" smtClean="0"/>
-              <a:t>30.05.2012</a:t>
+              <a:t>31.05.2012</a:t>
             </a:fld>
             <a:endParaRPr lang="de-DE"/>
           </a:p>
@@ -1334,7 +1419,7 @@
           <a:p>
             <a:fld id="{5430F42D-6984-4A4E-9090-AA314D14663F}" type="datetimeFigureOut">
               <a:rPr lang="de-DE" smtClean="0"/>
-              <a:t>30.05.2012</a:t>
+              <a:t>31.05.2012</a:t>
             </a:fld>
             <a:endParaRPr lang="de-DE"/>
           </a:p>
@@ -1580,7 +1665,7 @@
           <a:p>
             <a:fld id="{5430F42D-6984-4A4E-9090-AA314D14663F}" type="datetimeFigureOut">
               <a:rPr lang="de-DE" smtClean="0"/>
-              <a:t>30.05.2012</a:t>
+              <a:t>31.05.2012</a:t>
             </a:fld>
             <a:endParaRPr lang="de-DE"/>
           </a:p>
@@ -1868,7 +1953,7 @@
           <a:p>
             <a:fld id="{5430F42D-6984-4A4E-9090-AA314D14663F}" type="datetimeFigureOut">
               <a:rPr lang="de-DE" smtClean="0"/>
-              <a:t>30.05.2012</a:t>
+              <a:t>31.05.2012</a:t>
             </a:fld>
             <a:endParaRPr lang="de-DE"/>
           </a:p>
@@ -2290,7 +2375,7 @@
           <a:p>
             <a:fld id="{5430F42D-6984-4A4E-9090-AA314D14663F}" type="datetimeFigureOut">
               <a:rPr lang="de-DE" smtClean="0"/>
-              <a:t>30.05.2012</a:t>
+              <a:t>31.05.2012</a:t>
             </a:fld>
             <a:endParaRPr lang="de-DE"/>
           </a:p>
@@ -2408,7 +2493,7 @@
           <a:p>
             <a:fld id="{5430F42D-6984-4A4E-9090-AA314D14663F}" type="datetimeFigureOut">
               <a:rPr lang="de-DE" smtClean="0"/>
-              <a:t>30.05.2012</a:t>
+              <a:t>31.05.2012</a:t>
             </a:fld>
             <a:endParaRPr lang="de-DE"/>
           </a:p>
@@ -2503,7 +2588,7 @@
           <a:p>
             <a:fld id="{5430F42D-6984-4A4E-9090-AA314D14663F}" type="datetimeFigureOut">
               <a:rPr lang="de-DE" smtClean="0"/>
-              <a:t>30.05.2012</a:t>
+              <a:t>31.05.2012</a:t>
             </a:fld>
             <a:endParaRPr lang="de-DE"/>
           </a:p>
@@ -2780,7 +2865,7 @@
           <a:p>
             <a:fld id="{5430F42D-6984-4A4E-9090-AA314D14663F}" type="datetimeFigureOut">
               <a:rPr lang="de-DE" smtClean="0"/>
-              <a:t>30.05.2012</a:t>
+              <a:t>31.05.2012</a:t>
             </a:fld>
             <a:endParaRPr lang="de-DE"/>
           </a:p>
@@ -3033,7 +3118,7 @@
           <a:p>
             <a:fld id="{5430F42D-6984-4A4E-9090-AA314D14663F}" type="datetimeFigureOut">
               <a:rPr lang="de-DE" smtClean="0"/>
-              <a:t>30.05.2012</a:t>
+              <a:t>31.05.2012</a:t>
             </a:fld>
             <a:endParaRPr lang="de-DE"/>
           </a:p>
@@ -3246,7 +3331,7 @@
           <a:p>
             <a:fld id="{5430F42D-6984-4A4E-9090-AA314D14663F}" type="datetimeFigureOut">
               <a:rPr lang="de-DE" smtClean="0"/>
-              <a:t>30.05.2012</a:t>
+              <a:t>31.05.2012</a:t>
             </a:fld>
             <a:endParaRPr lang="de-DE"/>
           </a:p>
@@ -6438,676 +6523,6 @@
           <a:lstStyle/>
           <a:p>
             <a:r>
-              <a:rPr lang="de-DE" dirty="0" smtClean="0"/>
-              <a:t>Architektur</a:t>
-            </a:r>
-            <a:endParaRPr lang="de-DE" dirty="0"/>
-          </a:p>
-        </p:txBody>
-      </p:sp>
-      <p:grpSp>
-        <p:nvGrpSpPr>
-          <p:cNvPr id="17" name="Gruppieren 16"/>
-          <p:cNvGrpSpPr/>
-          <p:nvPr/>
-        </p:nvGrpSpPr>
-        <p:grpSpPr>
-          <a:xfrm>
-            <a:off x="1907704" y="4221088"/>
-            <a:ext cx="2131516" cy="918596"/>
-            <a:chOff x="827584" y="2060849"/>
-            <a:chExt cx="2592288" cy="3384376"/>
-          </a:xfrm>
-        </p:grpSpPr>
-        <p:sp>
-          <p:nvSpPr>
-            <p:cNvPr id="5" name="Rechteck 4"/>
-            <p:cNvSpPr/>
-            <p:nvPr/>
-          </p:nvSpPr>
-          <p:spPr>
-            <a:xfrm>
-              <a:off x="827584" y="2060849"/>
-              <a:ext cx="2592288" cy="3384376"/>
-            </a:xfrm>
-            <a:prstGeom prst="rect">
-              <a:avLst/>
-            </a:prstGeom>
-          </p:spPr>
-          <p:style>
-            <a:lnRef idx="1">
-              <a:schemeClr val="accent3"/>
-            </a:lnRef>
-            <a:fillRef idx="2">
-              <a:schemeClr val="accent3"/>
-            </a:fillRef>
-            <a:effectRef idx="1">
-              <a:schemeClr val="accent3"/>
-            </a:effectRef>
-            <a:fontRef idx="minor">
-              <a:schemeClr val="dk1"/>
-            </a:fontRef>
-          </p:style>
-          <p:txBody>
-            <a:bodyPr rtlCol="0" anchor="ctr"/>
-            <a:lstStyle/>
-            <a:p>
-              <a:pPr algn="ctr"/>
-              <a:endParaRPr lang="de-DE"/>
-            </a:p>
-          </p:txBody>
-        </p:sp>
-        <p:sp>
-          <p:nvSpPr>
-            <p:cNvPr id="16" name="Textfeld 15"/>
-            <p:cNvSpPr txBox="1"/>
-            <p:nvPr/>
-          </p:nvSpPr>
-          <p:spPr>
-            <a:xfrm>
-              <a:off x="827584" y="3893733"/>
-              <a:ext cx="2577429" cy="1474122"/>
-            </a:xfrm>
-            <a:prstGeom prst="rect">
-              <a:avLst/>
-            </a:prstGeom>
-            <a:noFill/>
-          </p:spPr>
-          <p:txBody>
-            <a:bodyPr wrap="square" rtlCol="0">
-              <a:spAutoFit/>
-            </a:bodyPr>
-            <a:lstStyle/>
-            <a:p>
-              <a:r>
-                <a:rPr lang="de-DE" sz="2000" b="1" dirty="0" err="1" smtClean="0"/>
-                <a:t>Usus.net.View</a:t>
-              </a:r>
-              <a:endParaRPr lang="de-DE" sz="2000" b="1" dirty="0"/>
-            </a:p>
-          </p:txBody>
-        </p:sp>
-      </p:grpSp>
-      <p:grpSp>
-        <p:nvGrpSpPr>
-          <p:cNvPr id="44" name="Gruppieren 43"/>
-          <p:cNvGrpSpPr/>
-          <p:nvPr/>
-        </p:nvGrpSpPr>
-        <p:grpSpPr>
-          <a:xfrm>
-            <a:off x="5178028" y="4221088"/>
-            <a:ext cx="2130276" cy="905655"/>
-            <a:chOff x="3779912" y="2060849"/>
-            <a:chExt cx="2592288" cy="3384376"/>
-          </a:xfrm>
-        </p:grpSpPr>
-        <p:sp>
-          <p:nvSpPr>
-            <p:cNvPr id="45" name="Rechteck 44"/>
-            <p:cNvSpPr/>
-            <p:nvPr/>
-          </p:nvSpPr>
-          <p:spPr>
-            <a:xfrm>
-              <a:off x="3779912" y="2060849"/>
-              <a:ext cx="2592288" cy="3384376"/>
-            </a:xfrm>
-            <a:prstGeom prst="rect">
-              <a:avLst/>
-            </a:prstGeom>
-          </p:spPr>
-          <p:style>
-            <a:lnRef idx="1">
-              <a:schemeClr val="accent5"/>
-            </a:lnRef>
-            <a:fillRef idx="2">
-              <a:schemeClr val="accent5"/>
-            </a:fillRef>
-            <a:effectRef idx="1">
-              <a:schemeClr val="accent5"/>
-            </a:effectRef>
-            <a:fontRef idx="minor">
-              <a:schemeClr val="dk1"/>
-            </a:fontRef>
-          </p:style>
-          <p:txBody>
-            <a:bodyPr rtlCol="0" anchor="ctr"/>
-            <a:lstStyle/>
-            <a:p>
-              <a:pPr algn="ctr"/>
-              <a:endParaRPr lang="de-DE" dirty="0"/>
-            </a:p>
-          </p:txBody>
-        </p:sp>
-        <p:sp>
-          <p:nvSpPr>
-            <p:cNvPr id="47" name="Textfeld 46"/>
-            <p:cNvSpPr txBox="1"/>
-            <p:nvPr/>
-          </p:nvSpPr>
-          <p:spPr>
-            <a:xfrm>
-              <a:off x="3779912" y="3908030"/>
-              <a:ext cx="2592288" cy="1485621"/>
-            </a:xfrm>
-            <a:prstGeom prst="rect">
-              <a:avLst/>
-            </a:prstGeom>
-            <a:noFill/>
-          </p:spPr>
-          <p:txBody>
-            <a:bodyPr wrap="square" rtlCol="0">
-              <a:spAutoFit/>
-            </a:bodyPr>
-            <a:lstStyle/>
-            <a:p>
-              <a:r>
-                <a:rPr lang="de-DE" sz="2000" b="1" dirty="0" err="1" smtClean="0"/>
-                <a:t>Usus.net.Core</a:t>
-              </a:r>
-              <a:endParaRPr lang="de-DE" sz="2000" b="1" dirty="0"/>
-            </a:p>
-          </p:txBody>
-        </p:sp>
-      </p:grpSp>
-      <p:sp>
-        <p:nvSpPr>
-          <p:cNvPr id="57" name="Textfeld 56"/>
-          <p:cNvSpPr txBox="1"/>
-          <p:nvPr/>
-        </p:nvSpPr>
-        <p:spPr>
-          <a:xfrm>
-            <a:off x="1242500" y="1503879"/>
-            <a:ext cx="1941573" cy="461665"/>
-          </a:xfrm>
-          <a:prstGeom prst="rect">
-            <a:avLst/>
-          </a:prstGeom>
-          <a:noFill/>
-        </p:spPr>
-        <p:txBody>
-          <a:bodyPr wrap="square" rtlCol="0">
-            <a:spAutoFit/>
-          </a:bodyPr>
-          <a:lstStyle/>
-          <a:p>
-            <a:r>
-              <a:rPr lang="de-DE" sz="2400" dirty="0" smtClean="0">
-                <a:solidFill>
-                  <a:schemeClr val="bg1"/>
-                </a:solidFill>
-              </a:rPr>
-              <a:t>Visual Studio</a:t>
-            </a:r>
-            <a:endParaRPr lang="de-DE" sz="2400" dirty="0">
-              <a:solidFill>
-                <a:schemeClr val="bg1"/>
-              </a:solidFill>
-            </a:endParaRPr>
-          </a:p>
-        </p:txBody>
-      </p:sp>
-      <p:grpSp>
-        <p:nvGrpSpPr>
-          <p:cNvPr id="58" name="Gruppieren 57"/>
-          <p:cNvGrpSpPr/>
-          <p:nvPr/>
-        </p:nvGrpSpPr>
-        <p:grpSpPr>
-          <a:xfrm>
-            <a:off x="5178028" y="2307323"/>
-            <a:ext cx="2130276" cy="905404"/>
-            <a:chOff x="3779912" y="2060849"/>
-            <a:chExt cx="2592288" cy="3384376"/>
-          </a:xfrm>
-        </p:grpSpPr>
-        <p:sp>
-          <p:nvSpPr>
-            <p:cNvPr id="59" name="Rechteck 58"/>
-            <p:cNvSpPr/>
-            <p:nvPr/>
-          </p:nvSpPr>
-          <p:spPr>
-            <a:xfrm>
-              <a:off x="3779912" y="2060849"/>
-              <a:ext cx="2592288" cy="3384376"/>
-            </a:xfrm>
-            <a:prstGeom prst="rect">
-              <a:avLst/>
-            </a:prstGeom>
-          </p:spPr>
-          <p:style>
-            <a:lnRef idx="1">
-              <a:schemeClr val="accent6"/>
-            </a:lnRef>
-            <a:fillRef idx="2">
-              <a:schemeClr val="accent6"/>
-            </a:fillRef>
-            <a:effectRef idx="1">
-              <a:schemeClr val="accent6"/>
-            </a:effectRef>
-            <a:fontRef idx="minor">
-              <a:schemeClr val="dk1"/>
-            </a:fontRef>
-          </p:style>
-          <p:txBody>
-            <a:bodyPr rtlCol="0" anchor="ctr"/>
-            <a:lstStyle/>
-            <a:p>
-              <a:pPr algn="ctr"/>
-              <a:endParaRPr lang="de-DE" dirty="0"/>
-            </a:p>
-          </p:txBody>
-        </p:sp>
-        <p:sp>
-          <p:nvSpPr>
-            <p:cNvPr id="60" name="Textfeld 59"/>
-            <p:cNvSpPr txBox="1"/>
-            <p:nvPr/>
-          </p:nvSpPr>
-          <p:spPr>
-            <a:xfrm>
-              <a:off x="3779912" y="3944997"/>
-              <a:ext cx="2592288" cy="1495601"/>
-            </a:xfrm>
-            <a:prstGeom prst="rect">
-              <a:avLst/>
-            </a:prstGeom>
-            <a:noFill/>
-          </p:spPr>
-          <p:txBody>
-            <a:bodyPr wrap="square" rtlCol="0">
-              <a:spAutoFit/>
-            </a:bodyPr>
-            <a:lstStyle/>
-            <a:p>
-              <a:r>
-                <a:rPr lang="de-DE" sz="2000" b="1" dirty="0" err="1" smtClean="0"/>
-                <a:t>Usus.net.Console</a:t>
-              </a:r>
-              <a:endParaRPr lang="de-DE" sz="2000" b="1" dirty="0"/>
-            </a:p>
-          </p:txBody>
-        </p:sp>
-      </p:grpSp>
-      <p:grpSp>
-        <p:nvGrpSpPr>
-          <p:cNvPr id="61" name="Gruppieren 60"/>
-          <p:cNvGrpSpPr/>
-          <p:nvPr/>
-        </p:nvGrpSpPr>
-        <p:grpSpPr>
-          <a:xfrm>
-            <a:off x="1895486" y="2307323"/>
-            <a:ext cx="2131516" cy="905653"/>
-            <a:chOff x="827584" y="2060849"/>
-            <a:chExt cx="2592288" cy="3384376"/>
-          </a:xfrm>
-        </p:grpSpPr>
-        <p:sp>
-          <p:nvSpPr>
-            <p:cNvPr id="62" name="Rechteck 61"/>
-            <p:cNvSpPr/>
-            <p:nvPr/>
-          </p:nvSpPr>
-          <p:spPr>
-            <a:xfrm>
-              <a:off x="827584" y="2060849"/>
-              <a:ext cx="2592288" cy="3384376"/>
-            </a:xfrm>
-            <a:prstGeom prst="rect">
-              <a:avLst/>
-            </a:prstGeom>
-          </p:spPr>
-          <p:style>
-            <a:lnRef idx="1">
-              <a:schemeClr val="accent4"/>
-            </a:lnRef>
-            <a:fillRef idx="2">
-              <a:schemeClr val="accent4"/>
-            </a:fillRef>
-            <a:effectRef idx="1">
-              <a:schemeClr val="accent4"/>
-            </a:effectRef>
-            <a:fontRef idx="minor">
-              <a:schemeClr val="dk1"/>
-            </a:fontRef>
-          </p:style>
-          <p:txBody>
-            <a:bodyPr rtlCol="0" anchor="ctr"/>
-            <a:lstStyle/>
-            <a:p>
-              <a:pPr algn="ctr"/>
-              <a:endParaRPr lang="de-DE"/>
-            </a:p>
-          </p:txBody>
-        </p:sp>
-        <p:sp>
-          <p:nvSpPr>
-            <p:cNvPr id="63" name="Textfeld 62"/>
-            <p:cNvSpPr txBox="1"/>
-            <p:nvPr/>
-          </p:nvSpPr>
-          <p:spPr>
-            <a:xfrm>
-              <a:off x="827584" y="3918899"/>
-              <a:ext cx="2577429" cy="1513411"/>
-            </a:xfrm>
-            <a:prstGeom prst="rect">
-              <a:avLst/>
-            </a:prstGeom>
-            <a:noFill/>
-          </p:spPr>
-          <p:txBody>
-            <a:bodyPr wrap="square" rtlCol="0">
-              <a:spAutoFit/>
-            </a:bodyPr>
-            <a:lstStyle/>
-            <a:p>
-              <a:r>
-                <a:rPr lang="de-DE" sz="2000" b="1" dirty="0" smtClean="0"/>
-                <a:t>Usus.net</a:t>
-              </a:r>
-              <a:endParaRPr lang="de-DE" sz="2000" b="1" dirty="0"/>
-            </a:p>
-          </p:txBody>
-        </p:sp>
-      </p:grpSp>
-      <p:sp>
-        <p:nvSpPr>
-          <p:cNvPr id="2" name="Pfeil nach unten 1"/>
-          <p:cNvSpPr/>
-          <p:nvPr/>
-        </p:nvSpPr>
-        <p:spPr>
-          <a:xfrm>
-            <a:off x="2747203" y="3321390"/>
-            <a:ext cx="452519" cy="843598"/>
-          </a:xfrm>
-          <a:prstGeom prst="downArrow">
-            <a:avLst/>
-          </a:prstGeom>
-        </p:spPr>
-        <p:style>
-          <a:lnRef idx="1">
-            <a:schemeClr val="dk1"/>
-          </a:lnRef>
-          <a:fillRef idx="2">
-            <a:schemeClr val="dk1"/>
-          </a:fillRef>
-          <a:effectRef idx="1">
-            <a:schemeClr val="dk1"/>
-          </a:effectRef>
-          <a:fontRef idx="minor">
-            <a:schemeClr val="dk1"/>
-          </a:fontRef>
-        </p:style>
-        <p:txBody>
-          <a:bodyPr rtlCol="0" anchor="ctr"/>
-          <a:lstStyle/>
-          <a:p>
-            <a:pPr algn="ctr"/>
-            <a:endParaRPr lang="de-DE"/>
-          </a:p>
-        </p:txBody>
-      </p:sp>
-      <p:sp>
-        <p:nvSpPr>
-          <p:cNvPr id="64" name="Pfeil nach unten 63"/>
-          <p:cNvSpPr/>
-          <p:nvPr/>
-        </p:nvSpPr>
-        <p:spPr>
-          <a:xfrm>
-            <a:off x="6016906" y="3321390"/>
-            <a:ext cx="452519" cy="843598"/>
-          </a:xfrm>
-          <a:prstGeom prst="downArrow">
-            <a:avLst/>
-          </a:prstGeom>
-        </p:spPr>
-        <p:style>
-          <a:lnRef idx="1">
-            <a:schemeClr val="dk1"/>
-          </a:lnRef>
-          <a:fillRef idx="2">
-            <a:schemeClr val="dk1"/>
-          </a:fillRef>
-          <a:effectRef idx="1">
-            <a:schemeClr val="dk1"/>
-          </a:effectRef>
-          <a:fontRef idx="minor">
-            <a:schemeClr val="dk1"/>
-          </a:fontRef>
-        </p:style>
-        <p:txBody>
-          <a:bodyPr rtlCol="0" anchor="ctr"/>
-          <a:lstStyle/>
-          <a:p>
-            <a:pPr algn="ctr"/>
-            <a:endParaRPr lang="de-DE"/>
-          </a:p>
-        </p:txBody>
-      </p:sp>
-      <p:sp>
-        <p:nvSpPr>
-          <p:cNvPr id="65" name="Pfeil nach unten 64"/>
-          <p:cNvSpPr/>
-          <p:nvPr/>
-        </p:nvSpPr>
-        <p:spPr>
-          <a:xfrm rot="16200000">
-            <a:off x="4413903" y="4283132"/>
-            <a:ext cx="452519" cy="843598"/>
-          </a:xfrm>
-          <a:prstGeom prst="downArrow">
-            <a:avLst/>
-          </a:prstGeom>
-        </p:spPr>
-        <p:style>
-          <a:lnRef idx="1">
-            <a:schemeClr val="dk1"/>
-          </a:lnRef>
-          <a:fillRef idx="2">
-            <a:schemeClr val="dk1"/>
-          </a:fillRef>
-          <a:effectRef idx="1">
-            <a:schemeClr val="dk1"/>
-          </a:effectRef>
-          <a:fontRef idx="minor">
-            <a:schemeClr val="dk1"/>
-          </a:fontRef>
-        </p:style>
-        <p:txBody>
-          <a:bodyPr rtlCol="0" anchor="ctr"/>
-          <a:lstStyle/>
-          <a:p>
-            <a:pPr algn="ctr"/>
-            <a:endParaRPr lang="de-DE"/>
-          </a:p>
-        </p:txBody>
-      </p:sp>
-      <p:sp>
-        <p:nvSpPr>
-          <p:cNvPr id="3" name="Textfeld 2"/>
-          <p:cNvSpPr txBox="1"/>
-          <p:nvPr/>
-        </p:nvSpPr>
-        <p:spPr>
-          <a:xfrm>
-            <a:off x="1907705" y="2314723"/>
-            <a:ext cx="2119298" cy="369332"/>
-          </a:xfrm>
-          <a:prstGeom prst="rect">
-            <a:avLst/>
-          </a:prstGeom>
-          <a:noFill/>
-        </p:spPr>
-        <p:txBody>
-          <a:bodyPr wrap="square" rtlCol="0">
-            <a:spAutoFit/>
-          </a:bodyPr>
-          <a:lstStyle/>
-          <a:p>
-            <a:r>
-              <a:rPr lang="de-DE" dirty="0" smtClean="0"/>
-              <a:t>&lt;&lt;VS Extension&gt;&gt;</a:t>
-            </a:r>
-            <a:endParaRPr lang="de-DE" dirty="0"/>
-          </a:p>
-        </p:txBody>
-      </p:sp>
-      <p:sp>
-        <p:nvSpPr>
-          <p:cNvPr id="67" name="Textfeld 66"/>
-          <p:cNvSpPr txBox="1"/>
-          <p:nvPr/>
-        </p:nvSpPr>
-        <p:spPr>
-          <a:xfrm>
-            <a:off x="5183517" y="2315135"/>
-            <a:ext cx="2119298" cy="369332"/>
-          </a:xfrm>
-          <a:prstGeom prst="rect">
-            <a:avLst/>
-          </a:prstGeom>
-          <a:noFill/>
-        </p:spPr>
-        <p:txBody>
-          <a:bodyPr wrap="square" rtlCol="0">
-            <a:spAutoFit/>
-          </a:bodyPr>
-          <a:lstStyle/>
-          <a:p>
-            <a:r>
-              <a:rPr lang="de-DE" dirty="0" smtClean="0"/>
-              <a:t>&lt;&lt;</a:t>
-            </a:r>
-            <a:r>
-              <a:rPr lang="de-DE" dirty="0" err="1" smtClean="0"/>
-              <a:t>Executable</a:t>
-            </a:r>
-            <a:r>
-              <a:rPr lang="de-DE" dirty="0" smtClean="0"/>
-              <a:t>&gt;&gt;</a:t>
-            </a:r>
-            <a:endParaRPr lang="de-DE" dirty="0"/>
-          </a:p>
-        </p:txBody>
-      </p:sp>
-      <p:sp>
-        <p:nvSpPr>
-          <p:cNvPr id="68" name="Textfeld 67"/>
-          <p:cNvSpPr txBox="1"/>
-          <p:nvPr/>
-        </p:nvSpPr>
-        <p:spPr>
-          <a:xfrm>
-            <a:off x="5189006" y="4228739"/>
-            <a:ext cx="2119298" cy="369332"/>
-          </a:xfrm>
-          <a:prstGeom prst="rect">
-            <a:avLst/>
-          </a:prstGeom>
-          <a:noFill/>
-        </p:spPr>
-        <p:txBody>
-          <a:bodyPr wrap="square" rtlCol="0">
-            <a:spAutoFit/>
-          </a:bodyPr>
-          <a:lstStyle/>
-          <a:p>
-            <a:r>
-              <a:rPr lang="de-DE" dirty="0" smtClean="0"/>
-              <a:t>&lt;&lt;Library&gt;&gt;</a:t>
-            </a:r>
-            <a:endParaRPr lang="de-DE" dirty="0"/>
-          </a:p>
-        </p:txBody>
-      </p:sp>
-      <p:sp>
-        <p:nvSpPr>
-          <p:cNvPr id="70" name="Textfeld 69"/>
-          <p:cNvSpPr txBox="1"/>
-          <p:nvPr/>
-        </p:nvSpPr>
-        <p:spPr>
-          <a:xfrm>
-            <a:off x="1919922" y="4228739"/>
-            <a:ext cx="2119298" cy="369332"/>
-          </a:xfrm>
-          <a:prstGeom prst="rect">
-            <a:avLst/>
-          </a:prstGeom>
-          <a:noFill/>
-        </p:spPr>
-        <p:txBody>
-          <a:bodyPr wrap="square" rtlCol="0">
-            <a:spAutoFit/>
-          </a:bodyPr>
-          <a:lstStyle/>
-          <a:p>
-            <a:r>
-              <a:rPr lang="de-DE" dirty="0" smtClean="0"/>
-              <a:t>&lt;&lt;Library&gt;&gt;</a:t>
-            </a:r>
-            <a:endParaRPr lang="de-DE" dirty="0"/>
-          </a:p>
-        </p:txBody>
-      </p:sp>
-    </p:spTree>
-    <p:extLst>
-      <p:ext uri="{BB962C8B-B14F-4D97-AF65-F5344CB8AC3E}">
-        <p14:creationId xmlns:p14="http://schemas.microsoft.com/office/powerpoint/2010/main" val="4078637376"/>
-      </p:ext>
-    </p:extLst>
-  </p:cSld>
-  <p:clrMapOvr>
-    <a:masterClrMapping/>
-  </p:clrMapOvr>
-</p:sld>
-</file>
-
-<file path=ppt/slides/slide5.xml><?xml version="1.0" encoding="utf-8"?>
-<p:sld xmlns:a="http://schemas.openxmlformats.org/drawingml/2006/main" xmlns:r="http://schemas.openxmlformats.org/officeDocument/2006/relationships" xmlns:p="http://schemas.openxmlformats.org/presentationml/2006/main">
-  <p:cSld>
-    <p:spTree>
-      <p:nvGrpSpPr>
-        <p:cNvPr id="1" name=""/>
-        <p:cNvGrpSpPr/>
-        <p:nvPr/>
-      </p:nvGrpSpPr>
-      <p:grpSpPr>
-        <a:xfrm>
-          <a:off x="0" y="0"/>
-          <a:ext cx="0" cy="0"/>
-          <a:chOff x="0" y="0"/>
-          <a:chExt cx="0" cy="0"/>
-        </a:xfrm>
-      </p:grpSpPr>
-      <p:sp>
-        <p:nvSpPr>
-          <p:cNvPr id="4" name="Titel 31"/>
-          <p:cNvSpPr>
-            <a:spLocks noGrp="1"/>
-          </p:cNvSpPr>
-          <p:nvPr>
-            <p:ph type="title"/>
-          </p:nvPr>
-        </p:nvSpPr>
-        <p:spPr>
-          <a:xfrm>
-            <a:off x="457200" y="274638"/>
-            <a:ext cx="8229600" cy="1143000"/>
-          </a:xfrm>
-        </p:spPr>
-        <p:txBody>
-          <a:bodyPr/>
-          <a:lstStyle/>
-          <a:p>
-            <a:r>
               <a:rPr lang="de-DE" dirty="0" err="1" smtClean="0"/>
               <a:t>Use</a:t>
             </a:r>
@@ -8325,7 +7740,7 @@
 </p:sld>
 </file>
 
-<file path=ppt/slides/slide6.xml><?xml version="1.0" encoding="utf-8"?>
+<file path=ppt/slides/slide5.xml><?xml version="1.0" encoding="utf-8"?>
 <p:sld xmlns:a="http://schemas.openxmlformats.org/drawingml/2006/main" xmlns:r="http://schemas.openxmlformats.org/officeDocument/2006/relationships" xmlns:p="http://schemas.openxmlformats.org/presentationml/2006/main">
   <p:cSld>
     <p:spTree>
@@ -10668,6 +10083,1427 @@
     <p:extLst>
       <p:ext uri="{BB962C8B-B14F-4D97-AF65-F5344CB8AC3E}">
         <p14:creationId xmlns:p14="http://schemas.microsoft.com/office/powerpoint/2010/main" val="3015475056"/>
+      </p:ext>
+    </p:extLst>
+  </p:cSld>
+  <p:clrMapOvr>
+    <a:masterClrMapping/>
+  </p:clrMapOvr>
+</p:sld>
+</file>
+
+<file path=ppt/slides/slide6.xml><?xml version="1.0" encoding="utf-8"?>
+<p:sld xmlns:a="http://schemas.openxmlformats.org/drawingml/2006/main" xmlns:r="http://schemas.openxmlformats.org/officeDocument/2006/relationships" xmlns:p="http://schemas.openxmlformats.org/presentationml/2006/main">
+  <p:cSld>
+    <p:spTree>
+      <p:nvGrpSpPr>
+        <p:cNvPr id="1" name=""/>
+        <p:cNvGrpSpPr/>
+        <p:nvPr/>
+      </p:nvGrpSpPr>
+      <p:grpSpPr>
+        <a:xfrm>
+          <a:off x="0" y="0"/>
+          <a:ext cx="0" cy="0"/>
+          <a:chOff x="0" y="0"/>
+          <a:chExt cx="0" cy="0"/>
+        </a:xfrm>
+      </p:grpSpPr>
+      <p:sp>
+        <p:nvSpPr>
+          <p:cNvPr id="4" name="Titel 31"/>
+          <p:cNvSpPr>
+            <a:spLocks noGrp="1"/>
+          </p:cNvSpPr>
+          <p:nvPr>
+            <p:ph type="title"/>
+          </p:nvPr>
+        </p:nvSpPr>
+        <p:spPr>
+          <a:xfrm>
+            <a:off x="457200" y="274638"/>
+            <a:ext cx="8229600" cy="1143000"/>
+          </a:xfrm>
+        </p:spPr>
+        <p:txBody>
+          <a:bodyPr/>
+          <a:lstStyle/>
+          <a:p>
+            <a:r>
+              <a:rPr lang="de-DE" dirty="0" smtClean="0"/>
+              <a:t>Architektur Usus.net</a:t>
+            </a:r>
+            <a:endParaRPr lang="de-DE" dirty="0"/>
+          </a:p>
+        </p:txBody>
+      </p:sp>
+      <p:grpSp>
+        <p:nvGrpSpPr>
+          <p:cNvPr id="17" name="Gruppieren 16"/>
+          <p:cNvGrpSpPr/>
+          <p:nvPr/>
+        </p:nvGrpSpPr>
+        <p:grpSpPr>
+          <a:xfrm>
+            <a:off x="1907704" y="4221088"/>
+            <a:ext cx="2131516" cy="918596"/>
+            <a:chOff x="827584" y="2060849"/>
+            <a:chExt cx="2592288" cy="3384376"/>
+          </a:xfrm>
+        </p:grpSpPr>
+        <p:sp>
+          <p:nvSpPr>
+            <p:cNvPr id="5" name="Rechteck 4"/>
+            <p:cNvSpPr/>
+            <p:nvPr/>
+          </p:nvSpPr>
+          <p:spPr>
+            <a:xfrm>
+              <a:off x="827584" y="2060849"/>
+              <a:ext cx="2592288" cy="3384376"/>
+            </a:xfrm>
+            <a:prstGeom prst="rect">
+              <a:avLst/>
+            </a:prstGeom>
+          </p:spPr>
+          <p:style>
+            <a:lnRef idx="1">
+              <a:schemeClr val="accent3"/>
+            </a:lnRef>
+            <a:fillRef idx="2">
+              <a:schemeClr val="accent3"/>
+            </a:fillRef>
+            <a:effectRef idx="1">
+              <a:schemeClr val="accent3"/>
+            </a:effectRef>
+            <a:fontRef idx="minor">
+              <a:schemeClr val="dk1"/>
+            </a:fontRef>
+          </p:style>
+          <p:txBody>
+            <a:bodyPr rtlCol="0" anchor="ctr"/>
+            <a:lstStyle/>
+            <a:p>
+              <a:pPr algn="ctr"/>
+              <a:endParaRPr lang="de-DE"/>
+            </a:p>
+          </p:txBody>
+        </p:sp>
+        <p:sp>
+          <p:nvSpPr>
+            <p:cNvPr id="16" name="Textfeld 15"/>
+            <p:cNvSpPr txBox="1"/>
+            <p:nvPr/>
+          </p:nvSpPr>
+          <p:spPr>
+            <a:xfrm>
+              <a:off x="827584" y="3893733"/>
+              <a:ext cx="2577429" cy="1474122"/>
+            </a:xfrm>
+            <a:prstGeom prst="rect">
+              <a:avLst/>
+            </a:prstGeom>
+            <a:noFill/>
+          </p:spPr>
+          <p:txBody>
+            <a:bodyPr wrap="square" rtlCol="0">
+              <a:spAutoFit/>
+            </a:bodyPr>
+            <a:lstStyle/>
+            <a:p>
+              <a:r>
+                <a:rPr lang="de-DE" sz="2000" b="1" dirty="0" err="1" smtClean="0"/>
+                <a:t>Usus.net.View</a:t>
+              </a:r>
+              <a:endParaRPr lang="de-DE" sz="2000" b="1" dirty="0"/>
+            </a:p>
+          </p:txBody>
+        </p:sp>
+      </p:grpSp>
+      <p:grpSp>
+        <p:nvGrpSpPr>
+          <p:cNvPr id="44" name="Gruppieren 43"/>
+          <p:cNvGrpSpPr/>
+          <p:nvPr/>
+        </p:nvGrpSpPr>
+        <p:grpSpPr>
+          <a:xfrm>
+            <a:off x="5178028" y="4221088"/>
+            <a:ext cx="2130276" cy="905655"/>
+            <a:chOff x="3779912" y="2060849"/>
+            <a:chExt cx="2592288" cy="3384376"/>
+          </a:xfrm>
+        </p:grpSpPr>
+        <p:sp>
+          <p:nvSpPr>
+            <p:cNvPr id="45" name="Rechteck 44"/>
+            <p:cNvSpPr/>
+            <p:nvPr/>
+          </p:nvSpPr>
+          <p:spPr>
+            <a:xfrm>
+              <a:off x="3779912" y="2060849"/>
+              <a:ext cx="2592288" cy="3384376"/>
+            </a:xfrm>
+            <a:prstGeom prst="rect">
+              <a:avLst/>
+            </a:prstGeom>
+          </p:spPr>
+          <p:style>
+            <a:lnRef idx="1">
+              <a:schemeClr val="accent5"/>
+            </a:lnRef>
+            <a:fillRef idx="2">
+              <a:schemeClr val="accent5"/>
+            </a:fillRef>
+            <a:effectRef idx="1">
+              <a:schemeClr val="accent5"/>
+            </a:effectRef>
+            <a:fontRef idx="minor">
+              <a:schemeClr val="dk1"/>
+            </a:fontRef>
+          </p:style>
+          <p:txBody>
+            <a:bodyPr rtlCol="0" anchor="ctr"/>
+            <a:lstStyle/>
+            <a:p>
+              <a:pPr algn="ctr"/>
+              <a:endParaRPr lang="de-DE" dirty="0"/>
+            </a:p>
+          </p:txBody>
+        </p:sp>
+        <p:sp>
+          <p:nvSpPr>
+            <p:cNvPr id="47" name="Textfeld 46"/>
+            <p:cNvSpPr txBox="1"/>
+            <p:nvPr/>
+          </p:nvSpPr>
+          <p:spPr>
+            <a:xfrm>
+              <a:off x="3779912" y="3908030"/>
+              <a:ext cx="2592288" cy="1485621"/>
+            </a:xfrm>
+            <a:prstGeom prst="rect">
+              <a:avLst/>
+            </a:prstGeom>
+            <a:noFill/>
+          </p:spPr>
+          <p:txBody>
+            <a:bodyPr wrap="square" rtlCol="0">
+              <a:spAutoFit/>
+            </a:bodyPr>
+            <a:lstStyle/>
+            <a:p>
+              <a:r>
+                <a:rPr lang="de-DE" sz="2000" b="1" dirty="0" err="1" smtClean="0"/>
+                <a:t>Usus.net.Core</a:t>
+              </a:r>
+              <a:endParaRPr lang="de-DE" sz="2000" b="1" dirty="0"/>
+            </a:p>
+          </p:txBody>
+        </p:sp>
+      </p:grpSp>
+      <p:sp>
+        <p:nvSpPr>
+          <p:cNvPr id="57" name="Textfeld 56"/>
+          <p:cNvSpPr txBox="1"/>
+          <p:nvPr/>
+        </p:nvSpPr>
+        <p:spPr>
+          <a:xfrm>
+            <a:off x="1242500" y="1503879"/>
+            <a:ext cx="1941573" cy="461665"/>
+          </a:xfrm>
+          <a:prstGeom prst="rect">
+            <a:avLst/>
+          </a:prstGeom>
+          <a:noFill/>
+        </p:spPr>
+        <p:txBody>
+          <a:bodyPr wrap="square" rtlCol="0">
+            <a:spAutoFit/>
+          </a:bodyPr>
+          <a:lstStyle/>
+          <a:p>
+            <a:r>
+              <a:rPr lang="de-DE" sz="2400" dirty="0" smtClean="0">
+                <a:solidFill>
+                  <a:schemeClr val="bg1"/>
+                </a:solidFill>
+              </a:rPr>
+              <a:t>Visual Studio</a:t>
+            </a:r>
+            <a:endParaRPr lang="de-DE" sz="2400" dirty="0">
+              <a:solidFill>
+                <a:schemeClr val="bg1"/>
+              </a:solidFill>
+            </a:endParaRPr>
+          </a:p>
+        </p:txBody>
+      </p:sp>
+      <p:grpSp>
+        <p:nvGrpSpPr>
+          <p:cNvPr id="58" name="Gruppieren 57"/>
+          <p:cNvGrpSpPr/>
+          <p:nvPr/>
+        </p:nvGrpSpPr>
+        <p:grpSpPr>
+          <a:xfrm>
+            <a:off x="5178028" y="2307323"/>
+            <a:ext cx="2130276" cy="905404"/>
+            <a:chOff x="3779912" y="2060849"/>
+            <a:chExt cx="2592288" cy="3384376"/>
+          </a:xfrm>
+        </p:grpSpPr>
+        <p:sp>
+          <p:nvSpPr>
+            <p:cNvPr id="59" name="Rechteck 58"/>
+            <p:cNvSpPr/>
+            <p:nvPr/>
+          </p:nvSpPr>
+          <p:spPr>
+            <a:xfrm>
+              <a:off x="3779912" y="2060849"/>
+              <a:ext cx="2592288" cy="3384376"/>
+            </a:xfrm>
+            <a:prstGeom prst="rect">
+              <a:avLst/>
+            </a:prstGeom>
+          </p:spPr>
+          <p:style>
+            <a:lnRef idx="1">
+              <a:schemeClr val="accent6"/>
+            </a:lnRef>
+            <a:fillRef idx="2">
+              <a:schemeClr val="accent6"/>
+            </a:fillRef>
+            <a:effectRef idx="1">
+              <a:schemeClr val="accent6"/>
+            </a:effectRef>
+            <a:fontRef idx="minor">
+              <a:schemeClr val="dk1"/>
+            </a:fontRef>
+          </p:style>
+          <p:txBody>
+            <a:bodyPr rtlCol="0" anchor="ctr"/>
+            <a:lstStyle/>
+            <a:p>
+              <a:pPr algn="ctr"/>
+              <a:endParaRPr lang="de-DE" dirty="0"/>
+            </a:p>
+          </p:txBody>
+        </p:sp>
+        <p:sp>
+          <p:nvSpPr>
+            <p:cNvPr id="60" name="Textfeld 59"/>
+            <p:cNvSpPr txBox="1"/>
+            <p:nvPr/>
+          </p:nvSpPr>
+          <p:spPr>
+            <a:xfrm>
+              <a:off x="3779912" y="3944997"/>
+              <a:ext cx="2592288" cy="1495601"/>
+            </a:xfrm>
+            <a:prstGeom prst="rect">
+              <a:avLst/>
+            </a:prstGeom>
+            <a:noFill/>
+          </p:spPr>
+          <p:txBody>
+            <a:bodyPr wrap="square" rtlCol="0">
+              <a:spAutoFit/>
+            </a:bodyPr>
+            <a:lstStyle/>
+            <a:p>
+              <a:r>
+                <a:rPr lang="de-DE" sz="2000" b="1" dirty="0" err="1" smtClean="0"/>
+                <a:t>Usus.net.Console</a:t>
+              </a:r>
+              <a:endParaRPr lang="de-DE" sz="2000" b="1" dirty="0"/>
+            </a:p>
+          </p:txBody>
+        </p:sp>
+      </p:grpSp>
+      <p:grpSp>
+        <p:nvGrpSpPr>
+          <p:cNvPr id="61" name="Gruppieren 60"/>
+          <p:cNvGrpSpPr/>
+          <p:nvPr/>
+        </p:nvGrpSpPr>
+        <p:grpSpPr>
+          <a:xfrm>
+            <a:off x="1895486" y="2307323"/>
+            <a:ext cx="2131516" cy="905653"/>
+            <a:chOff x="827584" y="2060849"/>
+            <a:chExt cx="2592288" cy="3384376"/>
+          </a:xfrm>
+        </p:grpSpPr>
+        <p:sp>
+          <p:nvSpPr>
+            <p:cNvPr id="62" name="Rechteck 61"/>
+            <p:cNvSpPr/>
+            <p:nvPr/>
+          </p:nvSpPr>
+          <p:spPr>
+            <a:xfrm>
+              <a:off x="827584" y="2060849"/>
+              <a:ext cx="2592288" cy="3384376"/>
+            </a:xfrm>
+            <a:prstGeom prst="rect">
+              <a:avLst/>
+            </a:prstGeom>
+          </p:spPr>
+          <p:style>
+            <a:lnRef idx="1">
+              <a:schemeClr val="accent4"/>
+            </a:lnRef>
+            <a:fillRef idx="2">
+              <a:schemeClr val="accent4"/>
+            </a:fillRef>
+            <a:effectRef idx="1">
+              <a:schemeClr val="accent4"/>
+            </a:effectRef>
+            <a:fontRef idx="minor">
+              <a:schemeClr val="dk1"/>
+            </a:fontRef>
+          </p:style>
+          <p:txBody>
+            <a:bodyPr rtlCol="0" anchor="ctr"/>
+            <a:lstStyle/>
+            <a:p>
+              <a:pPr algn="ctr"/>
+              <a:endParaRPr lang="de-DE"/>
+            </a:p>
+          </p:txBody>
+        </p:sp>
+        <p:sp>
+          <p:nvSpPr>
+            <p:cNvPr id="63" name="Textfeld 62"/>
+            <p:cNvSpPr txBox="1"/>
+            <p:nvPr/>
+          </p:nvSpPr>
+          <p:spPr>
+            <a:xfrm>
+              <a:off x="827584" y="3918899"/>
+              <a:ext cx="2577429" cy="1513411"/>
+            </a:xfrm>
+            <a:prstGeom prst="rect">
+              <a:avLst/>
+            </a:prstGeom>
+            <a:noFill/>
+          </p:spPr>
+          <p:txBody>
+            <a:bodyPr wrap="square" rtlCol="0">
+              <a:spAutoFit/>
+            </a:bodyPr>
+            <a:lstStyle/>
+            <a:p>
+              <a:r>
+                <a:rPr lang="de-DE" sz="2000" b="1" dirty="0" smtClean="0"/>
+                <a:t>Usus.net</a:t>
+              </a:r>
+              <a:endParaRPr lang="de-DE" sz="2000" b="1" dirty="0"/>
+            </a:p>
+          </p:txBody>
+        </p:sp>
+      </p:grpSp>
+      <p:sp>
+        <p:nvSpPr>
+          <p:cNvPr id="2" name="Pfeil nach unten 1"/>
+          <p:cNvSpPr/>
+          <p:nvPr/>
+        </p:nvSpPr>
+        <p:spPr>
+          <a:xfrm>
+            <a:off x="2747203" y="3321390"/>
+            <a:ext cx="452519" cy="843598"/>
+          </a:xfrm>
+          <a:prstGeom prst="downArrow">
+            <a:avLst/>
+          </a:prstGeom>
+        </p:spPr>
+        <p:style>
+          <a:lnRef idx="1">
+            <a:schemeClr val="dk1"/>
+          </a:lnRef>
+          <a:fillRef idx="2">
+            <a:schemeClr val="dk1"/>
+          </a:fillRef>
+          <a:effectRef idx="1">
+            <a:schemeClr val="dk1"/>
+          </a:effectRef>
+          <a:fontRef idx="minor">
+            <a:schemeClr val="dk1"/>
+          </a:fontRef>
+        </p:style>
+        <p:txBody>
+          <a:bodyPr rtlCol="0" anchor="ctr"/>
+          <a:lstStyle/>
+          <a:p>
+            <a:pPr algn="ctr"/>
+            <a:endParaRPr lang="de-DE"/>
+          </a:p>
+        </p:txBody>
+      </p:sp>
+      <p:sp>
+        <p:nvSpPr>
+          <p:cNvPr id="64" name="Pfeil nach unten 63"/>
+          <p:cNvSpPr/>
+          <p:nvPr/>
+        </p:nvSpPr>
+        <p:spPr>
+          <a:xfrm>
+            <a:off x="6016906" y="3321390"/>
+            <a:ext cx="452519" cy="843598"/>
+          </a:xfrm>
+          <a:prstGeom prst="downArrow">
+            <a:avLst/>
+          </a:prstGeom>
+        </p:spPr>
+        <p:style>
+          <a:lnRef idx="1">
+            <a:schemeClr val="dk1"/>
+          </a:lnRef>
+          <a:fillRef idx="2">
+            <a:schemeClr val="dk1"/>
+          </a:fillRef>
+          <a:effectRef idx="1">
+            <a:schemeClr val="dk1"/>
+          </a:effectRef>
+          <a:fontRef idx="minor">
+            <a:schemeClr val="dk1"/>
+          </a:fontRef>
+        </p:style>
+        <p:txBody>
+          <a:bodyPr rtlCol="0" anchor="ctr"/>
+          <a:lstStyle/>
+          <a:p>
+            <a:pPr algn="ctr"/>
+            <a:endParaRPr lang="de-DE"/>
+          </a:p>
+        </p:txBody>
+      </p:sp>
+      <p:sp>
+        <p:nvSpPr>
+          <p:cNvPr id="65" name="Pfeil nach unten 64"/>
+          <p:cNvSpPr/>
+          <p:nvPr/>
+        </p:nvSpPr>
+        <p:spPr>
+          <a:xfrm rot="16200000">
+            <a:off x="4413903" y="4283132"/>
+            <a:ext cx="452519" cy="843598"/>
+          </a:xfrm>
+          <a:prstGeom prst="downArrow">
+            <a:avLst/>
+          </a:prstGeom>
+        </p:spPr>
+        <p:style>
+          <a:lnRef idx="1">
+            <a:schemeClr val="dk1"/>
+          </a:lnRef>
+          <a:fillRef idx="2">
+            <a:schemeClr val="dk1"/>
+          </a:fillRef>
+          <a:effectRef idx="1">
+            <a:schemeClr val="dk1"/>
+          </a:effectRef>
+          <a:fontRef idx="minor">
+            <a:schemeClr val="dk1"/>
+          </a:fontRef>
+        </p:style>
+        <p:txBody>
+          <a:bodyPr rtlCol="0" anchor="ctr"/>
+          <a:lstStyle/>
+          <a:p>
+            <a:pPr algn="ctr"/>
+            <a:endParaRPr lang="de-DE"/>
+          </a:p>
+        </p:txBody>
+      </p:sp>
+      <p:sp>
+        <p:nvSpPr>
+          <p:cNvPr id="3" name="Textfeld 2"/>
+          <p:cNvSpPr txBox="1"/>
+          <p:nvPr/>
+        </p:nvSpPr>
+        <p:spPr>
+          <a:xfrm>
+            <a:off x="1907705" y="2314723"/>
+            <a:ext cx="2119298" cy="369332"/>
+          </a:xfrm>
+          <a:prstGeom prst="rect">
+            <a:avLst/>
+          </a:prstGeom>
+          <a:noFill/>
+        </p:spPr>
+        <p:txBody>
+          <a:bodyPr wrap="square" rtlCol="0">
+            <a:spAutoFit/>
+          </a:bodyPr>
+          <a:lstStyle/>
+          <a:p>
+            <a:r>
+              <a:rPr lang="de-DE" dirty="0" smtClean="0"/>
+              <a:t>&lt;&lt;VS Extension&gt;&gt;</a:t>
+            </a:r>
+            <a:endParaRPr lang="de-DE" dirty="0"/>
+          </a:p>
+        </p:txBody>
+      </p:sp>
+      <p:sp>
+        <p:nvSpPr>
+          <p:cNvPr id="67" name="Textfeld 66"/>
+          <p:cNvSpPr txBox="1"/>
+          <p:nvPr/>
+        </p:nvSpPr>
+        <p:spPr>
+          <a:xfrm>
+            <a:off x="5183517" y="2315135"/>
+            <a:ext cx="2119298" cy="369332"/>
+          </a:xfrm>
+          <a:prstGeom prst="rect">
+            <a:avLst/>
+          </a:prstGeom>
+          <a:noFill/>
+        </p:spPr>
+        <p:txBody>
+          <a:bodyPr wrap="square" rtlCol="0">
+            <a:spAutoFit/>
+          </a:bodyPr>
+          <a:lstStyle/>
+          <a:p>
+            <a:r>
+              <a:rPr lang="de-DE" dirty="0" smtClean="0"/>
+              <a:t>&lt;&lt;</a:t>
+            </a:r>
+            <a:r>
+              <a:rPr lang="de-DE" dirty="0" err="1" smtClean="0"/>
+              <a:t>Executable</a:t>
+            </a:r>
+            <a:r>
+              <a:rPr lang="de-DE" dirty="0" smtClean="0"/>
+              <a:t>&gt;&gt;</a:t>
+            </a:r>
+            <a:endParaRPr lang="de-DE" dirty="0"/>
+          </a:p>
+        </p:txBody>
+      </p:sp>
+      <p:sp>
+        <p:nvSpPr>
+          <p:cNvPr id="68" name="Textfeld 67"/>
+          <p:cNvSpPr txBox="1"/>
+          <p:nvPr/>
+        </p:nvSpPr>
+        <p:spPr>
+          <a:xfrm>
+            <a:off x="5189006" y="4228739"/>
+            <a:ext cx="2119298" cy="369332"/>
+          </a:xfrm>
+          <a:prstGeom prst="rect">
+            <a:avLst/>
+          </a:prstGeom>
+          <a:noFill/>
+        </p:spPr>
+        <p:txBody>
+          <a:bodyPr wrap="square" rtlCol="0">
+            <a:spAutoFit/>
+          </a:bodyPr>
+          <a:lstStyle/>
+          <a:p>
+            <a:r>
+              <a:rPr lang="de-DE" dirty="0" smtClean="0"/>
+              <a:t>&lt;&lt;Library&gt;&gt;</a:t>
+            </a:r>
+            <a:endParaRPr lang="de-DE" dirty="0"/>
+          </a:p>
+        </p:txBody>
+      </p:sp>
+      <p:sp>
+        <p:nvSpPr>
+          <p:cNvPr id="70" name="Textfeld 69"/>
+          <p:cNvSpPr txBox="1"/>
+          <p:nvPr/>
+        </p:nvSpPr>
+        <p:spPr>
+          <a:xfrm>
+            <a:off x="1919922" y="4228739"/>
+            <a:ext cx="2119298" cy="369332"/>
+          </a:xfrm>
+          <a:prstGeom prst="rect">
+            <a:avLst/>
+          </a:prstGeom>
+          <a:noFill/>
+        </p:spPr>
+        <p:txBody>
+          <a:bodyPr wrap="square" rtlCol="0">
+            <a:spAutoFit/>
+          </a:bodyPr>
+          <a:lstStyle/>
+          <a:p>
+            <a:r>
+              <a:rPr lang="de-DE" dirty="0" smtClean="0"/>
+              <a:t>&lt;&lt;Library&gt;&gt;</a:t>
+            </a:r>
+            <a:endParaRPr lang="de-DE" dirty="0"/>
+          </a:p>
+        </p:txBody>
+      </p:sp>
+    </p:spTree>
+    <p:extLst>
+      <p:ext uri="{BB962C8B-B14F-4D97-AF65-F5344CB8AC3E}">
+        <p14:creationId xmlns:p14="http://schemas.microsoft.com/office/powerpoint/2010/main" val="4078637376"/>
+      </p:ext>
+    </p:extLst>
+  </p:cSld>
+  <p:clrMapOvr>
+    <a:masterClrMapping/>
+  </p:clrMapOvr>
+</p:sld>
+</file>
+
+<file path=ppt/slides/slide7.xml><?xml version="1.0" encoding="utf-8"?>
+<p:sld xmlns:a="http://schemas.openxmlformats.org/drawingml/2006/main" xmlns:r="http://schemas.openxmlformats.org/officeDocument/2006/relationships" xmlns:p="http://schemas.openxmlformats.org/presentationml/2006/main">
+  <p:cSld>
+    <p:spTree>
+      <p:nvGrpSpPr>
+        <p:cNvPr id="1" name=""/>
+        <p:cNvGrpSpPr/>
+        <p:nvPr/>
+      </p:nvGrpSpPr>
+      <p:grpSpPr>
+        <a:xfrm>
+          <a:off x="0" y="0"/>
+          <a:ext cx="0" cy="0"/>
+          <a:chOff x="0" y="0"/>
+          <a:chExt cx="0" cy="0"/>
+        </a:xfrm>
+      </p:grpSpPr>
+      <p:sp>
+        <p:nvSpPr>
+          <p:cNvPr id="4" name="Titel 31"/>
+          <p:cNvSpPr>
+            <a:spLocks noGrp="1"/>
+          </p:cNvSpPr>
+          <p:nvPr>
+            <p:ph type="title"/>
+          </p:nvPr>
+        </p:nvSpPr>
+        <p:spPr>
+          <a:xfrm>
+            <a:off x="457200" y="274638"/>
+            <a:ext cx="8229600" cy="1143000"/>
+          </a:xfrm>
+        </p:spPr>
+        <p:txBody>
+          <a:bodyPr/>
+          <a:lstStyle/>
+          <a:p>
+            <a:r>
+              <a:rPr lang="de-DE" dirty="0" err="1" smtClean="0"/>
+              <a:t>Metrikberechnung</a:t>
+            </a:r>
+            <a:endParaRPr lang="de-DE" dirty="0"/>
+          </a:p>
+        </p:txBody>
+      </p:sp>
+      <p:sp>
+        <p:nvSpPr>
+          <p:cNvPr id="62" name="Rechteck 61"/>
+          <p:cNvSpPr/>
+          <p:nvPr/>
+        </p:nvSpPr>
+        <p:spPr>
+          <a:xfrm>
+            <a:off x="3184073" y="5133931"/>
+            <a:ext cx="1740410" cy="617621"/>
+          </a:xfrm>
+          <a:prstGeom prst="rect">
+            <a:avLst/>
+          </a:prstGeom>
+        </p:spPr>
+        <p:style>
+          <a:lnRef idx="1">
+            <a:schemeClr val="accent2"/>
+          </a:lnRef>
+          <a:fillRef idx="2">
+            <a:schemeClr val="accent2"/>
+          </a:fillRef>
+          <a:effectRef idx="1">
+            <a:schemeClr val="accent2"/>
+          </a:effectRef>
+          <a:fontRef idx="minor">
+            <a:schemeClr val="dk1"/>
+          </a:fontRef>
+        </p:style>
+        <p:txBody>
+          <a:bodyPr rtlCol="0" anchor="ctr"/>
+          <a:lstStyle/>
+          <a:p>
+            <a:pPr algn="ctr"/>
+            <a:r>
+              <a:rPr lang="de-DE" dirty="0" err="1" smtClean="0"/>
+              <a:t>AssemblyVisitor</a:t>
+            </a:r>
+            <a:endParaRPr lang="de-DE" dirty="0" smtClean="0"/>
+          </a:p>
+        </p:txBody>
+      </p:sp>
+      <p:sp>
+        <p:nvSpPr>
+          <p:cNvPr id="23" name="Rechteck 22"/>
+          <p:cNvSpPr/>
+          <p:nvPr/>
+        </p:nvSpPr>
+        <p:spPr>
+          <a:xfrm>
+            <a:off x="3169513" y="3492052"/>
+            <a:ext cx="1740410" cy="617621"/>
+          </a:xfrm>
+          <a:prstGeom prst="rect">
+            <a:avLst/>
+          </a:prstGeom>
+        </p:spPr>
+        <p:style>
+          <a:lnRef idx="1">
+            <a:schemeClr val="accent4"/>
+          </a:lnRef>
+          <a:fillRef idx="2">
+            <a:schemeClr val="accent4"/>
+          </a:fillRef>
+          <a:effectRef idx="1">
+            <a:schemeClr val="accent4"/>
+          </a:effectRef>
+          <a:fontRef idx="minor">
+            <a:schemeClr val="dk1"/>
+          </a:fontRef>
+        </p:style>
+        <p:txBody>
+          <a:bodyPr rtlCol="0" anchor="ctr"/>
+          <a:lstStyle/>
+          <a:p>
+            <a:pPr algn="ctr"/>
+            <a:r>
+              <a:rPr lang="de-DE" dirty="0" err="1" smtClean="0"/>
+              <a:t>MetricCollector</a:t>
+            </a:r>
+            <a:endParaRPr lang="de-DE" dirty="0" smtClean="0"/>
+          </a:p>
+        </p:txBody>
+      </p:sp>
+      <p:sp>
+        <p:nvSpPr>
+          <p:cNvPr id="24" name="Rechteck 23"/>
+          <p:cNvSpPr/>
+          <p:nvPr/>
+        </p:nvSpPr>
+        <p:spPr>
+          <a:xfrm>
+            <a:off x="6498780" y="1946577"/>
+            <a:ext cx="1740410" cy="617621"/>
+          </a:xfrm>
+          <a:prstGeom prst="rect">
+            <a:avLst/>
+          </a:prstGeom>
+        </p:spPr>
+        <p:style>
+          <a:lnRef idx="1">
+            <a:schemeClr val="accent6"/>
+          </a:lnRef>
+          <a:fillRef idx="2">
+            <a:schemeClr val="accent6"/>
+          </a:fillRef>
+          <a:effectRef idx="1">
+            <a:schemeClr val="accent6"/>
+          </a:effectRef>
+          <a:fontRef idx="minor">
+            <a:schemeClr val="dk1"/>
+          </a:fontRef>
+        </p:style>
+        <p:txBody>
+          <a:bodyPr rtlCol="0" anchor="ctr"/>
+          <a:lstStyle/>
+          <a:p>
+            <a:pPr algn="ctr"/>
+            <a:r>
+              <a:rPr lang="de-DE" dirty="0" err="1" smtClean="0"/>
+              <a:t>CyclomaticComplexityOfAst</a:t>
+            </a:r>
+            <a:endParaRPr lang="de-DE" dirty="0" smtClean="0"/>
+          </a:p>
+        </p:txBody>
+      </p:sp>
+      <p:sp>
+        <p:nvSpPr>
+          <p:cNvPr id="25" name="Rechteck 24"/>
+          <p:cNvSpPr/>
+          <p:nvPr/>
+        </p:nvSpPr>
+        <p:spPr>
+          <a:xfrm>
+            <a:off x="6839203" y="2719314"/>
+            <a:ext cx="1740410" cy="617621"/>
+          </a:xfrm>
+          <a:prstGeom prst="rect">
+            <a:avLst/>
+          </a:prstGeom>
+        </p:spPr>
+        <p:style>
+          <a:lnRef idx="1">
+            <a:schemeClr val="accent6"/>
+          </a:lnRef>
+          <a:fillRef idx="2">
+            <a:schemeClr val="accent6"/>
+          </a:fillRef>
+          <a:effectRef idx="1">
+            <a:schemeClr val="accent6"/>
+          </a:effectRef>
+          <a:fontRef idx="minor">
+            <a:schemeClr val="dk1"/>
+          </a:fontRef>
+        </p:style>
+        <p:txBody>
+          <a:bodyPr rtlCol="0" anchor="ctr"/>
+          <a:lstStyle/>
+          <a:p>
+            <a:pPr algn="ctr"/>
+            <a:r>
+              <a:rPr lang="de-DE" dirty="0" err="1"/>
+              <a:t>NumberOfStatements</a:t>
+            </a:r>
+            <a:r>
+              <a:rPr lang="de-DE" dirty="0"/>
+              <a:t> </a:t>
+            </a:r>
+            <a:endParaRPr lang="de-DE" dirty="0" smtClean="0"/>
+          </a:p>
+        </p:txBody>
+      </p:sp>
+      <p:sp>
+        <p:nvSpPr>
+          <p:cNvPr id="26" name="Rechteck 25"/>
+          <p:cNvSpPr/>
+          <p:nvPr/>
+        </p:nvSpPr>
+        <p:spPr>
+          <a:xfrm>
+            <a:off x="6985937" y="3508027"/>
+            <a:ext cx="1740410" cy="617621"/>
+          </a:xfrm>
+          <a:prstGeom prst="rect">
+            <a:avLst/>
+          </a:prstGeom>
+        </p:spPr>
+        <p:style>
+          <a:lnRef idx="1">
+            <a:schemeClr val="accent6"/>
+          </a:lnRef>
+          <a:fillRef idx="2">
+            <a:schemeClr val="accent6"/>
+          </a:fillRef>
+          <a:effectRef idx="1">
+            <a:schemeClr val="accent6"/>
+          </a:effectRef>
+          <a:fontRef idx="minor">
+            <a:schemeClr val="dk1"/>
+          </a:fontRef>
+        </p:style>
+        <p:txBody>
+          <a:bodyPr rtlCol="0" anchor="ctr"/>
+          <a:lstStyle/>
+          <a:p>
+            <a:pPr algn="ctr"/>
+            <a:r>
+              <a:rPr lang="de-DE" dirty="0" err="1"/>
+              <a:t>NumberOfRealLines</a:t>
+            </a:r>
+            <a:r>
+              <a:rPr lang="de-DE" dirty="0"/>
+              <a:t> </a:t>
+            </a:r>
+            <a:endParaRPr lang="de-DE" dirty="0" smtClean="0"/>
+          </a:p>
+        </p:txBody>
+      </p:sp>
+      <p:sp>
+        <p:nvSpPr>
+          <p:cNvPr id="27" name="Rechteck 26"/>
+          <p:cNvSpPr/>
+          <p:nvPr/>
+        </p:nvSpPr>
+        <p:spPr>
+          <a:xfrm>
+            <a:off x="6839203" y="4284140"/>
+            <a:ext cx="1740410" cy="617621"/>
+          </a:xfrm>
+          <a:prstGeom prst="rect">
+            <a:avLst/>
+          </a:prstGeom>
+        </p:spPr>
+        <p:style>
+          <a:lnRef idx="1">
+            <a:schemeClr val="accent6"/>
+          </a:lnRef>
+          <a:fillRef idx="2">
+            <a:schemeClr val="accent6"/>
+          </a:fillRef>
+          <a:effectRef idx="1">
+            <a:schemeClr val="accent6"/>
+          </a:effectRef>
+          <a:fontRef idx="minor">
+            <a:schemeClr val="dk1"/>
+          </a:fontRef>
+        </p:style>
+        <p:txBody>
+          <a:bodyPr rtlCol="0" anchor="ctr"/>
+          <a:lstStyle/>
+          <a:p>
+            <a:pPr algn="ctr"/>
+            <a:r>
+              <a:rPr lang="de-DE" dirty="0" err="1"/>
+              <a:t>NumberOfLogicalLines</a:t>
+            </a:r>
+            <a:r>
+              <a:rPr lang="de-DE" dirty="0"/>
+              <a:t> </a:t>
+            </a:r>
+            <a:endParaRPr lang="de-DE" dirty="0" smtClean="0"/>
+          </a:p>
+        </p:txBody>
+      </p:sp>
+      <p:sp>
+        <p:nvSpPr>
+          <p:cNvPr id="30" name="Rechteck 29"/>
+          <p:cNvSpPr/>
+          <p:nvPr/>
+        </p:nvSpPr>
+        <p:spPr>
+          <a:xfrm>
+            <a:off x="6498780" y="5076228"/>
+            <a:ext cx="1740410" cy="617621"/>
+          </a:xfrm>
+          <a:prstGeom prst="rect">
+            <a:avLst/>
+          </a:prstGeom>
+        </p:spPr>
+        <p:style>
+          <a:lnRef idx="1">
+            <a:schemeClr val="accent6"/>
+          </a:lnRef>
+          <a:fillRef idx="2">
+            <a:schemeClr val="accent6"/>
+          </a:fillRef>
+          <a:effectRef idx="1">
+            <a:schemeClr val="accent6"/>
+          </a:effectRef>
+          <a:fontRef idx="minor">
+            <a:schemeClr val="dk1"/>
+          </a:fontRef>
+        </p:style>
+        <p:txBody>
+          <a:bodyPr rtlCol="0" anchor="ctr"/>
+          <a:lstStyle/>
+          <a:p>
+            <a:pPr algn="ctr"/>
+            <a:r>
+              <a:rPr lang="de-DE" dirty="0" err="1"/>
+              <a:t>TypeDependencies</a:t>
+            </a:r>
+            <a:r>
+              <a:rPr lang="de-DE" dirty="0"/>
+              <a:t> </a:t>
+            </a:r>
+            <a:endParaRPr lang="de-DE" dirty="0" smtClean="0"/>
+          </a:p>
+        </p:txBody>
+      </p:sp>
+      <p:cxnSp>
+        <p:nvCxnSpPr>
+          <p:cNvPr id="7" name="Gerade Verbindung mit Pfeil 6"/>
+          <p:cNvCxnSpPr>
+            <a:stCxn id="23" idx="2"/>
+            <a:endCxn id="62" idx="0"/>
+          </p:cNvCxnSpPr>
+          <p:nvPr/>
+        </p:nvCxnSpPr>
+        <p:spPr>
+          <a:xfrm>
+            <a:off x="4039718" y="4109673"/>
+            <a:ext cx="14560" cy="1024258"/>
+          </a:xfrm>
+          <a:prstGeom prst="straightConnector1">
+            <a:avLst/>
+          </a:prstGeom>
+          <a:ln w="50800">
+            <a:tailEnd type="triangle" w="lg" len="med"/>
+          </a:ln>
+        </p:spPr>
+        <p:style>
+          <a:lnRef idx="1">
+            <a:schemeClr val="accent1"/>
+          </a:lnRef>
+          <a:fillRef idx="0">
+            <a:schemeClr val="accent1"/>
+          </a:fillRef>
+          <a:effectRef idx="0">
+            <a:schemeClr val="accent1"/>
+          </a:effectRef>
+          <a:fontRef idx="minor">
+            <a:schemeClr val="tx1"/>
+          </a:fontRef>
+        </p:style>
+      </p:cxnSp>
+      <p:cxnSp>
+        <p:nvCxnSpPr>
+          <p:cNvPr id="33" name="Gerade Verbindung mit Pfeil 32"/>
+          <p:cNvCxnSpPr>
+            <a:stCxn id="23" idx="3"/>
+            <a:endCxn id="24" idx="1"/>
+          </p:cNvCxnSpPr>
+          <p:nvPr/>
+        </p:nvCxnSpPr>
+        <p:spPr>
+          <a:xfrm flipV="1">
+            <a:off x="4909923" y="2255388"/>
+            <a:ext cx="1588857" cy="1545475"/>
+          </a:xfrm>
+          <a:prstGeom prst="straightConnector1">
+            <a:avLst/>
+          </a:prstGeom>
+          <a:ln w="50800">
+            <a:prstDash val="sysDash"/>
+            <a:tailEnd type="arrow" w="lg" len="med"/>
+          </a:ln>
+        </p:spPr>
+        <p:style>
+          <a:lnRef idx="1">
+            <a:schemeClr val="accent1"/>
+          </a:lnRef>
+          <a:fillRef idx="0">
+            <a:schemeClr val="accent1"/>
+          </a:fillRef>
+          <a:effectRef idx="0">
+            <a:schemeClr val="accent1"/>
+          </a:effectRef>
+          <a:fontRef idx="minor">
+            <a:schemeClr val="tx1"/>
+          </a:fontRef>
+        </p:style>
+      </p:cxnSp>
+      <p:cxnSp>
+        <p:nvCxnSpPr>
+          <p:cNvPr id="36" name="Gerade Verbindung mit Pfeil 35"/>
+          <p:cNvCxnSpPr>
+            <a:stCxn id="23" idx="3"/>
+            <a:endCxn id="25" idx="1"/>
+          </p:cNvCxnSpPr>
+          <p:nvPr/>
+        </p:nvCxnSpPr>
+        <p:spPr>
+          <a:xfrm flipV="1">
+            <a:off x="4909923" y="3028125"/>
+            <a:ext cx="1929280" cy="772738"/>
+          </a:xfrm>
+          <a:prstGeom prst="straightConnector1">
+            <a:avLst/>
+          </a:prstGeom>
+          <a:ln w="50800">
+            <a:prstDash val="sysDash"/>
+            <a:tailEnd type="arrow" w="lg" len="med"/>
+          </a:ln>
+        </p:spPr>
+        <p:style>
+          <a:lnRef idx="1">
+            <a:schemeClr val="accent1"/>
+          </a:lnRef>
+          <a:fillRef idx="0">
+            <a:schemeClr val="accent1"/>
+          </a:fillRef>
+          <a:effectRef idx="0">
+            <a:schemeClr val="accent1"/>
+          </a:effectRef>
+          <a:fontRef idx="minor">
+            <a:schemeClr val="tx1"/>
+          </a:fontRef>
+        </p:style>
+      </p:cxnSp>
+      <p:cxnSp>
+        <p:nvCxnSpPr>
+          <p:cNvPr id="39" name="Gerade Verbindung mit Pfeil 38"/>
+          <p:cNvCxnSpPr>
+            <a:stCxn id="23" idx="3"/>
+            <a:endCxn id="26" idx="1"/>
+          </p:cNvCxnSpPr>
+          <p:nvPr/>
+        </p:nvCxnSpPr>
+        <p:spPr>
+          <a:xfrm>
+            <a:off x="4909923" y="3800863"/>
+            <a:ext cx="2076014" cy="15975"/>
+          </a:xfrm>
+          <a:prstGeom prst="straightConnector1">
+            <a:avLst/>
+          </a:prstGeom>
+          <a:ln w="50800">
+            <a:prstDash val="sysDash"/>
+            <a:tailEnd type="arrow" w="lg" len="med"/>
+          </a:ln>
+        </p:spPr>
+        <p:style>
+          <a:lnRef idx="1">
+            <a:schemeClr val="accent1"/>
+          </a:lnRef>
+          <a:fillRef idx="0">
+            <a:schemeClr val="accent1"/>
+          </a:fillRef>
+          <a:effectRef idx="0">
+            <a:schemeClr val="accent1"/>
+          </a:effectRef>
+          <a:fontRef idx="minor">
+            <a:schemeClr val="tx1"/>
+          </a:fontRef>
+        </p:style>
+      </p:cxnSp>
+      <p:cxnSp>
+        <p:nvCxnSpPr>
+          <p:cNvPr id="42" name="Gerade Verbindung mit Pfeil 41"/>
+          <p:cNvCxnSpPr>
+            <a:stCxn id="23" idx="3"/>
+            <a:endCxn id="27" idx="1"/>
+          </p:cNvCxnSpPr>
+          <p:nvPr/>
+        </p:nvCxnSpPr>
+        <p:spPr>
+          <a:xfrm>
+            <a:off x="4909923" y="3800863"/>
+            <a:ext cx="1929280" cy="792088"/>
+          </a:xfrm>
+          <a:prstGeom prst="straightConnector1">
+            <a:avLst/>
+          </a:prstGeom>
+          <a:ln w="50800">
+            <a:prstDash val="sysDash"/>
+            <a:tailEnd type="arrow" w="lg" len="med"/>
+          </a:ln>
+        </p:spPr>
+        <p:style>
+          <a:lnRef idx="1">
+            <a:schemeClr val="accent1"/>
+          </a:lnRef>
+          <a:fillRef idx="0">
+            <a:schemeClr val="accent1"/>
+          </a:fillRef>
+          <a:effectRef idx="0">
+            <a:schemeClr val="accent1"/>
+          </a:effectRef>
+          <a:fontRef idx="minor">
+            <a:schemeClr val="tx1"/>
+          </a:fontRef>
+        </p:style>
+      </p:cxnSp>
+      <p:cxnSp>
+        <p:nvCxnSpPr>
+          <p:cNvPr id="46" name="Gerade Verbindung mit Pfeil 45"/>
+          <p:cNvCxnSpPr>
+            <a:stCxn id="23" idx="3"/>
+            <a:endCxn id="30" idx="1"/>
+          </p:cNvCxnSpPr>
+          <p:nvPr/>
+        </p:nvCxnSpPr>
+        <p:spPr>
+          <a:xfrm>
+            <a:off x="4909923" y="3800863"/>
+            <a:ext cx="1588857" cy="1584176"/>
+          </a:xfrm>
+          <a:prstGeom prst="straightConnector1">
+            <a:avLst/>
+          </a:prstGeom>
+          <a:ln w="50800">
+            <a:prstDash val="sysDash"/>
+            <a:tailEnd type="arrow" w="lg" len="med"/>
+          </a:ln>
+        </p:spPr>
+        <p:style>
+          <a:lnRef idx="1">
+            <a:schemeClr val="accent1"/>
+          </a:lnRef>
+          <a:fillRef idx="0">
+            <a:schemeClr val="accent1"/>
+          </a:fillRef>
+          <a:effectRef idx="0">
+            <a:schemeClr val="accent1"/>
+          </a:effectRef>
+          <a:fontRef idx="minor">
+            <a:schemeClr val="tx1"/>
+          </a:fontRef>
+        </p:style>
+      </p:cxnSp>
+      <p:sp>
+        <p:nvSpPr>
+          <p:cNvPr id="53" name="Rechteck 52"/>
+          <p:cNvSpPr/>
+          <p:nvPr/>
+        </p:nvSpPr>
+        <p:spPr>
+          <a:xfrm>
+            <a:off x="553680" y="3508027"/>
+            <a:ext cx="1740410" cy="617621"/>
+          </a:xfrm>
+          <a:prstGeom prst="rect">
+            <a:avLst/>
+          </a:prstGeom>
+        </p:spPr>
+        <p:style>
+          <a:lnRef idx="1">
+            <a:schemeClr val="accent4"/>
+          </a:lnRef>
+          <a:fillRef idx="2">
+            <a:schemeClr val="accent4"/>
+          </a:fillRef>
+          <a:effectRef idx="1">
+            <a:schemeClr val="accent4"/>
+          </a:effectRef>
+          <a:fontRef idx="minor">
+            <a:schemeClr val="dk1"/>
+          </a:fontRef>
+        </p:style>
+        <p:txBody>
+          <a:bodyPr rtlCol="0" anchor="ctr"/>
+          <a:lstStyle/>
+          <a:p>
+            <a:pPr algn="ctr"/>
+            <a:r>
+              <a:rPr lang="de-DE" dirty="0" err="1" smtClean="0"/>
+              <a:t>Analyze</a:t>
+            </a:r>
+            <a:endParaRPr lang="de-DE" dirty="0" smtClean="0"/>
+          </a:p>
+        </p:txBody>
+      </p:sp>
+      <p:cxnSp>
+        <p:nvCxnSpPr>
+          <p:cNvPr id="54" name="Gerade Verbindung mit Pfeil 53"/>
+          <p:cNvCxnSpPr>
+            <a:stCxn id="53" idx="3"/>
+            <a:endCxn id="23" idx="1"/>
+          </p:cNvCxnSpPr>
+          <p:nvPr/>
+        </p:nvCxnSpPr>
+        <p:spPr>
+          <a:xfrm flipV="1">
+            <a:off x="2294090" y="3800863"/>
+            <a:ext cx="875423" cy="15975"/>
+          </a:xfrm>
+          <a:prstGeom prst="straightConnector1">
+            <a:avLst/>
+          </a:prstGeom>
+          <a:ln w="50800">
+            <a:prstDash val="sysDash"/>
+            <a:tailEnd type="arrow" w="lg" len="med"/>
+          </a:ln>
+        </p:spPr>
+        <p:style>
+          <a:lnRef idx="1">
+            <a:schemeClr val="accent1"/>
+          </a:lnRef>
+          <a:fillRef idx="0">
+            <a:schemeClr val="accent1"/>
+          </a:fillRef>
+          <a:effectRef idx="0">
+            <a:schemeClr val="accent1"/>
+          </a:effectRef>
+          <a:fontRef idx="minor">
+            <a:schemeClr val="tx1"/>
+          </a:fontRef>
+        </p:style>
+      </p:cxnSp>
+      <p:sp>
+        <p:nvSpPr>
+          <p:cNvPr id="66" name="Rechteck 65"/>
+          <p:cNvSpPr/>
+          <p:nvPr/>
+        </p:nvSpPr>
+        <p:spPr>
+          <a:xfrm>
+            <a:off x="3169513" y="1946129"/>
+            <a:ext cx="1740410" cy="617621"/>
+          </a:xfrm>
+          <a:prstGeom prst="rect">
+            <a:avLst/>
+          </a:prstGeom>
+        </p:spPr>
+        <p:style>
+          <a:lnRef idx="1">
+            <a:schemeClr val="accent3"/>
+          </a:lnRef>
+          <a:fillRef idx="2">
+            <a:schemeClr val="accent3"/>
+          </a:fillRef>
+          <a:effectRef idx="1">
+            <a:schemeClr val="accent3"/>
+          </a:effectRef>
+          <a:fontRef idx="minor">
+            <a:schemeClr val="dk1"/>
+          </a:fontRef>
+        </p:style>
+        <p:txBody>
+          <a:bodyPr rtlCol="0" anchor="ctr"/>
+          <a:lstStyle/>
+          <a:p>
+            <a:pPr algn="ctr"/>
+            <a:r>
+              <a:rPr lang="de-DE" dirty="0" err="1"/>
+              <a:t>MetricsReport</a:t>
+            </a:r>
+            <a:r>
+              <a:rPr lang="de-DE" dirty="0"/>
+              <a:t> </a:t>
+            </a:r>
+            <a:endParaRPr lang="de-DE" dirty="0" smtClean="0"/>
+          </a:p>
+        </p:txBody>
+      </p:sp>
+      <p:cxnSp>
+        <p:nvCxnSpPr>
+          <p:cNvPr id="69" name="Gerade Verbindung mit Pfeil 68"/>
+          <p:cNvCxnSpPr>
+            <a:stCxn id="23" idx="0"/>
+            <a:endCxn id="66" idx="2"/>
+          </p:cNvCxnSpPr>
+          <p:nvPr/>
+        </p:nvCxnSpPr>
+        <p:spPr>
+          <a:xfrm flipV="1">
+            <a:off x="4039718" y="2563750"/>
+            <a:ext cx="0" cy="928302"/>
+          </a:xfrm>
+          <a:prstGeom prst="straightConnector1">
+            <a:avLst/>
+          </a:prstGeom>
+          <a:ln w="50800">
+            <a:prstDash val="sysDash"/>
+            <a:tailEnd type="arrow" w="lg" len="med"/>
+          </a:ln>
+        </p:spPr>
+        <p:style>
+          <a:lnRef idx="1">
+            <a:schemeClr val="accent1"/>
+          </a:lnRef>
+          <a:fillRef idx="0">
+            <a:schemeClr val="accent1"/>
+          </a:fillRef>
+          <a:effectRef idx="0">
+            <a:schemeClr val="accent1"/>
+          </a:effectRef>
+          <a:fontRef idx="minor">
+            <a:schemeClr val="tx1"/>
+          </a:fontRef>
+        </p:style>
+      </p:cxnSp>
+    </p:spTree>
+    <p:extLst>
+      <p:ext uri="{BB962C8B-B14F-4D97-AF65-F5344CB8AC3E}">
+        <p14:creationId xmlns:p14="http://schemas.microsoft.com/office/powerpoint/2010/main" val="1392992849"/>
       </p:ext>
     </p:extLst>
   </p:cSld>

</xml_diff>

<commit_message>
more text on type metrics
</commit_message>
<xml_diff>
--- a/text/images/illustrations.pptx
+++ b/text/images/illustrations.pptx
@@ -5,16 +5,18 @@
     <p:sldMasterId id="2147483648" r:id="rId1"/>
   </p:sldMasterIdLst>
   <p:notesMasterIdLst>
-    <p:notesMasterId r:id="rId9"/>
+    <p:notesMasterId r:id="rId11"/>
   </p:notesMasterIdLst>
   <p:sldIdLst>
     <p:sldId id="256" r:id="rId2"/>
     <p:sldId id="257" r:id="rId3"/>
     <p:sldId id="259" r:id="rId4"/>
     <p:sldId id="258" r:id="rId5"/>
-    <p:sldId id="260" r:id="rId6"/>
-    <p:sldId id="261" r:id="rId7"/>
-    <p:sldId id="262" r:id="rId8"/>
+    <p:sldId id="263" r:id="rId6"/>
+    <p:sldId id="260" r:id="rId7"/>
+    <p:sldId id="261" r:id="rId8"/>
+    <p:sldId id="262" r:id="rId9"/>
+    <p:sldId id="264" r:id="rId10"/>
   </p:sldIdLst>
   <p:sldSz cx="9144000" cy="6858000" type="screen4x3"/>
   <p:notesSz cx="6797675" cy="9856788"/>
@@ -198,7 +200,7 @@
           <a:p>
             <a:fld id="{7C9ABC5C-FC58-4AE2-89F8-727F30362B08}" type="datetimeFigureOut">
               <a:rPr lang="de-DE" smtClean="0"/>
-              <a:t>15.06.2012</a:t>
+              <a:t>18.06.2012</a:t>
             </a:fld>
             <a:endParaRPr lang="de-DE"/>
           </a:p>
@@ -615,7 +617,7 @@
           <a:p>
             <a:fld id="{AAC1FA76-46A6-49F4-8E84-FEF8584513B4}" type="slidenum">
               <a:rPr lang="de-DE" smtClean="0"/>
-              <a:t>6</a:t>
+              <a:t>7</a:t>
             </a:fld>
             <a:endParaRPr lang="de-DE"/>
           </a:p>
@@ -699,7 +701,91 @@
           <a:p>
             <a:fld id="{AAC1FA76-46A6-49F4-8E84-FEF8584513B4}" type="slidenum">
               <a:rPr lang="de-DE" smtClean="0"/>
-              <a:t>7</a:t>
+              <a:t>8</a:t>
+            </a:fld>
+            <a:endParaRPr lang="de-DE"/>
+          </a:p>
+        </p:txBody>
+      </p:sp>
+    </p:spTree>
+    <p:extLst>
+      <p:ext uri="{BB962C8B-B14F-4D97-AF65-F5344CB8AC3E}">
+        <p14:creationId xmlns:p14="http://schemas.microsoft.com/office/powerpoint/2010/main" val="2493930981"/>
+      </p:ext>
+    </p:extLst>
+  </p:cSld>
+  <p:clrMapOvr>
+    <a:masterClrMapping/>
+  </p:clrMapOvr>
+</p:notes>
+</file>
+
+<file path=ppt/notesSlides/notesSlide4.xml><?xml version="1.0" encoding="utf-8"?>
+<p:notes xmlns:a="http://schemas.openxmlformats.org/drawingml/2006/main" xmlns:r="http://schemas.openxmlformats.org/officeDocument/2006/relationships" xmlns:p="http://schemas.openxmlformats.org/presentationml/2006/main">
+  <p:cSld>
+    <p:spTree>
+      <p:nvGrpSpPr>
+        <p:cNvPr id="1" name=""/>
+        <p:cNvGrpSpPr/>
+        <p:nvPr/>
+      </p:nvGrpSpPr>
+      <p:grpSpPr>
+        <a:xfrm>
+          <a:off x="0" y="0"/>
+          <a:ext cx="0" cy="0"/>
+          <a:chOff x="0" y="0"/>
+          <a:chExt cx="0" cy="0"/>
+        </a:xfrm>
+      </p:grpSpPr>
+      <p:sp>
+        <p:nvSpPr>
+          <p:cNvPr id="2" name="Folienbildplatzhalter 1"/>
+          <p:cNvSpPr>
+            <a:spLocks noGrp="1" noRot="1" noChangeAspect="1"/>
+          </p:cNvSpPr>
+          <p:nvPr>
+            <p:ph type="sldImg"/>
+          </p:nvPr>
+        </p:nvSpPr>
+        <p:spPr/>
+      </p:sp>
+      <p:sp>
+        <p:nvSpPr>
+          <p:cNvPr id="3" name="Notizenplatzhalter 2"/>
+          <p:cNvSpPr>
+            <a:spLocks noGrp="1"/>
+          </p:cNvSpPr>
+          <p:nvPr>
+            <p:ph type="body" idx="1"/>
+          </p:nvPr>
+        </p:nvSpPr>
+        <p:spPr/>
+        <p:txBody>
+          <a:bodyPr/>
+          <a:lstStyle/>
+          <a:p>
+            <a:endParaRPr lang="de-DE" dirty="0"/>
+          </a:p>
+        </p:txBody>
+      </p:sp>
+      <p:sp>
+        <p:nvSpPr>
+          <p:cNvPr id="4" name="Foliennummernplatzhalter 3"/>
+          <p:cNvSpPr>
+            <a:spLocks noGrp="1"/>
+          </p:cNvSpPr>
+          <p:nvPr>
+            <p:ph type="sldNum" sz="quarter" idx="10"/>
+          </p:nvPr>
+        </p:nvSpPr>
+        <p:spPr/>
+        <p:txBody>
+          <a:bodyPr/>
+          <a:lstStyle/>
+          <a:p>
+            <a:fld id="{AAC1FA76-46A6-49F4-8E84-FEF8584513B4}" type="slidenum">
+              <a:rPr lang="de-DE" smtClean="0"/>
+              <a:t>9</a:t>
             </a:fld>
             <a:endParaRPr lang="de-DE"/>
           </a:p>
@@ -899,7 +985,7 @@
           <a:p>
             <a:fld id="{5430F42D-6984-4A4E-9090-AA314D14663F}" type="datetimeFigureOut">
               <a:rPr lang="de-DE" smtClean="0"/>
-              <a:t>15.06.2012</a:t>
+              <a:t>18.06.2012</a:t>
             </a:fld>
             <a:endParaRPr lang="de-DE"/>
           </a:p>
@@ -1069,7 +1155,7 @@
           <a:p>
             <a:fld id="{5430F42D-6984-4A4E-9090-AA314D14663F}" type="datetimeFigureOut">
               <a:rPr lang="de-DE" smtClean="0"/>
-              <a:t>15.06.2012</a:t>
+              <a:t>18.06.2012</a:t>
             </a:fld>
             <a:endParaRPr lang="de-DE"/>
           </a:p>
@@ -1249,7 +1335,7 @@
           <a:p>
             <a:fld id="{5430F42D-6984-4A4E-9090-AA314D14663F}" type="datetimeFigureOut">
               <a:rPr lang="de-DE" smtClean="0"/>
-              <a:t>15.06.2012</a:t>
+              <a:t>18.06.2012</a:t>
             </a:fld>
             <a:endParaRPr lang="de-DE"/>
           </a:p>
@@ -1419,7 +1505,7 @@
           <a:p>
             <a:fld id="{5430F42D-6984-4A4E-9090-AA314D14663F}" type="datetimeFigureOut">
               <a:rPr lang="de-DE" smtClean="0"/>
-              <a:t>15.06.2012</a:t>
+              <a:t>18.06.2012</a:t>
             </a:fld>
             <a:endParaRPr lang="de-DE"/>
           </a:p>
@@ -1665,7 +1751,7 @@
           <a:p>
             <a:fld id="{5430F42D-6984-4A4E-9090-AA314D14663F}" type="datetimeFigureOut">
               <a:rPr lang="de-DE" smtClean="0"/>
-              <a:t>15.06.2012</a:t>
+              <a:t>18.06.2012</a:t>
             </a:fld>
             <a:endParaRPr lang="de-DE"/>
           </a:p>
@@ -1953,7 +2039,7 @@
           <a:p>
             <a:fld id="{5430F42D-6984-4A4E-9090-AA314D14663F}" type="datetimeFigureOut">
               <a:rPr lang="de-DE" smtClean="0"/>
-              <a:t>15.06.2012</a:t>
+              <a:t>18.06.2012</a:t>
             </a:fld>
             <a:endParaRPr lang="de-DE"/>
           </a:p>
@@ -2375,7 +2461,7 @@
           <a:p>
             <a:fld id="{5430F42D-6984-4A4E-9090-AA314D14663F}" type="datetimeFigureOut">
               <a:rPr lang="de-DE" smtClean="0"/>
-              <a:t>15.06.2012</a:t>
+              <a:t>18.06.2012</a:t>
             </a:fld>
             <a:endParaRPr lang="de-DE"/>
           </a:p>
@@ -2493,7 +2579,7 @@
           <a:p>
             <a:fld id="{5430F42D-6984-4A4E-9090-AA314D14663F}" type="datetimeFigureOut">
               <a:rPr lang="de-DE" smtClean="0"/>
-              <a:t>15.06.2012</a:t>
+              <a:t>18.06.2012</a:t>
             </a:fld>
             <a:endParaRPr lang="de-DE"/>
           </a:p>
@@ -2588,7 +2674,7 @@
           <a:p>
             <a:fld id="{5430F42D-6984-4A4E-9090-AA314D14663F}" type="datetimeFigureOut">
               <a:rPr lang="de-DE" smtClean="0"/>
-              <a:t>15.06.2012</a:t>
+              <a:t>18.06.2012</a:t>
             </a:fld>
             <a:endParaRPr lang="de-DE"/>
           </a:p>
@@ -2865,7 +2951,7 @@
           <a:p>
             <a:fld id="{5430F42D-6984-4A4E-9090-AA314D14663F}" type="datetimeFigureOut">
               <a:rPr lang="de-DE" smtClean="0"/>
-              <a:t>15.06.2012</a:t>
+              <a:t>18.06.2012</a:t>
             </a:fld>
             <a:endParaRPr lang="de-DE"/>
           </a:p>
@@ -3118,7 +3204,7 @@
           <a:p>
             <a:fld id="{5430F42D-6984-4A4E-9090-AA314D14663F}" type="datetimeFigureOut">
               <a:rPr lang="de-DE" smtClean="0"/>
-              <a:t>15.06.2012</a:t>
+              <a:t>18.06.2012</a:t>
             </a:fld>
             <a:endParaRPr lang="de-DE"/>
           </a:p>
@@ -3331,7 +3417,7 @@
           <a:p>
             <a:fld id="{5430F42D-6984-4A4E-9090-AA314D14663F}" type="datetimeFigureOut">
               <a:rPr lang="de-DE" smtClean="0"/>
-              <a:t>15.06.2012</a:t>
+              <a:t>18.06.2012</a:t>
             </a:fld>
             <a:endParaRPr lang="de-DE"/>
           </a:p>
@@ -7769,6 +7855,132 @@
         </p:nvSpPr>
         <p:spPr>
           <a:xfrm>
+            <a:off x="457200" y="274638"/>
+            <a:ext cx="8229600" cy="1143000"/>
+          </a:xfrm>
+        </p:spPr>
+        <p:txBody>
+          <a:bodyPr/>
+          <a:lstStyle/>
+          <a:p>
+            <a:r>
+              <a:rPr lang="de-DE" dirty="0" err="1" smtClean="0"/>
+              <a:t>Use</a:t>
+            </a:r>
+            <a:r>
+              <a:rPr lang="de-DE" dirty="0" smtClean="0"/>
+              <a:t> Cases</a:t>
+            </a:r>
+            <a:endParaRPr lang="de-DE" dirty="0"/>
+          </a:p>
+        </p:txBody>
+      </p:sp>
+      <p:pic>
+        <p:nvPicPr>
+          <p:cNvPr id="1026" name="Picture 2"/>
+          <p:cNvPicPr>
+            <a:picLocks noChangeAspect="1" noChangeArrowheads="1"/>
+          </p:cNvPicPr>
+          <p:nvPr/>
+        </p:nvPicPr>
+        <p:blipFill>
+          <a:blip r:embed="rId2">
+            <a:extLst>
+              <a:ext uri="{28A0092B-C50C-407E-A947-70E740481C1C}">
+                <a14:useLocalDpi xmlns:a14="http://schemas.microsoft.com/office/drawing/2010/main" val="0"/>
+              </a:ext>
+            </a:extLst>
+          </a:blip>
+          <a:srcRect/>
+          <a:stretch>
+            <a:fillRect/>
+          </a:stretch>
+        </p:blipFill>
+        <p:spPr bwMode="auto">
+          <a:xfrm>
+            <a:off x="1714500" y="2024063"/>
+            <a:ext cx="5715000" cy="2809875"/>
+          </a:xfrm>
+          <a:prstGeom prst="rect">
+            <a:avLst/>
+          </a:prstGeom>
+          <a:noFill/>
+          <a:ln>
+            <a:noFill/>
+          </a:ln>
+          <a:effectLst/>
+          <a:extLst>
+            <a:ext uri="{909E8E84-426E-40DD-AFC4-6F175D3DCCD1}">
+              <a14:hiddenFill xmlns:a14="http://schemas.microsoft.com/office/drawing/2010/main">
+                <a:solidFill>
+                  <a:schemeClr val="accent1"/>
+                </a:solidFill>
+              </a14:hiddenFill>
+            </a:ext>
+            <a:ext uri="{91240B29-F687-4F45-9708-019B960494DF}">
+              <a14:hiddenLine xmlns:a14="http://schemas.microsoft.com/office/drawing/2010/main" w="9525">
+                <a:solidFill>
+                  <a:schemeClr val="tx1"/>
+                </a:solidFill>
+                <a:miter lim="800000"/>
+                <a:headEnd/>
+                <a:tailEnd/>
+              </a14:hiddenLine>
+            </a:ext>
+            <a:ext uri="{AF507438-7753-43E0-B8FC-AC1667EBCBE1}">
+              <a14:hiddenEffects xmlns:a14="http://schemas.microsoft.com/office/drawing/2010/main">
+                <a:effectLst>
+                  <a:outerShdw dist="35921" dir="2700000" algn="ctr" rotWithShape="0">
+                    <a:schemeClr val="bg2"/>
+                  </a:outerShdw>
+                </a:effectLst>
+              </a14:hiddenEffects>
+            </a:ext>
+          </a:extLst>
+        </p:spPr>
+      </p:pic>
+    </p:spTree>
+    <p:extLst>
+      <p:ext uri="{BB962C8B-B14F-4D97-AF65-F5344CB8AC3E}">
+        <p14:creationId xmlns:p14="http://schemas.microsoft.com/office/powerpoint/2010/main" val="3208043863"/>
+      </p:ext>
+    </p:extLst>
+  </p:cSld>
+  <p:clrMapOvr>
+    <a:masterClrMapping/>
+  </p:clrMapOvr>
+</p:sld>
+</file>
+
+<file path=ppt/slides/slide6.xml><?xml version="1.0" encoding="utf-8"?>
+<p:sld xmlns:a="http://schemas.openxmlformats.org/drawingml/2006/main" xmlns:r="http://schemas.openxmlformats.org/officeDocument/2006/relationships" xmlns:p="http://schemas.openxmlformats.org/presentationml/2006/main">
+  <p:cSld>
+    <p:spTree>
+      <p:nvGrpSpPr>
+        <p:cNvPr id="1" name=""/>
+        <p:cNvGrpSpPr/>
+        <p:nvPr/>
+      </p:nvGrpSpPr>
+      <p:grpSpPr>
+        <a:xfrm>
+          <a:off x="0" y="0"/>
+          <a:ext cx="0" cy="0"/>
+          <a:chOff x="0" y="0"/>
+          <a:chExt cx="0" cy="0"/>
+        </a:xfrm>
+      </p:grpSpPr>
+      <p:sp>
+        <p:nvSpPr>
+          <p:cNvPr id="4" name="Titel 31"/>
+          <p:cNvSpPr>
+            <a:spLocks noGrp="1"/>
+          </p:cNvSpPr>
+          <p:nvPr>
+            <p:ph type="title"/>
+          </p:nvPr>
+        </p:nvSpPr>
+        <p:spPr>
+          <a:xfrm>
             <a:off x="-1" y="0"/>
             <a:ext cx="9144001" cy="188640"/>
           </a:xfrm>
@@ -10084,7 +10296,7 @@
 </p:sld>
 </file>
 
-<file path=ppt/slides/slide6.xml><?xml version="1.0" encoding="utf-8"?>
+<file path=ppt/slides/slide7.xml><?xml version="1.0" encoding="utf-8"?>
 <p:sld xmlns:a="http://schemas.openxmlformats.org/drawingml/2006/main" xmlns:r="http://schemas.openxmlformats.org/officeDocument/2006/relationships" xmlns:p="http://schemas.openxmlformats.org/presentationml/2006/main">
   <p:cSld>
     <p:spTree>
@@ -10754,7 +10966,7 @@
 </p:sld>
 </file>
 
-<file path=ppt/slides/slide7.xml><?xml version="1.0" encoding="utf-8"?>
+<file path=ppt/slides/slide8.xml><?xml version="1.0" encoding="utf-8"?>
 <p:sld xmlns:a="http://schemas.openxmlformats.org/drawingml/2006/main" xmlns:r="http://schemas.openxmlformats.org/officeDocument/2006/relationships" xmlns:p="http://schemas.openxmlformats.org/presentationml/2006/main">
   <p:cSld>
     <p:spTree>
@@ -11496,6 +11708,128 @@
     <p:extLst>
       <p:ext uri="{BB962C8B-B14F-4D97-AF65-F5344CB8AC3E}">
         <p14:creationId xmlns:p14="http://schemas.microsoft.com/office/powerpoint/2010/main" val="1392992849"/>
+      </p:ext>
+    </p:extLst>
+  </p:cSld>
+  <p:clrMapOvr>
+    <a:masterClrMapping/>
+  </p:clrMapOvr>
+</p:sld>
+</file>
+
+<file path=ppt/slides/slide9.xml><?xml version="1.0" encoding="utf-8"?>
+<p:sld xmlns:a="http://schemas.openxmlformats.org/drawingml/2006/main" xmlns:r="http://schemas.openxmlformats.org/officeDocument/2006/relationships" xmlns:p="http://schemas.openxmlformats.org/presentationml/2006/main">
+  <p:cSld>
+    <p:spTree>
+      <p:nvGrpSpPr>
+        <p:cNvPr id="1" name=""/>
+        <p:cNvGrpSpPr/>
+        <p:nvPr/>
+      </p:nvGrpSpPr>
+      <p:grpSpPr>
+        <a:xfrm>
+          <a:off x="0" y="0"/>
+          <a:ext cx="0" cy="0"/>
+          <a:chOff x="0" y="0"/>
+          <a:chExt cx="0" cy="0"/>
+        </a:xfrm>
+      </p:grpSpPr>
+      <p:sp>
+        <p:nvSpPr>
+          <p:cNvPr id="4" name="Titel 31"/>
+          <p:cNvSpPr>
+            <a:spLocks noGrp="1"/>
+          </p:cNvSpPr>
+          <p:nvPr>
+            <p:ph type="title"/>
+          </p:nvPr>
+        </p:nvSpPr>
+        <p:spPr>
+          <a:xfrm>
+            <a:off x="457200" y="274638"/>
+            <a:ext cx="8229600" cy="1143000"/>
+          </a:xfrm>
+        </p:spPr>
+        <p:txBody>
+          <a:bodyPr/>
+          <a:lstStyle/>
+          <a:p>
+            <a:r>
+              <a:rPr lang="de-DE" dirty="0" err="1" smtClean="0"/>
+              <a:t>Metrikberechnung</a:t>
+            </a:r>
+            <a:endParaRPr lang="de-DE" dirty="0"/>
+          </a:p>
+        </p:txBody>
+      </p:sp>
+      <p:pic>
+        <p:nvPicPr>
+          <p:cNvPr id="1026" name="Picture 2"/>
+          <p:cNvPicPr>
+            <a:picLocks noChangeAspect="1" noChangeArrowheads="1"/>
+          </p:cNvPicPr>
+          <p:nvPr/>
+        </p:nvPicPr>
+        <p:blipFill>
+          <a:blip r:embed="rId3">
+            <a:extLst>
+              <a:ext uri="{28A0092B-C50C-407E-A947-70E740481C1C}">
+                <a14:useLocalDpi xmlns:a14="http://schemas.microsoft.com/office/drawing/2010/main" val="0"/>
+              </a:ext>
+            </a:extLst>
+          </a:blip>
+          <a:srcRect/>
+          <a:stretch>
+            <a:fillRect/>
+          </a:stretch>
+        </p:blipFill>
+        <p:spPr bwMode="auto">
+          <a:xfrm>
+            <a:off x="366713" y="1281113"/>
+            <a:ext cx="8410575" cy="4295775"/>
+          </a:xfrm>
+          <a:prstGeom prst="rect">
+            <a:avLst/>
+          </a:prstGeom>
+          <a:noFill/>
+          <a:ln>
+            <a:noFill/>
+          </a:ln>
+          <a:effectLst/>
+          <a:extLst>
+            <a:ext uri="{909E8E84-426E-40DD-AFC4-6F175D3DCCD1}">
+              <a14:hiddenFill xmlns:a14="http://schemas.microsoft.com/office/drawing/2010/main">
+                <a:solidFill>
+                  <a:schemeClr val="accent1"/>
+                </a:solidFill>
+              </a14:hiddenFill>
+            </a:ext>
+            <a:ext uri="{91240B29-F687-4F45-9708-019B960494DF}">
+              <a14:hiddenLine xmlns:a14="http://schemas.microsoft.com/office/drawing/2010/main" w="9525">
+                <a:solidFill>
+                  <a:schemeClr val="tx1"/>
+                </a:solidFill>
+                <a:miter lim="800000"/>
+                <a:headEnd/>
+                <a:tailEnd/>
+              </a14:hiddenLine>
+            </a:ext>
+            <a:ext uri="{AF507438-7753-43E0-B8FC-AC1667EBCBE1}">
+              <a14:hiddenEffects xmlns:a14="http://schemas.microsoft.com/office/drawing/2010/main">
+                <a:effectLst>
+                  <a:outerShdw dist="35921" dir="2700000" algn="ctr" rotWithShape="0">
+                    <a:schemeClr val="bg2"/>
+                  </a:outerShdw>
+                </a:effectLst>
+              </a14:hiddenEffects>
+            </a:ext>
+          </a:extLst>
+        </p:spPr>
+      </p:pic>
+    </p:spTree>
+    <p:extLst>
+      <p:ext uri="{BB962C8B-B14F-4D97-AF65-F5344CB8AC3E}">
+        <p14:creationId xmlns:p14="http://schemas.microsoft.com/office/powerpoint/2010/main" val="2571404412"/>
       </p:ext>
     </p:extLst>
   </p:cSld>

</xml_diff>

<commit_message>
modeling project, namespace cylces text, metric calc text, objectmodel text startet
</commit_message>
<xml_diff>
--- a/text/images/illustrations.pptx
+++ b/text/images/illustrations.pptx
@@ -5,7 +5,7 @@
     <p:sldMasterId id="2147483648" r:id="rId1"/>
   </p:sldMasterIdLst>
   <p:notesMasterIdLst>
-    <p:notesMasterId r:id="rId11"/>
+    <p:notesMasterId r:id="rId12"/>
   </p:notesMasterIdLst>
   <p:sldIdLst>
     <p:sldId id="256" r:id="rId2"/>
@@ -17,6 +17,7 @@
     <p:sldId id="261" r:id="rId8"/>
     <p:sldId id="262" r:id="rId9"/>
     <p:sldId id="264" r:id="rId10"/>
+    <p:sldId id="265" r:id="rId11"/>
   </p:sldIdLst>
   <p:sldSz cx="9144000" cy="6858000" type="screen4x3"/>
   <p:notesSz cx="6797675" cy="9856788"/>
@@ -200,7 +201,7 @@
           <a:p>
             <a:fld id="{7C9ABC5C-FC58-4AE2-89F8-727F30362B08}" type="datetimeFigureOut">
               <a:rPr lang="de-DE" smtClean="0"/>
-              <a:t>18.06.2012</a:t>
+              <a:t>19.06.2012</a:t>
             </a:fld>
             <a:endParaRPr lang="de-DE"/>
           </a:p>
@@ -804,6 +805,90 @@
 </p:notes>
 </file>
 
+<file path=ppt/notesSlides/notesSlide5.xml><?xml version="1.0" encoding="utf-8"?>
+<p:notes xmlns:a="http://schemas.openxmlformats.org/drawingml/2006/main" xmlns:r="http://schemas.openxmlformats.org/officeDocument/2006/relationships" xmlns:p="http://schemas.openxmlformats.org/presentationml/2006/main">
+  <p:cSld>
+    <p:spTree>
+      <p:nvGrpSpPr>
+        <p:cNvPr id="1" name=""/>
+        <p:cNvGrpSpPr/>
+        <p:nvPr/>
+      </p:nvGrpSpPr>
+      <p:grpSpPr>
+        <a:xfrm>
+          <a:off x="0" y="0"/>
+          <a:ext cx="0" cy="0"/>
+          <a:chOff x="0" y="0"/>
+          <a:chExt cx="0" cy="0"/>
+        </a:xfrm>
+      </p:grpSpPr>
+      <p:sp>
+        <p:nvSpPr>
+          <p:cNvPr id="2" name="Folienbildplatzhalter 1"/>
+          <p:cNvSpPr>
+            <a:spLocks noGrp="1" noRot="1" noChangeAspect="1"/>
+          </p:cNvSpPr>
+          <p:nvPr>
+            <p:ph type="sldImg"/>
+          </p:nvPr>
+        </p:nvSpPr>
+        <p:spPr/>
+      </p:sp>
+      <p:sp>
+        <p:nvSpPr>
+          <p:cNvPr id="3" name="Notizenplatzhalter 2"/>
+          <p:cNvSpPr>
+            <a:spLocks noGrp="1"/>
+          </p:cNvSpPr>
+          <p:nvPr>
+            <p:ph type="body" idx="1"/>
+          </p:nvPr>
+        </p:nvSpPr>
+        <p:spPr/>
+        <p:txBody>
+          <a:bodyPr/>
+          <a:lstStyle/>
+          <a:p>
+            <a:endParaRPr lang="de-DE" dirty="0"/>
+          </a:p>
+        </p:txBody>
+      </p:sp>
+      <p:sp>
+        <p:nvSpPr>
+          <p:cNvPr id="4" name="Foliennummernplatzhalter 3"/>
+          <p:cNvSpPr>
+            <a:spLocks noGrp="1"/>
+          </p:cNvSpPr>
+          <p:nvPr>
+            <p:ph type="sldNum" sz="quarter" idx="10"/>
+          </p:nvPr>
+        </p:nvSpPr>
+        <p:spPr/>
+        <p:txBody>
+          <a:bodyPr/>
+          <a:lstStyle/>
+          <a:p>
+            <a:fld id="{AAC1FA76-46A6-49F4-8E84-FEF8584513B4}" type="slidenum">
+              <a:rPr lang="de-DE" smtClean="0"/>
+              <a:t>10</a:t>
+            </a:fld>
+            <a:endParaRPr lang="de-DE"/>
+          </a:p>
+        </p:txBody>
+      </p:sp>
+    </p:spTree>
+    <p:extLst>
+      <p:ext uri="{BB962C8B-B14F-4D97-AF65-F5344CB8AC3E}">
+        <p14:creationId xmlns:p14="http://schemas.microsoft.com/office/powerpoint/2010/main" val="2493930981"/>
+      </p:ext>
+    </p:extLst>
+  </p:cSld>
+  <p:clrMapOvr>
+    <a:masterClrMapping/>
+  </p:clrMapOvr>
+</p:notes>
+</file>
+
 <file path=ppt/slideLayouts/slideLayout1.xml><?xml version="1.0" encoding="utf-8"?>
 <p:sldLayout xmlns:a="http://schemas.openxmlformats.org/drawingml/2006/main" xmlns:r="http://schemas.openxmlformats.org/officeDocument/2006/relationships" xmlns:p="http://schemas.openxmlformats.org/presentationml/2006/main" type="title" preserve="1">
   <p:cSld name="Titelfolie">
@@ -985,7 +1070,7 @@
           <a:p>
             <a:fld id="{5430F42D-6984-4A4E-9090-AA314D14663F}" type="datetimeFigureOut">
               <a:rPr lang="de-DE" smtClean="0"/>
-              <a:t>18.06.2012</a:t>
+              <a:t>19.06.2012</a:t>
             </a:fld>
             <a:endParaRPr lang="de-DE"/>
           </a:p>
@@ -1155,7 +1240,7 @@
           <a:p>
             <a:fld id="{5430F42D-6984-4A4E-9090-AA314D14663F}" type="datetimeFigureOut">
               <a:rPr lang="de-DE" smtClean="0"/>
-              <a:t>18.06.2012</a:t>
+              <a:t>19.06.2012</a:t>
             </a:fld>
             <a:endParaRPr lang="de-DE"/>
           </a:p>
@@ -1335,7 +1420,7 @@
           <a:p>
             <a:fld id="{5430F42D-6984-4A4E-9090-AA314D14663F}" type="datetimeFigureOut">
               <a:rPr lang="de-DE" smtClean="0"/>
-              <a:t>18.06.2012</a:t>
+              <a:t>19.06.2012</a:t>
             </a:fld>
             <a:endParaRPr lang="de-DE"/>
           </a:p>
@@ -1505,7 +1590,7 @@
           <a:p>
             <a:fld id="{5430F42D-6984-4A4E-9090-AA314D14663F}" type="datetimeFigureOut">
               <a:rPr lang="de-DE" smtClean="0"/>
-              <a:t>18.06.2012</a:t>
+              <a:t>19.06.2012</a:t>
             </a:fld>
             <a:endParaRPr lang="de-DE"/>
           </a:p>
@@ -1751,7 +1836,7 @@
           <a:p>
             <a:fld id="{5430F42D-6984-4A4E-9090-AA314D14663F}" type="datetimeFigureOut">
               <a:rPr lang="de-DE" smtClean="0"/>
-              <a:t>18.06.2012</a:t>
+              <a:t>19.06.2012</a:t>
             </a:fld>
             <a:endParaRPr lang="de-DE"/>
           </a:p>
@@ -2039,7 +2124,7 @@
           <a:p>
             <a:fld id="{5430F42D-6984-4A4E-9090-AA314D14663F}" type="datetimeFigureOut">
               <a:rPr lang="de-DE" smtClean="0"/>
-              <a:t>18.06.2012</a:t>
+              <a:t>19.06.2012</a:t>
             </a:fld>
             <a:endParaRPr lang="de-DE"/>
           </a:p>
@@ -2461,7 +2546,7 @@
           <a:p>
             <a:fld id="{5430F42D-6984-4A4E-9090-AA314D14663F}" type="datetimeFigureOut">
               <a:rPr lang="de-DE" smtClean="0"/>
-              <a:t>18.06.2012</a:t>
+              <a:t>19.06.2012</a:t>
             </a:fld>
             <a:endParaRPr lang="de-DE"/>
           </a:p>
@@ -2579,7 +2664,7 @@
           <a:p>
             <a:fld id="{5430F42D-6984-4A4E-9090-AA314D14663F}" type="datetimeFigureOut">
               <a:rPr lang="de-DE" smtClean="0"/>
-              <a:t>18.06.2012</a:t>
+              <a:t>19.06.2012</a:t>
             </a:fld>
             <a:endParaRPr lang="de-DE"/>
           </a:p>
@@ -2674,7 +2759,7 @@
           <a:p>
             <a:fld id="{5430F42D-6984-4A4E-9090-AA314D14663F}" type="datetimeFigureOut">
               <a:rPr lang="de-DE" smtClean="0"/>
-              <a:t>18.06.2012</a:t>
+              <a:t>19.06.2012</a:t>
             </a:fld>
             <a:endParaRPr lang="de-DE"/>
           </a:p>
@@ -2951,7 +3036,7 @@
           <a:p>
             <a:fld id="{5430F42D-6984-4A4E-9090-AA314D14663F}" type="datetimeFigureOut">
               <a:rPr lang="de-DE" smtClean="0"/>
-              <a:t>18.06.2012</a:t>
+              <a:t>19.06.2012</a:t>
             </a:fld>
             <a:endParaRPr lang="de-DE"/>
           </a:p>
@@ -3204,7 +3289,7 @@
           <a:p>
             <a:fld id="{5430F42D-6984-4A4E-9090-AA314D14663F}" type="datetimeFigureOut">
               <a:rPr lang="de-DE" smtClean="0"/>
-              <a:t>18.06.2012</a:t>
+              <a:t>19.06.2012</a:t>
             </a:fld>
             <a:endParaRPr lang="de-DE"/>
           </a:p>
@@ -3417,7 +3502,7 @@
           <a:p>
             <a:fld id="{5430F42D-6984-4A4E-9090-AA314D14663F}" type="datetimeFigureOut">
               <a:rPr lang="de-DE" smtClean="0"/>
-              <a:t>18.06.2012</a:t>
+              <a:t>19.06.2012</a:t>
             </a:fld>
             <a:endParaRPr lang="de-DE"/>
           </a:p>
@@ -4387,6 +4472,1911 @@
 </p:sld>
 </file>
 
+<file path=ppt/slides/slide10.xml><?xml version="1.0" encoding="utf-8"?>
+<p:sld xmlns:a="http://schemas.openxmlformats.org/drawingml/2006/main" xmlns:r="http://schemas.openxmlformats.org/officeDocument/2006/relationships" xmlns:p="http://schemas.openxmlformats.org/presentationml/2006/main">
+  <p:cSld>
+    <p:spTree>
+      <p:nvGrpSpPr>
+        <p:cNvPr id="1" name=""/>
+        <p:cNvGrpSpPr/>
+        <p:nvPr/>
+      </p:nvGrpSpPr>
+      <p:grpSpPr>
+        <a:xfrm>
+          <a:off x="0" y="0"/>
+          <a:ext cx="0" cy="0"/>
+          <a:chOff x="0" y="0"/>
+          <a:chExt cx="0" cy="0"/>
+        </a:xfrm>
+      </p:grpSpPr>
+      <p:sp>
+        <p:nvSpPr>
+          <p:cNvPr id="24" name="Ellipse 23"/>
+          <p:cNvSpPr/>
+          <p:nvPr/>
+        </p:nvSpPr>
+        <p:spPr>
+          <a:xfrm>
+            <a:off x="4077470" y="1585367"/>
+            <a:ext cx="864095" cy="1368152"/>
+          </a:xfrm>
+          <a:prstGeom prst="ellipse">
+            <a:avLst/>
+          </a:prstGeom>
+        </p:spPr>
+        <p:style>
+          <a:lnRef idx="2">
+            <a:schemeClr val="accent6">
+              <a:shade val="50000"/>
+            </a:schemeClr>
+          </a:lnRef>
+          <a:fillRef idx="1">
+            <a:schemeClr val="accent6"/>
+          </a:fillRef>
+          <a:effectRef idx="0">
+            <a:schemeClr val="accent6"/>
+          </a:effectRef>
+          <a:fontRef idx="minor">
+            <a:schemeClr val="lt1"/>
+          </a:fontRef>
+        </p:style>
+        <p:txBody>
+          <a:bodyPr rtlCol="0" anchor="ctr"/>
+          <a:lstStyle/>
+          <a:p>
+            <a:pPr algn="ctr"/>
+            <a:endParaRPr lang="de-DE"/>
+          </a:p>
+        </p:txBody>
+      </p:sp>
+      <p:sp>
+        <p:nvSpPr>
+          <p:cNvPr id="4" name="Titel 31"/>
+          <p:cNvSpPr>
+            <a:spLocks noGrp="1"/>
+          </p:cNvSpPr>
+          <p:nvPr>
+            <p:ph type="title"/>
+          </p:nvPr>
+        </p:nvSpPr>
+        <p:spPr>
+          <a:xfrm>
+            <a:off x="457200" y="274638"/>
+            <a:ext cx="8229600" cy="1143000"/>
+          </a:xfrm>
+        </p:spPr>
+        <p:txBody>
+          <a:bodyPr/>
+          <a:lstStyle/>
+          <a:p>
+            <a:r>
+              <a:rPr lang="de-DE" dirty="0" smtClean="0"/>
+              <a:t>Vertex </a:t>
+            </a:r>
+            <a:r>
+              <a:rPr lang="de-DE" dirty="0" err="1" smtClean="0"/>
+              <a:t>Reduction</a:t>
+            </a:r>
+            <a:endParaRPr lang="de-DE" dirty="0"/>
+          </a:p>
+        </p:txBody>
+      </p:sp>
+      <p:sp>
+        <p:nvSpPr>
+          <p:cNvPr id="3" name="Ellipse 2"/>
+          <p:cNvSpPr/>
+          <p:nvPr/>
+        </p:nvSpPr>
+        <p:spPr>
+          <a:xfrm>
+            <a:off x="467544" y="2060848"/>
+            <a:ext cx="576064" cy="432048"/>
+          </a:xfrm>
+          <a:prstGeom prst="ellipse">
+            <a:avLst/>
+          </a:prstGeom>
+        </p:spPr>
+        <p:style>
+          <a:lnRef idx="2">
+            <a:schemeClr val="accent2">
+              <a:shade val="50000"/>
+            </a:schemeClr>
+          </a:lnRef>
+          <a:fillRef idx="1">
+            <a:schemeClr val="accent2"/>
+          </a:fillRef>
+          <a:effectRef idx="0">
+            <a:schemeClr val="accent2"/>
+          </a:effectRef>
+          <a:fontRef idx="minor">
+            <a:schemeClr val="lt1"/>
+          </a:fontRef>
+        </p:style>
+        <p:txBody>
+          <a:bodyPr rtlCol="0" anchor="ctr"/>
+          <a:lstStyle/>
+          <a:p>
+            <a:pPr algn="ctr"/>
+            <a:endParaRPr lang="de-DE"/>
+          </a:p>
+        </p:txBody>
+      </p:sp>
+      <p:sp>
+        <p:nvSpPr>
+          <p:cNvPr id="6" name="Ellipse 5"/>
+          <p:cNvSpPr/>
+          <p:nvPr/>
+        </p:nvSpPr>
+        <p:spPr>
+          <a:xfrm>
+            <a:off x="1331640" y="1772816"/>
+            <a:ext cx="576064" cy="432048"/>
+          </a:xfrm>
+          <a:prstGeom prst="ellipse">
+            <a:avLst/>
+          </a:prstGeom>
+        </p:spPr>
+        <p:style>
+          <a:lnRef idx="2">
+            <a:schemeClr val="accent1">
+              <a:shade val="50000"/>
+            </a:schemeClr>
+          </a:lnRef>
+          <a:fillRef idx="1">
+            <a:schemeClr val="accent1"/>
+          </a:fillRef>
+          <a:effectRef idx="0">
+            <a:schemeClr val="accent1"/>
+          </a:effectRef>
+          <a:fontRef idx="minor">
+            <a:schemeClr val="lt1"/>
+          </a:fontRef>
+        </p:style>
+        <p:txBody>
+          <a:bodyPr rtlCol="0" anchor="ctr"/>
+          <a:lstStyle/>
+          <a:p>
+            <a:pPr algn="ctr"/>
+            <a:endParaRPr lang="de-DE"/>
+          </a:p>
+        </p:txBody>
+      </p:sp>
+      <p:sp>
+        <p:nvSpPr>
+          <p:cNvPr id="7" name="Ellipse 6"/>
+          <p:cNvSpPr/>
+          <p:nvPr/>
+        </p:nvSpPr>
+        <p:spPr>
+          <a:xfrm>
+            <a:off x="1331640" y="2336701"/>
+            <a:ext cx="576064" cy="432048"/>
+          </a:xfrm>
+          <a:prstGeom prst="ellipse">
+            <a:avLst/>
+          </a:prstGeom>
+        </p:spPr>
+        <p:style>
+          <a:lnRef idx="2">
+            <a:schemeClr val="accent1">
+              <a:shade val="50000"/>
+            </a:schemeClr>
+          </a:lnRef>
+          <a:fillRef idx="1">
+            <a:schemeClr val="accent1"/>
+          </a:fillRef>
+          <a:effectRef idx="0">
+            <a:schemeClr val="accent1"/>
+          </a:effectRef>
+          <a:fontRef idx="minor">
+            <a:schemeClr val="lt1"/>
+          </a:fontRef>
+        </p:style>
+        <p:txBody>
+          <a:bodyPr rtlCol="0" anchor="ctr"/>
+          <a:lstStyle/>
+          <a:p>
+            <a:pPr algn="ctr"/>
+            <a:endParaRPr lang="de-DE"/>
+          </a:p>
+        </p:txBody>
+      </p:sp>
+      <p:sp>
+        <p:nvSpPr>
+          <p:cNvPr id="8" name="Ellipse 7"/>
+          <p:cNvSpPr/>
+          <p:nvPr/>
+        </p:nvSpPr>
+        <p:spPr>
+          <a:xfrm>
+            <a:off x="2195736" y="2060848"/>
+            <a:ext cx="576064" cy="432048"/>
+          </a:xfrm>
+          <a:prstGeom prst="ellipse">
+            <a:avLst/>
+          </a:prstGeom>
+        </p:spPr>
+        <p:style>
+          <a:lnRef idx="2">
+            <a:schemeClr val="accent3">
+              <a:shade val="50000"/>
+            </a:schemeClr>
+          </a:lnRef>
+          <a:fillRef idx="1">
+            <a:schemeClr val="accent3"/>
+          </a:fillRef>
+          <a:effectRef idx="0">
+            <a:schemeClr val="accent3"/>
+          </a:effectRef>
+          <a:fontRef idx="minor">
+            <a:schemeClr val="lt1"/>
+          </a:fontRef>
+        </p:style>
+        <p:txBody>
+          <a:bodyPr rtlCol="0" anchor="ctr"/>
+          <a:lstStyle/>
+          <a:p>
+            <a:pPr algn="ctr"/>
+            <a:endParaRPr lang="de-DE"/>
+          </a:p>
+        </p:txBody>
+      </p:sp>
+      <p:cxnSp>
+        <p:nvCxnSpPr>
+          <p:cNvPr id="9" name="Gerade Verbindung mit Pfeil 8"/>
+          <p:cNvCxnSpPr>
+            <a:stCxn id="3" idx="7"/>
+            <a:endCxn id="6" idx="2"/>
+          </p:cNvCxnSpPr>
+          <p:nvPr/>
+        </p:nvCxnSpPr>
+        <p:spPr>
+          <a:xfrm flipV="1">
+            <a:off x="959245" y="1988840"/>
+            <a:ext cx="372395" cy="135280"/>
+          </a:xfrm>
+          <a:prstGeom prst="straightConnector1">
+            <a:avLst/>
+          </a:prstGeom>
+          <a:ln w="38100">
+            <a:tailEnd type="arrow"/>
+          </a:ln>
+        </p:spPr>
+        <p:style>
+          <a:lnRef idx="1">
+            <a:schemeClr val="accent1"/>
+          </a:lnRef>
+          <a:fillRef idx="0">
+            <a:schemeClr val="accent1"/>
+          </a:fillRef>
+          <a:effectRef idx="0">
+            <a:schemeClr val="accent1"/>
+          </a:effectRef>
+          <a:fontRef idx="minor">
+            <a:schemeClr val="tx1"/>
+          </a:fontRef>
+        </p:style>
+      </p:cxnSp>
+      <p:cxnSp>
+        <p:nvCxnSpPr>
+          <p:cNvPr id="14" name="Gerade Verbindung mit Pfeil 13"/>
+          <p:cNvCxnSpPr>
+            <a:stCxn id="7" idx="7"/>
+            <a:endCxn id="8" idx="2"/>
+          </p:cNvCxnSpPr>
+          <p:nvPr/>
+        </p:nvCxnSpPr>
+        <p:spPr>
+          <a:xfrm flipV="1">
+            <a:off x="1823341" y="2276872"/>
+            <a:ext cx="372395" cy="123101"/>
+          </a:xfrm>
+          <a:prstGeom prst="straightConnector1">
+            <a:avLst/>
+          </a:prstGeom>
+          <a:ln w="38100">
+            <a:tailEnd type="arrow"/>
+          </a:ln>
+        </p:spPr>
+        <p:style>
+          <a:lnRef idx="1">
+            <a:schemeClr val="accent1"/>
+          </a:lnRef>
+          <a:fillRef idx="0">
+            <a:schemeClr val="accent1"/>
+          </a:fillRef>
+          <a:effectRef idx="0">
+            <a:schemeClr val="accent1"/>
+          </a:effectRef>
+          <a:fontRef idx="minor">
+            <a:schemeClr val="tx1"/>
+          </a:fontRef>
+        </p:style>
+      </p:cxnSp>
+      <p:sp>
+        <p:nvSpPr>
+          <p:cNvPr id="18" name="Ellipse 17"/>
+          <p:cNvSpPr/>
+          <p:nvPr/>
+        </p:nvSpPr>
+        <p:spPr>
+          <a:xfrm>
+            <a:off x="3347864" y="2060848"/>
+            <a:ext cx="576064" cy="432048"/>
+          </a:xfrm>
+          <a:prstGeom prst="ellipse">
+            <a:avLst/>
+          </a:prstGeom>
+        </p:spPr>
+        <p:style>
+          <a:lnRef idx="2">
+            <a:schemeClr val="accent2">
+              <a:shade val="50000"/>
+            </a:schemeClr>
+          </a:lnRef>
+          <a:fillRef idx="1">
+            <a:schemeClr val="accent2"/>
+          </a:fillRef>
+          <a:effectRef idx="0">
+            <a:schemeClr val="accent2"/>
+          </a:effectRef>
+          <a:fontRef idx="minor">
+            <a:schemeClr val="lt1"/>
+          </a:fontRef>
+        </p:style>
+        <p:txBody>
+          <a:bodyPr rtlCol="0" anchor="ctr"/>
+          <a:lstStyle/>
+          <a:p>
+            <a:pPr algn="ctr"/>
+            <a:endParaRPr lang="de-DE"/>
+          </a:p>
+        </p:txBody>
+      </p:sp>
+      <p:sp>
+        <p:nvSpPr>
+          <p:cNvPr id="19" name="Ellipse 18"/>
+          <p:cNvSpPr/>
+          <p:nvPr/>
+        </p:nvSpPr>
+        <p:spPr>
+          <a:xfrm>
+            <a:off x="4211960" y="1772816"/>
+            <a:ext cx="576064" cy="432048"/>
+          </a:xfrm>
+          <a:prstGeom prst="ellipse">
+            <a:avLst/>
+          </a:prstGeom>
+        </p:spPr>
+        <p:style>
+          <a:lnRef idx="2">
+            <a:schemeClr val="accent1">
+              <a:shade val="50000"/>
+            </a:schemeClr>
+          </a:lnRef>
+          <a:fillRef idx="1">
+            <a:schemeClr val="accent1"/>
+          </a:fillRef>
+          <a:effectRef idx="0">
+            <a:schemeClr val="accent1"/>
+          </a:effectRef>
+          <a:fontRef idx="minor">
+            <a:schemeClr val="lt1"/>
+          </a:fontRef>
+        </p:style>
+        <p:txBody>
+          <a:bodyPr rtlCol="0" anchor="ctr"/>
+          <a:lstStyle/>
+          <a:p>
+            <a:pPr algn="ctr"/>
+            <a:endParaRPr lang="de-DE"/>
+          </a:p>
+        </p:txBody>
+      </p:sp>
+      <p:sp>
+        <p:nvSpPr>
+          <p:cNvPr id="20" name="Ellipse 19"/>
+          <p:cNvSpPr/>
+          <p:nvPr/>
+        </p:nvSpPr>
+        <p:spPr>
+          <a:xfrm>
+            <a:off x="4211960" y="2336701"/>
+            <a:ext cx="576064" cy="432048"/>
+          </a:xfrm>
+          <a:prstGeom prst="ellipse">
+            <a:avLst/>
+          </a:prstGeom>
+        </p:spPr>
+        <p:style>
+          <a:lnRef idx="2">
+            <a:schemeClr val="accent1">
+              <a:shade val="50000"/>
+            </a:schemeClr>
+          </a:lnRef>
+          <a:fillRef idx="1">
+            <a:schemeClr val="accent1"/>
+          </a:fillRef>
+          <a:effectRef idx="0">
+            <a:schemeClr val="accent1"/>
+          </a:effectRef>
+          <a:fontRef idx="minor">
+            <a:schemeClr val="lt1"/>
+          </a:fontRef>
+        </p:style>
+        <p:txBody>
+          <a:bodyPr rtlCol="0" anchor="ctr"/>
+          <a:lstStyle/>
+          <a:p>
+            <a:pPr algn="ctr"/>
+            <a:endParaRPr lang="de-DE"/>
+          </a:p>
+        </p:txBody>
+      </p:sp>
+      <p:sp>
+        <p:nvSpPr>
+          <p:cNvPr id="21" name="Ellipse 20"/>
+          <p:cNvSpPr/>
+          <p:nvPr/>
+        </p:nvSpPr>
+        <p:spPr>
+          <a:xfrm>
+            <a:off x="5076056" y="2060848"/>
+            <a:ext cx="576064" cy="432048"/>
+          </a:xfrm>
+          <a:prstGeom prst="ellipse">
+            <a:avLst/>
+          </a:prstGeom>
+        </p:spPr>
+        <p:style>
+          <a:lnRef idx="2">
+            <a:schemeClr val="accent3">
+              <a:shade val="50000"/>
+            </a:schemeClr>
+          </a:lnRef>
+          <a:fillRef idx="1">
+            <a:schemeClr val="accent3"/>
+          </a:fillRef>
+          <a:effectRef idx="0">
+            <a:schemeClr val="accent3"/>
+          </a:effectRef>
+          <a:fontRef idx="minor">
+            <a:schemeClr val="lt1"/>
+          </a:fontRef>
+        </p:style>
+        <p:txBody>
+          <a:bodyPr rtlCol="0" anchor="ctr"/>
+          <a:lstStyle/>
+          <a:p>
+            <a:pPr algn="ctr"/>
+            <a:endParaRPr lang="de-DE"/>
+          </a:p>
+        </p:txBody>
+      </p:sp>
+      <p:cxnSp>
+        <p:nvCxnSpPr>
+          <p:cNvPr id="22" name="Gerade Verbindung mit Pfeil 21"/>
+          <p:cNvCxnSpPr>
+            <a:stCxn id="18" idx="7"/>
+            <a:endCxn id="19" idx="2"/>
+          </p:cNvCxnSpPr>
+          <p:nvPr/>
+        </p:nvCxnSpPr>
+        <p:spPr>
+          <a:xfrm flipV="1">
+            <a:off x="3839565" y="1988840"/>
+            <a:ext cx="372395" cy="135280"/>
+          </a:xfrm>
+          <a:prstGeom prst="straightConnector1">
+            <a:avLst/>
+          </a:prstGeom>
+          <a:ln w="38100">
+            <a:tailEnd type="arrow"/>
+          </a:ln>
+        </p:spPr>
+        <p:style>
+          <a:lnRef idx="1">
+            <a:schemeClr val="accent1"/>
+          </a:lnRef>
+          <a:fillRef idx="0">
+            <a:schemeClr val="accent1"/>
+          </a:fillRef>
+          <a:effectRef idx="0">
+            <a:schemeClr val="accent1"/>
+          </a:effectRef>
+          <a:fontRef idx="minor">
+            <a:schemeClr val="tx1"/>
+          </a:fontRef>
+        </p:style>
+      </p:cxnSp>
+      <p:cxnSp>
+        <p:nvCxnSpPr>
+          <p:cNvPr id="23" name="Gerade Verbindung mit Pfeil 22"/>
+          <p:cNvCxnSpPr>
+            <a:stCxn id="20" idx="7"/>
+            <a:endCxn id="21" idx="2"/>
+          </p:cNvCxnSpPr>
+          <p:nvPr/>
+        </p:nvCxnSpPr>
+        <p:spPr>
+          <a:xfrm flipV="1">
+            <a:off x="4703661" y="2276872"/>
+            <a:ext cx="372395" cy="123101"/>
+          </a:xfrm>
+          <a:prstGeom prst="straightConnector1">
+            <a:avLst/>
+          </a:prstGeom>
+          <a:ln w="38100">
+            <a:tailEnd type="arrow"/>
+          </a:ln>
+        </p:spPr>
+        <p:style>
+          <a:lnRef idx="1">
+            <a:schemeClr val="accent1"/>
+          </a:lnRef>
+          <a:fillRef idx="0">
+            <a:schemeClr val="accent1"/>
+          </a:fillRef>
+          <a:effectRef idx="0">
+            <a:schemeClr val="accent1"/>
+          </a:effectRef>
+          <a:fontRef idx="minor">
+            <a:schemeClr val="tx1"/>
+          </a:fontRef>
+        </p:style>
+      </p:cxnSp>
+      <p:sp>
+        <p:nvSpPr>
+          <p:cNvPr id="26" name="Ellipse 25"/>
+          <p:cNvSpPr/>
+          <p:nvPr/>
+        </p:nvSpPr>
+        <p:spPr>
+          <a:xfrm>
+            <a:off x="6357268" y="1873299"/>
+            <a:ext cx="576064" cy="432048"/>
+          </a:xfrm>
+          <a:prstGeom prst="ellipse">
+            <a:avLst/>
+          </a:prstGeom>
+        </p:spPr>
+        <p:style>
+          <a:lnRef idx="2">
+            <a:schemeClr val="accent2">
+              <a:shade val="50000"/>
+            </a:schemeClr>
+          </a:lnRef>
+          <a:fillRef idx="1">
+            <a:schemeClr val="accent2"/>
+          </a:fillRef>
+          <a:effectRef idx="0">
+            <a:schemeClr val="accent2"/>
+          </a:effectRef>
+          <a:fontRef idx="minor">
+            <a:schemeClr val="lt1"/>
+          </a:fontRef>
+        </p:style>
+        <p:txBody>
+          <a:bodyPr rtlCol="0" anchor="ctr"/>
+          <a:lstStyle/>
+          <a:p>
+            <a:pPr algn="ctr"/>
+            <a:endParaRPr lang="de-DE"/>
+          </a:p>
+        </p:txBody>
+      </p:sp>
+      <p:sp>
+        <p:nvSpPr>
+          <p:cNvPr id="27" name="Ellipse 26"/>
+          <p:cNvSpPr/>
+          <p:nvPr/>
+        </p:nvSpPr>
+        <p:spPr>
+          <a:xfrm>
+            <a:off x="7221364" y="1585267"/>
+            <a:ext cx="576064" cy="432048"/>
+          </a:xfrm>
+          <a:prstGeom prst="ellipse">
+            <a:avLst/>
+          </a:prstGeom>
+        </p:spPr>
+        <p:style>
+          <a:lnRef idx="2">
+            <a:schemeClr val="accent1">
+              <a:shade val="50000"/>
+            </a:schemeClr>
+          </a:lnRef>
+          <a:fillRef idx="1">
+            <a:schemeClr val="accent1"/>
+          </a:fillRef>
+          <a:effectRef idx="0">
+            <a:schemeClr val="accent1"/>
+          </a:effectRef>
+          <a:fontRef idx="minor">
+            <a:schemeClr val="lt1"/>
+          </a:fontRef>
+        </p:style>
+        <p:txBody>
+          <a:bodyPr rtlCol="0" anchor="ctr"/>
+          <a:lstStyle/>
+          <a:p>
+            <a:pPr algn="ctr"/>
+            <a:endParaRPr lang="de-DE"/>
+          </a:p>
+        </p:txBody>
+      </p:sp>
+      <p:sp>
+        <p:nvSpPr>
+          <p:cNvPr id="28" name="Ellipse 27"/>
+          <p:cNvSpPr/>
+          <p:nvPr/>
+        </p:nvSpPr>
+        <p:spPr>
+          <a:xfrm>
+            <a:off x="7221364" y="2149152"/>
+            <a:ext cx="576064" cy="432048"/>
+          </a:xfrm>
+          <a:prstGeom prst="ellipse">
+            <a:avLst/>
+          </a:prstGeom>
+        </p:spPr>
+        <p:style>
+          <a:lnRef idx="2">
+            <a:schemeClr val="accent1">
+              <a:shade val="50000"/>
+            </a:schemeClr>
+          </a:lnRef>
+          <a:fillRef idx="1">
+            <a:schemeClr val="accent1"/>
+          </a:fillRef>
+          <a:effectRef idx="0">
+            <a:schemeClr val="accent1"/>
+          </a:effectRef>
+          <a:fontRef idx="minor">
+            <a:schemeClr val="lt1"/>
+          </a:fontRef>
+        </p:style>
+        <p:txBody>
+          <a:bodyPr rtlCol="0" anchor="ctr"/>
+          <a:lstStyle/>
+          <a:p>
+            <a:pPr algn="ctr"/>
+            <a:endParaRPr lang="de-DE"/>
+          </a:p>
+        </p:txBody>
+      </p:sp>
+      <p:sp>
+        <p:nvSpPr>
+          <p:cNvPr id="29" name="Ellipse 28"/>
+          <p:cNvSpPr/>
+          <p:nvPr/>
+        </p:nvSpPr>
+        <p:spPr>
+          <a:xfrm>
+            <a:off x="8085460" y="1873299"/>
+            <a:ext cx="576064" cy="432048"/>
+          </a:xfrm>
+          <a:prstGeom prst="ellipse">
+            <a:avLst/>
+          </a:prstGeom>
+        </p:spPr>
+        <p:style>
+          <a:lnRef idx="2">
+            <a:schemeClr val="accent3">
+              <a:shade val="50000"/>
+            </a:schemeClr>
+          </a:lnRef>
+          <a:fillRef idx="1">
+            <a:schemeClr val="accent3"/>
+          </a:fillRef>
+          <a:effectRef idx="0">
+            <a:schemeClr val="accent3"/>
+          </a:effectRef>
+          <a:fontRef idx="minor">
+            <a:schemeClr val="lt1"/>
+          </a:fontRef>
+        </p:style>
+        <p:txBody>
+          <a:bodyPr rtlCol="0" anchor="ctr"/>
+          <a:lstStyle/>
+          <a:p>
+            <a:pPr algn="ctr"/>
+            <a:endParaRPr lang="de-DE"/>
+          </a:p>
+        </p:txBody>
+      </p:sp>
+      <p:cxnSp>
+        <p:nvCxnSpPr>
+          <p:cNvPr id="30" name="Gerade Verbindung mit Pfeil 29"/>
+          <p:cNvCxnSpPr>
+            <a:stCxn id="26" idx="7"/>
+            <a:endCxn id="27" idx="2"/>
+          </p:cNvCxnSpPr>
+          <p:nvPr/>
+        </p:nvCxnSpPr>
+        <p:spPr>
+          <a:xfrm flipV="1">
+            <a:off x="6848969" y="1801291"/>
+            <a:ext cx="372395" cy="135280"/>
+          </a:xfrm>
+          <a:prstGeom prst="straightConnector1">
+            <a:avLst/>
+          </a:prstGeom>
+          <a:ln w="38100">
+            <a:tailEnd type="arrow"/>
+          </a:ln>
+        </p:spPr>
+        <p:style>
+          <a:lnRef idx="1">
+            <a:schemeClr val="accent1"/>
+          </a:lnRef>
+          <a:fillRef idx="0">
+            <a:schemeClr val="accent1"/>
+          </a:fillRef>
+          <a:effectRef idx="0">
+            <a:schemeClr val="accent1"/>
+          </a:effectRef>
+          <a:fontRef idx="minor">
+            <a:schemeClr val="tx1"/>
+          </a:fontRef>
+        </p:style>
+      </p:cxnSp>
+      <p:cxnSp>
+        <p:nvCxnSpPr>
+          <p:cNvPr id="31" name="Gerade Verbindung mit Pfeil 30"/>
+          <p:cNvCxnSpPr>
+            <a:stCxn id="28" idx="7"/>
+            <a:endCxn id="29" idx="2"/>
+          </p:cNvCxnSpPr>
+          <p:nvPr/>
+        </p:nvCxnSpPr>
+        <p:spPr>
+          <a:xfrm flipV="1">
+            <a:off x="7713065" y="2089323"/>
+            <a:ext cx="372395" cy="123101"/>
+          </a:xfrm>
+          <a:prstGeom prst="straightConnector1">
+            <a:avLst/>
+          </a:prstGeom>
+          <a:ln w="38100">
+            <a:tailEnd type="arrow"/>
+          </a:ln>
+        </p:spPr>
+        <p:style>
+          <a:lnRef idx="1">
+            <a:schemeClr val="accent1"/>
+          </a:lnRef>
+          <a:fillRef idx="0">
+            <a:schemeClr val="accent1"/>
+          </a:fillRef>
+          <a:effectRef idx="0">
+            <a:schemeClr val="accent1"/>
+          </a:effectRef>
+          <a:fontRef idx="minor">
+            <a:schemeClr val="tx1"/>
+          </a:fontRef>
+        </p:style>
+      </p:cxnSp>
+      <p:sp>
+        <p:nvSpPr>
+          <p:cNvPr id="32" name="Ellipse 31"/>
+          <p:cNvSpPr/>
+          <p:nvPr/>
+        </p:nvSpPr>
+        <p:spPr>
+          <a:xfrm>
+            <a:off x="6424847" y="2806719"/>
+            <a:ext cx="576064" cy="432048"/>
+          </a:xfrm>
+          <a:prstGeom prst="ellipse">
+            <a:avLst/>
+          </a:prstGeom>
+        </p:spPr>
+        <p:style>
+          <a:lnRef idx="2">
+            <a:schemeClr val="accent6">
+              <a:shade val="50000"/>
+            </a:schemeClr>
+          </a:lnRef>
+          <a:fillRef idx="1">
+            <a:schemeClr val="accent6"/>
+          </a:fillRef>
+          <a:effectRef idx="0">
+            <a:schemeClr val="accent6"/>
+          </a:effectRef>
+          <a:fontRef idx="minor">
+            <a:schemeClr val="lt1"/>
+          </a:fontRef>
+        </p:style>
+        <p:txBody>
+          <a:bodyPr rtlCol="0" anchor="ctr"/>
+          <a:lstStyle/>
+          <a:p>
+            <a:pPr algn="ctr"/>
+            <a:endParaRPr lang="de-DE"/>
+          </a:p>
+        </p:txBody>
+      </p:sp>
+      <p:cxnSp>
+        <p:nvCxnSpPr>
+          <p:cNvPr id="33" name="Gerade Verbindung mit Pfeil 32"/>
+          <p:cNvCxnSpPr>
+            <a:stCxn id="32" idx="7"/>
+            <a:endCxn id="28" idx="3"/>
+          </p:cNvCxnSpPr>
+          <p:nvPr/>
+        </p:nvCxnSpPr>
+        <p:spPr>
+          <a:xfrm flipV="1">
+            <a:off x="6916548" y="2517928"/>
+            <a:ext cx="389179" cy="352063"/>
+          </a:xfrm>
+          <a:prstGeom prst="straightConnector1">
+            <a:avLst/>
+          </a:prstGeom>
+          <a:ln w="38100">
+            <a:solidFill>
+              <a:schemeClr val="accent6"/>
+            </a:solidFill>
+            <a:headEnd type="arrow"/>
+            <a:tailEnd type="arrow"/>
+          </a:ln>
+        </p:spPr>
+        <p:style>
+          <a:lnRef idx="1">
+            <a:schemeClr val="accent1"/>
+          </a:lnRef>
+          <a:fillRef idx="0">
+            <a:schemeClr val="accent1"/>
+          </a:fillRef>
+          <a:effectRef idx="0">
+            <a:schemeClr val="accent1"/>
+          </a:effectRef>
+          <a:fontRef idx="minor">
+            <a:schemeClr val="tx1"/>
+          </a:fontRef>
+        </p:style>
+      </p:cxnSp>
+      <p:cxnSp>
+        <p:nvCxnSpPr>
+          <p:cNvPr id="41" name="Gerade Verbindung mit Pfeil 40"/>
+          <p:cNvCxnSpPr>
+            <a:stCxn id="32" idx="0"/>
+            <a:endCxn id="27" idx="3"/>
+          </p:cNvCxnSpPr>
+          <p:nvPr/>
+        </p:nvCxnSpPr>
+        <p:spPr>
+          <a:xfrm flipV="1">
+            <a:off x="6712879" y="1954043"/>
+            <a:ext cx="592848" cy="852676"/>
+          </a:xfrm>
+          <a:prstGeom prst="straightConnector1">
+            <a:avLst/>
+          </a:prstGeom>
+          <a:ln w="38100">
+            <a:solidFill>
+              <a:schemeClr val="accent6"/>
+            </a:solidFill>
+            <a:headEnd type="arrow"/>
+            <a:tailEnd type="arrow"/>
+          </a:ln>
+        </p:spPr>
+        <p:style>
+          <a:lnRef idx="1">
+            <a:schemeClr val="accent1"/>
+          </a:lnRef>
+          <a:fillRef idx="0">
+            <a:schemeClr val="accent1"/>
+          </a:fillRef>
+          <a:effectRef idx="0">
+            <a:schemeClr val="accent1"/>
+          </a:effectRef>
+          <a:fontRef idx="minor">
+            <a:schemeClr val="tx1"/>
+          </a:fontRef>
+        </p:style>
+      </p:cxnSp>
+      <p:sp>
+        <p:nvSpPr>
+          <p:cNvPr id="56" name="Ellipse 55"/>
+          <p:cNvSpPr/>
+          <p:nvPr/>
+        </p:nvSpPr>
+        <p:spPr>
+          <a:xfrm>
+            <a:off x="467544" y="4151764"/>
+            <a:ext cx="576064" cy="432048"/>
+          </a:xfrm>
+          <a:prstGeom prst="ellipse">
+            <a:avLst/>
+          </a:prstGeom>
+        </p:spPr>
+        <p:style>
+          <a:lnRef idx="2">
+            <a:schemeClr val="accent2">
+              <a:shade val="50000"/>
+            </a:schemeClr>
+          </a:lnRef>
+          <a:fillRef idx="1">
+            <a:schemeClr val="accent2"/>
+          </a:fillRef>
+          <a:effectRef idx="0">
+            <a:schemeClr val="accent2"/>
+          </a:effectRef>
+          <a:fontRef idx="minor">
+            <a:schemeClr val="lt1"/>
+          </a:fontRef>
+        </p:style>
+        <p:txBody>
+          <a:bodyPr rtlCol="0" anchor="ctr"/>
+          <a:lstStyle/>
+          <a:p>
+            <a:pPr algn="ctr"/>
+            <a:endParaRPr lang="de-DE"/>
+          </a:p>
+        </p:txBody>
+      </p:sp>
+      <p:sp>
+        <p:nvSpPr>
+          <p:cNvPr id="57" name="Ellipse 56"/>
+          <p:cNvSpPr/>
+          <p:nvPr/>
+        </p:nvSpPr>
+        <p:spPr>
+          <a:xfrm>
+            <a:off x="1331640" y="3863732"/>
+            <a:ext cx="576064" cy="432048"/>
+          </a:xfrm>
+          <a:prstGeom prst="ellipse">
+            <a:avLst/>
+          </a:prstGeom>
+        </p:spPr>
+        <p:style>
+          <a:lnRef idx="2">
+            <a:schemeClr val="accent1"/>
+          </a:lnRef>
+          <a:fillRef idx="1">
+            <a:schemeClr val="lt1"/>
+          </a:fillRef>
+          <a:effectRef idx="0">
+            <a:schemeClr val="accent1"/>
+          </a:effectRef>
+          <a:fontRef idx="minor">
+            <a:schemeClr val="dk1"/>
+          </a:fontRef>
+        </p:style>
+        <p:txBody>
+          <a:bodyPr rtlCol="0" anchor="ctr"/>
+          <a:lstStyle/>
+          <a:p>
+            <a:pPr algn="ctr"/>
+            <a:endParaRPr lang="de-DE"/>
+          </a:p>
+        </p:txBody>
+      </p:sp>
+      <p:sp>
+        <p:nvSpPr>
+          <p:cNvPr id="58" name="Ellipse 57"/>
+          <p:cNvSpPr/>
+          <p:nvPr/>
+        </p:nvSpPr>
+        <p:spPr>
+          <a:xfrm>
+            <a:off x="1331640" y="4427617"/>
+            <a:ext cx="576064" cy="432048"/>
+          </a:xfrm>
+          <a:prstGeom prst="ellipse">
+            <a:avLst/>
+          </a:prstGeom>
+        </p:spPr>
+        <p:style>
+          <a:lnRef idx="2">
+            <a:schemeClr val="accent1">
+              <a:shade val="50000"/>
+            </a:schemeClr>
+          </a:lnRef>
+          <a:fillRef idx="1">
+            <a:schemeClr val="accent1"/>
+          </a:fillRef>
+          <a:effectRef idx="0">
+            <a:schemeClr val="accent1"/>
+          </a:effectRef>
+          <a:fontRef idx="minor">
+            <a:schemeClr val="lt1"/>
+          </a:fontRef>
+        </p:style>
+        <p:txBody>
+          <a:bodyPr rtlCol="0" anchor="ctr"/>
+          <a:lstStyle/>
+          <a:p>
+            <a:pPr algn="ctr"/>
+            <a:endParaRPr lang="de-DE"/>
+          </a:p>
+        </p:txBody>
+      </p:sp>
+      <p:sp>
+        <p:nvSpPr>
+          <p:cNvPr id="59" name="Ellipse 58"/>
+          <p:cNvSpPr/>
+          <p:nvPr/>
+        </p:nvSpPr>
+        <p:spPr>
+          <a:xfrm>
+            <a:off x="2195736" y="4151764"/>
+            <a:ext cx="576064" cy="432048"/>
+          </a:xfrm>
+          <a:prstGeom prst="ellipse">
+            <a:avLst/>
+          </a:prstGeom>
+        </p:spPr>
+        <p:style>
+          <a:lnRef idx="2">
+            <a:schemeClr val="accent3">
+              <a:shade val="50000"/>
+            </a:schemeClr>
+          </a:lnRef>
+          <a:fillRef idx="1">
+            <a:schemeClr val="accent3"/>
+          </a:fillRef>
+          <a:effectRef idx="0">
+            <a:schemeClr val="accent3"/>
+          </a:effectRef>
+          <a:fontRef idx="minor">
+            <a:schemeClr val="lt1"/>
+          </a:fontRef>
+        </p:style>
+        <p:txBody>
+          <a:bodyPr rtlCol="0" anchor="ctr"/>
+          <a:lstStyle/>
+          <a:p>
+            <a:pPr algn="ctr"/>
+            <a:endParaRPr lang="de-DE"/>
+          </a:p>
+        </p:txBody>
+      </p:sp>
+      <p:cxnSp>
+        <p:nvCxnSpPr>
+          <p:cNvPr id="60" name="Gerade Verbindung mit Pfeil 59"/>
+          <p:cNvCxnSpPr>
+            <a:stCxn id="56" idx="4"/>
+            <a:endCxn id="62" idx="0"/>
+          </p:cNvCxnSpPr>
+          <p:nvPr/>
+        </p:nvCxnSpPr>
+        <p:spPr>
+          <a:xfrm>
+            <a:off x="755576" y="4583812"/>
+            <a:ext cx="67579" cy="501372"/>
+          </a:xfrm>
+          <a:prstGeom prst="straightConnector1">
+            <a:avLst/>
+          </a:prstGeom>
+          <a:ln w="38100">
+            <a:tailEnd type="arrow"/>
+          </a:ln>
+        </p:spPr>
+        <p:style>
+          <a:lnRef idx="1">
+            <a:schemeClr val="accent1"/>
+          </a:lnRef>
+          <a:fillRef idx="0">
+            <a:schemeClr val="accent1"/>
+          </a:fillRef>
+          <a:effectRef idx="0">
+            <a:schemeClr val="accent1"/>
+          </a:effectRef>
+          <a:fontRef idx="minor">
+            <a:schemeClr val="tx1"/>
+          </a:fontRef>
+        </p:style>
+      </p:cxnSp>
+      <p:cxnSp>
+        <p:nvCxnSpPr>
+          <p:cNvPr id="61" name="Gerade Verbindung mit Pfeil 60"/>
+          <p:cNvCxnSpPr>
+            <a:stCxn id="58" idx="7"/>
+            <a:endCxn id="59" idx="2"/>
+          </p:cNvCxnSpPr>
+          <p:nvPr/>
+        </p:nvCxnSpPr>
+        <p:spPr>
+          <a:xfrm flipV="1">
+            <a:off x="1823341" y="4367788"/>
+            <a:ext cx="372395" cy="123101"/>
+          </a:xfrm>
+          <a:prstGeom prst="straightConnector1">
+            <a:avLst/>
+          </a:prstGeom>
+          <a:ln w="38100">
+            <a:tailEnd type="arrow"/>
+          </a:ln>
+        </p:spPr>
+        <p:style>
+          <a:lnRef idx="1">
+            <a:schemeClr val="accent1"/>
+          </a:lnRef>
+          <a:fillRef idx="0">
+            <a:schemeClr val="accent1"/>
+          </a:fillRef>
+          <a:effectRef idx="0">
+            <a:schemeClr val="accent1"/>
+          </a:effectRef>
+          <a:fontRef idx="minor">
+            <a:schemeClr val="tx1"/>
+          </a:fontRef>
+        </p:style>
+      </p:cxnSp>
+      <p:sp>
+        <p:nvSpPr>
+          <p:cNvPr id="62" name="Ellipse 61"/>
+          <p:cNvSpPr/>
+          <p:nvPr/>
+        </p:nvSpPr>
+        <p:spPr>
+          <a:xfrm>
+            <a:off x="535123" y="5085184"/>
+            <a:ext cx="576064" cy="432048"/>
+          </a:xfrm>
+          <a:prstGeom prst="ellipse">
+            <a:avLst/>
+          </a:prstGeom>
+        </p:spPr>
+        <p:style>
+          <a:lnRef idx="2">
+            <a:schemeClr val="accent6">
+              <a:shade val="50000"/>
+            </a:schemeClr>
+          </a:lnRef>
+          <a:fillRef idx="1">
+            <a:schemeClr val="accent6"/>
+          </a:fillRef>
+          <a:effectRef idx="0">
+            <a:schemeClr val="accent6"/>
+          </a:effectRef>
+          <a:fontRef idx="minor">
+            <a:schemeClr val="lt1"/>
+          </a:fontRef>
+        </p:style>
+        <p:txBody>
+          <a:bodyPr rtlCol="0" anchor="ctr"/>
+          <a:lstStyle/>
+          <a:p>
+            <a:pPr algn="ctr"/>
+            <a:endParaRPr lang="de-DE"/>
+          </a:p>
+        </p:txBody>
+      </p:sp>
+      <p:cxnSp>
+        <p:nvCxnSpPr>
+          <p:cNvPr id="63" name="Gerade Verbindung mit Pfeil 62"/>
+          <p:cNvCxnSpPr>
+            <a:stCxn id="62" idx="7"/>
+            <a:endCxn id="58" idx="3"/>
+          </p:cNvCxnSpPr>
+          <p:nvPr/>
+        </p:nvCxnSpPr>
+        <p:spPr>
+          <a:xfrm flipV="1">
+            <a:off x="1026824" y="4796393"/>
+            <a:ext cx="389179" cy="352063"/>
+          </a:xfrm>
+          <a:prstGeom prst="straightConnector1">
+            <a:avLst/>
+          </a:prstGeom>
+          <a:ln w="38100">
+            <a:solidFill>
+              <a:schemeClr val="accent6"/>
+            </a:solidFill>
+            <a:headEnd type="arrow"/>
+            <a:tailEnd type="arrow"/>
+          </a:ln>
+        </p:spPr>
+        <p:style>
+          <a:lnRef idx="1">
+            <a:schemeClr val="accent1"/>
+          </a:lnRef>
+          <a:fillRef idx="0">
+            <a:schemeClr val="accent1"/>
+          </a:fillRef>
+          <a:effectRef idx="0">
+            <a:schemeClr val="accent1"/>
+          </a:effectRef>
+          <a:fontRef idx="minor">
+            <a:schemeClr val="tx1"/>
+          </a:fontRef>
+        </p:style>
+      </p:cxnSp>
+      <p:sp>
+        <p:nvSpPr>
+          <p:cNvPr id="67" name="Ellipse 66"/>
+          <p:cNvSpPr/>
+          <p:nvPr/>
+        </p:nvSpPr>
+        <p:spPr>
+          <a:xfrm>
+            <a:off x="3347864" y="4151764"/>
+            <a:ext cx="576064" cy="432048"/>
+          </a:xfrm>
+          <a:prstGeom prst="ellipse">
+            <a:avLst/>
+          </a:prstGeom>
+        </p:spPr>
+        <p:style>
+          <a:lnRef idx="2">
+            <a:schemeClr val="accent2">
+              <a:shade val="50000"/>
+            </a:schemeClr>
+          </a:lnRef>
+          <a:fillRef idx="1">
+            <a:schemeClr val="accent2"/>
+          </a:fillRef>
+          <a:effectRef idx="0">
+            <a:schemeClr val="accent2"/>
+          </a:effectRef>
+          <a:fontRef idx="minor">
+            <a:schemeClr val="lt1"/>
+          </a:fontRef>
+        </p:style>
+        <p:txBody>
+          <a:bodyPr rtlCol="0" anchor="ctr"/>
+          <a:lstStyle/>
+          <a:p>
+            <a:pPr algn="ctr"/>
+            <a:endParaRPr lang="de-DE"/>
+          </a:p>
+        </p:txBody>
+      </p:sp>
+      <p:sp>
+        <p:nvSpPr>
+          <p:cNvPr id="68" name="Ellipse 67"/>
+          <p:cNvSpPr/>
+          <p:nvPr/>
+        </p:nvSpPr>
+        <p:spPr>
+          <a:xfrm>
+            <a:off x="4211960" y="3863732"/>
+            <a:ext cx="576064" cy="432048"/>
+          </a:xfrm>
+          <a:prstGeom prst="ellipse">
+            <a:avLst/>
+          </a:prstGeom>
+        </p:spPr>
+        <p:style>
+          <a:lnRef idx="2">
+            <a:schemeClr val="accent1"/>
+          </a:lnRef>
+          <a:fillRef idx="1">
+            <a:schemeClr val="lt1"/>
+          </a:fillRef>
+          <a:effectRef idx="0">
+            <a:schemeClr val="accent1"/>
+          </a:effectRef>
+          <a:fontRef idx="minor">
+            <a:schemeClr val="dk1"/>
+          </a:fontRef>
+        </p:style>
+        <p:txBody>
+          <a:bodyPr rtlCol="0" anchor="ctr"/>
+          <a:lstStyle/>
+          <a:p>
+            <a:pPr algn="ctr"/>
+            <a:endParaRPr lang="de-DE"/>
+          </a:p>
+        </p:txBody>
+      </p:sp>
+      <p:sp>
+        <p:nvSpPr>
+          <p:cNvPr id="69" name="Ellipse 68"/>
+          <p:cNvSpPr/>
+          <p:nvPr/>
+        </p:nvSpPr>
+        <p:spPr>
+          <a:xfrm>
+            <a:off x="4211960" y="4427617"/>
+            <a:ext cx="576064" cy="432048"/>
+          </a:xfrm>
+          <a:prstGeom prst="ellipse">
+            <a:avLst/>
+          </a:prstGeom>
+        </p:spPr>
+        <p:style>
+          <a:lnRef idx="2">
+            <a:schemeClr val="accent1"/>
+          </a:lnRef>
+          <a:fillRef idx="1">
+            <a:schemeClr val="lt1"/>
+          </a:fillRef>
+          <a:effectRef idx="0">
+            <a:schemeClr val="accent1"/>
+          </a:effectRef>
+          <a:fontRef idx="minor">
+            <a:schemeClr val="dk1"/>
+          </a:fontRef>
+        </p:style>
+        <p:txBody>
+          <a:bodyPr rtlCol="0" anchor="ctr"/>
+          <a:lstStyle/>
+          <a:p>
+            <a:pPr algn="ctr"/>
+            <a:endParaRPr lang="de-DE"/>
+          </a:p>
+        </p:txBody>
+      </p:sp>
+      <p:sp>
+        <p:nvSpPr>
+          <p:cNvPr id="70" name="Ellipse 69"/>
+          <p:cNvSpPr/>
+          <p:nvPr/>
+        </p:nvSpPr>
+        <p:spPr>
+          <a:xfrm>
+            <a:off x="5076056" y="4151764"/>
+            <a:ext cx="576064" cy="432048"/>
+          </a:xfrm>
+          <a:prstGeom prst="ellipse">
+            <a:avLst/>
+          </a:prstGeom>
+        </p:spPr>
+        <p:style>
+          <a:lnRef idx="2">
+            <a:schemeClr val="accent3">
+              <a:shade val="50000"/>
+            </a:schemeClr>
+          </a:lnRef>
+          <a:fillRef idx="1">
+            <a:schemeClr val="accent3"/>
+          </a:fillRef>
+          <a:effectRef idx="0">
+            <a:schemeClr val="accent3"/>
+          </a:effectRef>
+          <a:fontRef idx="minor">
+            <a:schemeClr val="lt1"/>
+          </a:fontRef>
+        </p:style>
+        <p:txBody>
+          <a:bodyPr rtlCol="0" anchor="ctr"/>
+          <a:lstStyle/>
+          <a:p>
+            <a:pPr algn="ctr"/>
+            <a:endParaRPr lang="de-DE"/>
+          </a:p>
+        </p:txBody>
+      </p:sp>
+      <p:cxnSp>
+        <p:nvCxnSpPr>
+          <p:cNvPr id="71" name="Gerade Verbindung mit Pfeil 70"/>
+          <p:cNvCxnSpPr>
+            <a:stCxn id="67" idx="4"/>
+            <a:endCxn id="73" idx="0"/>
+          </p:cNvCxnSpPr>
+          <p:nvPr/>
+        </p:nvCxnSpPr>
+        <p:spPr>
+          <a:xfrm>
+            <a:off x="3635896" y="4583812"/>
+            <a:ext cx="67579" cy="501372"/>
+          </a:xfrm>
+          <a:prstGeom prst="straightConnector1">
+            <a:avLst/>
+          </a:prstGeom>
+          <a:ln w="38100">
+            <a:tailEnd type="arrow"/>
+          </a:ln>
+        </p:spPr>
+        <p:style>
+          <a:lnRef idx="1">
+            <a:schemeClr val="accent1"/>
+          </a:lnRef>
+          <a:fillRef idx="0">
+            <a:schemeClr val="accent1"/>
+          </a:fillRef>
+          <a:effectRef idx="0">
+            <a:schemeClr val="accent1"/>
+          </a:effectRef>
+          <a:fontRef idx="minor">
+            <a:schemeClr val="tx1"/>
+          </a:fontRef>
+        </p:style>
+      </p:cxnSp>
+      <p:cxnSp>
+        <p:nvCxnSpPr>
+          <p:cNvPr id="72" name="Gerade Verbindung mit Pfeil 71"/>
+          <p:cNvCxnSpPr>
+            <a:stCxn id="73" idx="6"/>
+            <a:endCxn id="70" idx="3"/>
+          </p:cNvCxnSpPr>
+          <p:nvPr/>
+        </p:nvCxnSpPr>
+        <p:spPr>
+          <a:xfrm flipV="1">
+            <a:off x="3991507" y="4520540"/>
+            <a:ext cx="1168912" cy="780668"/>
+          </a:xfrm>
+          <a:prstGeom prst="straightConnector1">
+            <a:avLst/>
+          </a:prstGeom>
+          <a:ln w="38100">
+            <a:tailEnd type="arrow"/>
+          </a:ln>
+        </p:spPr>
+        <p:style>
+          <a:lnRef idx="1">
+            <a:schemeClr val="accent1"/>
+          </a:lnRef>
+          <a:fillRef idx="0">
+            <a:schemeClr val="accent1"/>
+          </a:fillRef>
+          <a:effectRef idx="0">
+            <a:schemeClr val="accent1"/>
+          </a:effectRef>
+          <a:fontRef idx="minor">
+            <a:schemeClr val="tx1"/>
+          </a:fontRef>
+        </p:style>
+      </p:cxnSp>
+      <p:sp>
+        <p:nvSpPr>
+          <p:cNvPr id="73" name="Ellipse 72"/>
+          <p:cNvSpPr/>
+          <p:nvPr/>
+        </p:nvSpPr>
+        <p:spPr>
+          <a:xfrm>
+            <a:off x="3415443" y="5085184"/>
+            <a:ext cx="576064" cy="432048"/>
+          </a:xfrm>
+          <a:prstGeom prst="ellipse">
+            <a:avLst/>
+          </a:prstGeom>
+        </p:spPr>
+        <p:style>
+          <a:lnRef idx="2">
+            <a:schemeClr val="accent6">
+              <a:shade val="50000"/>
+            </a:schemeClr>
+          </a:lnRef>
+          <a:fillRef idx="1">
+            <a:schemeClr val="accent6"/>
+          </a:fillRef>
+          <a:effectRef idx="0">
+            <a:schemeClr val="accent6"/>
+          </a:effectRef>
+          <a:fontRef idx="minor">
+            <a:schemeClr val="lt1"/>
+          </a:fontRef>
+        </p:style>
+        <p:txBody>
+          <a:bodyPr rtlCol="0" anchor="ctr"/>
+          <a:lstStyle/>
+          <a:p>
+            <a:pPr algn="ctr"/>
+            <a:endParaRPr lang="de-DE"/>
+          </a:p>
+        </p:txBody>
+      </p:sp>
+      <p:sp>
+        <p:nvSpPr>
+          <p:cNvPr id="77" name="Ellipse 76"/>
+          <p:cNvSpPr/>
+          <p:nvPr/>
+        </p:nvSpPr>
+        <p:spPr>
+          <a:xfrm>
+            <a:off x="6326436" y="4151764"/>
+            <a:ext cx="576064" cy="432048"/>
+          </a:xfrm>
+          <a:prstGeom prst="ellipse">
+            <a:avLst/>
+          </a:prstGeom>
+        </p:spPr>
+        <p:style>
+          <a:lnRef idx="2">
+            <a:schemeClr val="accent2">
+              <a:shade val="50000"/>
+            </a:schemeClr>
+          </a:lnRef>
+          <a:fillRef idx="1">
+            <a:schemeClr val="accent2"/>
+          </a:fillRef>
+          <a:effectRef idx="0">
+            <a:schemeClr val="accent2"/>
+          </a:effectRef>
+          <a:fontRef idx="minor">
+            <a:schemeClr val="lt1"/>
+          </a:fontRef>
+        </p:style>
+        <p:txBody>
+          <a:bodyPr rtlCol="0" anchor="ctr"/>
+          <a:lstStyle/>
+          <a:p>
+            <a:pPr algn="ctr"/>
+            <a:endParaRPr lang="de-DE"/>
+          </a:p>
+        </p:txBody>
+      </p:sp>
+      <p:sp>
+        <p:nvSpPr>
+          <p:cNvPr id="80" name="Ellipse 79"/>
+          <p:cNvSpPr/>
+          <p:nvPr/>
+        </p:nvSpPr>
+        <p:spPr>
+          <a:xfrm>
+            <a:off x="8085460" y="4151764"/>
+            <a:ext cx="576064" cy="432048"/>
+          </a:xfrm>
+          <a:prstGeom prst="ellipse">
+            <a:avLst/>
+          </a:prstGeom>
+        </p:spPr>
+        <p:style>
+          <a:lnRef idx="2">
+            <a:schemeClr val="accent3">
+              <a:shade val="50000"/>
+            </a:schemeClr>
+          </a:lnRef>
+          <a:fillRef idx="1">
+            <a:schemeClr val="accent3"/>
+          </a:fillRef>
+          <a:effectRef idx="0">
+            <a:schemeClr val="accent3"/>
+          </a:effectRef>
+          <a:fontRef idx="minor">
+            <a:schemeClr val="lt1"/>
+          </a:fontRef>
+        </p:style>
+        <p:txBody>
+          <a:bodyPr rtlCol="0" anchor="ctr"/>
+          <a:lstStyle/>
+          <a:p>
+            <a:pPr algn="ctr"/>
+            <a:endParaRPr lang="de-DE"/>
+          </a:p>
+        </p:txBody>
+      </p:sp>
+      <p:cxnSp>
+        <p:nvCxnSpPr>
+          <p:cNvPr id="81" name="Gerade Verbindung mit Pfeil 80"/>
+          <p:cNvCxnSpPr>
+            <a:stCxn id="77" idx="6"/>
+            <a:endCxn id="83" idx="2"/>
+          </p:cNvCxnSpPr>
+          <p:nvPr/>
+        </p:nvCxnSpPr>
+        <p:spPr>
+          <a:xfrm>
+            <a:off x="6902500" y="4367788"/>
+            <a:ext cx="288032" cy="0"/>
+          </a:xfrm>
+          <a:prstGeom prst="straightConnector1">
+            <a:avLst/>
+          </a:prstGeom>
+          <a:ln w="38100">
+            <a:tailEnd type="arrow"/>
+          </a:ln>
+        </p:spPr>
+        <p:style>
+          <a:lnRef idx="1">
+            <a:schemeClr val="accent1"/>
+          </a:lnRef>
+          <a:fillRef idx="0">
+            <a:schemeClr val="accent1"/>
+          </a:fillRef>
+          <a:effectRef idx="0">
+            <a:schemeClr val="accent1"/>
+          </a:effectRef>
+          <a:fontRef idx="minor">
+            <a:schemeClr val="tx1"/>
+          </a:fontRef>
+        </p:style>
+      </p:cxnSp>
+      <p:cxnSp>
+        <p:nvCxnSpPr>
+          <p:cNvPr id="82" name="Gerade Verbindung mit Pfeil 81"/>
+          <p:cNvCxnSpPr>
+            <a:stCxn id="83" idx="6"/>
+            <a:endCxn id="80" idx="2"/>
+          </p:cNvCxnSpPr>
+          <p:nvPr/>
+        </p:nvCxnSpPr>
+        <p:spPr>
+          <a:xfrm>
+            <a:off x="7766596" y="4367788"/>
+            <a:ext cx="318864" cy="0"/>
+          </a:xfrm>
+          <a:prstGeom prst="straightConnector1">
+            <a:avLst/>
+          </a:prstGeom>
+          <a:ln w="38100">
+            <a:tailEnd type="arrow"/>
+          </a:ln>
+        </p:spPr>
+        <p:style>
+          <a:lnRef idx="1">
+            <a:schemeClr val="accent1"/>
+          </a:lnRef>
+          <a:fillRef idx="0">
+            <a:schemeClr val="accent1"/>
+          </a:fillRef>
+          <a:effectRef idx="0">
+            <a:schemeClr val="accent1"/>
+          </a:effectRef>
+          <a:fontRef idx="minor">
+            <a:schemeClr val="tx1"/>
+          </a:fontRef>
+        </p:style>
+      </p:cxnSp>
+      <p:sp>
+        <p:nvSpPr>
+          <p:cNvPr id="83" name="Ellipse 82"/>
+          <p:cNvSpPr/>
+          <p:nvPr/>
+        </p:nvSpPr>
+        <p:spPr>
+          <a:xfrm>
+            <a:off x="7190532" y="4151764"/>
+            <a:ext cx="576064" cy="432048"/>
+          </a:xfrm>
+          <a:prstGeom prst="ellipse">
+            <a:avLst/>
+          </a:prstGeom>
+        </p:spPr>
+        <p:style>
+          <a:lnRef idx="2">
+            <a:schemeClr val="accent6">
+              <a:shade val="50000"/>
+            </a:schemeClr>
+          </a:lnRef>
+          <a:fillRef idx="1">
+            <a:schemeClr val="accent6"/>
+          </a:fillRef>
+          <a:effectRef idx="0">
+            <a:schemeClr val="accent6"/>
+          </a:effectRef>
+          <a:fontRef idx="minor">
+            <a:schemeClr val="lt1"/>
+          </a:fontRef>
+        </p:style>
+        <p:txBody>
+          <a:bodyPr rtlCol="0" anchor="ctr"/>
+          <a:lstStyle/>
+          <a:p>
+            <a:pPr algn="ctr"/>
+            <a:endParaRPr lang="de-DE"/>
+          </a:p>
+        </p:txBody>
+      </p:sp>
+      <p:sp>
+        <p:nvSpPr>
+          <p:cNvPr id="88" name="Textfeld 87"/>
+          <p:cNvSpPr txBox="1"/>
+          <p:nvPr/>
+        </p:nvSpPr>
+        <p:spPr>
+          <a:xfrm>
+            <a:off x="604733" y="1556792"/>
+            <a:ext cx="367408" cy="523220"/>
+          </a:xfrm>
+          <a:prstGeom prst="rect">
+            <a:avLst/>
+          </a:prstGeom>
+          <a:noFill/>
+        </p:spPr>
+        <p:txBody>
+          <a:bodyPr wrap="none" rtlCol="0">
+            <a:spAutoFit/>
+          </a:bodyPr>
+          <a:lstStyle/>
+          <a:p>
+            <a:r>
+              <a:rPr lang="de-DE" sz="2800" dirty="0" smtClean="0">
+                <a:solidFill>
+                  <a:schemeClr val="bg1">
+                    <a:lumMod val="65000"/>
+                  </a:schemeClr>
+                </a:solidFill>
+              </a:rPr>
+              <a:t>1</a:t>
+            </a:r>
+            <a:endParaRPr lang="de-DE" sz="2800" dirty="0">
+              <a:solidFill>
+                <a:schemeClr val="bg1">
+                  <a:lumMod val="65000"/>
+                </a:schemeClr>
+              </a:solidFill>
+            </a:endParaRPr>
+          </a:p>
+        </p:txBody>
+      </p:sp>
+      <p:sp>
+        <p:nvSpPr>
+          <p:cNvPr id="90" name="Textfeld 89"/>
+          <p:cNvSpPr txBox="1"/>
+          <p:nvPr/>
+        </p:nvSpPr>
+        <p:spPr>
+          <a:xfrm>
+            <a:off x="3485053" y="1556792"/>
+            <a:ext cx="367408" cy="523220"/>
+          </a:xfrm>
+          <a:prstGeom prst="rect">
+            <a:avLst/>
+          </a:prstGeom>
+          <a:noFill/>
+        </p:spPr>
+        <p:txBody>
+          <a:bodyPr wrap="none" rtlCol="0">
+            <a:spAutoFit/>
+          </a:bodyPr>
+          <a:lstStyle/>
+          <a:p>
+            <a:r>
+              <a:rPr lang="de-DE" sz="2800" dirty="0">
+                <a:solidFill>
+                  <a:schemeClr val="bg1">
+                    <a:lumMod val="65000"/>
+                  </a:schemeClr>
+                </a:solidFill>
+              </a:rPr>
+              <a:t>2</a:t>
+            </a:r>
+          </a:p>
+        </p:txBody>
+      </p:sp>
+      <p:sp>
+        <p:nvSpPr>
+          <p:cNvPr id="91" name="Textfeld 90"/>
+          <p:cNvSpPr txBox="1"/>
+          <p:nvPr/>
+        </p:nvSpPr>
+        <p:spPr>
+          <a:xfrm>
+            <a:off x="6372200" y="1412776"/>
+            <a:ext cx="367408" cy="523220"/>
+          </a:xfrm>
+          <a:prstGeom prst="rect">
+            <a:avLst/>
+          </a:prstGeom>
+          <a:noFill/>
+        </p:spPr>
+        <p:txBody>
+          <a:bodyPr wrap="none" rtlCol="0">
+            <a:spAutoFit/>
+          </a:bodyPr>
+          <a:lstStyle/>
+          <a:p>
+            <a:r>
+              <a:rPr lang="de-DE" sz="2800" dirty="0">
+                <a:solidFill>
+                  <a:schemeClr val="bg1">
+                    <a:lumMod val="65000"/>
+                  </a:schemeClr>
+                </a:solidFill>
+              </a:rPr>
+              <a:t>3</a:t>
+            </a:r>
+          </a:p>
+        </p:txBody>
+      </p:sp>
+      <p:sp>
+        <p:nvSpPr>
+          <p:cNvPr id="92" name="Textfeld 91"/>
+          <p:cNvSpPr txBox="1"/>
+          <p:nvPr/>
+        </p:nvSpPr>
+        <p:spPr>
+          <a:xfrm>
+            <a:off x="604733" y="3647708"/>
+            <a:ext cx="367408" cy="523220"/>
+          </a:xfrm>
+          <a:prstGeom prst="rect">
+            <a:avLst/>
+          </a:prstGeom>
+          <a:noFill/>
+        </p:spPr>
+        <p:txBody>
+          <a:bodyPr wrap="none" rtlCol="0">
+            <a:spAutoFit/>
+          </a:bodyPr>
+          <a:lstStyle/>
+          <a:p>
+            <a:r>
+              <a:rPr lang="de-DE" sz="2800" dirty="0">
+                <a:solidFill>
+                  <a:schemeClr val="bg1">
+                    <a:lumMod val="65000"/>
+                  </a:schemeClr>
+                </a:solidFill>
+              </a:rPr>
+              <a:t>4</a:t>
+            </a:r>
+          </a:p>
+        </p:txBody>
+      </p:sp>
+      <p:sp>
+        <p:nvSpPr>
+          <p:cNvPr id="93" name="Textfeld 92"/>
+          <p:cNvSpPr txBox="1"/>
+          <p:nvPr/>
+        </p:nvSpPr>
+        <p:spPr>
+          <a:xfrm>
+            <a:off x="3485053" y="3647708"/>
+            <a:ext cx="367408" cy="523220"/>
+          </a:xfrm>
+          <a:prstGeom prst="rect">
+            <a:avLst/>
+          </a:prstGeom>
+          <a:noFill/>
+        </p:spPr>
+        <p:txBody>
+          <a:bodyPr wrap="none" rtlCol="0">
+            <a:spAutoFit/>
+          </a:bodyPr>
+          <a:lstStyle/>
+          <a:p>
+            <a:r>
+              <a:rPr lang="de-DE" sz="2800" dirty="0">
+                <a:solidFill>
+                  <a:schemeClr val="bg1">
+                    <a:lumMod val="65000"/>
+                  </a:schemeClr>
+                </a:solidFill>
+              </a:rPr>
+              <a:t>5</a:t>
+            </a:r>
+          </a:p>
+        </p:txBody>
+      </p:sp>
+      <p:sp>
+        <p:nvSpPr>
+          <p:cNvPr id="94" name="Textfeld 93"/>
+          <p:cNvSpPr txBox="1"/>
+          <p:nvPr/>
+        </p:nvSpPr>
+        <p:spPr>
+          <a:xfrm>
+            <a:off x="6444208" y="3647708"/>
+            <a:ext cx="367408" cy="523220"/>
+          </a:xfrm>
+          <a:prstGeom prst="rect">
+            <a:avLst/>
+          </a:prstGeom>
+          <a:noFill/>
+        </p:spPr>
+        <p:txBody>
+          <a:bodyPr wrap="none" rtlCol="0">
+            <a:spAutoFit/>
+          </a:bodyPr>
+          <a:lstStyle/>
+          <a:p>
+            <a:r>
+              <a:rPr lang="de-DE" sz="2800" dirty="0">
+                <a:solidFill>
+                  <a:schemeClr val="bg1">
+                    <a:lumMod val="65000"/>
+                  </a:schemeClr>
+                </a:solidFill>
+              </a:rPr>
+              <a:t>6</a:t>
+            </a:r>
+          </a:p>
+        </p:txBody>
+      </p:sp>
+    </p:spTree>
+    <p:extLst>
+      <p:ext uri="{BB962C8B-B14F-4D97-AF65-F5344CB8AC3E}">
+        <p14:creationId xmlns:p14="http://schemas.microsoft.com/office/powerpoint/2010/main" val="1160278323"/>
+      </p:ext>
+    </p:extLst>
+  </p:cSld>
+  <p:clrMapOvr>
+    <a:masterClrMapping/>
+  </p:clrMapOvr>
+</p:sld>
+</file>
+
 <file path=ppt/slides/slide2.xml><?xml version="1.0" encoding="utf-8"?>
 <p:sld xmlns:a="http://schemas.openxmlformats.org/drawingml/2006/main" xmlns:r="http://schemas.openxmlformats.org/officeDocument/2006/relationships" xmlns:p="http://schemas.openxmlformats.org/presentationml/2006/main">
   <p:cSld>
@@ -11764,7 +13754,7 @@
       </p:sp>
       <p:pic>
         <p:nvPicPr>
-          <p:cNvPr id="1026" name="Picture 2"/>
+          <p:cNvPr id="2" name="Picture 2"/>
           <p:cNvPicPr>
             <a:picLocks noChangeAspect="1" noChangeArrowheads="1"/>
           </p:cNvPicPr>
@@ -11785,8 +13775,8 @@
         </p:blipFill>
         <p:spPr bwMode="auto">
           <a:xfrm>
-            <a:off x="366713" y="1281113"/>
-            <a:ext cx="8410575" cy="4295775"/>
+            <a:off x="366713" y="1252538"/>
+            <a:ext cx="8410575" cy="4352925"/>
           </a:xfrm>
           <a:prstGeom prst="rect">
             <a:avLst/>

</xml_diff>

<commit_message>
metrics report class diagram
</commit_message>
<xml_diff>
--- a/text/images/illustrations.pptx
+++ b/text/images/illustrations.pptx
@@ -5,7 +5,7 @@
     <p:sldMasterId id="2147483648" r:id="rId1"/>
   </p:sldMasterIdLst>
   <p:notesMasterIdLst>
-    <p:notesMasterId r:id="rId12"/>
+    <p:notesMasterId r:id="rId13"/>
   </p:notesMasterIdLst>
   <p:sldIdLst>
     <p:sldId id="256" r:id="rId2"/>
@@ -18,6 +18,7 @@
     <p:sldId id="262" r:id="rId9"/>
     <p:sldId id="264" r:id="rId10"/>
     <p:sldId id="265" r:id="rId11"/>
+    <p:sldId id="266" r:id="rId12"/>
   </p:sldIdLst>
   <p:sldSz cx="9144000" cy="6858000" type="screen4x3"/>
   <p:notesSz cx="6797675" cy="9856788"/>
@@ -201,7 +202,7 @@
           <a:p>
             <a:fld id="{7C9ABC5C-FC58-4AE2-89F8-727F30362B08}" type="datetimeFigureOut">
               <a:rPr lang="de-DE" smtClean="0"/>
-              <a:t>19.06.2012</a:t>
+              <a:t>20.06.2012</a:t>
             </a:fld>
             <a:endParaRPr lang="de-DE"/>
           </a:p>
@@ -889,6 +890,90 @@
 </p:notes>
 </file>
 
+<file path=ppt/notesSlides/notesSlide6.xml><?xml version="1.0" encoding="utf-8"?>
+<p:notes xmlns:a="http://schemas.openxmlformats.org/drawingml/2006/main" xmlns:r="http://schemas.openxmlformats.org/officeDocument/2006/relationships" xmlns:p="http://schemas.openxmlformats.org/presentationml/2006/main">
+  <p:cSld>
+    <p:spTree>
+      <p:nvGrpSpPr>
+        <p:cNvPr id="1" name=""/>
+        <p:cNvGrpSpPr/>
+        <p:nvPr/>
+      </p:nvGrpSpPr>
+      <p:grpSpPr>
+        <a:xfrm>
+          <a:off x="0" y="0"/>
+          <a:ext cx="0" cy="0"/>
+          <a:chOff x="0" y="0"/>
+          <a:chExt cx="0" cy="0"/>
+        </a:xfrm>
+      </p:grpSpPr>
+      <p:sp>
+        <p:nvSpPr>
+          <p:cNvPr id="2" name="Folienbildplatzhalter 1"/>
+          <p:cNvSpPr>
+            <a:spLocks noGrp="1" noRot="1" noChangeAspect="1"/>
+          </p:cNvSpPr>
+          <p:nvPr>
+            <p:ph type="sldImg"/>
+          </p:nvPr>
+        </p:nvSpPr>
+        <p:spPr/>
+      </p:sp>
+      <p:sp>
+        <p:nvSpPr>
+          <p:cNvPr id="3" name="Notizenplatzhalter 2"/>
+          <p:cNvSpPr>
+            <a:spLocks noGrp="1"/>
+          </p:cNvSpPr>
+          <p:nvPr>
+            <p:ph type="body" idx="1"/>
+          </p:nvPr>
+        </p:nvSpPr>
+        <p:spPr/>
+        <p:txBody>
+          <a:bodyPr/>
+          <a:lstStyle/>
+          <a:p>
+            <a:endParaRPr lang="de-DE" dirty="0"/>
+          </a:p>
+        </p:txBody>
+      </p:sp>
+      <p:sp>
+        <p:nvSpPr>
+          <p:cNvPr id="4" name="Foliennummernplatzhalter 3"/>
+          <p:cNvSpPr>
+            <a:spLocks noGrp="1"/>
+          </p:cNvSpPr>
+          <p:nvPr>
+            <p:ph type="sldNum" sz="quarter" idx="10"/>
+          </p:nvPr>
+        </p:nvSpPr>
+        <p:spPr/>
+        <p:txBody>
+          <a:bodyPr/>
+          <a:lstStyle/>
+          <a:p>
+            <a:fld id="{AAC1FA76-46A6-49F4-8E84-FEF8584513B4}" type="slidenum">
+              <a:rPr lang="de-DE" smtClean="0"/>
+              <a:t>11</a:t>
+            </a:fld>
+            <a:endParaRPr lang="de-DE"/>
+          </a:p>
+        </p:txBody>
+      </p:sp>
+    </p:spTree>
+    <p:extLst>
+      <p:ext uri="{BB962C8B-B14F-4D97-AF65-F5344CB8AC3E}">
+        <p14:creationId xmlns:p14="http://schemas.microsoft.com/office/powerpoint/2010/main" val="2493930981"/>
+      </p:ext>
+    </p:extLst>
+  </p:cSld>
+  <p:clrMapOvr>
+    <a:masterClrMapping/>
+  </p:clrMapOvr>
+</p:notes>
+</file>
+
 <file path=ppt/slideLayouts/slideLayout1.xml><?xml version="1.0" encoding="utf-8"?>
 <p:sldLayout xmlns:a="http://schemas.openxmlformats.org/drawingml/2006/main" xmlns:r="http://schemas.openxmlformats.org/officeDocument/2006/relationships" xmlns:p="http://schemas.openxmlformats.org/presentationml/2006/main" type="title" preserve="1">
   <p:cSld name="Titelfolie">
@@ -1070,7 +1155,7 @@
           <a:p>
             <a:fld id="{5430F42D-6984-4A4E-9090-AA314D14663F}" type="datetimeFigureOut">
               <a:rPr lang="de-DE" smtClean="0"/>
-              <a:t>19.06.2012</a:t>
+              <a:t>20.06.2012</a:t>
             </a:fld>
             <a:endParaRPr lang="de-DE"/>
           </a:p>
@@ -1240,7 +1325,7 @@
           <a:p>
             <a:fld id="{5430F42D-6984-4A4E-9090-AA314D14663F}" type="datetimeFigureOut">
               <a:rPr lang="de-DE" smtClean="0"/>
-              <a:t>19.06.2012</a:t>
+              <a:t>20.06.2012</a:t>
             </a:fld>
             <a:endParaRPr lang="de-DE"/>
           </a:p>
@@ -1420,7 +1505,7 @@
           <a:p>
             <a:fld id="{5430F42D-6984-4A4E-9090-AA314D14663F}" type="datetimeFigureOut">
               <a:rPr lang="de-DE" smtClean="0"/>
-              <a:t>19.06.2012</a:t>
+              <a:t>20.06.2012</a:t>
             </a:fld>
             <a:endParaRPr lang="de-DE"/>
           </a:p>
@@ -1590,7 +1675,7 @@
           <a:p>
             <a:fld id="{5430F42D-6984-4A4E-9090-AA314D14663F}" type="datetimeFigureOut">
               <a:rPr lang="de-DE" smtClean="0"/>
-              <a:t>19.06.2012</a:t>
+              <a:t>20.06.2012</a:t>
             </a:fld>
             <a:endParaRPr lang="de-DE"/>
           </a:p>
@@ -1836,7 +1921,7 @@
           <a:p>
             <a:fld id="{5430F42D-6984-4A4E-9090-AA314D14663F}" type="datetimeFigureOut">
               <a:rPr lang="de-DE" smtClean="0"/>
-              <a:t>19.06.2012</a:t>
+              <a:t>20.06.2012</a:t>
             </a:fld>
             <a:endParaRPr lang="de-DE"/>
           </a:p>
@@ -2124,7 +2209,7 @@
           <a:p>
             <a:fld id="{5430F42D-6984-4A4E-9090-AA314D14663F}" type="datetimeFigureOut">
               <a:rPr lang="de-DE" smtClean="0"/>
-              <a:t>19.06.2012</a:t>
+              <a:t>20.06.2012</a:t>
             </a:fld>
             <a:endParaRPr lang="de-DE"/>
           </a:p>
@@ -2546,7 +2631,7 @@
           <a:p>
             <a:fld id="{5430F42D-6984-4A4E-9090-AA314D14663F}" type="datetimeFigureOut">
               <a:rPr lang="de-DE" smtClean="0"/>
-              <a:t>19.06.2012</a:t>
+              <a:t>20.06.2012</a:t>
             </a:fld>
             <a:endParaRPr lang="de-DE"/>
           </a:p>
@@ -2664,7 +2749,7 @@
           <a:p>
             <a:fld id="{5430F42D-6984-4A4E-9090-AA314D14663F}" type="datetimeFigureOut">
               <a:rPr lang="de-DE" smtClean="0"/>
-              <a:t>19.06.2012</a:t>
+              <a:t>20.06.2012</a:t>
             </a:fld>
             <a:endParaRPr lang="de-DE"/>
           </a:p>
@@ -2759,7 +2844,7 @@
           <a:p>
             <a:fld id="{5430F42D-6984-4A4E-9090-AA314D14663F}" type="datetimeFigureOut">
               <a:rPr lang="de-DE" smtClean="0"/>
-              <a:t>19.06.2012</a:t>
+              <a:t>20.06.2012</a:t>
             </a:fld>
             <a:endParaRPr lang="de-DE"/>
           </a:p>
@@ -3036,7 +3121,7 @@
           <a:p>
             <a:fld id="{5430F42D-6984-4A4E-9090-AA314D14663F}" type="datetimeFigureOut">
               <a:rPr lang="de-DE" smtClean="0"/>
-              <a:t>19.06.2012</a:t>
+              <a:t>20.06.2012</a:t>
             </a:fld>
             <a:endParaRPr lang="de-DE"/>
           </a:p>
@@ -3289,7 +3374,7 @@
           <a:p>
             <a:fld id="{5430F42D-6984-4A4E-9090-AA314D14663F}" type="datetimeFigureOut">
               <a:rPr lang="de-DE" smtClean="0"/>
-              <a:t>19.06.2012</a:t>
+              <a:t>20.06.2012</a:t>
             </a:fld>
             <a:endParaRPr lang="de-DE"/>
           </a:p>
@@ -3502,7 +3587,7 @@
           <a:p>
             <a:fld id="{5430F42D-6984-4A4E-9090-AA314D14663F}" type="datetimeFigureOut">
               <a:rPr lang="de-DE" smtClean="0"/>
-              <a:t>19.06.2012</a:t>
+              <a:t>20.06.2012</a:t>
             </a:fld>
             <a:endParaRPr lang="de-DE"/>
           </a:p>
@@ -6368,6 +6453,128 @@
     <p:extLst>
       <p:ext uri="{BB962C8B-B14F-4D97-AF65-F5344CB8AC3E}">
         <p14:creationId xmlns:p14="http://schemas.microsoft.com/office/powerpoint/2010/main" val="1160278323"/>
+      </p:ext>
+    </p:extLst>
+  </p:cSld>
+  <p:clrMapOvr>
+    <a:masterClrMapping/>
+  </p:clrMapOvr>
+</p:sld>
+</file>
+
+<file path=ppt/slides/slide11.xml><?xml version="1.0" encoding="utf-8"?>
+<p:sld xmlns:a="http://schemas.openxmlformats.org/drawingml/2006/main" xmlns:r="http://schemas.openxmlformats.org/officeDocument/2006/relationships" xmlns:p="http://schemas.openxmlformats.org/presentationml/2006/main">
+  <p:cSld>
+    <p:spTree>
+      <p:nvGrpSpPr>
+        <p:cNvPr id="1" name=""/>
+        <p:cNvGrpSpPr/>
+        <p:nvPr/>
+      </p:nvGrpSpPr>
+      <p:grpSpPr>
+        <a:xfrm>
+          <a:off x="0" y="0"/>
+          <a:ext cx="0" cy="0"/>
+          <a:chOff x="0" y="0"/>
+          <a:chExt cx="0" cy="0"/>
+        </a:xfrm>
+      </p:grpSpPr>
+      <p:sp>
+        <p:nvSpPr>
+          <p:cNvPr id="4" name="Titel 31"/>
+          <p:cNvSpPr>
+            <a:spLocks noGrp="1"/>
+          </p:cNvSpPr>
+          <p:nvPr>
+            <p:ph type="title"/>
+          </p:nvPr>
+        </p:nvSpPr>
+        <p:spPr>
+          <a:xfrm>
+            <a:off x="457200" y="274638"/>
+            <a:ext cx="8229600" cy="1143000"/>
+          </a:xfrm>
+        </p:spPr>
+        <p:txBody>
+          <a:bodyPr/>
+          <a:lstStyle/>
+          <a:p>
+            <a:r>
+              <a:rPr lang="de-DE" dirty="0" err="1" smtClean="0"/>
+              <a:t>MetricsReport</a:t>
+            </a:r>
+            <a:endParaRPr lang="de-DE" dirty="0"/>
+          </a:p>
+        </p:txBody>
+      </p:sp>
+      <p:pic>
+        <p:nvPicPr>
+          <p:cNvPr id="2" name="Picture 2"/>
+          <p:cNvPicPr>
+            <a:picLocks noChangeAspect="1" noChangeArrowheads="1"/>
+          </p:cNvPicPr>
+          <p:nvPr/>
+        </p:nvPicPr>
+        <p:blipFill>
+          <a:blip r:embed="rId3">
+            <a:extLst>
+              <a:ext uri="{28A0092B-C50C-407E-A947-70E740481C1C}">
+                <a14:useLocalDpi xmlns:a14="http://schemas.microsoft.com/office/drawing/2010/main" val="0"/>
+              </a:ext>
+            </a:extLst>
+          </a:blip>
+          <a:srcRect/>
+          <a:stretch>
+            <a:fillRect/>
+          </a:stretch>
+        </p:blipFill>
+        <p:spPr bwMode="auto">
+          <a:xfrm>
+            <a:off x="253305" y="1219919"/>
+            <a:ext cx="8639175" cy="5305425"/>
+          </a:xfrm>
+          <a:prstGeom prst="rect">
+            <a:avLst/>
+          </a:prstGeom>
+          <a:noFill/>
+          <a:ln>
+            <a:noFill/>
+          </a:ln>
+          <a:effectLst/>
+          <a:extLst>
+            <a:ext uri="{909E8E84-426E-40DD-AFC4-6F175D3DCCD1}">
+              <a14:hiddenFill xmlns:a14="http://schemas.microsoft.com/office/drawing/2010/main">
+                <a:solidFill>
+                  <a:schemeClr val="accent1"/>
+                </a:solidFill>
+              </a14:hiddenFill>
+            </a:ext>
+            <a:ext uri="{91240B29-F687-4F45-9708-019B960494DF}">
+              <a14:hiddenLine xmlns:a14="http://schemas.microsoft.com/office/drawing/2010/main" w="9525">
+                <a:solidFill>
+                  <a:schemeClr val="tx1"/>
+                </a:solidFill>
+                <a:miter lim="800000"/>
+                <a:headEnd/>
+                <a:tailEnd/>
+              </a14:hiddenLine>
+            </a:ext>
+            <a:ext uri="{AF507438-7753-43E0-B8FC-AC1667EBCBE1}">
+              <a14:hiddenEffects xmlns:a14="http://schemas.microsoft.com/office/drawing/2010/main">
+                <a:effectLst>
+                  <a:outerShdw dist="35921" dir="2700000" algn="ctr" rotWithShape="0">
+                    <a:schemeClr val="bg2"/>
+                  </a:outerShdw>
+                </a:effectLst>
+              </a14:hiddenEffects>
+            </a:ext>
+          </a:extLst>
+        </p:spPr>
+      </p:pic>
+    </p:spTree>
+    <p:extLst>
+      <p:ext uri="{BB962C8B-B14F-4D97-AF65-F5344CB8AC3E}">
+        <p14:creationId xmlns:p14="http://schemas.microsoft.com/office/powerpoint/2010/main" val="2170548671"/>
       </p:ext>
     </p:extLst>
   </p:cSld>

</xml_diff>

<commit_message>
started text on vs extension
</commit_message>
<xml_diff>
--- a/text/images/illustrations.pptx
+++ b/text/images/illustrations.pptx
@@ -5,7 +5,7 @@
     <p:sldMasterId id="2147483648" r:id="rId1"/>
   </p:sldMasterIdLst>
   <p:notesMasterIdLst>
-    <p:notesMasterId r:id="rId13"/>
+    <p:notesMasterId r:id="rId14"/>
   </p:notesMasterIdLst>
   <p:sldIdLst>
     <p:sldId id="256" r:id="rId2"/>
@@ -19,6 +19,7 @@
     <p:sldId id="264" r:id="rId10"/>
     <p:sldId id="265" r:id="rId11"/>
     <p:sldId id="266" r:id="rId12"/>
+    <p:sldId id="267" r:id="rId13"/>
   </p:sldIdLst>
   <p:sldSz cx="9144000" cy="6858000" type="screen4x3"/>
   <p:notesSz cx="6797675" cy="9856788"/>
@@ -202,7 +203,7 @@
           <a:p>
             <a:fld id="{7C9ABC5C-FC58-4AE2-89F8-727F30362B08}" type="datetimeFigureOut">
               <a:rPr lang="de-DE" smtClean="0"/>
-              <a:t>20.06.2012</a:t>
+              <a:t>05.07.2012</a:t>
             </a:fld>
             <a:endParaRPr lang="de-DE"/>
           </a:p>
@@ -974,6 +975,90 @@
 </p:notes>
 </file>
 
+<file path=ppt/notesSlides/notesSlide7.xml><?xml version="1.0" encoding="utf-8"?>
+<p:notes xmlns:a="http://schemas.openxmlformats.org/drawingml/2006/main" xmlns:r="http://schemas.openxmlformats.org/officeDocument/2006/relationships" xmlns:p="http://schemas.openxmlformats.org/presentationml/2006/main">
+  <p:cSld>
+    <p:spTree>
+      <p:nvGrpSpPr>
+        <p:cNvPr id="1" name=""/>
+        <p:cNvGrpSpPr/>
+        <p:nvPr/>
+      </p:nvGrpSpPr>
+      <p:grpSpPr>
+        <a:xfrm>
+          <a:off x="0" y="0"/>
+          <a:ext cx="0" cy="0"/>
+          <a:chOff x="0" y="0"/>
+          <a:chExt cx="0" cy="0"/>
+        </a:xfrm>
+      </p:grpSpPr>
+      <p:sp>
+        <p:nvSpPr>
+          <p:cNvPr id="2" name="Folienbildplatzhalter 1"/>
+          <p:cNvSpPr>
+            <a:spLocks noGrp="1" noRot="1" noChangeAspect="1"/>
+          </p:cNvSpPr>
+          <p:nvPr>
+            <p:ph type="sldImg"/>
+          </p:nvPr>
+        </p:nvSpPr>
+        <p:spPr/>
+      </p:sp>
+      <p:sp>
+        <p:nvSpPr>
+          <p:cNvPr id="3" name="Notizenplatzhalter 2"/>
+          <p:cNvSpPr>
+            <a:spLocks noGrp="1"/>
+          </p:cNvSpPr>
+          <p:nvPr>
+            <p:ph type="body" idx="1"/>
+          </p:nvPr>
+        </p:nvSpPr>
+        <p:spPr/>
+        <p:txBody>
+          <a:bodyPr/>
+          <a:lstStyle/>
+          <a:p>
+            <a:endParaRPr lang="de-DE" dirty="0"/>
+          </a:p>
+        </p:txBody>
+      </p:sp>
+      <p:sp>
+        <p:nvSpPr>
+          <p:cNvPr id="4" name="Foliennummernplatzhalter 3"/>
+          <p:cNvSpPr>
+            <a:spLocks noGrp="1"/>
+          </p:cNvSpPr>
+          <p:nvPr>
+            <p:ph type="sldNum" sz="quarter" idx="10"/>
+          </p:nvPr>
+        </p:nvSpPr>
+        <p:spPr/>
+        <p:txBody>
+          <a:bodyPr/>
+          <a:lstStyle/>
+          <a:p>
+            <a:fld id="{AAC1FA76-46A6-49F4-8E84-FEF8584513B4}" type="slidenum">
+              <a:rPr lang="de-DE" smtClean="0"/>
+              <a:t>12</a:t>
+            </a:fld>
+            <a:endParaRPr lang="de-DE"/>
+          </a:p>
+        </p:txBody>
+      </p:sp>
+    </p:spTree>
+    <p:extLst>
+      <p:ext uri="{BB962C8B-B14F-4D97-AF65-F5344CB8AC3E}">
+        <p14:creationId xmlns:p14="http://schemas.microsoft.com/office/powerpoint/2010/main" val="2493930981"/>
+      </p:ext>
+    </p:extLst>
+  </p:cSld>
+  <p:clrMapOvr>
+    <a:masterClrMapping/>
+  </p:clrMapOvr>
+</p:notes>
+</file>
+
 <file path=ppt/slideLayouts/slideLayout1.xml><?xml version="1.0" encoding="utf-8"?>
 <p:sldLayout xmlns:a="http://schemas.openxmlformats.org/drawingml/2006/main" xmlns:r="http://schemas.openxmlformats.org/officeDocument/2006/relationships" xmlns:p="http://schemas.openxmlformats.org/presentationml/2006/main" type="title" preserve="1">
   <p:cSld name="Titelfolie">
@@ -1155,7 +1240,7 @@
           <a:p>
             <a:fld id="{5430F42D-6984-4A4E-9090-AA314D14663F}" type="datetimeFigureOut">
               <a:rPr lang="de-DE" smtClean="0"/>
-              <a:t>20.06.2012</a:t>
+              <a:t>05.07.2012</a:t>
             </a:fld>
             <a:endParaRPr lang="de-DE"/>
           </a:p>
@@ -1325,7 +1410,7 @@
           <a:p>
             <a:fld id="{5430F42D-6984-4A4E-9090-AA314D14663F}" type="datetimeFigureOut">
               <a:rPr lang="de-DE" smtClean="0"/>
-              <a:t>20.06.2012</a:t>
+              <a:t>05.07.2012</a:t>
             </a:fld>
             <a:endParaRPr lang="de-DE"/>
           </a:p>
@@ -1505,7 +1590,7 @@
           <a:p>
             <a:fld id="{5430F42D-6984-4A4E-9090-AA314D14663F}" type="datetimeFigureOut">
               <a:rPr lang="de-DE" smtClean="0"/>
-              <a:t>20.06.2012</a:t>
+              <a:t>05.07.2012</a:t>
             </a:fld>
             <a:endParaRPr lang="de-DE"/>
           </a:p>
@@ -1675,7 +1760,7 @@
           <a:p>
             <a:fld id="{5430F42D-6984-4A4E-9090-AA314D14663F}" type="datetimeFigureOut">
               <a:rPr lang="de-DE" smtClean="0"/>
-              <a:t>20.06.2012</a:t>
+              <a:t>05.07.2012</a:t>
             </a:fld>
             <a:endParaRPr lang="de-DE"/>
           </a:p>
@@ -1921,7 +2006,7 @@
           <a:p>
             <a:fld id="{5430F42D-6984-4A4E-9090-AA314D14663F}" type="datetimeFigureOut">
               <a:rPr lang="de-DE" smtClean="0"/>
-              <a:t>20.06.2012</a:t>
+              <a:t>05.07.2012</a:t>
             </a:fld>
             <a:endParaRPr lang="de-DE"/>
           </a:p>
@@ -2209,7 +2294,7 @@
           <a:p>
             <a:fld id="{5430F42D-6984-4A4E-9090-AA314D14663F}" type="datetimeFigureOut">
               <a:rPr lang="de-DE" smtClean="0"/>
-              <a:t>20.06.2012</a:t>
+              <a:t>05.07.2012</a:t>
             </a:fld>
             <a:endParaRPr lang="de-DE"/>
           </a:p>
@@ -2631,7 +2716,7 @@
           <a:p>
             <a:fld id="{5430F42D-6984-4A4E-9090-AA314D14663F}" type="datetimeFigureOut">
               <a:rPr lang="de-DE" smtClean="0"/>
-              <a:t>20.06.2012</a:t>
+              <a:t>05.07.2012</a:t>
             </a:fld>
             <a:endParaRPr lang="de-DE"/>
           </a:p>
@@ -2749,7 +2834,7 @@
           <a:p>
             <a:fld id="{5430F42D-6984-4A4E-9090-AA314D14663F}" type="datetimeFigureOut">
               <a:rPr lang="de-DE" smtClean="0"/>
-              <a:t>20.06.2012</a:t>
+              <a:t>05.07.2012</a:t>
             </a:fld>
             <a:endParaRPr lang="de-DE"/>
           </a:p>
@@ -2844,7 +2929,7 @@
           <a:p>
             <a:fld id="{5430F42D-6984-4A4E-9090-AA314D14663F}" type="datetimeFigureOut">
               <a:rPr lang="de-DE" smtClean="0"/>
-              <a:t>20.06.2012</a:t>
+              <a:t>05.07.2012</a:t>
             </a:fld>
             <a:endParaRPr lang="de-DE"/>
           </a:p>
@@ -3121,7 +3206,7 @@
           <a:p>
             <a:fld id="{5430F42D-6984-4A4E-9090-AA314D14663F}" type="datetimeFigureOut">
               <a:rPr lang="de-DE" smtClean="0"/>
-              <a:t>20.06.2012</a:t>
+              <a:t>05.07.2012</a:t>
             </a:fld>
             <a:endParaRPr lang="de-DE"/>
           </a:p>
@@ -3374,7 +3459,7 @@
           <a:p>
             <a:fld id="{5430F42D-6984-4A4E-9090-AA314D14663F}" type="datetimeFigureOut">
               <a:rPr lang="de-DE" smtClean="0"/>
-              <a:t>20.06.2012</a:t>
+              <a:t>05.07.2012</a:t>
             </a:fld>
             <a:endParaRPr lang="de-DE"/>
           </a:p>
@@ -3587,7 +3672,7 @@
           <a:p>
             <a:fld id="{5430F42D-6984-4A4E-9090-AA314D14663F}" type="datetimeFigureOut">
               <a:rPr lang="de-DE" smtClean="0"/>
-              <a:t>20.06.2012</a:t>
+              <a:t>05.07.2012</a:t>
             </a:fld>
             <a:endParaRPr lang="de-DE"/>
           </a:p>
@@ -6575,6 +6660,128 @@
     <p:extLst>
       <p:ext uri="{BB962C8B-B14F-4D97-AF65-F5344CB8AC3E}">
         <p14:creationId xmlns:p14="http://schemas.microsoft.com/office/powerpoint/2010/main" val="2170548671"/>
+      </p:ext>
+    </p:extLst>
+  </p:cSld>
+  <p:clrMapOvr>
+    <a:masterClrMapping/>
+  </p:clrMapOvr>
+</p:sld>
+</file>
+
+<file path=ppt/slides/slide12.xml><?xml version="1.0" encoding="utf-8"?>
+<p:sld xmlns:a="http://schemas.openxmlformats.org/drawingml/2006/main" xmlns:r="http://schemas.openxmlformats.org/officeDocument/2006/relationships" xmlns:p="http://schemas.openxmlformats.org/presentationml/2006/main">
+  <p:cSld>
+    <p:spTree>
+      <p:nvGrpSpPr>
+        <p:cNvPr id="1" name=""/>
+        <p:cNvGrpSpPr/>
+        <p:nvPr/>
+      </p:nvGrpSpPr>
+      <p:grpSpPr>
+        <a:xfrm>
+          <a:off x="0" y="0"/>
+          <a:ext cx="0" cy="0"/>
+          <a:chOff x="0" y="0"/>
+          <a:chExt cx="0" cy="0"/>
+        </a:xfrm>
+      </p:grpSpPr>
+      <p:sp>
+        <p:nvSpPr>
+          <p:cNvPr id="4" name="Titel 31"/>
+          <p:cNvSpPr>
+            <a:spLocks noGrp="1"/>
+          </p:cNvSpPr>
+          <p:nvPr>
+            <p:ph type="title"/>
+          </p:nvPr>
+        </p:nvSpPr>
+        <p:spPr>
+          <a:xfrm>
+            <a:off x="457200" y="274638"/>
+            <a:ext cx="8229600" cy="1143000"/>
+          </a:xfrm>
+        </p:spPr>
+        <p:txBody>
+          <a:bodyPr/>
+          <a:lstStyle/>
+          <a:p>
+            <a:r>
+              <a:rPr lang="de-DE" dirty="0" err="1" smtClean="0"/>
+              <a:t>ViewHub</a:t>
+            </a:r>
+            <a:endParaRPr lang="de-DE" dirty="0"/>
+          </a:p>
+        </p:txBody>
+      </p:sp>
+      <p:pic>
+        <p:nvPicPr>
+          <p:cNvPr id="1026" name="Picture 2"/>
+          <p:cNvPicPr>
+            <a:picLocks noChangeAspect="1" noChangeArrowheads="1"/>
+          </p:cNvPicPr>
+          <p:nvPr/>
+        </p:nvPicPr>
+        <p:blipFill>
+          <a:blip r:embed="rId3">
+            <a:extLst>
+              <a:ext uri="{28A0092B-C50C-407E-A947-70E740481C1C}">
+                <a14:useLocalDpi xmlns:a14="http://schemas.microsoft.com/office/drawing/2010/main" val="0"/>
+              </a:ext>
+            </a:extLst>
+          </a:blip>
+          <a:srcRect/>
+          <a:stretch>
+            <a:fillRect/>
+          </a:stretch>
+        </p:blipFill>
+        <p:spPr bwMode="auto">
+          <a:xfrm>
+            <a:off x="214313" y="1090613"/>
+            <a:ext cx="8715375" cy="4676775"/>
+          </a:xfrm>
+          <a:prstGeom prst="rect">
+            <a:avLst/>
+          </a:prstGeom>
+          <a:noFill/>
+          <a:ln>
+            <a:noFill/>
+          </a:ln>
+          <a:effectLst/>
+          <a:extLst>
+            <a:ext uri="{909E8E84-426E-40DD-AFC4-6F175D3DCCD1}">
+              <a14:hiddenFill xmlns:a14="http://schemas.microsoft.com/office/drawing/2010/main">
+                <a:solidFill>
+                  <a:schemeClr val="accent1"/>
+                </a:solidFill>
+              </a14:hiddenFill>
+            </a:ext>
+            <a:ext uri="{91240B29-F687-4F45-9708-019B960494DF}">
+              <a14:hiddenLine xmlns:a14="http://schemas.microsoft.com/office/drawing/2010/main" w="9525">
+                <a:solidFill>
+                  <a:schemeClr val="tx1"/>
+                </a:solidFill>
+                <a:miter lim="800000"/>
+                <a:headEnd/>
+                <a:tailEnd/>
+              </a14:hiddenLine>
+            </a:ext>
+            <a:ext uri="{AF507438-7753-43E0-B8FC-AC1667EBCBE1}">
+              <a14:hiddenEffects xmlns:a14="http://schemas.microsoft.com/office/drawing/2010/main">
+                <a:effectLst>
+                  <a:outerShdw dist="35921" dir="2700000" algn="ctr" rotWithShape="0">
+                    <a:schemeClr val="bg2"/>
+                  </a:outerShdw>
+                </a:effectLst>
+              </a14:hiddenEffects>
+            </a:ext>
+          </a:extLst>
+        </p:spPr>
+      </p:pic>
+    </p:spTree>
+    <p:extLst>
+      <p:ext uri="{BB962C8B-B14F-4D97-AF65-F5344CB8AC3E}">
+        <p14:creationId xmlns:p14="http://schemas.microsoft.com/office/powerpoint/2010/main" val="3699208271"/>
       </p:ext>
     </p:extLst>
   </p:cSld>

</xml_diff>

<commit_message>
vsi windows and menus text done
</commit_message>
<xml_diff>
--- a/text/images/illustrations.pptx
+++ b/text/images/illustrations.pptx
@@ -5,7 +5,7 @@
     <p:sldMasterId id="2147483648" r:id="rId1"/>
   </p:sldMasterIdLst>
   <p:notesMasterIdLst>
-    <p:notesMasterId r:id="rId14"/>
+    <p:notesMasterId r:id="rId15"/>
   </p:notesMasterIdLst>
   <p:sldIdLst>
     <p:sldId id="256" r:id="rId2"/>
@@ -20,6 +20,7 @@
     <p:sldId id="265" r:id="rId11"/>
     <p:sldId id="266" r:id="rId12"/>
     <p:sldId id="267" r:id="rId13"/>
+    <p:sldId id="268" r:id="rId14"/>
   </p:sldIdLst>
   <p:sldSz cx="9144000" cy="6858000" type="screen4x3"/>
   <p:notesSz cx="6797675" cy="9856788"/>
@@ -203,7 +204,7 @@
           <a:p>
             <a:fld id="{7C9ABC5C-FC58-4AE2-89F8-727F30362B08}" type="datetimeFigureOut">
               <a:rPr lang="de-DE" smtClean="0"/>
-              <a:t>06.07.2012</a:t>
+              <a:t>11.07.2012</a:t>
             </a:fld>
             <a:endParaRPr lang="de-DE"/>
           </a:p>
@@ -1059,6 +1060,90 @@
 </p:notes>
 </file>
 
+<file path=ppt/notesSlides/notesSlide8.xml><?xml version="1.0" encoding="utf-8"?>
+<p:notes xmlns:a="http://schemas.openxmlformats.org/drawingml/2006/main" xmlns:r="http://schemas.openxmlformats.org/officeDocument/2006/relationships" xmlns:p="http://schemas.openxmlformats.org/presentationml/2006/main">
+  <p:cSld>
+    <p:spTree>
+      <p:nvGrpSpPr>
+        <p:cNvPr id="1" name=""/>
+        <p:cNvGrpSpPr/>
+        <p:nvPr/>
+      </p:nvGrpSpPr>
+      <p:grpSpPr>
+        <a:xfrm>
+          <a:off x="0" y="0"/>
+          <a:ext cx="0" cy="0"/>
+          <a:chOff x="0" y="0"/>
+          <a:chExt cx="0" cy="0"/>
+        </a:xfrm>
+      </p:grpSpPr>
+      <p:sp>
+        <p:nvSpPr>
+          <p:cNvPr id="2" name="Folienbildplatzhalter 1"/>
+          <p:cNvSpPr>
+            <a:spLocks noGrp="1" noRot="1" noChangeAspect="1"/>
+          </p:cNvSpPr>
+          <p:nvPr>
+            <p:ph type="sldImg"/>
+          </p:nvPr>
+        </p:nvSpPr>
+        <p:spPr/>
+      </p:sp>
+      <p:sp>
+        <p:nvSpPr>
+          <p:cNvPr id="3" name="Notizenplatzhalter 2"/>
+          <p:cNvSpPr>
+            <a:spLocks noGrp="1"/>
+          </p:cNvSpPr>
+          <p:nvPr>
+            <p:ph type="body" idx="1"/>
+          </p:nvPr>
+        </p:nvSpPr>
+        <p:spPr/>
+        <p:txBody>
+          <a:bodyPr/>
+          <a:lstStyle/>
+          <a:p>
+            <a:endParaRPr lang="de-DE" dirty="0"/>
+          </a:p>
+        </p:txBody>
+      </p:sp>
+      <p:sp>
+        <p:nvSpPr>
+          <p:cNvPr id="4" name="Foliennummernplatzhalter 3"/>
+          <p:cNvSpPr>
+            <a:spLocks noGrp="1"/>
+          </p:cNvSpPr>
+          <p:nvPr>
+            <p:ph type="sldNum" sz="quarter" idx="10"/>
+          </p:nvPr>
+        </p:nvSpPr>
+        <p:spPr/>
+        <p:txBody>
+          <a:bodyPr/>
+          <a:lstStyle/>
+          <a:p>
+            <a:fld id="{AAC1FA76-46A6-49F4-8E84-FEF8584513B4}" type="slidenum">
+              <a:rPr lang="de-DE" smtClean="0"/>
+              <a:t>13</a:t>
+            </a:fld>
+            <a:endParaRPr lang="de-DE"/>
+          </a:p>
+        </p:txBody>
+      </p:sp>
+    </p:spTree>
+    <p:extLst>
+      <p:ext uri="{BB962C8B-B14F-4D97-AF65-F5344CB8AC3E}">
+        <p14:creationId xmlns:p14="http://schemas.microsoft.com/office/powerpoint/2010/main" val="2493930981"/>
+      </p:ext>
+    </p:extLst>
+  </p:cSld>
+  <p:clrMapOvr>
+    <a:masterClrMapping/>
+  </p:clrMapOvr>
+</p:notes>
+</file>
+
 <file path=ppt/slideLayouts/slideLayout1.xml><?xml version="1.0" encoding="utf-8"?>
 <p:sldLayout xmlns:a="http://schemas.openxmlformats.org/drawingml/2006/main" xmlns:r="http://schemas.openxmlformats.org/officeDocument/2006/relationships" xmlns:p="http://schemas.openxmlformats.org/presentationml/2006/main" type="title" preserve="1">
   <p:cSld name="Titelfolie">
@@ -1240,7 +1325,7 @@
           <a:p>
             <a:fld id="{5430F42D-6984-4A4E-9090-AA314D14663F}" type="datetimeFigureOut">
               <a:rPr lang="de-DE" smtClean="0"/>
-              <a:t>06.07.2012</a:t>
+              <a:t>11.07.2012</a:t>
             </a:fld>
             <a:endParaRPr lang="de-DE"/>
           </a:p>
@@ -1410,7 +1495,7 @@
           <a:p>
             <a:fld id="{5430F42D-6984-4A4E-9090-AA314D14663F}" type="datetimeFigureOut">
               <a:rPr lang="de-DE" smtClean="0"/>
-              <a:t>06.07.2012</a:t>
+              <a:t>11.07.2012</a:t>
             </a:fld>
             <a:endParaRPr lang="de-DE"/>
           </a:p>
@@ -1590,7 +1675,7 @@
           <a:p>
             <a:fld id="{5430F42D-6984-4A4E-9090-AA314D14663F}" type="datetimeFigureOut">
               <a:rPr lang="de-DE" smtClean="0"/>
-              <a:t>06.07.2012</a:t>
+              <a:t>11.07.2012</a:t>
             </a:fld>
             <a:endParaRPr lang="de-DE"/>
           </a:p>
@@ -1760,7 +1845,7 @@
           <a:p>
             <a:fld id="{5430F42D-6984-4A4E-9090-AA314D14663F}" type="datetimeFigureOut">
               <a:rPr lang="de-DE" smtClean="0"/>
-              <a:t>06.07.2012</a:t>
+              <a:t>11.07.2012</a:t>
             </a:fld>
             <a:endParaRPr lang="de-DE"/>
           </a:p>
@@ -2006,7 +2091,7 @@
           <a:p>
             <a:fld id="{5430F42D-6984-4A4E-9090-AA314D14663F}" type="datetimeFigureOut">
               <a:rPr lang="de-DE" smtClean="0"/>
-              <a:t>06.07.2012</a:t>
+              <a:t>11.07.2012</a:t>
             </a:fld>
             <a:endParaRPr lang="de-DE"/>
           </a:p>
@@ -2294,7 +2379,7 @@
           <a:p>
             <a:fld id="{5430F42D-6984-4A4E-9090-AA314D14663F}" type="datetimeFigureOut">
               <a:rPr lang="de-DE" smtClean="0"/>
-              <a:t>06.07.2012</a:t>
+              <a:t>11.07.2012</a:t>
             </a:fld>
             <a:endParaRPr lang="de-DE"/>
           </a:p>
@@ -2716,7 +2801,7 @@
           <a:p>
             <a:fld id="{5430F42D-6984-4A4E-9090-AA314D14663F}" type="datetimeFigureOut">
               <a:rPr lang="de-DE" smtClean="0"/>
-              <a:t>06.07.2012</a:t>
+              <a:t>11.07.2012</a:t>
             </a:fld>
             <a:endParaRPr lang="de-DE"/>
           </a:p>
@@ -2834,7 +2919,7 @@
           <a:p>
             <a:fld id="{5430F42D-6984-4A4E-9090-AA314D14663F}" type="datetimeFigureOut">
               <a:rPr lang="de-DE" smtClean="0"/>
-              <a:t>06.07.2012</a:t>
+              <a:t>11.07.2012</a:t>
             </a:fld>
             <a:endParaRPr lang="de-DE"/>
           </a:p>
@@ -2929,7 +3014,7 @@
           <a:p>
             <a:fld id="{5430F42D-6984-4A4E-9090-AA314D14663F}" type="datetimeFigureOut">
               <a:rPr lang="de-DE" smtClean="0"/>
-              <a:t>06.07.2012</a:t>
+              <a:t>11.07.2012</a:t>
             </a:fld>
             <a:endParaRPr lang="de-DE"/>
           </a:p>
@@ -3206,7 +3291,7 @@
           <a:p>
             <a:fld id="{5430F42D-6984-4A4E-9090-AA314D14663F}" type="datetimeFigureOut">
               <a:rPr lang="de-DE" smtClean="0"/>
-              <a:t>06.07.2012</a:t>
+              <a:t>11.07.2012</a:t>
             </a:fld>
             <a:endParaRPr lang="de-DE"/>
           </a:p>
@@ -3459,7 +3544,7 @@
           <a:p>
             <a:fld id="{5430F42D-6984-4A4E-9090-AA314D14663F}" type="datetimeFigureOut">
               <a:rPr lang="de-DE" smtClean="0"/>
-              <a:t>06.07.2012</a:t>
+              <a:t>11.07.2012</a:t>
             </a:fld>
             <a:endParaRPr lang="de-DE"/>
           </a:p>
@@ -3672,7 +3757,7 @@
           <a:p>
             <a:fld id="{5430F42D-6984-4A4E-9090-AA314D14663F}" type="datetimeFigureOut">
               <a:rPr lang="de-DE" smtClean="0"/>
-              <a:t>06.07.2012</a:t>
+              <a:t>11.07.2012</a:t>
             </a:fld>
             <a:endParaRPr lang="de-DE"/>
           </a:p>
@@ -6782,6 +6867,128 @@
     <p:extLst>
       <p:ext uri="{BB962C8B-B14F-4D97-AF65-F5344CB8AC3E}">
         <p14:creationId xmlns:p14="http://schemas.microsoft.com/office/powerpoint/2010/main" val="3699208271"/>
+      </p:ext>
+    </p:extLst>
+  </p:cSld>
+  <p:clrMapOvr>
+    <a:masterClrMapping/>
+  </p:clrMapOvr>
+</p:sld>
+</file>
+
+<file path=ppt/slides/slide13.xml><?xml version="1.0" encoding="utf-8"?>
+<p:sld xmlns:a="http://schemas.openxmlformats.org/drawingml/2006/main" xmlns:r="http://schemas.openxmlformats.org/officeDocument/2006/relationships" xmlns:p="http://schemas.openxmlformats.org/presentationml/2006/main">
+  <p:cSld>
+    <p:spTree>
+      <p:nvGrpSpPr>
+        <p:cNvPr id="1" name=""/>
+        <p:cNvGrpSpPr/>
+        <p:nvPr/>
+      </p:nvGrpSpPr>
+      <p:grpSpPr>
+        <a:xfrm>
+          <a:off x="0" y="0"/>
+          <a:ext cx="0" cy="0"/>
+          <a:chOff x="0" y="0"/>
+          <a:chExt cx="0" cy="0"/>
+        </a:xfrm>
+      </p:grpSpPr>
+      <p:sp>
+        <p:nvSpPr>
+          <p:cNvPr id="4" name="Titel 31"/>
+          <p:cNvSpPr>
+            <a:spLocks noGrp="1"/>
+          </p:cNvSpPr>
+          <p:nvPr>
+            <p:ph type="title"/>
+          </p:nvPr>
+        </p:nvSpPr>
+        <p:spPr>
+          <a:xfrm>
+            <a:off x="457200" y="274638"/>
+            <a:ext cx="8229600" cy="1143000"/>
+          </a:xfrm>
+        </p:spPr>
+        <p:txBody>
+          <a:bodyPr/>
+          <a:lstStyle/>
+          <a:p>
+            <a:r>
+              <a:rPr lang="de-DE" dirty="0" smtClean="0"/>
+              <a:t>Windows</a:t>
+            </a:r>
+            <a:endParaRPr lang="de-DE" dirty="0"/>
+          </a:p>
+        </p:txBody>
+      </p:sp>
+      <p:pic>
+        <p:nvPicPr>
+          <p:cNvPr id="1026" name="Picture 2"/>
+          <p:cNvPicPr>
+            <a:picLocks noChangeAspect="1" noChangeArrowheads="1"/>
+          </p:cNvPicPr>
+          <p:nvPr/>
+        </p:nvPicPr>
+        <p:blipFill>
+          <a:blip r:embed="rId3">
+            <a:extLst>
+              <a:ext uri="{28A0092B-C50C-407E-A947-70E740481C1C}">
+                <a14:useLocalDpi xmlns:a14="http://schemas.microsoft.com/office/drawing/2010/main" val="0"/>
+              </a:ext>
+            </a:extLst>
+          </a:blip>
+          <a:srcRect/>
+          <a:stretch>
+            <a:fillRect/>
+          </a:stretch>
+        </p:blipFill>
+        <p:spPr bwMode="auto">
+          <a:xfrm>
+            <a:off x="595313" y="1914525"/>
+            <a:ext cx="7953375" cy="3028950"/>
+          </a:xfrm>
+          <a:prstGeom prst="rect">
+            <a:avLst/>
+          </a:prstGeom>
+          <a:noFill/>
+          <a:ln>
+            <a:noFill/>
+          </a:ln>
+          <a:effectLst/>
+          <a:extLst>
+            <a:ext uri="{909E8E84-426E-40DD-AFC4-6F175D3DCCD1}">
+              <a14:hiddenFill xmlns:a14="http://schemas.microsoft.com/office/drawing/2010/main">
+                <a:solidFill>
+                  <a:schemeClr val="accent1"/>
+                </a:solidFill>
+              </a14:hiddenFill>
+            </a:ext>
+            <a:ext uri="{91240B29-F687-4F45-9708-019B960494DF}">
+              <a14:hiddenLine xmlns:a14="http://schemas.microsoft.com/office/drawing/2010/main" w="9525">
+                <a:solidFill>
+                  <a:schemeClr val="tx1"/>
+                </a:solidFill>
+                <a:miter lim="800000"/>
+                <a:headEnd/>
+                <a:tailEnd/>
+              </a14:hiddenLine>
+            </a:ext>
+            <a:ext uri="{AF507438-7753-43E0-B8FC-AC1667EBCBE1}">
+              <a14:hiddenEffects xmlns:a14="http://schemas.microsoft.com/office/drawing/2010/main">
+                <a:effectLst>
+                  <a:outerShdw dist="35921" dir="2700000" algn="ctr" rotWithShape="0">
+                    <a:schemeClr val="bg2"/>
+                  </a:outerShdw>
+                </a:effectLst>
+              </a14:hiddenEffects>
+            </a:ext>
+          </a:extLst>
+        </p:spPr>
+      </p:pic>
+    </p:spTree>
+    <p:extLst>
+      <p:ext uri="{BB962C8B-B14F-4D97-AF65-F5344CB8AC3E}">
+        <p14:creationId xmlns:p14="http://schemas.microsoft.com/office/powerpoint/2010/main" val="2368105218"/>
       </p:ext>
     </p:extLst>
   </p:cSld>

</xml_diff>

<commit_message>
more corrections and cc lambda test
</commit_message>
<xml_diff>
--- a/text/images/illustrations.pptx
+++ b/text/images/illustrations.pptx
@@ -204,7 +204,7 @@
           <a:p>
             <a:fld id="{7C9ABC5C-FC58-4AE2-89F8-727F30362B08}" type="datetimeFigureOut">
               <a:rPr lang="de-DE" smtClean="0"/>
-              <a:t>11.07.2012</a:t>
+              <a:t>12.07.2012</a:t>
             </a:fld>
             <a:endParaRPr lang="de-DE"/>
           </a:p>
@@ -1325,7 +1325,7 @@
           <a:p>
             <a:fld id="{5430F42D-6984-4A4E-9090-AA314D14663F}" type="datetimeFigureOut">
               <a:rPr lang="de-DE" smtClean="0"/>
-              <a:t>11.07.2012</a:t>
+              <a:t>12.07.2012</a:t>
             </a:fld>
             <a:endParaRPr lang="de-DE"/>
           </a:p>
@@ -1495,7 +1495,7 @@
           <a:p>
             <a:fld id="{5430F42D-6984-4A4E-9090-AA314D14663F}" type="datetimeFigureOut">
               <a:rPr lang="de-DE" smtClean="0"/>
-              <a:t>11.07.2012</a:t>
+              <a:t>12.07.2012</a:t>
             </a:fld>
             <a:endParaRPr lang="de-DE"/>
           </a:p>
@@ -1675,7 +1675,7 @@
           <a:p>
             <a:fld id="{5430F42D-6984-4A4E-9090-AA314D14663F}" type="datetimeFigureOut">
               <a:rPr lang="de-DE" smtClean="0"/>
-              <a:t>11.07.2012</a:t>
+              <a:t>12.07.2012</a:t>
             </a:fld>
             <a:endParaRPr lang="de-DE"/>
           </a:p>
@@ -1845,7 +1845,7 @@
           <a:p>
             <a:fld id="{5430F42D-6984-4A4E-9090-AA314D14663F}" type="datetimeFigureOut">
               <a:rPr lang="de-DE" smtClean="0"/>
-              <a:t>11.07.2012</a:t>
+              <a:t>12.07.2012</a:t>
             </a:fld>
             <a:endParaRPr lang="de-DE"/>
           </a:p>
@@ -2091,7 +2091,7 @@
           <a:p>
             <a:fld id="{5430F42D-6984-4A4E-9090-AA314D14663F}" type="datetimeFigureOut">
               <a:rPr lang="de-DE" smtClean="0"/>
-              <a:t>11.07.2012</a:t>
+              <a:t>12.07.2012</a:t>
             </a:fld>
             <a:endParaRPr lang="de-DE"/>
           </a:p>
@@ -2379,7 +2379,7 @@
           <a:p>
             <a:fld id="{5430F42D-6984-4A4E-9090-AA314D14663F}" type="datetimeFigureOut">
               <a:rPr lang="de-DE" smtClean="0"/>
-              <a:t>11.07.2012</a:t>
+              <a:t>12.07.2012</a:t>
             </a:fld>
             <a:endParaRPr lang="de-DE"/>
           </a:p>
@@ -2801,7 +2801,7 @@
           <a:p>
             <a:fld id="{5430F42D-6984-4A4E-9090-AA314D14663F}" type="datetimeFigureOut">
               <a:rPr lang="de-DE" smtClean="0"/>
-              <a:t>11.07.2012</a:t>
+              <a:t>12.07.2012</a:t>
             </a:fld>
             <a:endParaRPr lang="de-DE"/>
           </a:p>
@@ -2919,7 +2919,7 @@
           <a:p>
             <a:fld id="{5430F42D-6984-4A4E-9090-AA314D14663F}" type="datetimeFigureOut">
               <a:rPr lang="de-DE" smtClean="0"/>
-              <a:t>11.07.2012</a:t>
+              <a:t>12.07.2012</a:t>
             </a:fld>
             <a:endParaRPr lang="de-DE"/>
           </a:p>
@@ -3014,7 +3014,7 @@
           <a:p>
             <a:fld id="{5430F42D-6984-4A4E-9090-AA314D14663F}" type="datetimeFigureOut">
               <a:rPr lang="de-DE" smtClean="0"/>
-              <a:t>11.07.2012</a:t>
+              <a:t>12.07.2012</a:t>
             </a:fld>
             <a:endParaRPr lang="de-DE"/>
           </a:p>
@@ -3291,7 +3291,7 @@
           <a:p>
             <a:fld id="{5430F42D-6984-4A4E-9090-AA314D14663F}" type="datetimeFigureOut">
               <a:rPr lang="de-DE" smtClean="0"/>
-              <a:t>11.07.2012</a:t>
+              <a:t>12.07.2012</a:t>
             </a:fld>
             <a:endParaRPr lang="de-DE"/>
           </a:p>
@@ -3544,7 +3544,7 @@
           <a:p>
             <a:fld id="{5430F42D-6984-4A4E-9090-AA314D14663F}" type="datetimeFigureOut">
               <a:rPr lang="de-DE" smtClean="0"/>
-              <a:t>11.07.2012</a:t>
+              <a:t>12.07.2012</a:t>
             </a:fld>
             <a:endParaRPr lang="de-DE"/>
           </a:p>
@@ -3757,7 +3757,7 @@
           <a:p>
             <a:fld id="{5430F42D-6984-4A4E-9090-AA314D14663F}" type="datetimeFigureOut">
               <a:rPr lang="de-DE" smtClean="0"/>
-              <a:t>11.07.2012</a:t>
+              <a:t>12.07.2012</a:t>
             </a:fld>
             <a:endParaRPr lang="de-DE"/>
           </a:p>
@@ -5640,7 +5640,7 @@
         </p:nvSpPr>
         <p:spPr>
           <a:xfrm>
-            <a:off x="467544" y="4151764"/>
+            <a:off x="467544" y="3717032"/>
             <a:ext cx="576064" cy="432048"/>
           </a:xfrm>
           <a:prstGeom prst="ellipse">
@@ -5680,7 +5680,7 @@
         </p:nvSpPr>
         <p:spPr>
           <a:xfrm>
-            <a:off x="1331640" y="3863732"/>
+            <a:off x="1331640" y="3429000"/>
             <a:ext cx="576064" cy="432048"/>
           </a:xfrm>
           <a:prstGeom prst="ellipse">
@@ -5718,7 +5718,7 @@
         </p:nvSpPr>
         <p:spPr>
           <a:xfrm>
-            <a:off x="1331640" y="4427617"/>
+            <a:off x="1331640" y="3992885"/>
             <a:ext cx="576064" cy="432048"/>
           </a:xfrm>
           <a:prstGeom prst="ellipse">
@@ -5758,7 +5758,7 @@
         </p:nvSpPr>
         <p:spPr>
           <a:xfrm>
-            <a:off x="2195736" y="4151764"/>
+            <a:off x="2195736" y="3717032"/>
             <a:ext cx="576064" cy="432048"/>
           </a:xfrm>
           <a:prstGeom prst="ellipse">
@@ -5801,7 +5801,7 @@
         </p:nvCxnSpPr>
         <p:spPr>
           <a:xfrm>
-            <a:off x="755576" y="4583812"/>
+            <a:off x="755576" y="4149080"/>
             <a:ext cx="67579" cy="501372"/>
           </a:xfrm>
           <a:prstGeom prst="straightConnector1">
@@ -5837,7 +5837,7 @@
         </p:nvCxnSpPr>
         <p:spPr>
           <a:xfrm flipV="1">
-            <a:off x="1823341" y="4367788"/>
+            <a:off x="1823341" y="3933056"/>
             <a:ext cx="372395" cy="123101"/>
           </a:xfrm>
           <a:prstGeom prst="straightConnector1">
@@ -5870,7 +5870,7 @@
         </p:nvSpPr>
         <p:spPr>
           <a:xfrm>
-            <a:off x="535123" y="5085184"/>
+            <a:off x="535123" y="4650452"/>
             <a:ext cx="576064" cy="432048"/>
           </a:xfrm>
           <a:prstGeom prst="ellipse">
@@ -5913,7 +5913,7 @@
         </p:nvCxnSpPr>
         <p:spPr>
           <a:xfrm flipV="1">
-            <a:off x="1026824" y="4796393"/>
+            <a:off x="1026824" y="4361661"/>
             <a:ext cx="389179" cy="352063"/>
           </a:xfrm>
           <a:prstGeom prst="straightConnector1">
@@ -5950,7 +5950,7 @@
         </p:nvSpPr>
         <p:spPr>
           <a:xfrm>
-            <a:off x="3347864" y="4151764"/>
+            <a:off x="3347864" y="3717032"/>
             <a:ext cx="576064" cy="432048"/>
           </a:xfrm>
           <a:prstGeom prst="ellipse">
@@ -5990,7 +5990,7 @@
         </p:nvSpPr>
         <p:spPr>
           <a:xfrm>
-            <a:off x="4211960" y="3863732"/>
+            <a:off x="4211960" y="3429000"/>
             <a:ext cx="576064" cy="432048"/>
           </a:xfrm>
           <a:prstGeom prst="ellipse">
@@ -6028,7 +6028,7 @@
         </p:nvSpPr>
         <p:spPr>
           <a:xfrm>
-            <a:off x="4211960" y="4427617"/>
+            <a:off x="4211960" y="3992885"/>
             <a:ext cx="576064" cy="432048"/>
           </a:xfrm>
           <a:prstGeom prst="ellipse">
@@ -6066,7 +6066,7 @@
         </p:nvSpPr>
         <p:spPr>
           <a:xfrm>
-            <a:off x="5076056" y="4151764"/>
+            <a:off x="5076056" y="3717032"/>
             <a:ext cx="576064" cy="432048"/>
           </a:xfrm>
           <a:prstGeom prst="ellipse">
@@ -6109,7 +6109,7 @@
         </p:nvCxnSpPr>
         <p:spPr>
           <a:xfrm>
-            <a:off x="3635896" y="4583812"/>
+            <a:off x="3635896" y="4149080"/>
             <a:ext cx="67579" cy="501372"/>
           </a:xfrm>
           <a:prstGeom prst="straightConnector1">
@@ -6145,7 +6145,7 @@
         </p:nvCxnSpPr>
         <p:spPr>
           <a:xfrm flipV="1">
-            <a:off x="3991507" y="4520540"/>
+            <a:off x="3991507" y="4085808"/>
             <a:ext cx="1168912" cy="780668"/>
           </a:xfrm>
           <a:prstGeom prst="straightConnector1">
@@ -6178,7 +6178,7 @@
         </p:nvSpPr>
         <p:spPr>
           <a:xfrm>
-            <a:off x="3415443" y="5085184"/>
+            <a:off x="3415443" y="4650452"/>
             <a:ext cx="576064" cy="432048"/>
           </a:xfrm>
           <a:prstGeom prst="ellipse">
@@ -6218,7 +6218,7 @@
         </p:nvSpPr>
         <p:spPr>
           <a:xfrm>
-            <a:off x="6326436" y="4151764"/>
+            <a:off x="6326436" y="3717032"/>
             <a:ext cx="576064" cy="432048"/>
           </a:xfrm>
           <a:prstGeom prst="ellipse">
@@ -6258,7 +6258,7 @@
         </p:nvSpPr>
         <p:spPr>
           <a:xfrm>
-            <a:off x="8085460" y="4151764"/>
+            <a:off x="8085460" y="3717032"/>
             <a:ext cx="576064" cy="432048"/>
           </a:xfrm>
           <a:prstGeom prst="ellipse">
@@ -6301,7 +6301,7 @@
         </p:nvCxnSpPr>
         <p:spPr>
           <a:xfrm>
-            <a:off x="6902500" y="4367788"/>
+            <a:off x="6902500" y="3933056"/>
             <a:ext cx="288032" cy="0"/>
           </a:xfrm>
           <a:prstGeom prst="straightConnector1">
@@ -6337,7 +6337,7 @@
         </p:nvCxnSpPr>
         <p:spPr>
           <a:xfrm>
-            <a:off x="7766596" y="4367788"/>
+            <a:off x="7766596" y="3933056"/>
             <a:ext cx="318864" cy="0"/>
           </a:xfrm>
           <a:prstGeom prst="straightConnector1">
@@ -6370,7 +6370,7 @@
         </p:nvSpPr>
         <p:spPr>
           <a:xfrm>
-            <a:off x="7190532" y="4151764"/>
+            <a:off x="7190532" y="3717032"/>
             <a:ext cx="576064" cy="432048"/>
           </a:xfrm>
           <a:prstGeom prst="ellipse">
@@ -6522,7 +6522,7 @@
         </p:nvSpPr>
         <p:spPr>
           <a:xfrm>
-            <a:off x="604733" y="3647708"/>
+            <a:off x="604733" y="3284984"/>
             <a:ext cx="367408" cy="523220"/>
           </a:xfrm>
           <a:prstGeom prst="rect">
@@ -6557,7 +6557,7 @@
         </p:nvSpPr>
         <p:spPr>
           <a:xfrm>
-            <a:off x="3485053" y="3647708"/>
+            <a:off x="3485053" y="3284984"/>
             <a:ext cx="367408" cy="523220"/>
           </a:xfrm>
           <a:prstGeom prst="rect">
@@ -6592,7 +6592,7 @@
         </p:nvSpPr>
         <p:spPr>
           <a:xfrm>
-            <a:off x="6444208" y="3647708"/>
+            <a:off x="6444208" y="3284984"/>
             <a:ext cx="367408" cy="523220"/>
           </a:xfrm>
           <a:prstGeom prst="rect">

</xml_diff>

<commit_message>
vs integration text done, updated object model and complexity info on graph algorithms
</commit_message>
<xml_diff>
--- a/text/images/illustrations.pptx
+++ b/text/images/illustrations.pptx
@@ -204,7 +204,7 @@
           <a:p>
             <a:fld id="{7C9ABC5C-FC58-4AE2-89F8-727F30362B08}" type="datetimeFigureOut">
               <a:rPr lang="de-DE" smtClean="0"/>
-              <a:t>12.07.2012</a:t>
+              <a:t>16.07.2012</a:t>
             </a:fld>
             <a:endParaRPr lang="de-DE"/>
           </a:p>
@@ -1325,7 +1325,7 @@
           <a:p>
             <a:fld id="{5430F42D-6984-4A4E-9090-AA314D14663F}" type="datetimeFigureOut">
               <a:rPr lang="de-DE" smtClean="0"/>
-              <a:t>12.07.2012</a:t>
+              <a:t>16.07.2012</a:t>
             </a:fld>
             <a:endParaRPr lang="de-DE"/>
           </a:p>
@@ -1495,7 +1495,7 @@
           <a:p>
             <a:fld id="{5430F42D-6984-4A4E-9090-AA314D14663F}" type="datetimeFigureOut">
               <a:rPr lang="de-DE" smtClean="0"/>
-              <a:t>12.07.2012</a:t>
+              <a:t>16.07.2012</a:t>
             </a:fld>
             <a:endParaRPr lang="de-DE"/>
           </a:p>
@@ -1675,7 +1675,7 @@
           <a:p>
             <a:fld id="{5430F42D-6984-4A4E-9090-AA314D14663F}" type="datetimeFigureOut">
               <a:rPr lang="de-DE" smtClean="0"/>
-              <a:t>12.07.2012</a:t>
+              <a:t>16.07.2012</a:t>
             </a:fld>
             <a:endParaRPr lang="de-DE"/>
           </a:p>
@@ -1845,7 +1845,7 @@
           <a:p>
             <a:fld id="{5430F42D-6984-4A4E-9090-AA314D14663F}" type="datetimeFigureOut">
               <a:rPr lang="de-DE" smtClean="0"/>
-              <a:t>12.07.2012</a:t>
+              <a:t>16.07.2012</a:t>
             </a:fld>
             <a:endParaRPr lang="de-DE"/>
           </a:p>
@@ -2091,7 +2091,7 @@
           <a:p>
             <a:fld id="{5430F42D-6984-4A4E-9090-AA314D14663F}" type="datetimeFigureOut">
               <a:rPr lang="de-DE" smtClean="0"/>
-              <a:t>12.07.2012</a:t>
+              <a:t>16.07.2012</a:t>
             </a:fld>
             <a:endParaRPr lang="de-DE"/>
           </a:p>
@@ -2379,7 +2379,7 @@
           <a:p>
             <a:fld id="{5430F42D-6984-4A4E-9090-AA314D14663F}" type="datetimeFigureOut">
               <a:rPr lang="de-DE" smtClean="0"/>
-              <a:t>12.07.2012</a:t>
+              <a:t>16.07.2012</a:t>
             </a:fld>
             <a:endParaRPr lang="de-DE"/>
           </a:p>
@@ -2801,7 +2801,7 @@
           <a:p>
             <a:fld id="{5430F42D-6984-4A4E-9090-AA314D14663F}" type="datetimeFigureOut">
               <a:rPr lang="de-DE" smtClean="0"/>
-              <a:t>12.07.2012</a:t>
+              <a:t>16.07.2012</a:t>
             </a:fld>
             <a:endParaRPr lang="de-DE"/>
           </a:p>
@@ -2919,7 +2919,7 @@
           <a:p>
             <a:fld id="{5430F42D-6984-4A4E-9090-AA314D14663F}" type="datetimeFigureOut">
               <a:rPr lang="de-DE" smtClean="0"/>
-              <a:t>12.07.2012</a:t>
+              <a:t>16.07.2012</a:t>
             </a:fld>
             <a:endParaRPr lang="de-DE"/>
           </a:p>
@@ -3014,7 +3014,7 @@
           <a:p>
             <a:fld id="{5430F42D-6984-4A4E-9090-AA314D14663F}" type="datetimeFigureOut">
               <a:rPr lang="de-DE" smtClean="0"/>
-              <a:t>12.07.2012</a:t>
+              <a:t>16.07.2012</a:t>
             </a:fld>
             <a:endParaRPr lang="de-DE"/>
           </a:p>
@@ -3291,7 +3291,7 @@
           <a:p>
             <a:fld id="{5430F42D-6984-4A4E-9090-AA314D14663F}" type="datetimeFigureOut">
               <a:rPr lang="de-DE" smtClean="0"/>
-              <a:t>12.07.2012</a:t>
+              <a:t>16.07.2012</a:t>
             </a:fld>
             <a:endParaRPr lang="de-DE"/>
           </a:p>
@@ -3544,7 +3544,7 @@
           <a:p>
             <a:fld id="{5430F42D-6984-4A4E-9090-AA314D14663F}" type="datetimeFigureOut">
               <a:rPr lang="de-DE" smtClean="0"/>
-              <a:t>12.07.2012</a:t>
+              <a:t>16.07.2012</a:t>
             </a:fld>
             <a:endParaRPr lang="de-DE"/>
           </a:p>
@@ -3757,7 +3757,7 @@
           <a:p>
             <a:fld id="{5430F42D-6984-4A4E-9090-AA314D14663F}" type="datetimeFigureOut">
               <a:rPr lang="de-DE" smtClean="0"/>
-              <a:t>12.07.2012</a:t>
+              <a:t>16.07.2012</a:t>
             </a:fld>
             <a:endParaRPr lang="de-DE"/>
           </a:p>
@@ -6679,7 +6679,7 @@
       </p:sp>
       <p:pic>
         <p:nvPicPr>
-          <p:cNvPr id="2" name="Picture 2"/>
+          <p:cNvPr id="1027" name="Picture 3"/>
           <p:cNvPicPr>
             <a:picLocks noChangeAspect="1" noChangeArrowheads="1"/>
           </p:cNvPicPr>
@@ -6700,7 +6700,7 @@
         </p:blipFill>
         <p:spPr bwMode="auto">
           <a:xfrm>
-            <a:off x="253305" y="1219919"/>
+            <a:off x="252413" y="1219919"/>
             <a:ext cx="8639175" cy="5305425"/>
           </a:xfrm>
           <a:prstGeom prst="rect">

</xml_diff>

<commit_message>
first license, preview, some text correction
</commit_message>
<xml_diff>
--- a/text/images/illustrations.pptx
+++ b/text/images/illustrations.pptx
@@ -204,7 +204,7 @@
           <a:p>
             <a:fld id="{7C9ABC5C-FC58-4AE2-89F8-727F30362B08}" type="datetimeFigureOut">
               <a:rPr lang="de-DE" smtClean="0"/>
-              <a:t>16.07.2012</a:t>
+              <a:t>10.08.2012</a:t>
             </a:fld>
             <a:endParaRPr lang="de-DE"/>
           </a:p>
@@ -1325,7 +1325,7 @@
           <a:p>
             <a:fld id="{5430F42D-6984-4A4E-9090-AA314D14663F}" type="datetimeFigureOut">
               <a:rPr lang="de-DE" smtClean="0"/>
-              <a:t>16.07.2012</a:t>
+              <a:t>10.08.2012</a:t>
             </a:fld>
             <a:endParaRPr lang="de-DE"/>
           </a:p>
@@ -1495,7 +1495,7 @@
           <a:p>
             <a:fld id="{5430F42D-6984-4A4E-9090-AA314D14663F}" type="datetimeFigureOut">
               <a:rPr lang="de-DE" smtClean="0"/>
-              <a:t>16.07.2012</a:t>
+              <a:t>10.08.2012</a:t>
             </a:fld>
             <a:endParaRPr lang="de-DE"/>
           </a:p>
@@ -1675,7 +1675,7 @@
           <a:p>
             <a:fld id="{5430F42D-6984-4A4E-9090-AA314D14663F}" type="datetimeFigureOut">
               <a:rPr lang="de-DE" smtClean="0"/>
-              <a:t>16.07.2012</a:t>
+              <a:t>10.08.2012</a:t>
             </a:fld>
             <a:endParaRPr lang="de-DE"/>
           </a:p>
@@ -1845,7 +1845,7 @@
           <a:p>
             <a:fld id="{5430F42D-6984-4A4E-9090-AA314D14663F}" type="datetimeFigureOut">
               <a:rPr lang="de-DE" smtClean="0"/>
-              <a:t>16.07.2012</a:t>
+              <a:t>10.08.2012</a:t>
             </a:fld>
             <a:endParaRPr lang="de-DE"/>
           </a:p>
@@ -2091,7 +2091,7 @@
           <a:p>
             <a:fld id="{5430F42D-6984-4A4E-9090-AA314D14663F}" type="datetimeFigureOut">
               <a:rPr lang="de-DE" smtClean="0"/>
-              <a:t>16.07.2012</a:t>
+              <a:t>10.08.2012</a:t>
             </a:fld>
             <a:endParaRPr lang="de-DE"/>
           </a:p>
@@ -2379,7 +2379,7 @@
           <a:p>
             <a:fld id="{5430F42D-6984-4A4E-9090-AA314D14663F}" type="datetimeFigureOut">
               <a:rPr lang="de-DE" smtClean="0"/>
-              <a:t>16.07.2012</a:t>
+              <a:t>10.08.2012</a:t>
             </a:fld>
             <a:endParaRPr lang="de-DE"/>
           </a:p>
@@ -2801,7 +2801,7 @@
           <a:p>
             <a:fld id="{5430F42D-6984-4A4E-9090-AA314D14663F}" type="datetimeFigureOut">
               <a:rPr lang="de-DE" smtClean="0"/>
-              <a:t>16.07.2012</a:t>
+              <a:t>10.08.2012</a:t>
             </a:fld>
             <a:endParaRPr lang="de-DE"/>
           </a:p>
@@ -2919,7 +2919,7 @@
           <a:p>
             <a:fld id="{5430F42D-6984-4A4E-9090-AA314D14663F}" type="datetimeFigureOut">
               <a:rPr lang="de-DE" smtClean="0"/>
-              <a:t>16.07.2012</a:t>
+              <a:t>10.08.2012</a:t>
             </a:fld>
             <a:endParaRPr lang="de-DE"/>
           </a:p>
@@ -3014,7 +3014,7 @@
           <a:p>
             <a:fld id="{5430F42D-6984-4A4E-9090-AA314D14663F}" type="datetimeFigureOut">
               <a:rPr lang="de-DE" smtClean="0"/>
-              <a:t>16.07.2012</a:t>
+              <a:t>10.08.2012</a:t>
             </a:fld>
             <a:endParaRPr lang="de-DE"/>
           </a:p>
@@ -3291,7 +3291,7 @@
           <a:p>
             <a:fld id="{5430F42D-6984-4A4E-9090-AA314D14663F}" type="datetimeFigureOut">
               <a:rPr lang="de-DE" smtClean="0"/>
-              <a:t>16.07.2012</a:t>
+              <a:t>10.08.2012</a:t>
             </a:fld>
             <a:endParaRPr lang="de-DE"/>
           </a:p>
@@ -3544,7 +3544,7 @@
           <a:p>
             <a:fld id="{5430F42D-6984-4A4E-9090-AA314D14663F}" type="datetimeFigureOut">
               <a:rPr lang="de-DE" smtClean="0"/>
-              <a:t>16.07.2012</a:t>
+              <a:t>10.08.2012</a:t>
             </a:fld>
             <a:endParaRPr lang="de-DE"/>
           </a:p>
@@ -3757,7 +3757,7 @@
           <a:p>
             <a:fld id="{5430F42D-6984-4A4E-9090-AA314D14663F}" type="datetimeFigureOut">
               <a:rPr lang="de-DE" smtClean="0"/>
-              <a:t>16.07.2012</a:t>
+              <a:t>10.08.2012</a:t>
             </a:fld>
             <a:endParaRPr lang="de-DE"/>
           </a:p>
@@ -4421,8 +4421,13 @@
             <a:pPr algn="ctr"/>
             <a:r>
               <a:rPr lang="de-DE" sz="1400" dirty="0" smtClean="0"/>
-              <a:t>CCD: 3</a:t>
-            </a:r>
+              <a:t>CCD: </a:t>
+            </a:r>
+            <a:r>
+              <a:rPr lang="de-DE" sz="1400" dirty="0" smtClean="0"/>
+              <a:t>1</a:t>
+            </a:r>
+            <a:endParaRPr lang="de-DE" sz="1400" dirty="0" smtClean="0"/>
           </a:p>
         </p:txBody>
       </p:sp>
@@ -4470,8 +4475,13 @@
             <a:pPr algn="ctr"/>
             <a:r>
               <a:rPr lang="de-DE" sz="1400" dirty="0" smtClean="0"/>
-              <a:t>CCD: 3</a:t>
-            </a:r>
+              <a:t>CCD: </a:t>
+            </a:r>
+            <a:r>
+              <a:rPr lang="de-DE" sz="1400" dirty="0" smtClean="0"/>
+              <a:t>1</a:t>
+            </a:r>
+            <a:endParaRPr lang="de-DE" sz="1400" dirty="0" smtClean="0"/>
           </a:p>
         </p:txBody>
       </p:sp>

</xml_diff>

<commit_message>
more layout and glossary
</commit_message>
<xml_diff>
--- a/text/images/illustrations.pptx
+++ b/text/images/illustrations.pptx
@@ -205,7 +205,7 @@
           <a:p>
             <a:fld id="{7C9ABC5C-FC58-4AE2-89F8-727F30362B08}" type="datetimeFigureOut">
               <a:rPr lang="de-DE" smtClean="0"/>
-              <a:t>14.08.2012</a:t>
+              <a:t>15.08.2012</a:t>
             </a:fld>
             <a:endParaRPr lang="de-DE"/>
           </a:p>
@@ -1326,7 +1326,7 @@
           <a:p>
             <a:fld id="{5430F42D-6984-4A4E-9090-AA314D14663F}" type="datetimeFigureOut">
               <a:rPr lang="de-DE" smtClean="0"/>
-              <a:t>14.08.2012</a:t>
+              <a:t>15.08.2012</a:t>
             </a:fld>
             <a:endParaRPr lang="de-DE"/>
           </a:p>
@@ -1496,7 +1496,7 @@
           <a:p>
             <a:fld id="{5430F42D-6984-4A4E-9090-AA314D14663F}" type="datetimeFigureOut">
               <a:rPr lang="de-DE" smtClean="0"/>
-              <a:t>14.08.2012</a:t>
+              <a:t>15.08.2012</a:t>
             </a:fld>
             <a:endParaRPr lang="de-DE"/>
           </a:p>
@@ -1676,7 +1676,7 @@
           <a:p>
             <a:fld id="{5430F42D-6984-4A4E-9090-AA314D14663F}" type="datetimeFigureOut">
               <a:rPr lang="de-DE" smtClean="0"/>
-              <a:t>14.08.2012</a:t>
+              <a:t>15.08.2012</a:t>
             </a:fld>
             <a:endParaRPr lang="de-DE"/>
           </a:p>
@@ -1846,7 +1846,7 @@
           <a:p>
             <a:fld id="{5430F42D-6984-4A4E-9090-AA314D14663F}" type="datetimeFigureOut">
               <a:rPr lang="de-DE" smtClean="0"/>
-              <a:t>14.08.2012</a:t>
+              <a:t>15.08.2012</a:t>
             </a:fld>
             <a:endParaRPr lang="de-DE"/>
           </a:p>
@@ -2092,7 +2092,7 @@
           <a:p>
             <a:fld id="{5430F42D-6984-4A4E-9090-AA314D14663F}" type="datetimeFigureOut">
               <a:rPr lang="de-DE" smtClean="0"/>
-              <a:t>14.08.2012</a:t>
+              <a:t>15.08.2012</a:t>
             </a:fld>
             <a:endParaRPr lang="de-DE"/>
           </a:p>
@@ -2380,7 +2380,7 @@
           <a:p>
             <a:fld id="{5430F42D-6984-4A4E-9090-AA314D14663F}" type="datetimeFigureOut">
               <a:rPr lang="de-DE" smtClean="0"/>
-              <a:t>14.08.2012</a:t>
+              <a:t>15.08.2012</a:t>
             </a:fld>
             <a:endParaRPr lang="de-DE"/>
           </a:p>
@@ -2802,7 +2802,7 @@
           <a:p>
             <a:fld id="{5430F42D-6984-4A4E-9090-AA314D14663F}" type="datetimeFigureOut">
               <a:rPr lang="de-DE" smtClean="0"/>
-              <a:t>14.08.2012</a:t>
+              <a:t>15.08.2012</a:t>
             </a:fld>
             <a:endParaRPr lang="de-DE"/>
           </a:p>
@@ -2920,7 +2920,7 @@
           <a:p>
             <a:fld id="{5430F42D-6984-4A4E-9090-AA314D14663F}" type="datetimeFigureOut">
               <a:rPr lang="de-DE" smtClean="0"/>
-              <a:t>14.08.2012</a:t>
+              <a:t>15.08.2012</a:t>
             </a:fld>
             <a:endParaRPr lang="de-DE"/>
           </a:p>
@@ -3015,7 +3015,7 @@
           <a:p>
             <a:fld id="{5430F42D-6984-4A4E-9090-AA314D14663F}" type="datetimeFigureOut">
               <a:rPr lang="de-DE" smtClean="0"/>
-              <a:t>14.08.2012</a:t>
+              <a:t>15.08.2012</a:t>
             </a:fld>
             <a:endParaRPr lang="de-DE"/>
           </a:p>
@@ -3292,7 +3292,7 @@
           <a:p>
             <a:fld id="{5430F42D-6984-4A4E-9090-AA314D14663F}" type="datetimeFigureOut">
               <a:rPr lang="de-DE" smtClean="0"/>
-              <a:t>14.08.2012</a:t>
+              <a:t>15.08.2012</a:t>
             </a:fld>
             <a:endParaRPr lang="de-DE"/>
           </a:p>
@@ -3545,7 +3545,7 @@
           <a:p>
             <a:fld id="{5430F42D-6984-4A4E-9090-AA314D14663F}" type="datetimeFigureOut">
               <a:rPr lang="de-DE" smtClean="0"/>
-              <a:t>14.08.2012</a:t>
+              <a:t>15.08.2012</a:t>
             </a:fld>
             <a:endParaRPr lang="de-DE"/>
           </a:p>
@@ -3758,7 +3758,7 @@
           <a:p>
             <a:fld id="{5430F42D-6984-4A4E-9090-AA314D14663F}" type="datetimeFigureOut">
               <a:rPr lang="de-DE" smtClean="0"/>
-              <a:t>14.08.2012</a:t>
+              <a:t>15.08.2012</a:t>
             </a:fld>
             <a:endParaRPr lang="de-DE"/>
           </a:p>
@@ -7016,1440 +7016,364 @@
           <a:chExt cx="0" cy="0"/>
         </a:xfrm>
       </p:grpSpPr>
-      <p:graphicFrame>
-        <p:nvGraphicFramePr>
-          <p:cNvPr id="5" name="Inhaltsplatzhalter 4"/>
-          <p:cNvGraphicFramePr>
-            <a:graphicFrameLocks noGrp="1"/>
-          </p:cNvGraphicFramePr>
-          <p:nvPr>
-            <p:ph idx="1"/>
-          </p:nvPr>
-        </p:nvGraphicFramePr>
-        <p:xfrm>
-          <a:off x="1917700" y="3196431"/>
-          <a:ext cx="5308600" cy="1333500"/>
-        </p:xfrm>
-        <a:graphic>
-          <a:graphicData uri="http://schemas.openxmlformats.org/drawingml/2006/table">
-            <a:tbl>
-              <a:tblPr/>
-              <a:tblGrid>
-                <a:gridCol w="1346200"/>
-                <a:gridCol w="1358900"/>
-                <a:gridCol w="1447800"/>
-                <a:gridCol w="1155700"/>
-              </a:tblGrid>
-              <a:tr h="190500">
-                <a:tc>
-                  <a:txBody>
-                    <a:bodyPr/>
-                    <a:lstStyle/>
-                    <a:p>
-                      <a:pPr algn="l" fontAlgn="b"/>
-                      <a:r>
-                        <a:rPr lang="de-DE" sz="1100" b="1" i="0" u="none" strike="noStrike">
-                          <a:solidFill>
-                            <a:srgbClr val="FFFFFF"/>
-                          </a:solidFill>
-                          <a:effectLst/>
-                          <a:latin typeface="Calibri"/>
-                        </a:rPr>
-                        <a:t>Projekt</a:t>
-                      </a:r>
-                    </a:p>
-                  </a:txBody>
-                  <a:tcPr marL="9525" marR="9525" marT="9525" marB="0" anchor="b">
-                    <a:lnL w="6350" cap="flat" cmpd="sng" algn="ctr">
-                      <a:solidFill>
-                        <a:srgbClr val="95B3D7"/>
-                      </a:solidFill>
-                      <a:prstDash val="solid"/>
-                      <a:round/>
-                      <a:headEnd type="none" w="med" len="med"/>
-                      <a:tailEnd type="none" w="med" len="med"/>
-                    </a:lnL>
-                    <a:lnR>
-                      <a:noFill/>
-                    </a:lnR>
-                    <a:lnT w="6350" cap="flat" cmpd="sng" algn="ctr">
-                      <a:solidFill>
-                        <a:srgbClr val="95B3D7"/>
-                      </a:solidFill>
-                      <a:prstDash val="solid"/>
-                      <a:round/>
-                      <a:headEnd type="none" w="med" len="med"/>
-                      <a:tailEnd type="none" w="med" len="med"/>
-                    </a:lnT>
-                    <a:lnB w="6350" cap="flat" cmpd="sng" algn="ctr">
-                      <a:solidFill>
-                        <a:srgbClr val="95B3D7"/>
-                      </a:solidFill>
-                      <a:prstDash val="solid"/>
-                      <a:round/>
-                      <a:headEnd type="none" w="med" len="med"/>
-                      <a:tailEnd type="none" w="med" len="med"/>
-                    </a:lnB>
-                    <a:solidFill>
-                      <a:srgbClr val="4F81BD"/>
-                    </a:solidFill>
-                  </a:tcPr>
-                </a:tc>
-                <a:tc>
-                  <a:txBody>
-                    <a:bodyPr/>
-                    <a:lstStyle/>
-                    <a:p>
-                      <a:pPr algn="l" fontAlgn="b"/>
-                      <a:r>
-                        <a:rPr lang="de-DE" sz="1100" b="1" i="0" u="none" strike="noStrike">
-                          <a:solidFill>
-                            <a:srgbClr val="FFFFFF"/>
-                          </a:solidFill>
-                          <a:effectLst/>
-                          <a:latin typeface="Calibri"/>
-                        </a:rPr>
-                        <a:t>Komplette Analyse</a:t>
-                      </a:r>
-                    </a:p>
-                  </a:txBody>
-                  <a:tcPr marL="9525" marR="9525" marT="9525" marB="0" anchor="b">
-                    <a:lnL>
-                      <a:noFill/>
-                    </a:lnL>
-                    <a:lnR>
-                      <a:noFill/>
-                    </a:lnR>
-                    <a:lnT w="6350" cap="flat" cmpd="sng" algn="ctr">
-                      <a:solidFill>
-                        <a:srgbClr val="95B3D7"/>
-                      </a:solidFill>
-                      <a:prstDash val="solid"/>
-                      <a:round/>
-                      <a:headEnd type="none" w="med" len="med"/>
-                      <a:tailEnd type="none" w="med" len="med"/>
-                    </a:lnT>
-                    <a:lnB w="6350" cap="flat" cmpd="sng" algn="ctr">
-                      <a:solidFill>
-                        <a:srgbClr val="95B3D7"/>
-                      </a:solidFill>
-                      <a:prstDash val="solid"/>
-                      <a:round/>
-                      <a:headEnd type="none" w="med" len="med"/>
-                      <a:tailEnd type="none" w="med" len="med"/>
-                    </a:lnB>
-                    <a:solidFill>
-                      <a:srgbClr val="4F81BD"/>
-                    </a:solidFill>
-                  </a:tcPr>
-                </a:tc>
-                <a:tc>
-                  <a:txBody>
-                    <a:bodyPr/>
-                    <a:lstStyle/>
-                    <a:p>
-                      <a:pPr algn="l" fontAlgn="b"/>
-                      <a:r>
-                        <a:rPr lang="de-DE" sz="1100" b="1" i="0" u="none" strike="noStrike">
-                          <a:solidFill>
-                            <a:srgbClr val="FFFFFF"/>
-                          </a:solidFill>
-                          <a:effectLst/>
-                          <a:latin typeface="Calibri"/>
-                        </a:rPr>
-                        <a:t>Assemblies einlesen</a:t>
-                      </a:r>
-                    </a:p>
-                  </a:txBody>
-                  <a:tcPr marL="9525" marR="9525" marT="9525" marB="0" anchor="b">
-                    <a:lnL>
-                      <a:noFill/>
-                    </a:lnL>
-                    <a:lnR>
-                      <a:noFill/>
-                    </a:lnR>
-                    <a:lnT w="6350" cap="flat" cmpd="sng" algn="ctr">
-                      <a:solidFill>
-                        <a:srgbClr val="95B3D7"/>
-                      </a:solidFill>
-                      <a:prstDash val="solid"/>
-                      <a:round/>
-                      <a:headEnd type="none" w="med" len="med"/>
-                      <a:tailEnd type="none" w="med" len="med"/>
-                    </a:lnT>
-                    <a:lnB w="6350" cap="flat" cmpd="sng" algn="ctr">
-                      <a:solidFill>
-                        <a:srgbClr val="95B3D7"/>
-                      </a:solidFill>
-                      <a:prstDash val="solid"/>
-                      <a:round/>
-                      <a:headEnd type="none" w="med" len="med"/>
-                      <a:tailEnd type="none" w="med" len="med"/>
-                    </a:lnB>
-                    <a:solidFill>
-                      <a:srgbClr val="4F81BD"/>
-                    </a:solidFill>
-                  </a:tcPr>
-                </a:tc>
-                <a:tc>
-                  <a:txBody>
-                    <a:bodyPr/>
-                    <a:lstStyle/>
-                    <a:p>
-                      <a:pPr algn="l" fontAlgn="b"/>
-                      <a:r>
-                        <a:rPr lang="de-DE" sz="1100" b="1" i="0" u="none" strike="noStrike">
-                          <a:solidFill>
-                            <a:srgbClr val="FFFFFF"/>
-                          </a:solidFill>
-                          <a:effectLst/>
-                          <a:latin typeface="Calibri"/>
-                        </a:rPr>
-                        <a:t>Post-Processing</a:t>
-                      </a:r>
-                    </a:p>
-                  </a:txBody>
-                  <a:tcPr marL="9525" marR="9525" marT="9525" marB="0" anchor="b">
-                    <a:lnL>
-                      <a:noFill/>
-                    </a:lnL>
-                    <a:lnR w="6350" cap="flat" cmpd="sng" algn="ctr">
-                      <a:solidFill>
-                        <a:srgbClr val="95B3D7"/>
-                      </a:solidFill>
-                      <a:prstDash val="solid"/>
-                      <a:round/>
-                      <a:headEnd type="none" w="med" len="med"/>
-                      <a:tailEnd type="none" w="med" len="med"/>
-                    </a:lnR>
-                    <a:lnT w="6350" cap="flat" cmpd="sng" algn="ctr">
-                      <a:solidFill>
-                        <a:srgbClr val="95B3D7"/>
-                      </a:solidFill>
-                      <a:prstDash val="solid"/>
-                      <a:round/>
-                      <a:headEnd type="none" w="med" len="med"/>
-                      <a:tailEnd type="none" w="med" len="med"/>
-                    </a:lnT>
-                    <a:lnB w="6350" cap="flat" cmpd="sng" algn="ctr">
-                      <a:solidFill>
-                        <a:srgbClr val="95B3D7"/>
-                      </a:solidFill>
-                      <a:prstDash val="solid"/>
-                      <a:round/>
-                      <a:headEnd type="none" w="med" len="med"/>
-                      <a:tailEnd type="none" w="med" len="med"/>
-                    </a:lnB>
-                    <a:solidFill>
-                      <a:srgbClr val="4F81BD"/>
-                    </a:solidFill>
-                  </a:tcPr>
-                </a:tc>
-              </a:tr>
-              <a:tr h="190500">
-                <a:tc>
-                  <a:txBody>
-                    <a:bodyPr/>
-                    <a:lstStyle/>
-                    <a:p>
-                      <a:pPr algn="l" fontAlgn="b"/>
-                      <a:r>
-                        <a:rPr lang="de-DE" sz="1100" b="0" i="0" u="none" strike="noStrike">
-                          <a:solidFill>
-                            <a:srgbClr val="000000"/>
-                          </a:solidFill>
-                          <a:effectLst/>
-                          <a:latin typeface="Calibri"/>
-                        </a:rPr>
-                        <a:t>CciAst</a:t>
-                      </a:r>
-                    </a:p>
-                  </a:txBody>
-                  <a:tcPr marL="9525" marR="9525" marT="9525" marB="0" anchor="b">
-                    <a:lnL w="6350" cap="flat" cmpd="sng" algn="ctr">
-                      <a:solidFill>
-                        <a:srgbClr val="95B3D7"/>
-                      </a:solidFill>
-                      <a:prstDash val="solid"/>
-                      <a:round/>
-                      <a:headEnd type="none" w="med" len="med"/>
-                      <a:tailEnd type="none" w="med" len="med"/>
-                    </a:lnL>
-                    <a:lnR>
-                      <a:noFill/>
-                    </a:lnR>
-                    <a:lnT w="6350" cap="flat" cmpd="sng" algn="ctr">
-                      <a:solidFill>
-                        <a:srgbClr val="95B3D7"/>
-                      </a:solidFill>
-                      <a:prstDash val="solid"/>
-                      <a:round/>
-                      <a:headEnd type="none" w="med" len="med"/>
-                      <a:tailEnd type="none" w="med" len="med"/>
-                    </a:lnT>
-                    <a:lnB w="6350" cap="flat" cmpd="sng" algn="ctr">
-                      <a:solidFill>
-                        <a:srgbClr val="95B3D7"/>
-                      </a:solidFill>
-                      <a:prstDash val="solid"/>
-                      <a:round/>
-                      <a:headEnd type="none" w="med" len="med"/>
-                      <a:tailEnd type="none" w="med" len="med"/>
-                    </a:lnB>
-                    <a:solidFill>
-                      <a:srgbClr val="DCE6F1"/>
-                    </a:solidFill>
-                  </a:tcPr>
-                </a:tc>
-                <a:tc>
-                  <a:txBody>
-                    <a:bodyPr/>
-                    <a:lstStyle/>
-                    <a:p>
-                      <a:pPr algn="ctr" fontAlgn="b"/>
-                      <a:r>
-                        <a:rPr lang="de-DE" sz="1100" b="0" i="0" u="none" strike="noStrike">
-                          <a:solidFill>
-                            <a:srgbClr val="000000"/>
-                          </a:solidFill>
-                          <a:effectLst/>
-                          <a:latin typeface="Calibri"/>
-                        </a:rPr>
-                        <a:t>1311ms</a:t>
-                      </a:r>
-                    </a:p>
-                  </a:txBody>
-                  <a:tcPr marL="9525" marR="9525" marT="9525" marB="0" anchor="b">
-                    <a:lnL>
-                      <a:noFill/>
-                    </a:lnL>
-                    <a:lnR>
-                      <a:noFill/>
-                    </a:lnR>
-                    <a:lnT w="6350" cap="flat" cmpd="sng" algn="ctr">
-                      <a:solidFill>
-                        <a:srgbClr val="95B3D7"/>
-                      </a:solidFill>
-                      <a:prstDash val="solid"/>
-                      <a:round/>
-                      <a:headEnd type="none" w="med" len="med"/>
-                      <a:tailEnd type="none" w="med" len="med"/>
-                    </a:lnT>
-                    <a:lnB w="6350" cap="flat" cmpd="sng" algn="ctr">
-                      <a:solidFill>
-                        <a:srgbClr val="95B3D7"/>
-                      </a:solidFill>
-                      <a:prstDash val="solid"/>
-                      <a:round/>
-                      <a:headEnd type="none" w="med" len="med"/>
-                      <a:tailEnd type="none" w="med" len="med"/>
-                    </a:lnB>
-                    <a:solidFill>
-                      <a:srgbClr val="DCE6F1"/>
-                    </a:solidFill>
-                  </a:tcPr>
-                </a:tc>
-                <a:tc>
-                  <a:txBody>
-                    <a:bodyPr/>
-                    <a:lstStyle/>
-                    <a:p>
-                      <a:pPr algn="ctr" fontAlgn="b"/>
-                      <a:r>
-                        <a:rPr lang="de-DE" sz="1100" b="0" i="0" u="none" strike="noStrike">
-                          <a:solidFill>
-                            <a:srgbClr val="000000"/>
-                          </a:solidFill>
-                          <a:effectLst/>
-                          <a:latin typeface="Calibri"/>
-                        </a:rPr>
-                        <a:t>835ms</a:t>
-                      </a:r>
-                    </a:p>
-                  </a:txBody>
-                  <a:tcPr marL="9525" marR="9525" marT="9525" marB="0" anchor="b">
-                    <a:lnL>
-                      <a:noFill/>
-                    </a:lnL>
-                    <a:lnR>
-                      <a:noFill/>
-                    </a:lnR>
-                    <a:lnT w="6350" cap="flat" cmpd="sng" algn="ctr">
-                      <a:solidFill>
-                        <a:srgbClr val="95B3D7"/>
-                      </a:solidFill>
-                      <a:prstDash val="solid"/>
-                      <a:round/>
-                      <a:headEnd type="none" w="med" len="med"/>
-                      <a:tailEnd type="none" w="med" len="med"/>
-                    </a:lnT>
-                    <a:lnB w="6350" cap="flat" cmpd="sng" algn="ctr">
-                      <a:solidFill>
-                        <a:srgbClr val="95B3D7"/>
-                      </a:solidFill>
-                      <a:prstDash val="solid"/>
-                      <a:round/>
-                      <a:headEnd type="none" w="med" len="med"/>
-                      <a:tailEnd type="none" w="med" len="med"/>
-                    </a:lnB>
-                    <a:solidFill>
-                      <a:srgbClr val="DCE6F1"/>
-                    </a:solidFill>
-                  </a:tcPr>
-                </a:tc>
-                <a:tc>
-                  <a:txBody>
-                    <a:bodyPr/>
-                    <a:lstStyle/>
-                    <a:p>
-                      <a:pPr algn="ctr" fontAlgn="b"/>
-                      <a:r>
-                        <a:rPr lang="de-DE" sz="1100" b="0" i="0" u="none" strike="noStrike">
-                          <a:solidFill>
-                            <a:srgbClr val="000000"/>
-                          </a:solidFill>
-                          <a:effectLst/>
-                          <a:latin typeface="Calibri"/>
-                        </a:rPr>
-                        <a:t>476ms</a:t>
-                      </a:r>
-                    </a:p>
-                  </a:txBody>
-                  <a:tcPr marL="9525" marR="9525" marT="9525" marB="0" anchor="b">
-                    <a:lnL>
-                      <a:noFill/>
-                    </a:lnL>
-                    <a:lnR w="6350" cap="flat" cmpd="sng" algn="ctr">
-                      <a:solidFill>
-                        <a:srgbClr val="95B3D7"/>
-                      </a:solidFill>
-                      <a:prstDash val="solid"/>
-                      <a:round/>
-                      <a:headEnd type="none" w="med" len="med"/>
-                      <a:tailEnd type="none" w="med" len="med"/>
-                    </a:lnR>
-                    <a:lnT w="6350" cap="flat" cmpd="sng" algn="ctr">
-                      <a:solidFill>
-                        <a:srgbClr val="95B3D7"/>
-                      </a:solidFill>
-                      <a:prstDash val="solid"/>
-                      <a:round/>
-                      <a:headEnd type="none" w="med" len="med"/>
-                      <a:tailEnd type="none" w="med" len="med"/>
-                    </a:lnT>
-                    <a:lnB w="6350" cap="flat" cmpd="sng" algn="ctr">
-                      <a:solidFill>
-                        <a:srgbClr val="95B3D7"/>
-                      </a:solidFill>
-                      <a:prstDash val="solid"/>
-                      <a:round/>
-                      <a:headEnd type="none" w="med" len="med"/>
-                      <a:tailEnd type="none" w="med" len="med"/>
-                    </a:lnB>
-                    <a:solidFill>
-                      <a:srgbClr val="DCE6F1"/>
-                    </a:solidFill>
-                  </a:tcPr>
-                </a:tc>
-              </a:tr>
-              <a:tr h="190500">
-                <a:tc>
-                  <a:txBody>
-                    <a:bodyPr/>
-                    <a:lstStyle/>
-                    <a:p>
-                      <a:pPr algn="l" fontAlgn="b"/>
-                      <a:r>
-                        <a:rPr lang="de-DE" sz="1100" b="0" i="0" u="none" strike="noStrike">
-                          <a:solidFill>
-                            <a:srgbClr val="000000"/>
-                          </a:solidFill>
-                          <a:effectLst/>
-                          <a:latin typeface="Calibri"/>
-                        </a:rPr>
-                        <a:t>CciMetadata</a:t>
-                      </a:r>
-                    </a:p>
-                  </a:txBody>
-                  <a:tcPr marL="9525" marR="9525" marT="9525" marB="0" anchor="b">
-                    <a:lnL w="6350" cap="flat" cmpd="sng" algn="ctr">
-                      <a:solidFill>
-                        <a:srgbClr val="95B3D7"/>
-                      </a:solidFill>
-                      <a:prstDash val="solid"/>
-                      <a:round/>
-                      <a:headEnd type="none" w="med" len="med"/>
-                      <a:tailEnd type="none" w="med" len="med"/>
-                    </a:lnL>
-                    <a:lnR>
-                      <a:noFill/>
-                    </a:lnR>
-                    <a:lnT w="6350" cap="flat" cmpd="sng" algn="ctr">
-                      <a:solidFill>
-                        <a:srgbClr val="95B3D7"/>
-                      </a:solidFill>
-                      <a:prstDash val="solid"/>
-                      <a:round/>
-                      <a:headEnd type="none" w="med" len="med"/>
-                      <a:tailEnd type="none" w="med" len="med"/>
-                    </a:lnT>
-                    <a:lnB w="6350" cap="flat" cmpd="sng" algn="ctr">
-                      <a:solidFill>
-                        <a:srgbClr val="95B3D7"/>
-                      </a:solidFill>
-                      <a:prstDash val="solid"/>
-                      <a:round/>
-                      <a:headEnd type="none" w="med" len="med"/>
-                      <a:tailEnd type="none" w="med" len="med"/>
-                    </a:lnB>
-                  </a:tcPr>
-                </a:tc>
-                <a:tc>
-                  <a:txBody>
-                    <a:bodyPr/>
-                    <a:lstStyle/>
-                    <a:p>
-                      <a:pPr algn="ctr" fontAlgn="b"/>
-                      <a:r>
-                        <a:rPr lang="de-DE" sz="1100" b="0" i="0" u="none" strike="noStrike">
-                          <a:solidFill>
-                            <a:srgbClr val="000000"/>
-                          </a:solidFill>
-                          <a:effectLst/>
-                          <a:latin typeface="Calibri"/>
-                        </a:rPr>
-                        <a:t>422ms</a:t>
-                      </a:r>
-                    </a:p>
-                  </a:txBody>
-                  <a:tcPr marL="9525" marR="9525" marT="9525" marB="0" anchor="b">
-                    <a:lnL>
-                      <a:noFill/>
-                    </a:lnL>
-                    <a:lnR>
-                      <a:noFill/>
-                    </a:lnR>
-                    <a:lnT w="6350" cap="flat" cmpd="sng" algn="ctr">
-                      <a:solidFill>
-                        <a:srgbClr val="95B3D7"/>
-                      </a:solidFill>
-                      <a:prstDash val="solid"/>
-                      <a:round/>
-                      <a:headEnd type="none" w="med" len="med"/>
-                      <a:tailEnd type="none" w="med" len="med"/>
-                    </a:lnT>
-                    <a:lnB w="6350" cap="flat" cmpd="sng" algn="ctr">
-                      <a:solidFill>
-                        <a:srgbClr val="95B3D7"/>
-                      </a:solidFill>
-                      <a:prstDash val="solid"/>
-                      <a:round/>
-                      <a:headEnd type="none" w="med" len="med"/>
-                      <a:tailEnd type="none" w="med" len="med"/>
-                    </a:lnB>
-                  </a:tcPr>
-                </a:tc>
-                <a:tc>
-                  <a:txBody>
-                    <a:bodyPr/>
-                    <a:lstStyle/>
-                    <a:p>
-                      <a:pPr algn="ctr" fontAlgn="b"/>
-                      <a:r>
-                        <a:rPr lang="de-DE" sz="1100" b="0" i="0" u="none" strike="noStrike">
-                          <a:solidFill>
-                            <a:srgbClr val="000000"/>
-                          </a:solidFill>
-                          <a:effectLst/>
-                          <a:latin typeface="Calibri"/>
-                        </a:rPr>
-                        <a:t>113ms</a:t>
-                      </a:r>
-                    </a:p>
-                  </a:txBody>
-                  <a:tcPr marL="9525" marR="9525" marT="9525" marB="0" anchor="b">
-                    <a:lnL>
-                      <a:noFill/>
-                    </a:lnL>
-                    <a:lnR>
-                      <a:noFill/>
-                    </a:lnR>
-                    <a:lnT w="6350" cap="flat" cmpd="sng" algn="ctr">
-                      <a:solidFill>
-                        <a:srgbClr val="95B3D7"/>
-                      </a:solidFill>
-                      <a:prstDash val="solid"/>
-                      <a:round/>
-                      <a:headEnd type="none" w="med" len="med"/>
-                      <a:tailEnd type="none" w="med" len="med"/>
-                    </a:lnT>
-                    <a:lnB w="6350" cap="flat" cmpd="sng" algn="ctr">
-                      <a:solidFill>
-                        <a:srgbClr val="95B3D7"/>
-                      </a:solidFill>
-                      <a:prstDash val="solid"/>
-                      <a:round/>
-                      <a:headEnd type="none" w="med" len="med"/>
-                      <a:tailEnd type="none" w="med" len="med"/>
-                    </a:lnB>
-                  </a:tcPr>
-                </a:tc>
-                <a:tc>
-                  <a:txBody>
-                    <a:bodyPr/>
-                    <a:lstStyle/>
-                    <a:p>
-                      <a:pPr algn="ctr" fontAlgn="b"/>
-                      <a:r>
-                        <a:rPr lang="de-DE" sz="1100" b="0" i="0" u="none" strike="noStrike">
-                          <a:solidFill>
-                            <a:srgbClr val="000000"/>
-                          </a:solidFill>
-                          <a:effectLst/>
-                          <a:latin typeface="Calibri"/>
-                        </a:rPr>
-                        <a:t>309ms</a:t>
-                      </a:r>
-                    </a:p>
-                  </a:txBody>
-                  <a:tcPr marL="9525" marR="9525" marT="9525" marB="0" anchor="b">
-                    <a:lnL>
-                      <a:noFill/>
-                    </a:lnL>
-                    <a:lnR w="6350" cap="flat" cmpd="sng" algn="ctr">
-                      <a:solidFill>
-                        <a:srgbClr val="95B3D7"/>
-                      </a:solidFill>
-                      <a:prstDash val="solid"/>
-                      <a:round/>
-                      <a:headEnd type="none" w="med" len="med"/>
-                      <a:tailEnd type="none" w="med" len="med"/>
-                    </a:lnR>
-                    <a:lnT w="6350" cap="flat" cmpd="sng" algn="ctr">
-                      <a:solidFill>
-                        <a:srgbClr val="95B3D7"/>
-                      </a:solidFill>
-                      <a:prstDash val="solid"/>
-                      <a:round/>
-                      <a:headEnd type="none" w="med" len="med"/>
-                      <a:tailEnd type="none" w="med" len="med"/>
-                    </a:lnT>
-                    <a:lnB w="6350" cap="flat" cmpd="sng" algn="ctr">
-                      <a:solidFill>
-                        <a:srgbClr val="95B3D7"/>
-                      </a:solidFill>
-                      <a:prstDash val="solid"/>
-                      <a:round/>
-                      <a:headEnd type="none" w="med" len="med"/>
-                      <a:tailEnd type="none" w="med" len="med"/>
-                    </a:lnB>
-                  </a:tcPr>
-                </a:tc>
-              </a:tr>
-              <a:tr h="190500">
-                <a:tc>
-                  <a:txBody>
-                    <a:bodyPr/>
-                    <a:lstStyle/>
-                    <a:p>
-                      <a:pPr algn="l" fontAlgn="b"/>
-                      <a:r>
-                        <a:rPr lang="de-DE" sz="1100" b="0" i="0" u="none" strike="noStrike">
-                          <a:solidFill>
-                            <a:srgbClr val="000000"/>
-                          </a:solidFill>
-                          <a:effectLst/>
-                          <a:latin typeface="Calibri"/>
-                        </a:rPr>
-                        <a:t>GraphSharp</a:t>
-                      </a:r>
-                    </a:p>
-                  </a:txBody>
-                  <a:tcPr marL="9525" marR="9525" marT="9525" marB="0" anchor="b">
-                    <a:lnL w="6350" cap="flat" cmpd="sng" algn="ctr">
-                      <a:solidFill>
-                        <a:srgbClr val="95B3D7"/>
-                      </a:solidFill>
-                      <a:prstDash val="solid"/>
-                      <a:round/>
-                      <a:headEnd type="none" w="med" len="med"/>
-                      <a:tailEnd type="none" w="med" len="med"/>
-                    </a:lnL>
-                    <a:lnR>
-                      <a:noFill/>
-                    </a:lnR>
-                    <a:lnT w="6350" cap="flat" cmpd="sng" algn="ctr">
-                      <a:solidFill>
-                        <a:srgbClr val="95B3D7"/>
-                      </a:solidFill>
-                      <a:prstDash val="solid"/>
-                      <a:round/>
-                      <a:headEnd type="none" w="med" len="med"/>
-                      <a:tailEnd type="none" w="med" len="med"/>
-                    </a:lnT>
-                    <a:lnB w="6350" cap="flat" cmpd="sng" algn="ctr">
-                      <a:solidFill>
-                        <a:srgbClr val="95B3D7"/>
-                      </a:solidFill>
-                      <a:prstDash val="solid"/>
-                      <a:round/>
-                      <a:headEnd type="none" w="med" len="med"/>
-                      <a:tailEnd type="none" w="med" len="med"/>
-                    </a:lnB>
-                    <a:solidFill>
-                      <a:srgbClr val="DCE6F1"/>
-                    </a:solidFill>
-                  </a:tcPr>
-                </a:tc>
-                <a:tc>
-                  <a:txBody>
-                    <a:bodyPr/>
-                    <a:lstStyle/>
-                    <a:p>
-                      <a:pPr algn="ctr" fontAlgn="b"/>
-                      <a:r>
-                        <a:rPr lang="de-DE" sz="1100" b="0" i="0" u="none" strike="noStrike">
-                          <a:solidFill>
-                            <a:srgbClr val="000000"/>
-                          </a:solidFill>
-                          <a:effectLst/>
-                          <a:latin typeface="Calibri"/>
-                        </a:rPr>
-                        <a:t>313ms</a:t>
-                      </a:r>
-                    </a:p>
-                  </a:txBody>
-                  <a:tcPr marL="9525" marR="9525" marT="9525" marB="0" anchor="b">
-                    <a:lnL>
-                      <a:noFill/>
-                    </a:lnL>
-                    <a:lnR>
-                      <a:noFill/>
-                    </a:lnR>
-                    <a:lnT w="6350" cap="flat" cmpd="sng" algn="ctr">
-                      <a:solidFill>
-                        <a:srgbClr val="95B3D7"/>
-                      </a:solidFill>
-                      <a:prstDash val="solid"/>
-                      <a:round/>
-                      <a:headEnd type="none" w="med" len="med"/>
-                      <a:tailEnd type="none" w="med" len="med"/>
-                    </a:lnT>
-                    <a:lnB w="6350" cap="flat" cmpd="sng" algn="ctr">
-                      <a:solidFill>
-                        <a:srgbClr val="95B3D7"/>
-                      </a:solidFill>
-                      <a:prstDash val="solid"/>
-                      <a:round/>
-                      <a:headEnd type="none" w="med" len="med"/>
-                      <a:tailEnd type="none" w="med" len="med"/>
-                    </a:lnB>
-                    <a:solidFill>
-                      <a:srgbClr val="DCE6F1"/>
-                    </a:solidFill>
-                  </a:tcPr>
-                </a:tc>
-                <a:tc>
-                  <a:txBody>
-                    <a:bodyPr/>
-                    <a:lstStyle/>
-                    <a:p>
-                      <a:pPr algn="ctr" fontAlgn="b"/>
-                      <a:r>
-                        <a:rPr lang="de-DE" sz="1100" b="0" i="0" u="none" strike="noStrike">
-                          <a:solidFill>
-                            <a:srgbClr val="000000"/>
-                          </a:solidFill>
-                          <a:effectLst/>
-                          <a:latin typeface="Calibri"/>
-                        </a:rPr>
-                        <a:t>293ms</a:t>
-                      </a:r>
-                    </a:p>
-                  </a:txBody>
-                  <a:tcPr marL="9525" marR="9525" marT="9525" marB="0" anchor="b">
-                    <a:lnL>
-                      <a:noFill/>
-                    </a:lnL>
-                    <a:lnR>
-                      <a:noFill/>
-                    </a:lnR>
-                    <a:lnT w="6350" cap="flat" cmpd="sng" algn="ctr">
-                      <a:solidFill>
-                        <a:srgbClr val="95B3D7"/>
-                      </a:solidFill>
-                      <a:prstDash val="solid"/>
-                      <a:round/>
-                      <a:headEnd type="none" w="med" len="med"/>
-                      <a:tailEnd type="none" w="med" len="med"/>
-                    </a:lnT>
-                    <a:lnB w="6350" cap="flat" cmpd="sng" algn="ctr">
-                      <a:solidFill>
-                        <a:srgbClr val="95B3D7"/>
-                      </a:solidFill>
-                      <a:prstDash val="solid"/>
-                      <a:round/>
-                      <a:headEnd type="none" w="med" len="med"/>
-                      <a:tailEnd type="none" w="med" len="med"/>
-                    </a:lnB>
-                    <a:solidFill>
-                      <a:srgbClr val="DCE6F1"/>
-                    </a:solidFill>
-                  </a:tcPr>
-                </a:tc>
-                <a:tc>
-                  <a:txBody>
-                    <a:bodyPr/>
-                    <a:lstStyle/>
-                    <a:p>
-                      <a:pPr algn="ctr" fontAlgn="b"/>
-                      <a:r>
-                        <a:rPr lang="de-DE" sz="1100" b="0" i="0" u="none" strike="noStrike">
-                          <a:solidFill>
-                            <a:srgbClr val="000000"/>
-                          </a:solidFill>
-                          <a:effectLst/>
-                          <a:latin typeface="Calibri"/>
-                        </a:rPr>
-                        <a:t>20ms</a:t>
-                      </a:r>
-                    </a:p>
-                  </a:txBody>
-                  <a:tcPr marL="9525" marR="9525" marT="9525" marB="0" anchor="b">
-                    <a:lnL>
-                      <a:noFill/>
-                    </a:lnL>
-                    <a:lnR w="6350" cap="flat" cmpd="sng" algn="ctr">
-                      <a:solidFill>
-                        <a:srgbClr val="95B3D7"/>
-                      </a:solidFill>
-                      <a:prstDash val="solid"/>
-                      <a:round/>
-                      <a:headEnd type="none" w="med" len="med"/>
-                      <a:tailEnd type="none" w="med" len="med"/>
-                    </a:lnR>
-                    <a:lnT w="6350" cap="flat" cmpd="sng" algn="ctr">
-                      <a:solidFill>
-                        <a:srgbClr val="95B3D7"/>
-                      </a:solidFill>
-                      <a:prstDash val="solid"/>
-                      <a:round/>
-                      <a:headEnd type="none" w="med" len="med"/>
-                      <a:tailEnd type="none" w="med" len="med"/>
-                    </a:lnT>
-                    <a:lnB w="6350" cap="flat" cmpd="sng" algn="ctr">
-                      <a:solidFill>
-                        <a:srgbClr val="95B3D7"/>
-                      </a:solidFill>
-                      <a:prstDash val="solid"/>
-                      <a:round/>
-                      <a:headEnd type="none" w="med" len="med"/>
-                      <a:tailEnd type="none" w="med" len="med"/>
-                    </a:lnB>
-                    <a:solidFill>
-                      <a:srgbClr val="DCE6F1"/>
-                    </a:solidFill>
-                  </a:tcPr>
-                </a:tc>
-              </a:tr>
-              <a:tr h="190500">
-                <a:tc>
-                  <a:txBody>
-                    <a:bodyPr/>
-                    <a:lstStyle/>
-                    <a:p>
-                      <a:pPr algn="l" fontAlgn="b"/>
-                      <a:r>
-                        <a:rPr lang="de-DE" sz="1100" b="0" i="0" u="none" strike="noStrike">
-                          <a:solidFill>
-                            <a:srgbClr val="000000"/>
-                          </a:solidFill>
-                          <a:effectLst/>
-                          <a:latin typeface="Calibri"/>
-                        </a:rPr>
-                        <a:t>QuickGraph</a:t>
-                      </a:r>
-                    </a:p>
-                  </a:txBody>
-                  <a:tcPr marL="9525" marR="9525" marT="9525" marB="0" anchor="b">
-                    <a:lnL w="6350" cap="flat" cmpd="sng" algn="ctr">
-                      <a:solidFill>
-                        <a:srgbClr val="95B3D7"/>
-                      </a:solidFill>
-                      <a:prstDash val="solid"/>
-                      <a:round/>
-                      <a:headEnd type="none" w="med" len="med"/>
-                      <a:tailEnd type="none" w="med" len="med"/>
-                    </a:lnL>
-                    <a:lnR>
-                      <a:noFill/>
-                    </a:lnR>
-                    <a:lnT w="6350" cap="flat" cmpd="sng" algn="ctr">
-                      <a:solidFill>
-                        <a:srgbClr val="95B3D7"/>
-                      </a:solidFill>
-                      <a:prstDash val="solid"/>
-                      <a:round/>
-                      <a:headEnd type="none" w="med" len="med"/>
-                      <a:tailEnd type="none" w="med" len="med"/>
-                    </a:lnT>
-                    <a:lnB w="6350" cap="flat" cmpd="sng" algn="ctr">
-                      <a:solidFill>
-                        <a:srgbClr val="95B3D7"/>
-                      </a:solidFill>
-                      <a:prstDash val="solid"/>
-                      <a:round/>
-                      <a:headEnd type="none" w="med" len="med"/>
-                      <a:tailEnd type="none" w="med" len="med"/>
-                    </a:lnB>
-                  </a:tcPr>
-                </a:tc>
-                <a:tc>
-                  <a:txBody>
-                    <a:bodyPr/>
-                    <a:lstStyle/>
-                    <a:p>
-                      <a:pPr algn="ctr" fontAlgn="b"/>
-                      <a:r>
-                        <a:rPr lang="de-DE" sz="1100" b="0" i="0" u="none" strike="noStrike">
-                          <a:solidFill>
-                            <a:srgbClr val="000000"/>
-                          </a:solidFill>
-                          <a:effectLst/>
-                          <a:latin typeface="Calibri"/>
-                        </a:rPr>
-                        <a:t>708ms</a:t>
-                      </a:r>
-                    </a:p>
-                  </a:txBody>
-                  <a:tcPr marL="9525" marR="9525" marT="9525" marB="0" anchor="b">
-                    <a:lnL>
-                      <a:noFill/>
-                    </a:lnL>
-                    <a:lnR>
-                      <a:noFill/>
-                    </a:lnR>
-                    <a:lnT w="6350" cap="flat" cmpd="sng" algn="ctr">
-                      <a:solidFill>
-                        <a:srgbClr val="95B3D7"/>
-                      </a:solidFill>
-                      <a:prstDash val="solid"/>
-                      <a:round/>
-                      <a:headEnd type="none" w="med" len="med"/>
-                      <a:tailEnd type="none" w="med" len="med"/>
-                    </a:lnT>
-                    <a:lnB w="6350" cap="flat" cmpd="sng" algn="ctr">
-                      <a:solidFill>
-                        <a:srgbClr val="95B3D7"/>
-                      </a:solidFill>
-                      <a:prstDash val="solid"/>
-                      <a:round/>
-                      <a:headEnd type="none" w="med" len="med"/>
-                      <a:tailEnd type="none" w="med" len="med"/>
-                    </a:lnB>
-                  </a:tcPr>
-                </a:tc>
-                <a:tc>
-                  <a:txBody>
-                    <a:bodyPr/>
-                    <a:lstStyle/>
-                    <a:p>
-                      <a:pPr algn="ctr" fontAlgn="b"/>
-                      <a:r>
-                        <a:rPr lang="de-DE" sz="1100" b="0" i="0" u="none" strike="noStrike">
-                          <a:solidFill>
-                            <a:srgbClr val="000000"/>
-                          </a:solidFill>
-                          <a:effectLst/>
-                          <a:latin typeface="Calibri"/>
-                        </a:rPr>
-                        <a:t>667ms</a:t>
-                      </a:r>
-                    </a:p>
-                  </a:txBody>
-                  <a:tcPr marL="9525" marR="9525" marT="9525" marB="0" anchor="b">
-                    <a:lnL>
-                      <a:noFill/>
-                    </a:lnL>
-                    <a:lnR>
-                      <a:noFill/>
-                    </a:lnR>
-                    <a:lnT w="6350" cap="flat" cmpd="sng" algn="ctr">
-                      <a:solidFill>
-                        <a:srgbClr val="95B3D7"/>
-                      </a:solidFill>
-                      <a:prstDash val="solid"/>
-                      <a:round/>
-                      <a:headEnd type="none" w="med" len="med"/>
-                      <a:tailEnd type="none" w="med" len="med"/>
-                    </a:lnT>
-                    <a:lnB w="6350" cap="flat" cmpd="sng" algn="ctr">
-                      <a:solidFill>
-                        <a:srgbClr val="95B3D7"/>
-                      </a:solidFill>
-                      <a:prstDash val="solid"/>
-                      <a:round/>
-                      <a:headEnd type="none" w="med" len="med"/>
-                      <a:tailEnd type="none" w="med" len="med"/>
-                    </a:lnB>
-                  </a:tcPr>
-                </a:tc>
-                <a:tc>
-                  <a:txBody>
-                    <a:bodyPr/>
-                    <a:lstStyle/>
-                    <a:p>
-                      <a:pPr algn="ctr" fontAlgn="b"/>
-                      <a:r>
-                        <a:rPr lang="de-DE" sz="1100" b="0" i="0" u="none" strike="noStrike">
-                          <a:solidFill>
-                            <a:srgbClr val="000000"/>
-                          </a:solidFill>
-                          <a:effectLst/>
-                          <a:latin typeface="Calibri"/>
-                        </a:rPr>
-                        <a:t>41ms</a:t>
-                      </a:r>
-                    </a:p>
-                  </a:txBody>
-                  <a:tcPr marL="9525" marR="9525" marT="9525" marB="0" anchor="b">
-                    <a:lnL>
-                      <a:noFill/>
-                    </a:lnL>
-                    <a:lnR w="6350" cap="flat" cmpd="sng" algn="ctr">
-                      <a:solidFill>
-                        <a:srgbClr val="95B3D7"/>
-                      </a:solidFill>
-                      <a:prstDash val="solid"/>
-                      <a:round/>
-                      <a:headEnd type="none" w="med" len="med"/>
-                      <a:tailEnd type="none" w="med" len="med"/>
-                    </a:lnR>
-                    <a:lnT w="6350" cap="flat" cmpd="sng" algn="ctr">
-                      <a:solidFill>
-                        <a:srgbClr val="95B3D7"/>
-                      </a:solidFill>
-                      <a:prstDash val="solid"/>
-                      <a:round/>
-                      <a:headEnd type="none" w="med" len="med"/>
-                      <a:tailEnd type="none" w="med" len="med"/>
-                    </a:lnT>
-                    <a:lnB w="6350" cap="flat" cmpd="sng" algn="ctr">
-                      <a:solidFill>
-                        <a:srgbClr val="95B3D7"/>
-                      </a:solidFill>
-                      <a:prstDash val="solid"/>
-                      <a:round/>
-                      <a:headEnd type="none" w="med" len="med"/>
-                      <a:tailEnd type="none" w="med" len="med"/>
-                    </a:lnB>
-                  </a:tcPr>
-                </a:tc>
-              </a:tr>
-              <a:tr h="190500">
-                <a:tc>
-                  <a:txBody>
-                    <a:bodyPr/>
-                    <a:lstStyle/>
-                    <a:p>
-                      <a:pPr algn="l" fontAlgn="b"/>
-                      <a:r>
-                        <a:rPr lang="de-DE" sz="1100" b="0" i="0" u="none" strike="noStrike">
-                          <a:solidFill>
-                            <a:srgbClr val="000000"/>
-                          </a:solidFill>
-                          <a:effectLst/>
-                          <a:latin typeface="Calibri"/>
-                        </a:rPr>
-                        <a:t>Usus.net (mit PDBs)</a:t>
-                      </a:r>
-                    </a:p>
-                  </a:txBody>
-                  <a:tcPr marL="9525" marR="9525" marT="9525" marB="0" anchor="b">
-                    <a:lnL w="6350" cap="flat" cmpd="sng" algn="ctr">
-                      <a:solidFill>
-                        <a:srgbClr val="95B3D7"/>
-                      </a:solidFill>
-                      <a:prstDash val="solid"/>
-                      <a:round/>
-                      <a:headEnd type="none" w="med" len="med"/>
-                      <a:tailEnd type="none" w="med" len="med"/>
-                    </a:lnL>
-                    <a:lnR>
-                      <a:noFill/>
-                    </a:lnR>
-                    <a:lnT w="6350" cap="flat" cmpd="sng" algn="ctr">
-                      <a:solidFill>
-                        <a:srgbClr val="95B3D7"/>
-                      </a:solidFill>
-                      <a:prstDash val="solid"/>
-                      <a:round/>
-                      <a:headEnd type="none" w="med" len="med"/>
-                      <a:tailEnd type="none" w="med" len="med"/>
-                    </a:lnT>
-                    <a:lnB w="6350" cap="flat" cmpd="sng" algn="ctr">
-                      <a:solidFill>
-                        <a:srgbClr val="95B3D7"/>
-                      </a:solidFill>
-                      <a:prstDash val="solid"/>
-                      <a:round/>
-                      <a:headEnd type="none" w="med" len="med"/>
-                      <a:tailEnd type="none" w="med" len="med"/>
-                    </a:lnB>
-                    <a:solidFill>
-                      <a:srgbClr val="DCE6F1"/>
-                    </a:solidFill>
-                  </a:tcPr>
-                </a:tc>
-                <a:tc>
-                  <a:txBody>
-                    <a:bodyPr/>
-                    <a:lstStyle/>
-                    <a:p>
-                      <a:pPr algn="ctr" fontAlgn="b"/>
-                      <a:r>
-                        <a:rPr lang="de-DE" sz="1100" b="0" i="0" u="none" strike="noStrike">
-                          <a:solidFill>
-                            <a:srgbClr val="000000"/>
-                          </a:solidFill>
-                          <a:effectLst/>
-                          <a:latin typeface="Calibri"/>
-                        </a:rPr>
-                        <a:t>878ms</a:t>
-                      </a:r>
-                    </a:p>
-                  </a:txBody>
-                  <a:tcPr marL="9525" marR="9525" marT="9525" marB="0" anchor="b">
-                    <a:lnL>
-                      <a:noFill/>
-                    </a:lnL>
-                    <a:lnR>
-                      <a:noFill/>
-                    </a:lnR>
-                    <a:lnT w="6350" cap="flat" cmpd="sng" algn="ctr">
-                      <a:solidFill>
-                        <a:srgbClr val="95B3D7"/>
-                      </a:solidFill>
-                      <a:prstDash val="solid"/>
-                      <a:round/>
-                      <a:headEnd type="none" w="med" len="med"/>
-                      <a:tailEnd type="none" w="med" len="med"/>
-                    </a:lnT>
-                    <a:lnB w="6350" cap="flat" cmpd="sng" algn="ctr">
-                      <a:solidFill>
-                        <a:srgbClr val="95B3D7"/>
-                      </a:solidFill>
-                      <a:prstDash val="solid"/>
-                      <a:round/>
-                      <a:headEnd type="none" w="med" len="med"/>
-                      <a:tailEnd type="none" w="med" len="med"/>
-                    </a:lnB>
-                    <a:solidFill>
-                      <a:srgbClr val="DCE6F1"/>
-                    </a:solidFill>
-                  </a:tcPr>
-                </a:tc>
-                <a:tc>
-                  <a:txBody>
-                    <a:bodyPr/>
-                    <a:lstStyle/>
-                    <a:p>
-                      <a:pPr algn="ctr" fontAlgn="b"/>
-                      <a:r>
-                        <a:rPr lang="de-DE" sz="1100" b="0" i="0" u="none" strike="noStrike">
-                          <a:solidFill>
-                            <a:srgbClr val="000000"/>
-                          </a:solidFill>
-                          <a:effectLst/>
-                          <a:latin typeface="Calibri"/>
-                        </a:rPr>
-                        <a:t>835ms</a:t>
-                      </a:r>
-                    </a:p>
-                  </a:txBody>
-                  <a:tcPr marL="9525" marR="9525" marT="9525" marB="0" anchor="b">
-                    <a:lnL>
-                      <a:noFill/>
-                    </a:lnL>
-                    <a:lnR>
-                      <a:noFill/>
-                    </a:lnR>
-                    <a:lnT w="6350" cap="flat" cmpd="sng" algn="ctr">
-                      <a:solidFill>
-                        <a:srgbClr val="95B3D7"/>
-                      </a:solidFill>
-                      <a:prstDash val="solid"/>
-                      <a:round/>
-                      <a:headEnd type="none" w="med" len="med"/>
-                      <a:tailEnd type="none" w="med" len="med"/>
-                    </a:lnT>
-                    <a:lnB w="6350" cap="flat" cmpd="sng" algn="ctr">
-                      <a:solidFill>
-                        <a:srgbClr val="95B3D7"/>
-                      </a:solidFill>
-                      <a:prstDash val="solid"/>
-                      <a:round/>
-                      <a:headEnd type="none" w="med" len="med"/>
-                      <a:tailEnd type="none" w="med" len="med"/>
-                    </a:lnB>
-                    <a:solidFill>
-                      <a:srgbClr val="DCE6F1"/>
-                    </a:solidFill>
-                  </a:tcPr>
-                </a:tc>
-                <a:tc>
-                  <a:txBody>
-                    <a:bodyPr/>
-                    <a:lstStyle/>
-                    <a:p>
-                      <a:pPr algn="ctr" fontAlgn="b"/>
-                      <a:r>
-                        <a:rPr lang="de-DE" sz="1100" b="0" i="0" u="none" strike="noStrike">
-                          <a:solidFill>
-                            <a:srgbClr val="000000"/>
-                          </a:solidFill>
-                          <a:effectLst/>
-                          <a:latin typeface="Calibri"/>
-                        </a:rPr>
-                        <a:t>43ms</a:t>
-                      </a:r>
-                    </a:p>
-                  </a:txBody>
-                  <a:tcPr marL="9525" marR="9525" marT="9525" marB="0" anchor="b">
-                    <a:lnL>
-                      <a:noFill/>
-                    </a:lnL>
-                    <a:lnR w="6350" cap="flat" cmpd="sng" algn="ctr">
-                      <a:solidFill>
-                        <a:srgbClr val="95B3D7"/>
-                      </a:solidFill>
-                      <a:prstDash val="solid"/>
-                      <a:round/>
-                      <a:headEnd type="none" w="med" len="med"/>
-                      <a:tailEnd type="none" w="med" len="med"/>
-                    </a:lnR>
-                    <a:lnT w="6350" cap="flat" cmpd="sng" algn="ctr">
-                      <a:solidFill>
-                        <a:srgbClr val="95B3D7"/>
-                      </a:solidFill>
-                      <a:prstDash val="solid"/>
-                      <a:round/>
-                      <a:headEnd type="none" w="med" len="med"/>
-                      <a:tailEnd type="none" w="med" len="med"/>
-                    </a:lnT>
-                    <a:lnB w="6350" cap="flat" cmpd="sng" algn="ctr">
-                      <a:solidFill>
-                        <a:srgbClr val="95B3D7"/>
-                      </a:solidFill>
-                      <a:prstDash val="solid"/>
-                      <a:round/>
-                      <a:headEnd type="none" w="med" len="med"/>
-                      <a:tailEnd type="none" w="med" len="med"/>
-                    </a:lnB>
-                    <a:solidFill>
-                      <a:srgbClr val="DCE6F1"/>
-                    </a:solidFill>
-                  </a:tcPr>
-                </a:tc>
-              </a:tr>
-              <a:tr h="190500">
-                <a:tc>
-                  <a:txBody>
-                    <a:bodyPr/>
-                    <a:lstStyle/>
-                    <a:p>
-                      <a:pPr algn="l" fontAlgn="b"/>
-                      <a:r>
-                        <a:rPr lang="de-DE" sz="1100" b="0" i="0" u="none" strike="noStrike">
-                          <a:solidFill>
-                            <a:srgbClr val="000000"/>
-                          </a:solidFill>
-                          <a:effectLst/>
-                          <a:latin typeface="Calibri"/>
-                        </a:rPr>
-                        <a:t>Usus.net (ohne PDBs)</a:t>
-                      </a:r>
-                    </a:p>
-                  </a:txBody>
-                  <a:tcPr marL="9525" marR="9525" marT="9525" marB="0" anchor="b">
-                    <a:lnL w="6350" cap="flat" cmpd="sng" algn="ctr">
-                      <a:solidFill>
-                        <a:srgbClr val="95B3D7"/>
-                      </a:solidFill>
-                      <a:prstDash val="solid"/>
-                      <a:round/>
-                      <a:headEnd type="none" w="med" len="med"/>
-                      <a:tailEnd type="none" w="med" len="med"/>
-                    </a:lnL>
-                    <a:lnR>
-                      <a:noFill/>
-                    </a:lnR>
-                    <a:lnT w="6350" cap="flat" cmpd="sng" algn="ctr">
-                      <a:solidFill>
-                        <a:srgbClr val="95B3D7"/>
-                      </a:solidFill>
-                      <a:prstDash val="solid"/>
-                      <a:round/>
-                      <a:headEnd type="none" w="med" len="med"/>
-                      <a:tailEnd type="none" w="med" len="med"/>
-                    </a:lnT>
-                    <a:lnB w="6350" cap="flat" cmpd="sng" algn="ctr">
-                      <a:solidFill>
-                        <a:srgbClr val="95B3D7"/>
-                      </a:solidFill>
-                      <a:prstDash val="solid"/>
-                      <a:round/>
-                      <a:headEnd type="none" w="med" len="med"/>
-                      <a:tailEnd type="none" w="med" len="med"/>
-                    </a:lnB>
-                  </a:tcPr>
-                </a:tc>
-                <a:tc>
-                  <a:txBody>
-                    <a:bodyPr/>
-                    <a:lstStyle/>
-                    <a:p>
-                      <a:pPr algn="ctr" fontAlgn="b"/>
-                      <a:r>
-                        <a:rPr lang="de-DE" sz="1100" b="0" i="0" u="none" strike="noStrike">
-                          <a:solidFill>
-                            <a:srgbClr val="000000"/>
-                          </a:solidFill>
-                          <a:effectLst/>
-                          <a:latin typeface="Calibri"/>
-                        </a:rPr>
-                        <a:t>577ms</a:t>
-                      </a:r>
-                    </a:p>
-                  </a:txBody>
-                  <a:tcPr marL="9525" marR="9525" marT="9525" marB="0" anchor="b">
-                    <a:lnL>
-                      <a:noFill/>
-                    </a:lnL>
-                    <a:lnR>
-                      <a:noFill/>
-                    </a:lnR>
-                    <a:lnT w="6350" cap="flat" cmpd="sng" algn="ctr">
-                      <a:solidFill>
-                        <a:srgbClr val="95B3D7"/>
-                      </a:solidFill>
-                      <a:prstDash val="solid"/>
-                      <a:round/>
-                      <a:headEnd type="none" w="med" len="med"/>
-                      <a:tailEnd type="none" w="med" len="med"/>
-                    </a:lnT>
-                    <a:lnB w="6350" cap="flat" cmpd="sng" algn="ctr">
-                      <a:solidFill>
-                        <a:srgbClr val="95B3D7"/>
-                      </a:solidFill>
-                      <a:prstDash val="solid"/>
-                      <a:round/>
-                      <a:headEnd type="none" w="med" len="med"/>
-                      <a:tailEnd type="none" w="med" len="med"/>
-                    </a:lnB>
-                  </a:tcPr>
-                </a:tc>
-                <a:tc>
-                  <a:txBody>
-                    <a:bodyPr/>
-                    <a:lstStyle/>
-                    <a:p>
-                      <a:pPr algn="ctr" fontAlgn="b"/>
-                      <a:r>
-                        <a:rPr lang="de-DE" sz="1100" b="0" i="0" u="none" strike="noStrike">
-                          <a:solidFill>
-                            <a:srgbClr val="000000"/>
-                          </a:solidFill>
-                          <a:effectLst/>
-                          <a:latin typeface="Calibri"/>
-                        </a:rPr>
-                        <a:t>532ms</a:t>
-                      </a:r>
-                    </a:p>
-                  </a:txBody>
-                  <a:tcPr marL="9525" marR="9525" marT="9525" marB="0" anchor="b">
-                    <a:lnL>
-                      <a:noFill/>
-                    </a:lnL>
-                    <a:lnR>
-                      <a:noFill/>
-                    </a:lnR>
-                    <a:lnT w="6350" cap="flat" cmpd="sng" algn="ctr">
-                      <a:solidFill>
-                        <a:srgbClr val="95B3D7"/>
-                      </a:solidFill>
-                      <a:prstDash val="solid"/>
-                      <a:round/>
-                      <a:headEnd type="none" w="med" len="med"/>
-                      <a:tailEnd type="none" w="med" len="med"/>
-                    </a:lnT>
-                    <a:lnB w="6350" cap="flat" cmpd="sng" algn="ctr">
-                      <a:solidFill>
-                        <a:srgbClr val="95B3D7"/>
-                      </a:solidFill>
-                      <a:prstDash val="solid"/>
-                      <a:round/>
-                      <a:headEnd type="none" w="med" len="med"/>
-                      <a:tailEnd type="none" w="med" len="med"/>
-                    </a:lnB>
-                  </a:tcPr>
-                </a:tc>
-                <a:tc>
-                  <a:txBody>
-                    <a:bodyPr/>
-                    <a:lstStyle/>
-                    <a:p>
-                      <a:pPr algn="ctr" fontAlgn="b"/>
-                      <a:r>
-                        <a:rPr lang="de-DE" sz="1100" b="0" i="0" u="none" strike="noStrike" dirty="0">
-                          <a:solidFill>
-                            <a:srgbClr val="000000"/>
-                          </a:solidFill>
-                          <a:effectLst/>
-                          <a:latin typeface="Calibri"/>
-                        </a:rPr>
-                        <a:t>45ms</a:t>
-                      </a:r>
-                    </a:p>
-                  </a:txBody>
-                  <a:tcPr marL="9525" marR="9525" marT="9525" marB="0" anchor="b">
-                    <a:lnL>
-                      <a:noFill/>
-                    </a:lnL>
-                    <a:lnR w="6350" cap="flat" cmpd="sng" algn="ctr">
-                      <a:solidFill>
-                        <a:srgbClr val="95B3D7"/>
-                      </a:solidFill>
-                      <a:prstDash val="solid"/>
-                      <a:round/>
-                      <a:headEnd type="none" w="med" len="med"/>
-                      <a:tailEnd type="none" w="med" len="med"/>
-                    </a:lnR>
-                    <a:lnT w="6350" cap="flat" cmpd="sng" algn="ctr">
-                      <a:solidFill>
-                        <a:srgbClr val="95B3D7"/>
-                      </a:solidFill>
-                      <a:prstDash val="solid"/>
-                      <a:round/>
-                      <a:headEnd type="none" w="med" len="med"/>
-                      <a:tailEnd type="none" w="med" len="med"/>
-                    </a:lnT>
-                    <a:lnB w="6350" cap="flat" cmpd="sng" algn="ctr">
-                      <a:solidFill>
-                        <a:srgbClr val="95B3D7"/>
-                      </a:solidFill>
-                      <a:prstDash val="solid"/>
-                      <a:round/>
-                      <a:headEnd type="none" w="med" len="med"/>
-                      <a:tailEnd type="none" w="med" len="med"/>
-                    </a:lnB>
-                  </a:tcPr>
-                </a:tc>
-              </a:tr>
-            </a:tbl>
-          </a:graphicData>
-        </a:graphic>
-      </p:graphicFrame>
+      <p:pic>
+        <p:nvPicPr>
+          <p:cNvPr id="1026" name="Picture 2"/>
+          <p:cNvPicPr>
+            <a:picLocks noChangeAspect="1" noChangeArrowheads="1"/>
+          </p:cNvPicPr>
+          <p:nvPr/>
+        </p:nvPicPr>
+        <p:blipFill>
+          <a:blip r:embed="rId2">
+            <a:extLst>
+              <a:ext uri="{28A0092B-C50C-407E-A947-70E740481C1C}">
+                <a14:useLocalDpi xmlns:a14="http://schemas.microsoft.com/office/drawing/2010/main" val="0"/>
+              </a:ext>
+            </a:extLst>
+          </a:blip>
+          <a:srcRect/>
+          <a:stretch>
+            <a:fillRect/>
+          </a:stretch>
+        </p:blipFill>
+        <p:spPr bwMode="auto">
+          <a:xfrm>
+            <a:off x="1519199" y="188641"/>
+            <a:ext cx="5049722" cy="3024336"/>
+          </a:xfrm>
+          <a:prstGeom prst="rect">
+            <a:avLst/>
+          </a:prstGeom>
+          <a:noFill/>
+          <a:ln>
+            <a:noFill/>
+          </a:ln>
+          <a:effectLst/>
+          <a:extLst>
+            <a:ext uri="{909E8E84-426E-40DD-AFC4-6F175D3DCCD1}">
+              <a14:hiddenFill xmlns:a14="http://schemas.microsoft.com/office/drawing/2010/main">
+                <a:solidFill>
+                  <a:schemeClr val="accent1"/>
+                </a:solidFill>
+              </a14:hiddenFill>
+            </a:ext>
+            <a:ext uri="{91240B29-F687-4F45-9708-019B960494DF}">
+              <a14:hiddenLine xmlns:a14="http://schemas.microsoft.com/office/drawing/2010/main" w="9525">
+                <a:solidFill>
+                  <a:schemeClr val="tx1"/>
+                </a:solidFill>
+                <a:miter lim="800000"/>
+                <a:headEnd/>
+                <a:tailEnd/>
+              </a14:hiddenLine>
+            </a:ext>
+            <a:ext uri="{AF507438-7753-43E0-B8FC-AC1667EBCBE1}">
+              <a14:hiddenEffects xmlns:a14="http://schemas.microsoft.com/office/drawing/2010/main">
+                <a:effectLst>
+                  <a:outerShdw dist="35921" dir="2700000" algn="ctr" rotWithShape="0">
+                    <a:schemeClr val="bg2"/>
+                  </a:outerShdw>
+                </a:effectLst>
+              </a14:hiddenEffects>
+            </a:ext>
+          </a:extLst>
+        </p:spPr>
+      </p:pic>
+      <p:pic>
+        <p:nvPicPr>
+          <p:cNvPr id="4" name="Picture 2"/>
+          <p:cNvPicPr>
+            <a:picLocks noChangeAspect="1" noChangeArrowheads="1"/>
+          </p:cNvPicPr>
+          <p:nvPr/>
+        </p:nvPicPr>
+        <p:blipFill>
+          <a:blip r:embed="rId3">
+            <a:extLst>
+              <a:ext uri="{28A0092B-C50C-407E-A947-70E740481C1C}">
+                <a14:useLocalDpi xmlns:a14="http://schemas.microsoft.com/office/drawing/2010/main" val="0"/>
+              </a:ext>
+            </a:extLst>
+          </a:blip>
+          <a:srcRect/>
+          <a:stretch>
+            <a:fillRect/>
+          </a:stretch>
+        </p:blipFill>
+        <p:spPr bwMode="auto">
+          <a:xfrm>
+            <a:off x="1517938" y="3217718"/>
+            <a:ext cx="5050984" cy="3019594"/>
+          </a:xfrm>
+          <a:prstGeom prst="rect">
+            <a:avLst/>
+          </a:prstGeom>
+          <a:noFill/>
+          <a:ln>
+            <a:noFill/>
+          </a:ln>
+          <a:effectLst/>
+          <a:extLst>
+            <a:ext uri="{909E8E84-426E-40DD-AFC4-6F175D3DCCD1}">
+              <a14:hiddenFill xmlns:a14="http://schemas.microsoft.com/office/drawing/2010/main">
+                <a:solidFill>
+                  <a:schemeClr val="accent1"/>
+                </a:solidFill>
+              </a14:hiddenFill>
+            </a:ext>
+            <a:ext uri="{91240B29-F687-4F45-9708-019B960494DF}">
+              <a14:hiddenLine xmlns:a14="http://schemas.microsoft.com/office/drawing/2010/main" w="9525">
+                <a:solidFill>
+                  <a:schemeClr val="tx1"/>
+                </a:solidFill>
+                <a:miter lim="800000"/>
+                <a:headEnd/>
+                <a:tailEnd/>
+              </a14:hiddenLine>
+            </a:ext>
+            <a:ext uri="{AF507438-7753-43E0-B8FC-AC1667EBCBE1}">
+              <a14:hiddenEffects xmlns:a14="http://schemas.microsoft.com/office/drawing/2010/main">
+                <a:effectLst>
+                  <a:outerShdw dist="35921" dir="2700000" algn="ctr" rotWithShape="0">
+                    <a:schemeClr val="bg2"/>
+                  </a:outerShdw>
+                </a:effectLst>
+              </a14:hiddenEffects>
+            </a:ext>
+          </a:extLst>
+        </p:spPr>
+      </p:pic>
+      <p:sp>
+        <p:nvSpPr>
+          <p:cNvPr id="2" name="Rechteck 1"/>
+          <p:cNvSpPr/>
+          <p:nvPr/>
+        </p:nvSpPr>
+        <p:spPr>
+          <a:xfrm>
+            <a:off x="1475656" y="3140968"/>
+            <a:ext cx="5184577" cy="144016"/>
+          </a:xfrm>
+          <a:prstGeom prst="rect">
+            <a:avLst/>
+          </a:prstGeom>
+          <a:solidFill>
+            <a:schemeClr val="bg1"/>
+          </a:solidFill>
+          <a:ln>
+            <a:noFill/>
+          </a:ln>
+        </p:spPr>
+        <p:style>
+          <a:lnRef idx="2">
+            <a:schemeClr val="accent1">
+              <a:shade val="50000"/>
+            </a:schemeClr>
+          </a:lnRef>
+          <a:fillRef idx="1">
+            <a:schemeClr val="accent1"/>
+          </a:fillRef>
+          <a:effectRef idx="0">
+            <a:schemeClr val="accent1"/>
+          </a:effectRef>
+          <a:fontRef idx="minor">
+            <a:schemeClr val="lt1"/>
+          </a:fontRef>
+        </p:style>
+        <p:txBody>
+          <a:bodyPr rtlCol="0" anchor="ctr"/>
+          <a:lstStyle/>
+          <a:p>
+            <a:pPr algn="ctr"/>
+            <a:endParaRPr lang="de-DE"/>
+          </a:p>
+        </p:txBody>
+      </p:sp>
+      <p:sp>
+        <p:nvSpPr>
+          <p:cNvPr id="9" name="Rechteck 8"/>
+          <p:cNvSpPr/>
+          <p:nvPr/>
+        </p:nvSpPr>
+        <p:spPr>
+          <a:xfrm>
+            <a:off x="1619673" y="6165303"/>
+            <a:ext cx="4896541" cy="144018"/>
+          </a:xfrm>
+          <a:prstGeom prst="rect">
+            <a:avLst/>
+          </a:prstGeom>
+          <a:solidFill>
+            <a:schemeClr val="bg1"/>
+          </a:solidFill>
+          <a:ln>
+            <a:noFill/>
+          </a:ln>
+        </p:spPr>
+        <p:style>
+          <a:lnRef idx="2">
+            <a:schemeClr val="accent1">
+              <a:shade val="50000"/>
+            </a:schemeClr>
+          </a:lnRef>
+          <a:fillRef idx="1">
+            <a:schemeClr val="accent1"/>
+          </a:fillRef>
+          <a:effectRef idx="0">
+            <a:schemeClr val="accent1"/>
+          </a:effectRef>
+          <a:fontRef idx="minor">
+            <a:schemeClr val="lt1"/>
+          </a:fontRef>
+        </p:style>
+        <p:txBody>
+          <a:bodyPr rtlCol="0" anchor="ctr"/>
+          <a:lstStyle/>
+          <a:p>
+            <a:pPr algn="ctr"/>
+            <a:endParaRPr lang="de-DE"/>
+          </a:p>
+        </p:txBody>
+      </p:sp>
+      <p:sp>
+        <p:nvSpPr>
+          <p:cNvPr id="10" name="Rechteck 9"/>
+          <p:cNvSpPr/>
+          <p:nvPr/>
+        </p:nvSpPr>
+        <p:spPr>
+          <a:xfrm>
+            <a:off x="1475656" y="116632"/>
+            <a:ext cx="5184577" cy="144016"/>
+          </a:xfrm>
+          <a:prstGeom prst="rect">
+            <a:avLst/>
+          </a:prstGeom>
+          <a:solidFill>
+            <a:schemeClr val="bg1"/>
+          </a:solidFill>
+          <a:ln>
+            <a:noFill/>
+          </a:ln>
+        </p:spPr>
+        <p:style>
+          <a:lnRef idx="2">
+            <a:schemeClr val="accent1">
+              <a:shade val="50000"/>
+            </a:schemeClr>
+          </a:lnRef>
+          <a:fillRef idx="1">
+            <a:schemeClr val="accent1"/>
+          </a:fillRef>
+          <a:effectRef idx="0">
+            <a:schemeClr val="accent1"/>
+          </a:effectRef>
+          <a:fontRef idx="minor">
+            <a:schemeClr val="lt1"/>
+          </a:fontRef>
+        </p:style>
+        <p:txBody>
+          <a:bodyPr rtlCol="0" anchor="ctr"/>
+          <a:lstStyle/>
+          <a:p>
+            <a:pPr algn="ctr"/>
+            <a:endParaRPr lang="de-DE"/>
+          </a:p>
+        </p:txBody>
+      </p:sp>
+      <p:sp>
+        <p:nvSpPr>
+          <p:cNvPr id="11" name="Rechteck 10"/>
+          <p:cNvSpPr/>
+          <p:nvPr/>
+        </p:nvSpPr>
+        <p:spPr>
+          <a:xfrm rot="5400000">
+            <a:off x="3563888" y="3140967"/>
+            <a:ext cx="6048672" cy="144017"/>
+          </a:xfrm>
+          <a:prstGeom prst="rect">
+            <a:avLst/>
+          </a:prstGeom>
+          <a:solidFill>
+            <a:schemeClr val="bg1"/>
+          </a:solidFill>
+          <a:ln>
+            <a:noFill/>
+          </a:ln>
+        </p:spPr>
+        <p:style>
+          <a:lnRef idx="2">
+            <a:schemeClr val="accent1">
+              <a:shade val="50000"/>
+            </a:schemeClr>
+          </a:lnRef>
+          <a:fillRef idx="1">
+            <a:schemeClr val="accent1"/>
+          </a:fillRef>
+          <a:effectRef idx="0">
+            <a:schemeClr val="accent1"/>
+          </a:effectRef>
+          <a:fontRef idx="minor">
+            <a:schemeClr val="lt1"/>
+          </a:fontRef>
+        </p:style>
+        <p:txBody>
+          <a:bodyPr rtlCol="0" anchor="ctr"/>
+          <a:lstStyle/>
+          <a:p>
+            <a:pPr algn="ctr"/>
+            <a:endParaRPr lang="de-DE"/>
+          </a:p>
+        </p:txBody>
+      </p:sp>
+      <p:sp>
+        <p:nvSpPr>
+          <p:cNvPr id="12" name="Rechteck 11"/>
+          <p:cNvSpPr/>
+          <p:nvPr/>
+        </p:nvSpPr>
+        <p:spPr>
+          <a:xfrm rot="5400000">
+            <a:off x="-1476671" y="3212976"/>
+            <a:ext cx="6048672" cy="144017"/>
+          </a:xfrm>
+          <a:prstGeom prst="rect">
+            <a:avLst/>
+          </a:prstGeom>
+          <a:solidFill>
+            <a:schemeClr val="bg1"/>
+          </a:solidFill>
+          <a:ln>
+            <a:noFill/>
+          </a:ln>
+        </p:spPr>
+        <p:style>
+          <a:lnRef idx="2">
+            <a:schemeClr val="accent1">
+              <a:shade val="50000"/>
+            </a:schemeClr>
+          </a:lnRef>
+          <a:fillRef idx="1">
+            <a:schemeClr val="accent1"/>
+          </a:fillRef>
+          <a:effectRef idx="0">
+            <a:schemeClr val="accent1"/>
+          </a:effectRef>
+          <a:fontRef idx="minor">
+            <a:schemeClr val="lt1"/>
+          </a:fontRef>
+        </p:style>
+        <p:txBody>
+          <a:bodyPr rtlCol="0" anchor="ctr"/>
+          <a:lstStyle/>
+          <a:p>
+            <a:pPr algn="ctr"/>
+            <a:endParaRPr lang="de-DE"/>
+          </a:p>
+        </p:txBody>
+      </p:sp>
     </p:spTree>
     <p:extLst>
       <p:ext uri="{BB962C8B-B14F-4D97-AF65-F5344CB8AC3E}">

</xml_diff>

<commit_message>
methodlength bug fixed, first gloassary
</commit_message>
<xml_diff>
--- a/text/images/illustrations.pptx
+++ b/text/images/illustrations.pptx
@@ -205,7 +205,7 @@
           <a:p>
             <a:fld id="{7C9ABC5C-FC58-4AE2-89F8-727F30362B08}" type="datetimeFigureOut">
               <a:rPr lang="de-DE" smtClean="0"/>
-              <a:t>15.08.2012</a:t>
+              <a:t>16.08.2012</a:t>
             </a:fld>
             <a:endParaRPr lang="de-DE"/>
           </a:p>
@@ -1326,7 +1326,7 @@
           <a:p>
             <a:fld id="{5430F42D-6984-4A4E-9090-AA314D14663F}" type="datetimeFigureOut">
               <a:rPr lang="de-DE" smtClean="0"/>
-              <a:t>15.08.2012</a:t>
+              <a:t>16.08.2012</a:t>
             </a:fld>
             <a:endParaRPr lang="de-DE"/>
           </a:p>
@@ -1496,7 +1496,7 @@
           <a:p>
             <a:fld id="{5430F42D-6984-4A4E-9090-AA314D14663F}" type="datetimeFigureOut">
               <a:rPr lang="de-DE" smtClean="0"/>
-              <a:t>15.08.2012</a:t>
+              <a:t>16.08.2012</a:t>
             </a:fld>
             <a:endParaRPr lang="de-DE"/>
           </a:p>
@@ -1676,7 +1676,7 @@
           <a:p>
             <a:fld id="{5430F42D-6984-4A4E-9090-AA314D14663F}" type="datetimeFigureOut">
               <a:rPr lang="de-DE" smtClean="0"/>
-              <a:t>15.08.2012</a:t>
+              <a:t>16.08.2012</a:t>
             </a:fld>
             <a:endParaRPr lang="de-DE"/>
           </a:p>
@@ -1846,7 +1846,7 @@
           <a:p>
             <a:fld id="{5430F42D-6984-4A4E-9090-AA314D14663F}" type="datetimeFigureOut">
               <a:rPr lang="de-DE" smtClean="0"/>
-              <a:t>15.08.2012</a:t>
+              <a:t>16.08.2012</a:t>
             </a:fld>
             <a:endParaRPr lang="de-DE"/>
           </a:p>
@@ -2092,7 +2092,7 @@
           <a:p>
             <a:fld id="{5430F42D-6984-4A4E-9090-AA314D14663F}" type="datetimeFigureOut">
               <a:rPr lang="de-DE" smtClean="0"/>
-              <a:t>15.08.2012</a:t>
+              <a:t>16.08.2012</a:t>
             </a:fld>
             <a:endParaRPr lang="de-DE"/>
           </a:p>
@@ -2380,7 +2380,7 @@
           <a:p>
             <a:fld id="{5430F42D-6984-4A4E-9090-AA314D14663F}" type="datetimeFigureOut">
               <a:rPr lang="de-DE" smtClean="0"/>
-              <a:t>15.08.2012</a:t>
+              <a:t>16.08.2012</a:t>
             </a:fld>
             <a:endParaRPr lang="de-DE"/>
           </a:p>
@@ -2802,7 +2802,7 @@
           <a:p>
             <a:fld id="{5430F42D-6984-4A4E-9090-AA314D14663F}" type="datetimeFigureOut">
               <a:rPr lang="de-DE" smtClean="0"/>
-              <a:t>15.08.2012</a:t>
+              <a:t>16.08.2012</a:t>
             </a:fld>
             <a:endParaRPr lang="de-DE"/>
           </a:p>
@@ -2920,7 +2920,7 @@
           <a:p>
             <a:fld id="{5430F42D-6984-4A4E-9090-AA314D14663F}" type="datetimeFigureOut">
               <a:rPr lang="de-DE" smtClean="0"/>
-              <a:t>15.08.2012</a:t>
+              <a:t>16.08.2012</a:t>
             </a:fld>
             <a:endParaRPr lang="de-DE"/>
           </a:p>
@@ -3015,7 +3015,7 @@
           <a:p>
             <a:fld id="{5430F42D-6984-4A4E-9090-AA314D14663F}" type="datetimeFigureOut">
               <a:rPr lang="de-DE" smtClean="0"/>
-              <a:t>15.08.2012</a:t>
+              <a:t>16.08.2012</a:t>
             </a:fld>
             <a:endParaRPr lang="de-DE"/>
           </a:p>
@@ -3292,7 +3292,7 @@
           <a:p>
             <a:fld id="{5430F42D-6984-4A4E-9090-AA314D14663F}" type="datetimeFigureOut">
               <a:rPr lang="de-DE" smtClean="0"/>
-              <a:t>15.08.2012</a:t>
+              <a:t>16.08.2012</a:t>
             </a:fld>
             <a:endParaRPr lang="de-DE"/>
           </a:p>
@@ -3545,7 +3545,7 @@
           <a:p>
             <a:fld id="{5430F42D-6984-4A4E-9090-AA314D14663F}" type="datetimeFigureOut">
               <a:rPr lang="de-DE" smtClean="0"/>
-              <a:t>15.08.2012</a:t>
+              <a:t>16.08.2012</a:t>
             </a:fld>
             <a:endParaRPr lang="de-DE"/>
           </a:p>
@@ -3758,7 +3758,7 @@
           <a:p>
             <a:fld id="{5430F42D-6984-4A4E-9090-AA314D14663F}" type="datetimeFigureOut">
               <a:rPr lang="de-DE" smtClean="0"/>
-              <a:t>15.08.2012</a:t>
+              <a:t>16.08.2012</a:t>
             </a:fld>
             <a:endParaRPr lang="de-DE"/>
           </a:p>
@@ -7018,7 +7018,7 @@
       </p:grpSpPr>
       <p:pic>
         <p:nvPicPr>
-          <p:cNvPr id="1026" name="Picture 2"/>
+          <p:cNvPr id="1027" name="Picture 3"/>
           <p:cNvPicPr>
             <a:picLocks noChangeAspect="1" noChangeArrowheads="1"/>
           </p:cNvPicPr>
@@ -7039,8 +7039,8 @@
         </p:blipFill>
         <p:spPr bwMode="auto">
           <a:xfrm>
-            <a:off x="1519199" y="188641"/>
-            <a:ext cx="5049722" cy="3024336"/>
+            <a:off x="1517939" y="3141724"/>
+            <a:ext cx="5057650" cy="3023580"/>
           </a:xfrm>
           <a:prstGeom prst="rect">
             <a:avLst/>
@@ -7082,7 +7082,7 @@
       </p:pic>
       <p:pic>
         <p:nvPicPr>
-          <p:cNvPr id="4" name="Picture 2"/>
+          <p:cNvPr id="3" name="Picture 2"/>
           <p:cNvPicPr>
             <a:picLocks noChangeAspect="1" noChangeArrowheads="1"/>
           </p:cNvPicPr>
@@ -7103,8 +7103,8 @@
         </p:blipFill>
         <p:spPr bwMode="auto">
           <a:xfrm>
-            <a:off x="1517938" y="3217718"/>
-            <a:ext cx="5050984" cy="3019594"/>
+            <a:off x="1517939" y="188642"/>
+            <a:ext cx="5050982" cy="3025090"/>
           </a:xfrm>
           <a:prstGeom prst="rect">
             <a:avLst/>
@@ -7198,8 +7198,8 @@
         </p:nvSpPr>
         <p:spPr>
           <a:xfrm>
-            <a:off x="1619673" y="6165303"/>
-            <a:ext cx="4896541" cy="144018"/>
+            <a:off x="1583951" y="6122324"/>
+            <a:ext cx="4932263" cy="144018"/>
           </a:xfrm>
           <a:prstGeom prst="rect">
             <a:avLst/>
@@ -7336,7 +7336,7 @@
         </p:nvSpPr>
         <p:spPr>
           <a:xfrm rot="5400000">
-            <a:off x="-1476671" y="3212976"/>
+            <a:off x="-1512394" y="3212976"/>
             <a:ext cx="6048672" cy="144017"/>
           </a:xfrm>
           <a:prstGeom prst="rect">

</xml_diff>